<commit_message>
reports: Insecure File Upload ppt done
</commit_message>
<xml_diff>
--- a/reports/Lifestyle Store/LifeStyle Store Application Reports.pptx
+++ b/reports/Lifestyle Store/LifeStyle Store Application Reports.pptx
@@ -5972,22 +5972,7 @@
           <a:p>
             <a:r>
               <a:rPr lang="en-US"/>
-              <a:t>2.</a:t>
-            </a:r>
-            <a:r>
-              <a:rPr lang="en-US" u="sng">
-                <a:solidFill>
-                  <a:schemeClr val="accent1"/>
-                </a:solidFill>
-                <a:effectLst>
-                  <a:outerShdw blurRad="38100" dist="25400" dir="5400000" algn="ctr" rotWithShape="0">
-                    <a:srgbClr val="6E747A">
-                      <a:alpha val="43000"/>
-                    </a:srgbClr>
-                  </a:outerShdw>
-                </a:effectLst>
-              </a:rPr>
-              <a:t>Arbitrary File Upload Vulnerability</a:t>
+              <a:t>2. Insecure File Uploads</a:t>
             </a:r>
             <a:endParaRPr lang="en-US" u="sng">
               <a:solidFill>
@@ -6271,7 +6256,7 @@
                           <a:cs typeface="Calibri" panose="020F0502020204030204" charset="0"/>
                           <a:sym typeface="Arial" panose="020B0604020202020204"/>
                         </a:rPr>
-                        <a:t>http://52.66.198.61/wondercms/</a:t>
+                        <a:t>http://13.233.207.87/wondercms/</a:t>
                       </a:r>
                       <a:endParaRPr lang="en-US" sz="1300" b="0" i="0" u="none" strike="noStrike" dirty="0" smtClean="0">
                         <a:solidFill>
@@ -6499,18 +6484,10 @@
           <a:bodyPr/>
           <a:p>
             <a:r>
-              <a:rPr lang="en-US" u="sng">
-                <a:ln w="22225">
-                  <a:solidFill>
-                    <a:schemeClr val="accent2"/>
-                  </a:solidFill>
-                  <a:prstDash val="solid"/>
-                </a:ln>
+              <a:rPr lang="en-US" b="1">
+                <a:ln/>
                 <a:solidFill>
-                  <a:schemeClr val="accent2">
-                    <a:lumMod val="40000"/>
-                    <a:lumOff val="60000"/>
-                  </a:schemeClr>
+                  <a:schemeClr val="tx1"/>
                 </a:solidFill>
                 <a:effectLst/>
               </a:rPr>
@@ -6551,14 +6528,16 @@
           </a:xfrm>
         </p:spPr>
         <p:txBody>
-          <a:bodyPr/>
+          <a:bodyPr>
+            <a:normAutofit lnSpcReduction="20000"/>
+          </a:bodyPr>
           <a:p>
             <a:pPr marL="0" indent="0">
               <a:buNone/>
             </a:pPr>
             <a:r>
               <a:rPr lang="en-US"/>
-              <a:t>When we click on blog option, and login to the admin panel we see file upload option in settings,where we can upload</a:t>
+              <a:t>When we click on blog option, and login to the admin panel using password admin, we see file upload option in settings,where we can upload</a:t>
             </a:r>
             <a:r>
               <a:rPr lang="en-US" i="1">
@@ -6588,7 +6567,7 @@
       </p:sp>
       <p:pic>
         <p:nvPicPr>
-          <p:cNvPr id="4" name="Content Placeholder 3" descr="this one here"/>
+          <p:cNvPr id="6" name="Content Placeholder 5" descr="observation"/>
           <p:cNvPicPr>
             <a:picLocks noChangeAspect="1"/>
           </p:cNvPicPr>
@@ -6604,8 +6583,8 @@
         </p:blipFill>
         <p:spPr>
           <a:xfrm>
-            <a:off x="1367155" y="2948940"/>
-            <a:ext cx="9277985" cy="3620135"/>
+            <a:off x="1110615" y="2949575"/>
+            <a:ext cx="9178925" cy="3501390"/>
           </a:xfrm>
           <a:prstGeom prst="rect">
             <a:avLst/>
@@ -6642,7 +6621,7 @@
         </p:nvSpPr>
         <p:spPr>
           <a:xfrm>
-            <a:off x="675640" y="-224155"/>
+            <a:off x="675640" y="-165735"/>
             <a:ext cx="10515600" cy="1325563"/>
           </a:xfrm>
         </p:spPr>
@@ -6652,14 +6631,22 @@
           </a:bodyPr>
           <a:p>
             <a:r>
-              <a:rPr lang="en-US" u="sng"/>
-              <a:t>Proof of Concept(PoC)</a:t>
-            </a:r>
-            <a:r>
-              <a:rPr lang="en-US"/>
-              <a:t>:</a:t>
-            </a:r>
-            <a:endParaRPr lang="en-US"/>
+              <a:rPr lang="en-US" b="1">
+                <a:ln/>
+                <a:solidFill>
+                  <a:schemeClr val="tx1"/>
+                </a:solidFill>
+                <a:effectLst/>
+              </a:rPr>
+              <a:t>Proof of Concept(PoC):</a:t>
+            </a:r>
+            <a:endParaRPr lang="en-US" b="1">
+              <a:ln/>
+              <a:solidFill>
+                <a:schemeClr val="tx1"/>
+              </a:solidFill>
+              <a:effectLst/>
+            </a:endParaRPr>
           </a:p>
         </p:txBody>
       </p:sp>
@@ -6694,7 +6681,7 @@
       </p:sp>
       <p:pic>
         <p:nvPicPr>
-          <p:cNvPr id="7" name="Content Placeholder 6" descr="this the one"/>
+          <p:cNvPr id="4" name="Content Placeholder 3" descr="POC"/>
           <p:cNvPicPr>
             <a:picLocks noChangeAspect="1"/>
           </p:cNvPicPr>
@@ -6710,8 +6697,8 @@
         </p:blipFill>
         <p:spPr>
           <a:xfrm>
-            <a:off x="1170305" y="1614170"/>
-            <a:ext cx="9852660" cy="5280660"/>
+            <a:off x="971550" y="1825625"/>
+            <a:ext cx="10675620" cy="4533265"/>
           </a:xfrm>
           <a:prstGeom prst="rect">
             <a:avLst/>
@@ -6751,34 +6738,20 @@
           <a:bodyPr/>
           <a:p>
             <a:r>
-              <a:rPr lang="en-US" u="sng">
-                <a:gradFill>
-                  <a:gsLst>
-                    <a:gs pos="21000">
-                      <a:srgbClr val="53575C"/>
-                    </a:gs>
-                    <a:gs pos="88000">
-                      <a:srgbClr val="C5C7CA"/>
-                    </a:gs>
-                  </a:gsLst>
-                  <a:lin ang="5400000"/>
-                </a:gradFill>
+              <a:rPr lang="en-US" b="1">
+                <a:ln/>
+                <a:solidFill>
+                  <a:schemeClr val="tx1"/>
+                </a:solidFill>
                 <a:effectLst/>
               </a:rPr>
               <a:t>Business Impact(High):</a:t>
             </a:r>
-            <a:endParaRPr lang="en-US" u="sng">
-              <a:gradFill>
-                <a:gsLst>
-                  <a:gs pos="21000">
-                    <a:srgbClr val="53575C"/>
-                  </a:gs>
-                  <a:gs pos="88000">
-                    <a:srgbClr val="C5C7CA"/>
-                  </a:gs>
-                </a:gsLst>
-                <a:lin ang="5400000"/>
-              </a:gradFill>
+            <a:endParaRPr lang="en-US" b="1">
+              <a:ln/>
+              <a:solidFill>
+                <a:schemeClr val="tx1"/>
+              </a:solidFill>
               <a:effectLst/>
             </a:endParaRPr>
           </a:p>
@@ -6869,43 +6842,21 @@
           <a:bodyPr/>
           <a:p>
             <a:r>
-              <a:rPr lang="en-US" u="sng">
-                <a:ln w="10160">
-                  <a:solidFill>
-                    <a:schemeClr val="accent5"/>
-                  </a:solidFill>
-                  <a:prstDash val="solid"/>
-                </a:ln>
+              <a:rPr lang="en-US" b="1">
+                <a:ln/>
                 <a:solidFill>
-                  <a:srgbClr val="FFFFFF"/>
+                  <a:schemeClr val="tx1"/>
                 </a:solidFill>
-                <a:effectLst>
-                  <a:outerShdw blurRad="38100" dist="22860" dir="5400000" algn="tl" rotWithShape="0">
-                    <a:srgbClr val="000000">
-                      <a:alpha val="30000"/>
-                    </a:srgbClr>
-                  </a:outerShdw>
-                </a:effectLst>
+                <a:effectLst/>
               </a:rPr>
               <a:t>Recommendations:</a:t>
             </a:r>
-            <a:endParaRPr lang="en-US" u="sng">
-              <a:ln w="10160">
-                <a:solidFill>
-                  <a:schemeClr val="accent5"/>
-                </a:solidFill>
-                <a:prstDash val="solid"/>
-              </a:ln>
+            <a:endParaRPr lang="en-US" b="1">
+              <a:ln/>
               <a:solidFill>
-                <a:srgbClr val="FFFFFF"/>
+                <a:schemeClr val="tx1"/>
               </a:solidFill>
-              <a:effectLst>
-                <a:outerShdw blurRad="38100" dist="22860" dir="5400000" algn="tl" rotWithShape="0">
-                  <a:srgbClr val="000000">
-                    <a:alpha val="30000"/>
-                  </a:srgbClr>
-                </a:outerShdw>
-              </a:effectLst>
+              <a:effectLst/>
             </a:endParaRPr>
           </a:p>
         </p:txBody>
@@ -7016,31 +6967,21 @@
           <a:bodyPr/>
           <a:p>
             <a:r>
-              <a:rPr lang="en-US" u="sng">
+              <a:rPr lang="en-US" b="1">
+                <a:ln/>
                 <a:solidFill>
-                  <a:schemeClr val="accent1"/>
+                  <a:schemeClr val="tx1"/>
                 </a:solidFill>
-                <a:effectLst>
-                  <a:outerShdw blurRad="38100" dist="25400" dir="5400000" algn="ctr" rotWithShape="0">
-                    <a:srgbClr val="6E747A">
-                      <a:alpha val="43000"/>
-                    </a:srgbClr>
-                  </a:outerShdw>
-                </a:effectLst>
+                <a:effectLst/>
               </a:rPr>
               <a:t>References:</a:t>
             </a:r>
-            <a:endParaRPr lang="en-US" u="sng">
+            <a:endParaRPr lang="en-US" b="1">
+              <a:ln/>
               <a:solidFill>
-                <a:schemeClr val="accent1"/>
+                <a:schemeClr val="tx1"/>
               </a:solidFill>
-              <a:effectLst>
-                <a:outerShdw blurRad="38100" dist="25400" dir="5400000" algn="ctr" rotWithShape="0">
-                  <a:srgbClr val="6E747A">
-                    <a:alpha val="43000"/>
-                  </a:srgbClr>
-                </a:outerShdw>
-              </a:effectLst>
+              <a:effectLst/>
             </a:endParaRPr>
           </a:p>
         </p:txBody>

</xml_diff>

<commit_message>
reports: File Inclusion Vulnerabilities ppt done
</commit_message>
<xml_diff>
--- a/reports/Lifestyle Store/LifeStyle Store Application Reports.pptx
+++ b/reports/Lifestyle Store/LifeStyle Store Application Reports.pptx
@@ -6103,7 +6103,7 @@
                           </a:solidFill>
                           <a:latin typeface="Calibri" panose="020F0502020204030204" charset="0"/>
                         </a:rPr>
-                        <a:t>Arbitrary File Upload</a:t>
+                        <a:t>Insecure File Uploads</a:t>
                       </a:r>
                       <a:endParaRPr lang="en-US" sz="1600" dirty="0">
                         <a:solidFill>
@@ -7215,38 +7215,22 @@
         </p:nvSpPr>
         <p:spPr/>
         <p:txBody>
-          <a:bodyPr>
-            <a:scene3d>
-              <a:camera prst="orthographicFront"/>
-              <a:lightRig rig="soft" dir="t">
-                <a:rot lat="0" lon="0" rev="15600000"/>
-              </a:lightRig>
-            </a:scene3d>
-            <a:sp3d extrusionH="57150" prstMaterial="softEdge">
-              <a:bevelT w="25400" h="38100"/>
-            </a:sp3d>
-          </a:bodyPr>
-          <a:p>
-            <a:r>
-              <a:rPr lang="en-US">
+          <a:bodyPr/>
+          <a:p>
+            <a:r>
+              <a:rPr lang="en-US" b="1">
+                <a:ln/>
                 <a:solidFill>
-                  <a:schemeClr val="accent4"/>
-                </a:solidFill>
-              </a:rPr>
-              <a:t>3.</a:t>
-            </a:r>
-            <a:r>
-              <a:rPr lang="en-US" u="sng">
-                <a:solidFill>
-                  <a:schemeClr val="accent4"/>
+                  <a:schemeClr val="tx1"/>
                 </a:solidFill>
                 <a:effectLst/>
               </a:rPr>
-              <a:t>Access to admin panel :</a:t>
-            </a:r>
-            <a:endParaRPr lang="en-US" u="sng">
+              <a:t>3. File Inclusion Vulnerabilities</a:t>
+            </a:r>
+            <a:endParaRPr lang="en-US" b="1" u="sng">
+              <a:ln/>
               <a:solidFill>
-                <a:schemeClr val="accent4"/>
+                <a:schemeClr val="tx1"/>
               </a:solidFill>
               <a:effectLst/>
             </a:endParaRPr>
@@ -7528,7 +7512,7 @@
                           <a:cs typeface="Calibri" panose="020F0502020204030204" charset="0"/>
                           <a:sym typeface="Arial" panose="020B0604020202020204"/>
                         </a:rPr>
-                        <a:t>http://52.66.198.61/wondercms/loginURL</a:t>
+                        <a:t>http://35.154.118.58</a:t>
                       </a:r>
                       <a:endParaRPr lang="en-US" sz="1300" b="0" i="0" u="none" strike="noStrike" dirty="0" smtClean="0">
                         <a:solidFill>
@@ -7539,42 +7523,6 @@
                         <a:ea typeface="+mn-ea"/>
                         <a:cs typeface="Calibri" panose="020F0502020204030204" charset="0"/>
                         <a:sym typeface="Arial" panose="020B0604020202020204"/>
-                      </a:endParaRPr>
-                    </a:p>
-                    <a:p>
-                      <a:pPr indent="0">
-                        <a:buFont typeface="Arial" panose="020B0604020202020204" pitchFamily="34" charset="0"/>
-                        <a:buNone/>
-                      </a:pPr>
-                      <a:endParaRPr lang="en-US" sz="1300" b="0" dirty="0" smtClean="0">
-                        <a:solidFill>
-                          <a:schemeClr val="tx1"/>
-                        </a:solidFill>
-                        <a:latin typeface="Calibri" panose="020F0502020204030204" charset="0"/>
-                      </a:endParaRPr>
-                    </a:p>
-                    <a:p>
-                      <a:pPr marL="0" marR="0" indent="0" defTabSz="914400" eaLnBrk="1" fontAlgn="auto" latinLnBrk="0" hangingPunct="1">
-                        <a:lnSpc>
-                          <a:spcPct val="100000"/>
-                        </a:lnSpc>
-                        <a:spcBef>
-                          <a:spcPts val="0"/>
-                        </a:spcBef>
-                        <a:spcAft>
-                          <a:spcPts val="0"/>
-                        </a:spcAft>
-                        <a:buClrTx/>
-                        <a:buSzTx/>
-                        <a:buFont typeface="Arial" panose="020B0604020202020204" pitchFamily="34" charset="0"/>
-                        <a:buNone/>
-                        <a:defRPr/>
-                      </a:pPr>
-                      <a:endParaRPr lang="en-US" sz="1300" b="0" dirty="0" smtClean="0">
-                        <a:solidFill>
-                          <a:schemeClr val="tx1"/>
-                        </a:solidFill>
-                        <a:latin typeface="Calibri" panose="020F0502020204030204" charset="0"/>
                       </a:endParaRPr>
                     </a:p>
                     <a:p>
@@ -7694,34 +7642,20 @@
           <a:bodyPr/>
           <a:p>
             <a:r>
-              <a:rPr lang="en-US" u="sng">
-                <a:gradFill>
-                  <a:gsLst>
-                    <a:gs pos="21000">
-                      <a:srgbClr val="53575C"/>
-                    </a:gs>
-                    <a:gs pos="88000">
-                      <a:srgbClr val="C5C7CA"/>
-                    </a:gs>
-                  </a:gsLst>
-                  <a:lin ang="5400000"/>
-                </a:gradFill>
+              <a:rPr lang="en-US" b="1">
+                <a:ln/>
+                <a:solidFill>
+                  <a:schemeClr val="tx1"/>
+                </a:solidFill>
                 <a:effectLst/>
               </a:rPr>
               <a:t>Observation:</a:t>
             </a:r>
-            <a:endParaRPr lang="en-US" u="sng">
-              <a:gradFill>
-                <a:gsLst>
-                  <a:gs pos="21000">
-                    <a:srgbClr val="53575C"/>
-                  </a:gs>
-                  <a:gs pos="88000">
-                    <a:srgbClr val="C5C7CA"/>
-                  </a:gs>
-                </a:gsLst>
-                <a:lin ang="5400000"/>
-              </a:gradFill>
+            <a:endParaRPr lang="en-US" b="1">
+              <a:ln/>
+              <a:solidFill>
+                <a:schemeClr val="tx1"/>
+              </a:solidFill>
               <a:effectLst/>
             </a:endParaRPr>
           </a:p>
@@ -7740,7 +7674,7 @@
         <p:spPr>
           <a:xfrm>
             <a:off x="785495" y="1427480"/>
-            <a:ext cx="10621010" cy="1285240"/>
+            <a:ext cx="10621010" cy="620395"/>
           </a:xfrm>
         </p:spPr>
         <p:txBody>
@@ -7750,16 +7684,22 @@
               <a:buNone/>
             </a:pPr>
             <a:r>
-              <a:rPr lang="en-US"/>
-              <a:t>When we open 'http://52.66.198.61/wondercms/ ' url ,we get the password on the page and login as admin in the url 'http://52.66.198.61/wondercms/loginURL' :</a:t>
-            </a:r>
-            <a:endParaRPr lang="en-US"/>
+              <a:rPr lang="en-US" sz="2400"/>
+              <a:t>Check if the index.php file exists in the URL. ie. http://13.232.248.46/index.php.</a:t>
+            </a:r>
+            <a:endParaRPr lang="en-US" sz="2400"/>
+          </a:p>
+          <a:p>
+            <a:pPr marL="0" indent="0">
+              <a:buNone/>
+            </a:pPr>
+            <a:endParaRPr lang="en-US" sz="2400"/>
           </a:p>
         </p:txBody>
       </p:sp>
       <p:pic>
         <p:nvPicPr>
-          <p:cNvPr id="4" name="Content Placeholder 3" descr="Capture"/>
+          <p:cNvPr id="6" name="Content Placeholder 5" descr="observation-index.php"/>
           <p:cNvPicPr>
             <a:picLocks noChangeAspect="1"/>
           </p:cNvPicPr>
@@ -7775,8 +7715,8 @@
         </p:blipFill>
         <p:spPr>
           <a:xfrm>
-            <a:off x="955675" y="2901315"/>
-            <a:ext cx="10450195" cy="3334385"/>
+            <a:off x="1035050" y="1905635"/>
+            <a:ext cx="9427210" cy="4225925"/>
           </a:xfrm>
           <a:prstGeom prst="rect">
             <a:avLst/>
@@ -7816,10 +7756,22 @@
           <a:bodyPr/>
           <a:p>
             <a:r>
-              <a:rPr lang="en-US" u="sng"/>
+              <a:rPr lang="en-US" b="1">
+                <a:ln/>
+                <a:solidFill>
+                  <a:schemeClr val="tx1"/>
+                </a:solidFill>
+                <a:effectLst/>
+              </a:rPr>
               <a:t>Proof Of Concept(PoC):</a:t>
             </a:r>
-            <a:endParaRPr lang="en-US" u="sng"/>
+            <a:endParaRPr lang="en-US" b="1">
+              <a:ln/>
+              <a:solidFill>
+                <a:schemeClr val="tx1"/>
+              </a:solidFill>
+              <a:effectLst/>
+            </a:endParaRPr>
           </a:p>
         </p:txBody>
       </p:sp>
@@ -7835,21 +7787,27 @@
         </p:nvSpPr>
         <p:spPr>
           <a:xfrm>
-            <a:off x="838200" y="1825625"/>
-            <a:ext cx="9692640" cy="1065530"/>
+            <a:off x="838200" y="1489710"/>
+            <a:ext cx="10516235" cy="1210945"/>
           </a:xfrm>
         </p:spPr>
         <p:txBody>
           <a:bodyPr>
-            <a:normAutofit/>
+            <a:normAutofit fontScale="70000"/>
           </a:bodyPr>
           <a:p>
-            <a:pPr marL="0" indent="0">
+            <a:pPr marL="0" indent="0" algn="l">
               <a:buNone/>
             </a:pPr>
             <a:r>
               <a:rPr lang="en-US"/>
-              <a:t>We can change password making the actual admin unable to login the next time .We can also add and delete pages:</a:t>
+              <a:t>Change the url to "http://13.232.248.46/?includelang=http://13.232.248.46/wondercms/files/b374kmini.php". W</a:t>
+            </a:r>
+            <a:r>
+              <a:rPr lang="en-US">
+                <a:sym typeface="+mn-ea"/>
+              </a:rPr>
+              <a:t>e get the acces to directories by typing commands in the shell option and much more .</a:t>
             </a:r>
             <a:endParaRPr lang="en-US"/>
           </a:p>
@@ -7857,7 +7815,7 @@
       </p:sp>
       <p:pic>
         <p:nvPicPr>
-          <p:cNvPr id="5" name="Content Placeholder 4" descr="Capture"/>
+          <p:cNvPr id="7" name="Content Placeholder 6" descr="POC"/>
           <p:cNvPicPr>
             <a:picLocks noChangeAspect="1"/>
           </p:cNvPicPr>
@@ -7873,32 +7831,8 @@
         </p:blipFill>
         <p:spPr>
           <a:xfrm>
-            <a:off x="1274445" y="3185160"/>
-            <a:ext cx="4163060" cy="2102485"/>
-          </a:xfrm>
-          <a:prstGeom prst="rect">
-            <a:avLst/>
-          </a:prstGeom>
-        </p:spPr>
-      </p:pic>
-      <p:pic>
-        <p:nvPicPr>
-          <p:cNvPr id="6" name="Picture 5" descr="Capture2"/>
-          <p:cNvPicPr>
-            <a:picLocks noChangeAspect="1"/>
-          </p:cNvPicPr>
-          <p:nvPr/>
-        </p:nvPicPr>
-        <p:blipFill>
-          <a:blip r:embed="rId2"/>
-          <a:stretch>
-            <a:fillRect/>
-          </a:stretch>
-        </p:blipFill>
-        <p:spPr>
-          <a:xfrm>
-            <a:off x="6641465" y="3316605"/>
-            <a:ext cx="3889375" cy="1971040"/>
+            <a:off x="1020445" y="3037205"/>
+            <a:ext cx="7266305" cy="3084830"/>
           </a:xfrm>
           <a:prstGeom prst="rect">
             <a:avLst/>
@@ -7938,35 +7872,19 @@
           <a:bodyPr/>
           <a:p>
             <a:r>
-              <a:rPr lang="en-US" u="sng">
-                <a:ln w="22225">
-                  <a:solidFill>
-                    <a:schemeClr val="accent2"/>
-                  </a:solidFill>
-                  <a:prstDash val="solid"/>
-                </a:ln>
+              <a:rPr lang="en-US" b="1">
+                <a:ln/>
                 <a:solidFill>
-                  <a:schemeClr val="accent2">
-                    <a:lumMod val="40000"/>
-                    <a:lumOff val="60000"/>
-                  </a:schemeClr>
+                  <a:schemeClr val="tx1"/>
                 </a:solidFill>
                 <a:effectLst/>
               </a:rPr>
               <a:t>Business Impact(Extremely High):</a:t>
             </a:r>
-            <a:endParaRPr lang="en-US" u="sng">
-              <a:ln w="22225">
-                <a:solidFill>
-                  <a:schemeClr val="accent2"/>
-                </a:solidFill>
-                <a:prstDash val="solid"/>
-              </a:ln>
+            <a:endParaRPr lang="en-US" b="1">
+              <a:ln/>
               <a:solidFill>
-                <a:schemeClr val="accent2">
-                  <a:lumMod val="40000"/>
-                  <a:lumOff val="60000"/>
-                </a:schemeClr>
+                <a:schemeClr val="tx1"/>
               </a:solidFill>
               <a:effectLst/>
             </a:endParaRPr>
@@ -7992,30 +7910,38 @@
         <p:txBody>
           <a:bodyPr/>
           <a:p>
-            <a:r>
-              <a:rPr lang="en-US"/>
-              <a:t>Using this vulnerability,the attacker can get complete access to the blog of the website.</a:t>
+            <a:pPr marL="0" indent="0">
+              <a:buNone/>
+            </a:pPr>
+            <a:r>
+              <a:rPr lang="en-US">
+                <a:sym typeface="+mn-ea"/>
+              </a:rPr>
+              <a:t>Using this vulnerability,the attacker can get the complete control of the system, database and can also forward attacks in the back-end systems along with client-side attacks or simple defacement.</a:t>
             </a:r>
             <a:endParaRPr lang="en-US"/>
           </a:p>
           <a:p>
-            <a:r>
-              <a:rPr lang="en-US"/>
-              <a:t>The attacker can change the password or even change the url of the admin panel and restrict the admin to access it.</a:t>
+            <a:pPr marL="0" indent="0">
+              <a:buNone/>
+            </a:pPr>
+            <a:r>
+              <a:rPr lang="en-US">
+                <a:sym typeface="+mn-ea"/>
+              </a:rPr>
+              <a:t>The impact of this vulnerability is high, supposed code can be executed in the server context or on the client side. A malicious file such as a Unix shell script, a windows virus, an Excel file with a dangerous formula, or a reverse shell can be uploaded on the server in order to execute code by an administrator or webmaster later -- on the victim's machine.</a:t>
             </a:r>
             <a:endParaRPr lang="en-US"/>
           </a:p>
           <a:p>
-            <a:r>
-              <a:rPr lang="en-US"/>
-              <a:t>Even pages can be created and deleted along with editing.</a:t>
-            </a:r>
-            <a:endParaRPr lang="en-US"/>
-          </a:p>
-          <a:p>
-            <a:r>
-              <a:rPr lang="en-US"/>
-              <a:t>Files can be added (without verification) and hence can be dangerous to the entire website,as the control of the entire website can be taken.</a:t>
+            <a:pPr marL="0" indent="0">
+              <a:buNone/>
+            </a:pPr>
+            <a:r>
+              <a:rPr lang="en-US">
+                <a:sym typeface="+mn-ea"/>
+              </a:rPr>
+              <a:t>An attacker might be able to put a phishing page into the website or deface the website and much more.</a:t>
             </a:r>
             <a:endParaRPr lang="en-US"/>
           </a:p>
@@ -8054,31 +7980,21 @@
           <a:bodyPr/>
           <a:p>
             <a:r>
-              <a:rPr lang="en-US" u="sng">
+              <a:rPr lang="en-US" b="1">
+                <a:ln/>
                 <a:solidFill>
-                  <a:schemeClr val="accent1"/>
+                  <a:schemeClr val="tx1"/>
                 </a:solidFill>
-                <a:effectLst>
-                  <a:outerShdw blurRad="38100" dist="25400" dir="5400000" algn="ctr" rotWithShape="0">
-                    <a:srgbClr val="6E747A">
-                      <a:alpha val="43000"/>
-                    </a:srgbClr>
-                  </a:outerShdw>
-                </a:effectLst>
+                <a:effectLst/>
               </a:rPr>
               <a:t>Recommendation:</a:t>
             </a:r>
-            <a:endParaRPr lang="en-US" u="sng">
+            <a:endParaRPr lang="en-US" b="1">
+              <a:ln/>
               <a:solidFill>
-                <a:schemeClr val="accent1"/>
+                <a:schemeClr val="tx1"/>
               </a:solidFill>
-              <a:effectLst>
-                <a:outerShdw blurRad="38100" dist="25400" dir="5400000" algn="ctr" rotWithShape="0">
-                  <a:srgbClr val="6E747A">
-                    <a:alpha val="43000"/>
-                  </a:srgbClr>
-                </a:outerShdw>
-              </a:effectLst>
+              <a:effectLst/>
             </a:endParaRPr>
           </a:p>
         </p:txBody>
@@ -8104,42 +8020,21 @@
           <a:p>
             <a:r>
               <a:rPr lang="en-US"/>
-              <a:t>The default password should be changed and a strong password must be setup.</a:t>
+              <a:t>Use a whitelist of filenames and ignore every other filename and path.</a:t>
             </a:r>
             <a:endParaRPr lang="en-US"/>
           </a:p>
           <a:p>
             <a:r>
               <a:rPr lang="en-US"/>
-              <a:t>The admin url must also be such that its not accessible to normal users.</a:t>
+              <a:t>Instead of including files on the web server, store their content in databases where possible.</a:t>
             </a:r>
             <a:endParaRPr lang="en-US"/>
           </a:p>
           <a:p>
             <a:r>
               <a:rPr lang="en-US"/>
-              <a:t>Password changing option must be done with 2 to 3 step verification. </a:t>
-            </a:r>
-            <a:endParaRPr lang="en-US"/>
-          </a:p>
-          <a:p>
-            <a:r>
-              <a:rPr lang="en-US"/>
-              <a:t>Password must be atleast 8 characters long containing numbers,alphanumerics,etc.</a:t>
-            </a:r>
-            <a:endParaRPr lang="en-US"/>
-          </a:p>
-          <a:p>
-            <a:r>
-              <a:rPr lang="en-US"/>
-              <a:t>All the dafault accounts should be removed.</a:t>
-            </a:r>
-            <a:endParaRPr lang="en-US"/>
-          </a:p>
-          <a:p>
-            <a:r>
-              <a:rPr lang="en-US"/>
-              <a:t>Password should not be reused.</a:t>
+              <a:t>Removing or blacklisting character sequences. There are known bypasses for removing or blacklisting those.</a:t>
             </a:r>
             <a:endParaRPr lang="en-US"/>
           </a:p>
@@ -8194,7 +8089,7 @@
         <p:spPr>
           <a:xfrm>
             <a:off x="749935" y="1983105"/>
-            <a:ext cx="11442065" cy="1753235"/>
+            <a:ext cx="11442065" cy="829945"/>
           </a:xfrm>
           <a:prstGeom prst="rect">
             <a:avLst/>
@@ -8206,45 +8101,23 @@
           </a:bodyPr>
           <a:p>
             <a:r>
-              <a:rPr lang="en-US" altLang="en-IN" i="1" dirty="0" smtClean="0"/>
-              <a:t>1)</a:t>
-            </a:r>
-            <a:r>
-              <a:rPr lang="en-IN" i="1" dirty="0" smtClean="0"/>
-              <a:t>https://www.owasp.org/index.php/Testing_for_weak_password_change_or_reset_functionalities_(OTG-AUTHN-009)</a:t>
-            </a:r>
-            <a:endParaRPr lang="en-IN" i="1" dirty="0" smtClean="0"/>
-          </a:p>
-          <a:p>
-            <a:endParaRPr lang="en-IN" i="1" dirty="0" smtClean="0"/>
-          </a:p>
-          <a:p>
-            <a:r>
-              <a:rPr lang="en-US" altLang="en-IN" i="1" dirty="0" smtClean="0"/>
-              <a:t>2)</a:t>
-            </a:r>
-            <a:r>
-              <a:rPr lang="en-IN" i="1" dirty="0" smtClean="0"/>
-              <a:t>https://www.owasp.org/index.php/Default_Passwords</a:t>
-            </a:r>
-            <a:endParaRPr lang="en-IN" i="1" dirty="0" smtClean="0"/>
-          </a:p>
-          <a:p>
-            <a:endParaRPr lang="en-IN" i="1" dirty="0" smtClean="0"/>
-          </a:p>
-          <a:p>
-            <a:r>
-              <a:rPr lang="en-US" altLang="en-IN" i="1" dirty="0" smtClean="0"/>
-              <a:t>3)</a:t>
-            </a:r>
-            <a:r>
-              <a:rPr lang="en-IN" i="1" dirty="0" smtClean="0"/>
-              <a:t>https://www.us-cert.gov/ncas/alerts/TA13-175A</a:t>
-            </a:r>
-            <a:endParaRPr lang="en-IN" i="1" dirty="0" smtClean="0"/>
-          </a:p>
-          <a:p>
-            <a:endParaRPr lang="en-IN" i="1" dirty="0"/>
+              <a:rPr lang="en-US" sz="2400">
+                <a:sym typeface="+mn-ea"/>
+              </a:rPr>
+              <a:t>https://www.owasp.org/index.php/Unrestricted_File_Upload</a:t>
+            </a:r>
+            <a:endParaRPr lang="en-US" sz="2400"/>
+          </a:p>
+          <a:p>
+            <a:r>
+              <a:rPr lang="en-US" sz="2400">
+                <a:sym typeface="+mn-ea"/>
+              </a:rPr>
+              <a:t>https://www.opswat.com/blog/file-upload-protection-best-practices</a:t>
+            </a:r>
+            <a:endParaRPr lang="en-US" sz="2400" i="1" dirty="0">
+              <a:sym typeface="+mn-ea"/>
+            </a:endParaRPr>
           </a:p>
         </p:txBody>
       </p:sp>

</xml_diff>

<commit_message>
reports: Forced Browsing Flaws ppt done
</commit_message>
<xml_diff>
--- a/reports/Lifestyle Store/LifeStyle Store Application Reports.pptx
+++ b/reports/Lifestyle Store/LifeStyle Store Application Reports.pptx
@@ -3812,14 +3812,14 @@
           <a:lstStyle/>
           <a:p>
             <a:r>
-              <a:rPr lang="en-IN" b="1" dirty="0" err="1" smtClean="0"/>
+              <a:rPr lang="en-IN" sz="3200" b="1" dirty="0" err="1" smtClean="0"/>
               <a:t>PoC</a:t>
             </a:r>
             <a:r>
-              <a:rPr lang="en-IN" b="1" dirty="0" smtClean="0"/>
+              <a:rPr lang="en-IN" sz="3200" b="1" dirty="0" smtClean="0"/>
               <a:t> – Attacker can dump arbitrary data</a:t>
             </a:r>
-            <a:endParaRPr lang="en-IN" b="1" dirty="0"/>
+            <a:endParaRPr lang="en-IN" sz="3200" b="1" dirty="0" smtClean="0"/>
           </a:p>
         </p:txBody>
       </p:sp>
@@ -5664,7 +5664,7 @@
           <a:lstStyle/>
           <a:p>
             <a:r>
-              <a:rPr lang="en-IN" b="1" dirty="0" smtClean="0">
+              <a:rPr lang="en-IN" sz="3200" b="1" dirty="0" smtClean="0">
                 <a:ln/>
                 <a:solidFill>
                   <a:schemeClr val="tx1"/>
@@ -5673,7 +5673,7 @@
               </a:rPr>
               <a:t>Recommendation</a:t>
             </a:r>
-            <a:endParaRPr lang="en-IN" b="1" dirty="0" smtClean="0">
+            <a:endParaRPr lang="en-IN" sz="3200" b="1" dirty="0" smtClean="0">
               <a:ln/>
               <a:solidFill>
                 <a:schemeClr val="tx1"/>
@@ -5862,7 +5862,7 @@
           <a:lstStyle/>
           <a:p>
             <a:r>
-              <a:rPr lang="en-IN" b="1" dirty="0" smtClean="0">
+              <a:rPr lang="en-IN" sz="3200" b="1" dirty="0" smtClean="0">
                 <a:ln/>
                 <a:solidFill>
                   <a:schemeClr val="tx1"/>
@@ -5871,7 +5871,7 @@
               </a:rPr>
               <a:t>References</a:t>
             </a:r>
-            <a:endParaRPr lang="en-IN" b="1" dirty="0" smtClean="0">
+            <a:endParaRPr lang="en-IN" sz="3200" b="1" dirty="0" smtClean="0">
               <a:ln/>
               <a:solidFill>
                 <a:schemeClr val="tx1"/>
@@ -5971,10 +5971,10 @@
           <a:bodyPr/>
           <a:p>
             <a:r>
-              <a:rPr lang="en-US"/>
+              <a:rPr lang="en-US" sz="4000" b="1"/>
               <a:t>2. Insecure File Uploads</a:t>
             </a:r>
-            <a:endParaRPr lang="en-US" u="sng">
+            <a:endParaRPr lang="en-US" sz="4000" b="1" u="sng">
               <a:solidFill>
                 <a:schemeClr val="accent1"/>
               </a:solidFill>
@@ -6201,7 +6201,7 @@
                           </a:solidFill>
                           <a:latin typeface="Calibri" panose="020F0502020204030204" charset="0"/>
                         </a:rPr>
-                        <a:t>Below mentioned URL is vulnerable to Arbitrary File Upload</a:t>
+                        <a:t>Below mentioned URL is vulnerable to Insecure File Upload</a:t>
                       </a:r>
                       <a:endParaRPr lang="en-US" sz="1300" dirty="0" smtClean="0">
                         <a:solidFill>
@@ -6484,7 +6484,7 @@
           <a:bodyPr/>
           <a:p>
             <a:r>
-              <a:rPr lang="en-US" b="1">
+              <a:rPr lang="en-US" sz="3200" b="1">
                 <a:ln/>
                 <a:solidFill>
                   <a:schemeClr val="tx1"/>
@@ -6493,18 +6493,10 @@
               </a:rPr>
               <a:t>Observation:</a:t>
             </a:r>
-            <a:endParaRPr lang="en-US" u="sng">
-              <a:ln w="22225">
-                <a:solidFill>
-                  <a:schemeClr val="accent2"/>
-                </a:solidFill>
-                <a:prstDash val="solid"/>
-              </a:ln>
+            <a:endParaRPr lang="en-US" sz="3200" b="1" u="sng">
+              <a:ln/>
               <a:solidFill>
-                <a:schemeClr val="accent2">
-                  <a:lumMod val="40000"/>
-                  <a:lumOff val="60000"/>
-                </a:schemeClr>
+                <a:schemeClr val="tx1"/>
               </a:solidFill>
               <a:effectLst/>
             </a:endParaRPr>
@@ -6621,7 +6613,7 @@
         </p:nvSpPr>
         <p:spPr>
           <a:xfrm>
-            <a:off x="675640" y="-165735"/>
+            <a:off x="675640" y="-92710"/>
             <a:ext cx="10515600" cy="1325563"/>
           </a:xfrm>
         </p:spPr>
@@ -6631,7 +6623,7 @@
           </a:bodyPr>
           <a:p>
             <a:r>
-              <a:rPr lang="en-US" b="1">
+              <a:rPr lang="en-US" sz="3200" b="1">
                 <a:ln/>
                 <a:solidFill>
                   <a:schemeClr val="tx1"/>
@@ -6640,7 +6632,7 @@
               </a:rPr>
               <a:t>Proof of Concept(PoC):</a:t>
             </a:r>
-            <a:endParaRPr lang="en-US" b="1">
+            <a:endParaRPr lang="en-US" sz="3200" b="1">
               <a:ln/>
               <a:solidFill>
                 <a:schemeClr val="tx1"/>
@@ -6738,7 +6730,7 @@
           <a:bodyPr/>
           <a:p>
             <a:r>
-              <a:rPr lang="en-US" b="1">
+              <a:rPr lang="en-US" sz="3200" b="1">
                 <a:ln/>
                 <a:solidFill>
                   <a:schemeClr val="tx1"/>
@@ -6747,7 +6739,7 @@
               </a:rPr>
               <a:t>Business Impact(High):</a:t>
             </a:r>
-            <a:endParaRPr lang="en-US" b="1">
+            <a:endParaRPr lang="en-US" sz="3200" b="1">
               <a:ln/>
               <a:solidFill>
                 <a:schemeClr val="tx1"/>
@@ -6842,7 +6834,7 @@
           <a:bodyPr/>
           <a:p>
             <a:r>
-              <a:rPr lang="en-US" b="1">
+              <a:rPr lang="en-US" sz="3200" b="1">
                 <a:ln/>
                 <a:solidFill>
                   <a:schemeClr val="tx1"/>
@@ -6851,7 +6843,7 @@
               </a:rPr>
               <a:t>Recommendations:</a:t>
             </a:r>
-            <a:endParaRPr lang="en-US" b="1">
+            <a:endParaRPr lang="en-US" sz="3200" b="1">
               <a:ln/>
               <a:solidFill>
                 <a:schemeClr val="tx1"/>
@@ -6967,7 +6959,7 @@
           <a:bodyPr/>
           <a:p>
             <a:r>
-              <a:rPr lang="en-US" b="1">
+              <a:rPr lang="en-US" sz="3200" b="1">
                 <a:ln/>
                 <a:solidFill>
                   <a:schemeClr val="tx1"/>
@@ -6976,7 +6968,7 @@
               </a:rPr>
               <a:t>References:</a:t>
             </a:r>
-            <a:endParaRPr lang="en-US" b="1">
+            <a:endParaRPr lang="en-US" sz="3200" b="1">
               <a:ln/>
               <a:solidFill>
                 <a:schemeClr val="tx1"/>
@@ -7048,6 +7040,9 @@
             <a:off x="838200" y="365125"/>
             <a:ext cx="10515600" cy="1075690"/>
           </a:xfrm>
+          <a:ln>
+            <a:noFill/>
+          </a:ln>
         </p:spPr>
         <p:style>
           <a:lnRef idx="2">
@@ -7067,18 +7062,10 @@
           <a:bodyPr/>
           <a:p>
             <a:r>
-              <a:rPr lang="en-IN" u="sng" dirty="0" smtClean="0"/>
-              <a:t>Security Status </a:t>
-            </a:r>
-            <a:r>
-              <a:rPr lang="en-IN" dirty="0" smtClean="0"/>
-              <a:t>– </a:t>
-            </a:r>
-            <a:r>
-              <a:rPr lang="en-IN" u="sng" dirty="0" smtClean="0"/>
-              <a:t>Extremely Vulnerable</a:t>
-            </a:r>
-            <a:endParaRPr lang="en-IN" u="sng" dirty="0"/>
+              <a:rPr lang="en-IN" sz="4000" b="1" dirty="0" smtClean="0"/>
+              <a:t>Security Status – Extremely Vulnerable</a:t>
+            </a:r>
+            <a:endParaRPr lang="en-IN" sz="4000" b="1" dirty="0" smtClean="0"/>
           </a:p>
         </p:txBody>
       </p:sp>
@@ -7218,7 +7205,7 @@
           <a:bodyPr/>
           <a:p>
             <a:r>
-              <a:rPr lang="en-US" b="1">
+              <a:rPr lang="en-US" sz="4000" b="1">
                 <a:ln/>
                 <a:solidFill>
                   <a:schemeClr val="tx1"/>
@@ -7227,7 +7214,7 @@
               </a:rPr>
               <a:t>3. File Inclusion Vulnerabilities</a:t>
             </a:r>
-            <a:endParaRPr lang="en-US" b="1" u="sng">
+            <a:endParaRPr lang="en-US" sz="4000" b="1" u="sng">
               <a:ln/>
               <a:solidFill>
                 <a:schemeClr val="tx1"/>
@@ -7351,7 +7338,7 @@
                           </a:solidFill>
                           <a:latin typeface="Calibri" panose="020F0502020204030204" charset="0"/>
                         </a:rPr>
-                        <a:t>Access to admin panel</a:t>
+                        <a:t>File Inclusion Vulnerabilities</a:t>
                       </a:r>
                       <a:endParaRPr lang="en-US" sz="1600" dirty="0">
                         <a:solidFill>
@@ -7449,7 +7436,7 @@
                           </a:solidFill>
                           <a:latin typeface="Calibri" panose="020F0502020204030204" charset="0"/>
                         </a:rPr>
-                        <a:t>Below mentioned URL is vulnerable to Arbitrary File Upload</a:t>
+                        <a:t>Below mentioned URL is vulnerable to File Inclusion Vulnerabilities</a:t>
                       </a:r>
                       <a:endParaRPr lang="en-US" sz="1300" dirty="0" smtClean="0">
                         <a:solidFill>
@@ -7642,7 +7629,7 @@
           <a:bodyPr/>
           <a:p>
             <a:r>
-              <a:rPr lang="en-US" b="1">
+              <a:rPr lang="en-US" sz="3200" b="1">
                 <a:ln/>
                 <a:solidFill>
                   <a:schemeClr val="tx1"/>
@@ -7651,7 +7638,7 @@
               </a:rPr>
               <a:t>Observation:</a:t>
             </a:r>
-            <a:endParaRPr lang="en-US" b="1">
+            <a:endParaRPr lang="en-US" sz="3200" b="1">
               <a:ln/>
               <a:solidFill>
                 <a:schemeClr val="tx1"/>
@@ -7756,7 +7743,7 @@
           <a:bodyPr/>
           <a:p>
             <a:r>
-              <a:rPr lang="en-US" b="1">
+              <a:rPr lang="en-US" sz="3200" b="1">
                 <a:ln/>
                 <a:solidFill>
                   <a:schemeClr val="tx1"/>
@@ -7765,7 +7752,7 @@
               </a:rPr>
               <a:t>Proof Of Concept(PoC):</a:t>
             </a:r>
-            <a:endParaRPr lang="en-US" b="1">
+            <a:endParaRPr lang="en-US" sz="3200" b="1">
               <a:ln/>
               <a:solidFill>
                 <a:schemeClr val="tx1"/>
@@ -7872,7 +7859,7 @@
           <a:bodyPr/>
           <a:p>
             <a:r>
-              <a:rPr lang="en-US" b="1">
+              <a:rPr lang="en-US" sz="3200" b="1">
                 <a:ln/>
                 <a:solidFill>
                   <a:schemeClr val="tx1"/>
@@ -7881,7 +7868,7 @@
               </a:rPr>
               <a:t>Business Impact(Extremely High):</a:t>
             </a:r>
-            <a:endParaRPr lang="en-US" b="1">
+            <a:endParaRPr lang="en-US" sz="3200" b="1">
               <a:ln/>
               <a:solidFill>
                 <a:schemeClr val="tx1"/>
@@ -7980,7 +7967,7 @@
           <a:bodyPr/>
           <a:p>
             <a:r>
-              <a:rPr lang="en-US" b="1">
+              <a:rPr lang="en-US" sz="3200" b="1">
                 <a:ln/>
                 <a:solidFill>
                   <a:schemeClr val="tx1"/>
@@ -7989,7 +7976,7 @@
               </a:rPr>
               <a:t>Recommendation:</a:t>
             </a:r>
-            <a:endParaRPr lang="en-US" b="1">
+            <a:endParaRPr lang="en-US" sz="3200" b="1">
               <a:ln/>
               <a:solidFill>
                 <a:schemeClr val="tx1"/>
@@ -8073,10 +8060,10 @@
           <a:bodyPr/>
           <a:p>
             <a:r>
-              <a:rPr lang="en-US" u="sng"/>
+              <a:rPr lang="en-US" sz="3200" b="1"/>
               <a:t>References:</a:t>
             </a:r>
-            <a:endParaRPr lang="en-US" u="sng"/>
+            <a:endParaRPr lang="en-US" sz="3200" b="1"/>
           </a:p>
         </p:txBody>
       </p:sp>
@@ -8149,7 +8136,25 @@
             <p:ph type="title"/>
           </p:nvPr>
         </p:nvSpPr>
-        <p:spPr/>
+        <p:spPr>
+          <a:xfrm>
+            <a:off x="838200" y="365125"/>
+            <a:ext cx="8627110" cy="1175385"/>
+          </a:xfrm>
+          <a:noFill/>
+          <a:ln>
+            <a:noFill/>
+          </a:ln>
+          <a:extLst>
+            <a:ext uri="{909E8E84-426E-40DD-AFC4-6F175D3DCCD1}">
+              <a14:hiddenFill xmlns:a14="http://schemas.microsoft.com/office/drawing/2010/main">
+                <a:solidFill>
+                  <a:schemeClr val="accent2"/>
+                </a:solidFill>
+              </a14:hiddenFill>
+            </a:ext>
+          </a:extLst>
+        </p:spPr>
         <p:style>
           <a:lnRef idx="2">
             <a:schemeClr val="accent2">
@@ -8170,10 +8175,26 @@
           <a:bodyPr/>
           <a:p>
             <a:r>
-              <a:rPr lang="en-US" u="sng"/>
-              <a:t>4.Account takeover via OTP Bypass</a:t>
-            </a:r>
-            <a:endParaRPr lang="en-US" u="sng"/>
+              <a:rPr lang="en-US" sz="4000" b="1">
+                <a:ln/>
+                <a:solidFill>
+                  <a:schemeClr val="tx1"/>
+                </a:solidFill>
+                <a:effectLst/>
+                <a:latin typeface="+mj-lt"/>
+                <a:cs typeface="+mj-lt"/>
+              </a:rPr>
+              <a:t>4. Forced Browsing Flaws</a:t>
+            </a:r>
+            <a:endParaRPr lang="en-US" sz="4000" b="1">
+              <a:ln/>
+              <a:solidFill>
+                <a:schemeClr val="tx1"/>
+              </a:solidFill>
+              <a:effectLst/>
+              <a:latin typeface="+mj-lt"/>
+              <a:cs typeface="+mj-lt"/>
+            </a:endParaRPr>
           </a:p>
         </p:txBody>
       </p:sp>
@@ -8201,7 +8222,7 @@
                 <a:gridCol w="1832610"/>
                 <a:gridCol w="8682990"/>
               </a:tblGrid>
-              <a:tr h="415137">
+              <a:tr h="415290">
                 <a:tc>
                   <a:txBody>
                     <a:bodyPr/>
@@ -8285,13 +8306,22 @@
                     <a:p>
                       <a:pPr algn="ctr"/>
                       <a:r>
+                        <a:rPr lang="en-US" altLang="en-IN" sz="1600" dirty="0" smtClean="0">
+                          <a:solidFill>
+                            <a:srgbClr val="FFFFFF"/>
+                          </a:solidFill>
+                          <a:latin typeface="Calibri" panose="020F0502020204030204" charset="0"/>
+                        </a:rPr>
+                        <a:t>Forced Browsing Flaws</a:t>
+                      </a:r>
+                      <a:r>
                         <a:rPr lang="en-IN" sz="1600" dirty="0" smtClean="0">
                           <a:solidFill>
                             <a:srgbClr val="FFFFFF"/>
                           </a:solidFill>
                           <a:latin typeface="Calibri" panose="020F0502020204030204" charset="0"/>
                         </a:rPr>
-                        <a:t>Account Takeover Using OTP Bypass </a:t>
+                        <a:t> </a:t>
                       </a:r>
                       <a:r>
                         <a:rPr lang="en-US" sz="1300" dirty="0" smtClean="0">
@@ -8374,32 +8404,14 @@
                     </a:p>
                     <a:p>
                       <a:r>
-                        <a:rPr lang="en-US" sz="1300" baseline="0" dirty="0" smtClean="0">
+                        <a:rPr lang="en-US" sz="1300" dirty="0" smtClean="0">
                           <a:solidFill>
                             <a:schemeClr val="tx1"/>
                           </a:solidFill>
                           <a:latin typeface="Calibri" panose="020F0502020204030204" charset="0"/>
                         </a:rPr>
-                        <a:t>The below mentioned login page allows login via OTP which can be </a:t>
-                      </a:r>
-                      <a:r>
-                        <a:rPr lang="en-US" sz="1300" baseline="0" dirty="0" err="1" smtClean="0">
-                          <a:solidFill>
-                            <a:schemeClr val="tx1"/>
-                          </a:solidFill>
-                          <a:latin typeface="Calibri" panose="020F0502020204030204" charset="0"/>
-                        </a:rPr>
-                        <a:t>bruteforced</a:t>
-                      </a:r>
-                      <a:endParaRPr lang="en-US" sz="1300" dirty="0" smtClean="0">
-                        <a:solidFill>
-                          <a:schemeClr val="tx1"/>
-                        </a:solidFill>
-                        <a:latin typeface="Calibri" panose="020F0502020204030204" charset="0"/>
-                        <a:cs typeface="Calibri" panose="020F0502020204030204" charset="0"/>
-                      </a:endParaRPr>
-                    </a:p>
-                    <a:p>
+                        <a:t>Access to admin dashboard after login into customer account </a:t>
+                      </a:r>
                       <a:endParaRPr lang="en-US" sz="1300" dirty="0" smtClean="0">
                         <a:solidFill>
                           <a:schemeClr val="tx1"/>
@@ -8444,7 +8456,7 @@
                           <a:cs typeface="Calibri" panose="020F0502020204030204" charset="0"/>
                           <a:sym typeface="Arial" panose="020B0604020202020204"/>
                         </a:rPr>
-                        <a:t>http://52.66.198.61/reset_password/admin.php</a:t>
+                        <a:t>http://35.154.249.93/profile/16/edit/</a:t>
                       </a:r>
                       <a:endParaRPr lang="en-US" sz="1300" b="0" i="0" u="none" strike="noStrike" dirty="0" smtClean="0">
                         <a:solidFill>
@@ -8493,25 +8505,7 @@
                           </a:solidFill>
                           <a:latin typeface="Calibri" panose="020F0502020204030204" charset="0"/>
                         </a:rPr>
-                        <a:t>Affected</a:t>
-                      </a:r>
-                      <a:r>
-                        <a:rPr lang="en-US" sz="1300" b="1" baseline="0" dirty="0" smtClean="0">
-                          <a:solidFill>
-                            <a:schemeClr val="tx1"/>
-                          </a:solidFill>
-                          <a:latin typeface="Calibri" panose="020F0502020204030204" charset="0"/>
-                        </a:rPr>
-                        <a:t> Parameters</a:t>
-                      </a:r>
-                      <a:r>
-                        <a:rPr lang="en-US" sz="1300" b="1" dirty="0" smtClean="0">
-                          <a:solidFill>
-                            <a:schemeClr val="tx1"/>
-                          </a:solidFill>
-                          <a:latin typeface="Calibri" panose="020F0502020204030204" charset="0"/>
-                        </a:rPr>
-                        <a:t> :</a:t>
+                        <a:t>Payload :</a:t>
                       </a:r>
                       <a:endParaRPr lang="en-US" sz="1300" b="0" dirty="0" smtClean="0">
                         <a:solidFill>
@@ -8532,16 +8526,7 @@
                           </a:solidFill>
                           <a:latin typeface="Calibri" panose="020F0502020204030204" charset="0"/>
                         </a:rPr>
-                        <a:t>OTP (POST</a:t>
-                      </a:r>
-                      <a:r>
-                        <a:rPr lang="en-US" sz="1300" b="0" baseline="0" dirty="0" smtClean="0">
-                          <a:solidFill>
-                            <a:schemeClr val="tx1"/>
-                          </a:solidFill>
-                          <a:latin typeface="Calibri" panose="020F0502020204030204" charset="0"/>
-                        </a:rPr>
-                        <a:t> parameters)</a:t>
+                        <a:t>Change the url to "http://35.154.249.93/admin31/dashboard.php"</a:t>
                       </a:r>
                       <a:endParaRPr lang="en-US" sz="1300" b="0" dirty="0" smtClean="0">
                         <a:solidFill>
@@ -8653,39 +8638,24 @@
         </p:nvSpPr>
         <p:spPr/>
         <p:txBody>
-          <a:bodyPr>
-            <a:scene3d>
-              <a:camera prst="orthographicFront"/>
-              <a:lightRig rig="threePt" dir="t"/>
-            </a:scene3d>
-          </a:bodyPr>
-          <a:p>
-            <a:r>
-              <a:rPr lang="en-US" u="sng">
+          <a:bodyPr/>
+          <a:p>
+            <a:r>
+              <a:rPr lang="en-US" sz="3200" b="1">
+                <a:ln/>
                 <a:solidFill>
                   <a:schemeClr val="tx1"/>
                 </a:solidFill>
-                <a:effectLst>
-                  <a:outerShdw blurRad="38100" dist="19050" dir="2700000" algn="tl" rotWithShape="0">
-                    <a:schemeClr val="dk1">
-                      <a:alpha val="40000"/>
-                    </a:schemeClr>
-                  </a:outerShdw>
-                </a:effectLst>
+                <a:effectLst/>
               </a:rPr>
               <a:t>Observation:</a:t>
             </a:r>
-            <a:endParaRPr lang="en-US" u="sng">
+            <a:endParaRPr lang="en-US" sz="3200" b="1">
+              <a:ln/>
               <a:solidFill>
                 <a:schemeClr val="tx1"/>
               </a:solidFill>
-              <a:effectLst>
-                <a:outerShdw blurRad="38100" dist="19050" dir="2700000" algn="tl" rotWithShape="0">
-                  <a:schemeClr val="dk1">
-                    <a:alpha val="40000"/>
-                  </a:schemeClr>
-                </a:outerShdw>
-              </a:effectLst>
+              <a:effectLst/>
             </a:endParaRPr>
           </a:p>
         </p:txBody>
@@ -8702,8 +8672,8 @@
         </p:nvSpPr>
         <p:spPr>
           <a:xfrm>
-            <a:off x="838200" y="1825625"/>
-            <a:ext cx="10754360" cy="1431925"/>
+            <a:off x="838200" y="1664970"/>
+            <a:ext cx="10514965" cy="692150"/>
           </a:xfrm>
         </p:spPr>
         <p:txBody>
@@ -8711,7 +8681,7 @@
           <a:p>
             <a:r>
               <a:rPr lang="en-US"/>
-              <a:t>When we navigate to admin login 'http://52.66.198.61/login/admin.php',and try to reset the password,we are asked for the three digit OTP as:</a:t>
+              <a:t>Login into customer account</a:t>
             </a:r>
             <a:endParaRPr lang="en-US"/>
           </a:p>
@@ -8719,7 +8689,7 @@
       </p:sp>
       <p:pic>
         <p:nvPicPr>
-          <p:cNvPr id="4" name="Content Placeholder 3" descr="admin reset otp"/>
+          <p:cNvPr id="6" name="Content Placeholder 5" descr="observation"/>
           <p:cNvPicPr>
             <a:picLocks noChangeAspect="1"/>
           </p:cNvPicPr>
@@ -8735,8 +8705,8 @@
         </p:blipFill>
         <p:spPr>
           <a:xfrm>
-            <a:off x="3341370" y="3257550"/>
-            <a:ext cx="5181600" cy="2756535"/>
+            <a:off x="1880870" y="2357120"/>
+            <a:ext cx="8141970" cy="3853180"/>
           </a:xfrm>
           <a:prstGeom prst="rect">
             <a:avLst/>
@@ -8776,35 +8746,70 @@
             <a:off x="840105" y="412750"/>
             <a:ext cx="3931920" cy="641985"/>
           </a:xfrm>
+          <a:noFill/>
+          <a:ln>
+            <a:noFill/>
+          </a:ln>
+          <a:extLst>
+            <a:ext uri="{909E8E84-426E-40DD-AFC4-6F175D3DCCD1}">
+              <a14:hiddenFill xmlns:a14="http://schemas.microsoft.com/office/drawing/2010/main">
+                <a:solidFill>
+                  <a:schemeClr val="lt1"/>
+                </a:solidFill>
+              </a14:hiddenFill>
+            </a:ext>
+          </a:extLst>
         </p:spPr>
         <p:style>
           <a:lnRef idx="2">
-            <a:schemeClr val="accent1">
-              <a:shade val="50000"/>
-            </a:schemeClr>
+            <a:schemeClr val="dk1"/>
           </a:lnRef>
           <a:fillRef idx="1">
-            <a:schemeClr val="accent1"/>
+            <a:schemeClr val="lt1"/>
           </a:fillRef>
           <a:effectRef idx="0">
-            <a:schemeClr val="accent1"/>
+            <a:schemeClr val="dk1"/>
           </a:effectRef>
           <a:fontRef idx="minor">
-            <a:schemeClr val="lt1"/>
+            <a:schemeClr val="dk1"/>
           </a:fontRef>
         </p:style>
         <p:txBody>
           <a:bodyPr/>
           <a:p>
             <a:r>
-              <a:rPr lang="en-IN" dirty="0" smtClean="0"/>
+              <a:rPr lang="en-IN" b="1" dirty="0" smtClean="0">
+                <a:ln/>
+                <a:solidFill>
+                  <a:schemeClr val="tx1"/>
+                </a:solidFill>
+                <a:effectLst/>
+                <a:latin typeface="+mj-lt"/>
+                <a:cs typeface="+mj-lt"/>
+              </a:rPr>
               <a:t>Observation</a:t>
             </a:r>
             <a:r>
-              <a:rPr lang="en-US" altLang="en-IN" dirty="0" smtClean="0"/>
+              <a:rPr lang="en-US" altLang="en-IN" b="1" dirty="0" smtClean="0">
+                <a:ln/>
+                <a:solidFill>
+                  <a:schemeClr val="tx1"/>
+                </a:solidFill>
+                <a:effectLst/>
+                <a:latin typeface="+mj-lt"/>
+                <a:cs typeface="+mj-lt"/>
+              </a:rPr>
               <a:t>:</a:t>
             </a:r>
-            <a:endParaRPr lang="en-US" altLang="en-IN" dirty="0" smtClean="0"/>
+            <a:endParaRPr lang="en-US" altLang="en-IN" b="1" dirty="0" smtClean="0">
+              <a:ln/>
+              <a:solidFill>
+                <a:schemeClr val="tx1"/>
+              </a:solidFill>
+              <a:effectLst/>
+              <a:latin typeface="+mj-lt"/>
+              <a:cs typeface="+mj-lt"/>
+            </a:endParaRPr>
           </a:p>
         </p:txBody>
       </p:sp>
@@ -8820,7 +8825,7 @@
         </p:nvSpPr>
         <p:spPr>
           <a:xfrm>
-            <a:off x="840105" y="1522730"/>
+            <a:off x="840105" y="1420495"/>
             <a:ext cx="10963910" cy="539750"/>
           </a:xfrm>
         </p:spPr>
@@ -8831,50 +8836,15 @@
           <a:p>
             <a:r>
               <a:rPr lang="en-IN" sz="2000" dirty="0" smtClean="0"/>
-              <a:t>Following request will be generated containing OTP parameter. </a:t>
-            </a:r>
-            <a:endParaRPr lang="en-IN" sz="2000" b="1" dirty="0" smtClean="0">
-              <a:solidFill>
-                <a:srgbClr val="FF0000"/>
-              </a:solidFill>
-            </a:endParaRPr>
+              <a:t>Change the url to "http://35.154.249.93/admin31/dashboard.php"</a:t>
+            </a:r>
+            <a:endParaRPr lang="en-IN" sz="2000" dirty="0" smtClean="0"/>
           </a:p>
           <a:p>
             <a:endParaRPr lang="en-IN" sz="2000" dirty="0"/>
           </a:p>
         </p:txBody>
       </p:sp>
-      <p:pic>
-        <p:nvPicPr>
-          <p:cNvPr id="7" name="Picture Placeholder 6" descr="Capture"/>
-          <p:cNvPicPr>
-            <a:picLocks noChangeAspect="1"/>
-          </p:cNvPicPr>
-          <p:nvPr>
-            <p:ph type="pic" idx="1"/>
-          </p:nvPr>
-        </p:nvPicPr>
-        <p:blipFill>
-          <a:blip r:embed="rId1"/>
-          <a:stretch>
-            <a:fillRect/>
-          </a:stretch>
-        </p:blipFill>
-        <p:spPr>
-          <a:xfrm>
-            <a:off x="1927860" y="2231390"/>
-            <a:ext cx="8465820" cy="2517775"/>
-          </a:xfrm>
-          <a:prstGeom prst="rect">
-            <a:avLst/>
-          </a:prstGeom>
-          <a:ln>
-            <a:solidFill>
-              <a:schemeClr val="accent1"/>
-            </a:solidFill>
-          </a:ln>
-        </p:spPr>
-      </p:pic>
       <p:sp>
         <p:nvSpPr>
           <p:cNvPr id="8" name="Rectangle 7"/>
@@ -8920,6 +8890,32 @@
           </a:p>
         </p:txBody>
       </p:sp>
+      <p:pic>
+        <p:nvPicPr>
+          <p:cNvPr id="3" name="Picture Placeholder 2" descr="observation1"/>
+          <p:cNvPicPr>
+            <a:picLocks noChangeAspect="1"/>
+          </p:cNvPicPr>
+          <p:nvPr>
+            <p:ph type="pic" idx="1"/>
+          </p:nvPr>
+        </p:nvPicPr>
+        <p:blipFill>
+          <a:blip r:embed="rId1"/>
+          <a:stretch>
+            <a:fillRect/>
+          </a:stretch>
+        </p:blipFill>
+        <p:spPr>
+          <a:xfrm>
+            <a:off x="1602740" y="1960245"/>
+            <a:ext cx="9313545" cy="4168140"/>
+          </a:xfrm>
+          <a:prstGeom prst="rect">
+            <a:avLst/>
+          </a:prstGeom>
+        </p:spPr>
+      </p:pic>
     </p:spTree>
   </p:cSld>
   <p:clrMapOvr>
@@ -8950,50 +8946,60 @@
         </p:nvSpPr>
         <p:spPr>
           <a:xfrm>
-            <a:off x="776605" y="-195580"/>
+            <a:off x="776605" y="-107950"/>
             <a:ext cx="10515600" cy="1325563"/>
           </a:xfrm>
+          <a:noFill/>
+          <a:ln>
+            <a:noFill/>
+          </a:ln>
+          <a:extLst>
+            <a:ext uri="{909E8E84-426E-40DD-AFC4-6F175D3DCCD1}">
+              <a14:hiddenFill xmlns:a14="http://schemas.microsoft.com/office/drawing/2010/main">
+                <a:solidFill>
+                  <a:schemeClr val="lt1"/>
+                </a:solidFill>
+              </a14:hiddenFill>
+            </a:ext>
+          </a:extLst>
         </p:spPr>
+        <p:style>
+          <a:lnRef idx="2">
+            <a:schemeClr val="dk1"/>
+          </a:lnRef>
+          <a:fillRef idx="1">
+            <a:schemeClr val="lt1"/>
+          </a:fillRef>
+          <a:effectRef idx="0">
+            <a:schemeClr val="dk1"/>
+          </a:effectRef>
+          <a:fontRef idx="minor">
+            <a:schemeClr val="dk1"/>
+          </a:fontRef>
+        </p:style>
         <p:txBody>
-          <a:bodyPr>
-            <a:scene3d>
-              <a:camera prst="orthographicFront"/>
-              <a:lightRig rig="threePt" dir="t"/>
-            </a:scene3d>
-          </a:bodyPr>
-          <a:p>
-            <a:r>
-              <a:rPr lang="en-IN" u="sng" dirty="0" smtClean="0">
-                <a:ln w="22225">
-                  <a:solidFill>
-                    <a:schemeClr val="accent2"/>
-                  </a:solidFill>
-                  <a:prstDash val="solid"/>
-                </a:ln>
+          <a:bodyPr/>
+          <a:p>
+            <a:r>
+              <a:rPr lang="en-US" altLang="en-IN" sz="3200" b="1" dirty="0" smtClean="0">
+                <a:ln/>
                 <a:solidFill>
-                  <a:schemeClr val="accent2">
-                    <a:lumMod val="40000"/>
-                    <a:lumOff val="60000"/>
-                  </a:schemeClr>
+                  <a:schemeClr val="tx1"/>
                 </a:solidFill>
                 <a:effectLst/>
+                <a:latin typeface="+mj-lt"/>
+                <a:cs typeface="+mj-lt"/>
               </a:rPr>
-              <a:t>Observation</a:t>
-            </a:r>
-            <a:endParaRPr lang="en-IN" u="sng" dirty="0" smtClean="0">
-              <a:ln w="22225">
-                <a:solidFill>
-                  <a:schemeClr val="accent2"/>
-                </a:solidFill>
-                <a:prstDash val="solid"/>
-              </a:ln>
+              <a:t>POC</a:t>
+            </a:r>
+            <a:endParaRPr lang="en-US" altLang="en-IN" sz="3200" b="1" dirty="0" smtClean="0">
+              <a:ln/>
               <a:solidFill>
-                <a:schemeClr val="accent2">
-                  <a:lumMod val="40000"/>
-                  <a:lumOff val="60000"/>
-                </a:schemeClr>
+                <a:schemeClr val="tx1"/>
               </a:solidFill>
               <a:effectLst/>
+              <a:latin typeface="+mj-lt"/>
+              <a:cs typeface="+mj-lt"/>
             </a:endParaRPr>
           </a:p>
         </p:txBody>
@@ -9007,7 +9013,7 @@
         <p:spPr>
           <a:xfrm>
             <a:off x="776605" y="900430"/>
-            <a:ext cx="11170285" cy="645160"/>
+            <a:ext cx="11170285" cy="368300"/>
           </a:xfrm>
           <a:prstGeom prst="rect">
             <a:avLst/>
@@ -9020,34 +9026,10 @@
           </a:bodyPr>
           <a:p>
             <a:r>
-              <a:rPr lang="en-IN" dirty="0" smtClean="0">
+              <a:rPr lang="en-US" dirty="0" smtClean="0">
                 <a:sym typeface="+mn-ea"/>
               </a:rPr>
-              <a:t>We shoot the request with all possible combinations of </a:t>
-            </a:r>
-            <a:r>
-              <a:rPr lang="en-US" altLang="en-IN" dirty="0" smtClean="0">
-                <a:sym typeface="+mn-ea"/>
-              </a:rPr>
-              <a:t>3</a:t>
-            </a:r>
-            <a:r>
-              <a:rPr lang="en-IN" dirty="0" smtClean="0">
-                <a:sym typeface="+mn-ea"/>
-              </a:rPr>
-              <a:t> Digit OTPs and upon a successful hit, we get a response containing </a:t>
-            </a:r>
-            <a:r>
-              <a:rPr lang="en-US" altLang="en-IN" dirty="0" smtClean="0">
-                <a:sym typeface="+mn-ea"/>
-              </a:rPr>
-              <a:t>“Enter New Admin Password”</a:t>
-            </a:r>
-            <a:r>
-              <a:rPr lang="en-IN" dirty="0" smtClean="0">
-                <a:sym typeface="+mn-ea"/>
-              </a:rPr>
-              <a:t>. We can use the same OTP then to login.</a:t>
+              <a:t>Malicious hacker can access the admin dashboard page, he can then add, update product.</a:t>
             </a:r>
             <a:endParaRPr lang="en-US"/>
           </a:p>
@@ -9055,7 +9037,7 @@
       </p:sp>
       <p:pic>
         <p:nvPicPr>
-          <p:cNvPr id="7" name="Content Placeholder 6" descr="bruteforced successfully"/>
+          <p:cNvPr id="3" name="Content Placeholder 2" descr="POC"/>
           <p:cNvPicPr>
             <a:picLocks noChangeAspect="1"/>
           </p:cNvPicPr>
@@ -9071,104 +9053,14 @@
         </p:blipFill>
         <p:spPr>
           <a:xfrm>
-            <a:off x="1148080" y="1545590"/>
-            <a:ext cx="9983470" cy="5234940"/>
+            <a:off x="1609725" y="1537335"/>
+            <a:ext cx="8849360" cy="4775835"/>
           </a:xfrm>
           <a:prstGeom prst="rect">
             <a:avLst/>
           </a:prstGeom>
         </p:spPr>
       </p:pic>
-      <p:sp>
-        <p:nvSpPr>
-          <p:cNvPr id="8" name="Rectangle 7"/>
-          <p:cNvSpPr/>
-          <p:nvPr/>
-        </p:nvSpPr>
-        <p:spPr>
-          <a:xfrm>
-            <a:off x="1268730" y="2791460"/>
-            <a:ext cx="7809865" cy="302260"/>
-          </a:xfrm>
-          <a:prstGeom prst="rect">
-            <a:avLst/>
-          </a:prstGeom>
-          <a:noFill/>
-          <a:ln w="38100">
-            <a:solidFill>
-              <a:srgbClr val="FF0000"/>
-            </a:solidFill>
-          </a:ln>
-        </p:spPr>
-        <p:style>
-          <a:lnRef idx="2">
-            <a:schemeClr val="accent1">
-              <a:shade val="50000"/>
-            </a:schemeClr>
-          </a:lnRef>
-          <a:fillRef idx="1">
-            <a:schemeClr val="accent1"/>
-          </a:fillRef>
-          <a:effectRef idx="0">
-            <a:schemeClr val="accent1"/>
-          </a:effectRef>
-          <a:fontRef idx="minor">
-            <a:schemeClr val="lt1"/>
-          </a:fontRef>
-        </p:style>
-        <p:txBody>
-          <a:bodyPr rtlCol="0" anchor="ctr"/>
-          <a:p>
-            <a:pPr algn="ctr"/>
-            <a:endParaRPr lang="en-IN"/>
-          </a:p>
-        </p:txBody>
-      </p:sp>
-      <p:sp>
-        <p:nvSpPr>
-          <p:cNvPr id="9" name="Rectangle 8"/>
-          <p:cNvSpPr/>
-          <p:nvPr/>
-        </p:nvSpPr>
-        <p:spPr>
-          <a:xfrm>
-            <a:off x="1268730" y="5720080"/>
-            <a:ext cx="2665095" cy="332740"/>
-          </a:xfrm>
-          <a:prstGeom prst="rect">
-            <a:avLst/>
-          </a:prstGeom>
-          <a:noFill/>
-          <a:ln w="38100">
-            <a:solidFill>
-              <a:srgbClr val="FF0000"/>
-            </a:solidFill>
-          </a:ln>
-        </p:spPr>
-        <p:style>
-          <a:lnRef idx="2">
-            <a:schemeClr val="accent1">
-              <a:shade val="50000"/>
-            </a:schemeClr>
-          </a:lnRef>
-          <a:fillRef idx="1">
-            <a:schemeClr val="accent1"/>
-          </a:fillRef>
-          <a:effectRef idx="0">
-            <a:schemeClr val="accent1"/>
-          </a:effectRef>
-          <a:fontRef idx="minor">
-            <a:schemeClr val="lt1"/>
-          </a:fontRef>
-        </p:style>
-        <p:txBody>
-          <a:bodyPr rtlCol="0" anchor="ctr"/>
-          <a:p>
-            <a:pPr algn="ctr"/>
-            <a:endParaRPr lang="en-IN"/>
-          </a:p>
-        </p:txBody>
-      </p:sp>
     </p:spTree>
   </p:cSld>
   <p:clrMapOvr>
@@ -9206,18 +9098,16 @@
         </p:nvSpPr>
         <p:spPr>
           <a:xfrm>
-            <a:off x="1819275" y="306070"/>
+            <a:off x="1118235" y="306070"/>
             <a:ext cx="5486400" cy="1325880"/>
           </a:xfrm>
         </p:spPr>
         <p:txBody>
-          <a:bodyPr>
-            <a:normAutofit/>
-          </a:bodyPr>
+          <a:bodyPr/>
           <a:lstStyle/>
           <a:p>
             <a:r>
-              <a:rPr lang="en-IN" dirty="0" smtClean="0">
+              <a:rPr lang="en-IN" sz="4000" dirty="0" smtClean="0">
                 <a:ln/>
                 <a:solidFill>
                   <a:schemeClr val="tx1"/>
@@ -9228,7 +9118,7 @@
               </a:rPr>
               <a:t>Vulnerability Statistics</a:t>
             </a:r>
-            <a:endParaRPr lang="en-IN" dirty="0" smtClean="0">
+            <a:endParaRPr lang="en-IN" sz="4000" dirty="0" smtClean="0">
               <a:ln/>
               <a:solidFill>
                 <a:schemeClr val="tx1"/>
@@ -9293,7 +9183,7 @@
                       <a:pPr algn="ctr"/>
                       <a:r>
                         <a:rPr lang="en-US" altLang="en-IN" dirty="0"/>
-                        <a:t>4</a:t>
+                        <a:t>5</a:t>
                       </a:r>
                       <a:endParaRPr lang="en-US" altLang="en-IN" dirty="0"/>
                     </a:p>
@@ -9354,7 +9244,7 @@
                       <a:pPr algn="ctr"/>
                       <a:r>
                         <a:rPr lang="en-US" altLang="en-IN" dirty="0"/>
-                        <a:t>19</a:t>
+                        <a:t>18</a:t>
                       </a:r>
                       <a:endParaRPr lang="en-US" altLang="en-IN" dirty="0"/>
                     </a:p>
@@ -9524,32 +9414,29 @@
             <p:ph type="title"/>
           </p:nvPr>
         </p:nvSpPr>
-        <p:spPr/>
+        <p:spPr>
+          <a:xfrm>
+            <a:off x="838200" y="365125"/>
+            <a:ext cx="10515600" cy="1235075"/>
+          </a:xfrm>
+        </p:spPr>
         <p:txBody>
-          <a:bodyPr>
-            <a:scene3d>
-              <a:camera prst="orthographicFront"/>
-              <a:lightRig rig="soft" dir="t">
-                <a:rot lat="0" lon="0" rev="15600000"/>
-              </a:lightRig>
-            </a:scene3d>
-            <a:sp3d extrusionH="57150" prstMaterial="softEdge">
-              <a:bevelT w="25400" h="38100"/>
-            </a:sp3d>
-          </a:bodyPr>
-          <a:p>
-            <a:r>
-              <a:rPr lang="en-US" u="sng">
+          <a:bodyPr/>
+          <a:p>
+            <a:r>
+              <a:rPr lang="en-US" sz="3200" b="1">
+                <a:ln/>
                 <a:solidFill>
-                  <a:schemeClr val="accent4"/>
+                  <a:schemeClr val="tx1"/>
                 </a:solidFill>
                 <a:effectLst/>
               </a:rPr>
               <a:t>Business Impact:Extremely High</a:t>
             </a:r>
-            <a:endParaRPr lang="en-US" u="sng">
+            <a:endParaRPr lang="en-US" sz="3200" b="1">
+              <a:ln/>
               <a:solidFill>
-                <a:schemeClr val="accent4"/>
+                <a:schemeClr val="tx1"/>
               </a:solidFill>
               <a:effectLst/>
             </a:endParaRPr>
@@ -9568,8 +9455,8 @@
         </p:nvSpPr>
         <p:spPr>
           <a:xfrm>
-            <a:off x="838200" y="1383030"/>
-            <a:ext cx="10515600" cy="1625600"/>
+            <a:off x="1042670" y="1543685"/>
+            <a:ext cx="10515600" cy="3453130"/>
           </a:xfrm>
         </p:spPr>
         <p:txBody>
@@ -9577,9 +9464,6 @@
             <a:noAutofit/>
           </a:bodyPr>
           <a:p>
-            <a:pPr marL="0" indent="0">
-              <a:buNone/>
-            </a:pPr>
             <a:r>
               <a:rPr lang="en-US">
                 <a:solidFill>
@@ -9597,9 +9481,6 @@
             </a:endParaRPr>
           </a:p>
           <a:p>
-            <a:pPr marL="0" indent="0">
-              <a:buNone/>
-            </a:pPr>
             <a:r>
               <a:rPr lang="en-US">
                 <a:solidFill>
@@ -9607,7 +9488,7 @@
                 </a:solidFill>
                 <a:uFillTx/>
               </a:rPr>
-              <a:t>Right from changing the seller details with their corresponding product to adding false product.They can make customers pay for false products and this may have a great business impact and hamper the privacy too. </a:t>
+              <a:t>Right from changing the product, product details, Seller, Category etc..They can even change the product image, this may have a great business impact and hamper the privacy too. </a:t>
             </a:r>
             <a:endParaRPr lang="en-US">
               <a:solidFill>
@@ -9617,9 +9498,6 @@
             </a:endParaRPr>
           </a:p>
           <a:p>
-            <a:pPr marL="0" indent="0">
-              <a:buNone/>
-            </a:pPr>
             <a:r>
               <a:rPr lang="en-US">
                 <a:solidFill>
@@ -9677,36 +9555,31 @@
             <p:ph type="title"/>
           </p:nvPr>
         </p:nvSpPr>
-        <p:spPr/>
+        <p:spPr>
+          <a:xfrm>
+            <a:off x="458470" y="350520"/>
+            <a:ext cx="10515600" cy="661670"/>
+          </a:xfrm>
+        </p:spPr>
         <p:txBody>
           <a:bodyPr/>
           <a:p>
             <a:r>
-              <a:rPr lang="en-US" u="sng">
+              <a:rPr lang="en-US" sz="3200" b="1">
+                <a:ln/>
                 <a:solidFill>
-                  <a:schemeClr val="accent1"/>
+                  <a:schemeClr val="tx1"/>
                 </a:solidFill>
-                <a:effectLst>
-                  <a:outerShdw blurRad="38100" dist="25400" dir="5400000" algn="ctr" rotWithShape="0">
-                    <a:srgbClr val="6E747A">
-                      <a:alpha val="43000"/>
-                    </a:srgbClr>
-                  </a:outerShdw>
-                </a:effectLst>
+                <a:effectLst/>
               </a:rPr>
               <a:t>Recommendation:</a:t>
             </a:r>
-            <a:endParaRPr lang="en-US" u="sng">
+            <a:endParaRPr lang="en-US" sz="3200" b="1">
+              <a:ln/>
               <a:solidFill>
-                <a:schemeClr val="accent1"/>
+                <a:schemeClr val="tx1"/>
               </a:solidFill>
-              <a:effectLst>
-                <a:outerShdw blurRad="38100" dist="25400" dir="5400000" algn="ctr" rotWithShape="0">
-                  <a:srgbClr val="6E747A">
-                    <a:alpha val="43000"/>
-                  </a:srgbClr>
-                </a:outerShdw>
-              </a:effectLst>
+              <a:effectLst/>
             </a:endParaRPr>
           </a:p>
         </p:txBody>
@@ -9719,8 +9592,8 @@
         </p:nvSpPr>
         <p:spPr>
           <a:xfrm>
-            <a:off x="838200" y="1548765"/>
-            <a:ext cx="10142855" cy="2584450"/>
+            <a:off x="662940" y="876935"/>
+            <a:ext cx="11078210" cy="4190365"/>
           </a:xfrm>
           <a:prstGeom prst="rect">
             <a:avLst/>
@@ -9734,37 +9607,47 @@
           <a:p>
             <a:r>
               <a:rPr lang="en-US"/>
-              <a:t>1)The length of the OTP should be done atleast 6.This makes bruteforcing impractical.</a:t>
+              <a:t>There are two ways to protect against forced browsing – enforcing an application URL space allow list and using proper access control.</a:t>
             </a:r>
             <a:endParaRPr lang="en-US"/>
           </a:p>
           <a:p>
+            <a:pPr>
+              <a:lnSpc>
+                <a:spcPct val="50000"/>
+              </a:lnSpc>
+            </a:pPr>
             <a:endParaRPr lang="en-US"/>
           </a:p>
           <a:p>
+            <a:pPr marL="285750" indent="-285750">
+              <a:buFont typeface="Arial" panose="020B0604020202020204" pitchFamily="34" charset="0"/>
+              <a:buChar char="•"/>
+            </a:pPr>
             <a:r>
               <a:rPr lang="en-US"/>
-              <a:t>2)There should be at least two-step verification before reseting password.</a:t>
+              <a:t>Creating an allow list (or whitelist) involves allowing explicit access to a set of URLs that are considered to be a part of the application to exercise its functionality as intended. Any request not in this URL space is denied by default. Manually creating and maintaining such a list can be tedious. You can use the Barracuda Web Application Firewall’s adaptive profiling to automatically create such a list and enforce it by learning the valid URL space from trusted traffic. It also comes with a block list of common files and directories that are commonly left exposed unintentionally.</a:t>
             </a:r>
             <a:endParaRPr lang="en-US"/>
           </a:p>
           <a:p>
+            <a:pPr marL="285750" indent="-285750">
+              <a:lnSpc>
+                <a:spcPct val="30000"/>
+              </a:lnSpc>
+              <a:buFont typeface="Arial" panose="020B0604020202020204" pitchFamily="34" charset="0"/>
+              <a:buChar char="•"/>
+            </a:pPr>
             <a:endParaRPr lang="en-US"/>
           </a:p>
           <a:p>
+            <a:pPr marL="285750" indent="-285750">
+              <a:buFont typeface="Arial" panose="020B0604020202020204" pitchFamily="34" charset="0"/>
+              <a:buChar char="•"/>
+            </a:pPr>
             <a:r>
               <a:rPr lang="en-US"/>
-              <a:t>3)Captcha can be used to protect from bruteforcing.</a:t>
-            </a:r>
-            <a:endParaRPr lang="en-US"/>
-          </a:p>
-          <a:p>
-            <a:endParaRPr lang="en-US"/>
-          </a:p>
-          <a:p>
-            <a:r>
-              <a:rPr lang="en-US"/>
-              <a:t>4)Number of attemps can be limited.</a:t>
+              <a:t>In the second method, using proper access control and authorization policies, access is only given to users commensurate with their privileges. The Barracuda Web Application Firewall provides authorization policies at a URL level along with protection against session-based attacks to provide proper access control enforcement against such abuse</a:t>
             </a:r>
             <a:endParaRPr lang="en-US"/>
           </a:p>
@@ -9786,8 +9669,8 @@
         </p:nvSpPr>
         <p:spPr>
           <a:xfrm>
-            <a:off x="935355" y="3720465"/>
-            <a:ext cx="10515600" cy="1325563"/>
+            <a:off x="555625" y="4359910"/>
+            <a:ext cx="10515600" cy="963930"/>
           </a:xfrm>
           <a:prstGeom prst="rect">
             <a:avLst/>
@@ -9818,31 +9701,21 @@
           </a:lstStyle>
           <a:p>
             <a:r>
-              <a:rPr lang="en-US" u="sng">
+              <a:rPr lang="en-US" sz="3200" b="1">
+                <a:ln/>
                 <a:solidFill>
-                  <a:schemeClr val="accent1"/>
+                  <a:schemeClr val="tx1"/>
                 </a:solidFill>
-                <a:effectLst>
-                  <a:outerShdw blurRad="38100" dist="25400" dir="5400000" algn="ctr" rotWithShape="0">
-                    <a:srgbClr val="6E747A">
-                      <a:alpha val="43000"/>
-                    </a:srgbClr>
-                  </a:outerShdw>
-                </a:effectLst>
+                <a:effectLst/>
               </a:rPr>
               <a:t>References:</a:t>
             </a:r>
-            <a:endParaRPr lang="en-US" u="sng">
+            <a:endParaRPr lang="en-US" sz="3200" b="1">
+              <a:ln/>
               <a:solidFill>
-                <a:schemeClr val="accent1"/>
+                <a:schemeClr val="tx1"/>
               </a:solidFill>
-              <a:effectLst>
-                <a:outerShdw blurRad="38100" dist="25400" dir="5400000" algn="ctr" rotWithShape="0">
-                  <a:srgbClr val="6E747A">
-                    <a:alpha val="43000"/>
-                  </a:srgbClr>
-                </a:outerShdw>
-              </a:effectLst>
+              <a:effectLst/>
             </a:endParaRPr>
           </a:p>
         </p:txBody>
@@ -9855,8 +9728,8 @@
         </p:nvSpPr>
         <p:spPr>
           <a:xfrm>
-            <a:off x="935355" y="4895215"/>
-            <a:ext cx="9928860" cy="922020"/>
+            <a:off x="935355" y="5099685"/>
+            <a:ext cx="9928860" cy="1198880"/>
           </a:xfrm>
           <a:prstGeom prst="rect">
             <a:avLst/>
@@ -9868,19 +9741,42 @@
             <a:spAutoFit/>
           </a:bodyPr>
           <a:p>
+            <a:pPr indent="0">
+              <a:buNone/>
+            </a:pPr>
             <a:r>
               <a:rPr lang="en-US"/>
-              <a:t>1)https://www.cloudways.com/blog/what-is-brute-force-attack/</a:t>
+              <a:t>1. https://hackingheart.wordpress.com/2012/07/03/forced-browsing-attack/</a:t>
             </a:r>
             <a:endParaRPr lang="en-US"/>
           </a:p>
           <a:p>
+            <a:pPr indent="0">
+              <a:buNone/>
+            </a:pPr>
+            <a:r>
+              <a:rPr lang="en-US"/>
+              <a:t>2. https://seclists.org/webappsec/2006/q3/182</a:t>
+            </a:r>
             <a:endParaRPr lang="en-US"/>
           </a:p>
           <a:p>
+            <a:pPr indent="0">
+              <a:buNone/>
+            </a:pPr>
             <a:r>
               <a:rPr lang="en-US"/>
-              <a:t>2)https://www.owasp.org/index.php/Blocking_Brute_Force_Attacks</a:t>
+              <a:t>3. http://projects.webappsec.org/w/page/13246953/Predictable%20Resource%20Location</a:t>
+            </a:r>
+            <a:endParaRPr lang="en-US"/>
+          </a:p>
+          <a:p>
+            <a:pPr indent="0">
+              <a:buNone/>
+            </a:pPr>
+            <a:r>
+              <a:rPr lang="en-US"/>
+              <a:t>4. https://cwe.mitre.org/data/definitions/425.html</a:t>
             </a:r>
             <a:endParaRPr lang="en-US"/>
           </a:p>
@@ -13015,7 +12911,7 @@
                         <a:rPr lang="en-US" sz="1300" b="0" dirty="0">
                           <a:latin typeface="Calibri" panose="020F0502020204030204" charset="0"/>
                         </a:rPr>
-                        <a:t>Severe</a:t>
+                        <a:t>Critical</a:t>
                       </a:r>
                       <a:endParaRPr lang="en-US" sz="1300" b="0" dirty="0">
                         <a:latin typeface="Calibri" panose="020F0502020204030204" charset="0"/>
@@ -14114,7 +14010,7 @@
         </p:nvSpPr>
         <p:spPr>
           <a:xfrm>
-            <a:off x="543560" y="127000"/>
+            <a:off x="864870" y="127000"/>
             <a:ext cx="10515600" cy="1325563"/>
           </a:xfrm>
         </p:spPr>
@@ -14123,10 +14019,10 @@
           <a:lstStyle/>
           <a:p>
             <a:r>
-              <a:rPr lang="en-IN" dirty="0" smtClean="0"/>
+              <a:rPr lang="en-IN" sz="4000" b="1" dirty="0" smtClean="0"/>
               <a:t>Vulnerabilities:</a:t>
             </a:r>
-            <a:endParaRPr lang="en-IN" dirty="0"/>
+            <a:endParaRPr lang="en-IN" sz="4000" b="1" dirty="0" smtClean="0"/>
           </a:p>
         </p:txBody>
       </p:sp>
@@ -20504,10 +20400,10 @@
           <a:lstStyle/>
           <a:p>
             <a:r>
-              <a:rPr lang="en-IN" dirty="0" smtClean="0"/>
+              <a:rPr lang="en-IN" sz="4000" b="1" dirty="0" smtClean="0"/>
               <a:t>1. SQL Injection</a:t>
             </a:r>
-            <a:endParaRPr lang="en-IN" dirty="0"/>
+            <a:endParaRPr lang="en-IN" sz="4000" b="1" dirty="0" smtClean="0"/>
           </a:p>
         </p:txBody>
       </p:sp>
@@ -26297,7 +26193,7 @@
           <a:bodyPr/>
           <a:p>
             <a:r>
-              <a:rPr lang="en-IN" b="1" dirty="0" smtClean="0">
+              <a:rPr lang="en-IN" sz="3200" b="1" dirty="0" smtClean="0">
                 <a:ln/>
                 <a:solidFill>
                   <a:schemeClr val="tx1"/>
@@ -26306,7 +26202,7 @@
               </a:rPr>
               <a:t>Observation</a:t>
             </a:r>
-            <a:endParaRPr lang="en-IN" b="1" dirty="0" smtClean="0">
+            <a:endParaRPr lang="en-IN" sz="3200" b="1" dirty="0" smtClean="0">
               <a:ln/>
               <a:solidFill>
                 <a:schemeClr val="tx1"/>
@@ -28519,10 +28415,10 @@
           <a:bodyPr/>
           <a:p>
             <a:r>
-              <a:rPr lang="en-US" b="1"/>
+              <a:rPr lang="en-US" sz="3200" b="1"/>
               <a:t>POC using SQL-map</a:t>
             </a:r>
-            <a:endParaRPr lang="en-US" b="1"/>
+            <a:endParaRPr lang="en-US" sz="3200" b="1"/>
           </a:p>
         </p:txBody>
       </p:sp>

</xml_diff>

<commit_message>
reports: Cross Site Request Forgery ppt done
</commit_message>
<xml_diff>
--- a/reports/Lifestyle Store/LifeStyle Store Application Reports.pptx
+++ b/reports/Lifestyle Store/LifeStyle Store Application Reports.pptx
@@ -14422,43 +14422,21 @@
           <a:bodyPr/>
           <a:p>
             <a:r>
-              <a:rPr lang="en-US" u="sng">
-                <a:ln w="10160">
-                  <a:solidFill>
-                    <a:schemeClr val="accent5"/>
-                  </a:solidFill>
-                  <a:prstDash val="solid"/>
-                </a:ln>
+              <a:rPr lang="en-US" sz="3200" b="1">
+                <a:ln/>
                 <a:solidFill>
-                  <a:srgbClr val="FFFFFF"/>
+                  <a:schemeClr val="tx1"/>
                 </a:solidFill>
-                <a:effectLst>
-                  <a:outerShdw blurRad="38100" dist="22860" dir="5400000" algn="tl" rotWithShape="0">
-                    <a:srgbClr val="000000">
-                      <a:alpha val="30000"/>
-                    </a:srgbClr>
-                  </a:outerShdw>
-                </a:effectLst>
+                <a:effectLst/>
               </a:rPr>
               <a:t>7. Cross Site Request Forgery(CSRF):</a:t>
             </a:r>
-            <a:endParaRPr lang="en-US" u="sng">
-              <a:ln w="10160">
-                <a:solidFill>
-                  <a:schemeClr val="accent5"/>
-                </a:solidFill>
-                <a:prstDash val="solid"/>
-              </a:ln>
+            <a:endParaRPr lang="en-US" sz="3200" b="1">
+              <a:ln/>
               <a:solidFill>
-                <a:srgbClr val="FFFFFF"/>
+                <a:schemeClr val="tx1"/>
               </a:solidFill>
-              <a:effectLst>
-                <a:outerShdw blurRad="38100" dist="22860" dir="5400000" algn="tl" rotWithShape="0">
-                  <a:srgbClr val="000000">
-                    <a:alpha val="30000"/>
-                  </a:srgbClr>
-                </a:outerShdw>
-              </a:effectLst>
+              <a:effectLst/>
             </a:endParaRPr>
           </a:p>
         </p:txBody>
@@ -14474,8 +14452,8 @@
           </p:nvPr>
         </p:nvGraphicFramePr>
         <p:xfrm>
-          <a:off x="1294765" y="1841500"/>
-          <a:ext cx="10059035" cy="4232275"/>
+          <a:off x="1812290" y="1768475"/>
+          <a:ext cx="8340090" cy="3543300"/>
         </p:xfrm>
         <a:graphic>
           <a:graphicData uri="http://schemas.openxmlformats.org/drawingml/2006/table">
@@ -14484,16 +14462,19 @@
                 <a:tableStyleId>{5C22544A-7EE6-4342-B048-85BDC9FD1C3A}</a:tableStyleId>
               </a:tblPr>
               <a:tblGrid>
-                <a:gridCol w="1753870"/>
-                <a:gridCol w="8305165"/>
+                <a:gridCol w="1454785"/>
+                <a:gridCol w="6885305"/>
               </a:tblGrid>
-              <a:tr h="296545">
+              <a:tr h="280670">
                 <a:tc>
                   <a:txBody>
                     <a:bodyPr/>
                     <a:p>
                       <a:pPr algn="ctr"/>
-                      <a:endParaRPr lang="en-US" sz="1200" dirty="0"/>
+                      <a:endParaRPr lang="en-US" sz="1300" dirty="0">
+                        <a:latin typeface="Calibri" panose="020F0502020204030204" charset="0"/>
+                        <a:cs typeface="Calibri" panose="020F0502020204030204" charset="0"/>
+                      </a:endParaRPr>
                     </a:p>
                   </a:txBody>
                   <a:tcPr marL="82988" marR="82988" marT="41494" marB="41494">
@@ -14530,7 +14511,10 @@
                   <a:txBody>
                     <a:bodyPr/>
                     <a:p>
-                      <a:endParaRPr lang="en-US" sz="1200" dirty="0"/>
+                      <a:endParaRPr lang="en-US" sz="1300" dirty="0">
+                        <a:latin typeface="Calibri" panose="020F0502020204030204" charset="0"/>
+                        <a:cs typeface="Calibri" panose="020F0502020204030204" charset="0"/>
+                      </a:endParaRPr>
                     </a:p>
                   </a:txBody>
                   <a:tcPr marL="82988" marR="82988" marT="41494" marB="41494">
@@ -14564,44 +14548,48 @@
                   </a:tcPr>
                 </a:tc>
               </a:tr>
-              <a:tr h="1926590">
+              <a:tr h="1865630">
                 <a:tc rowSpan="2">
                   <a:txBody>
                     <a:bodyPr/>
                     <a:p>
                       <a:pPr algn="ctr"/>
                       <a:r>
-                        <a:rPr lang="en-IN" sz="1200" dirty="0" smtClean="0">
+                        <a:rPr lang="en-IN" sz="1600" dirty="0" smtClean="0">
                           <a:solidFill>
                             <a:srgbClr val="FFFFFF"/>
                           </a:solidFill>
                           <a:latin typeface="Calibri" panose="020F0502020204030204" charset="0"/>
+                          <a:cs typeface="Calibri" panose="020F0502020204030204" charset="0"/>
                         </a:rPr>
                         <a:t> Cross Site </a:t>
                       </a:r>
                       <a:r>
-                        <a:rPr lang="en-US" altLang="en-IN" sz="1200" dirty="0" smtClean="0">
+                        <a:rPr lang="en-US" altLang="en-IN" sz="1600" dirty="0" smtClean="0">
                           <a:solidFill>
                             <a:srgbClr val="FFFFFF"/>
                           </a:solidFill>
                           <a:latin typeface="Calibri" panose="020F0502020204030204" charset="0"/>
+                          <a:cs typeface="Calibri" panose="020F0502020204030204" charset="0"/>
                         </a:rPr>
                         <a:t>Request Forgery</a:t>
                       </a:r>
                       <a:r>
-                        <a:rPr lang="en-US" sz="1100" dirty="0" smtClean="0">
+                        <a:rPr lang="en-US" sz="1600" dirty="0" smtClean="0">
                           <a:solidFill>
                             <a:srgbClr val="FFFFFF"/>
                           </a:solidFill>
                           <a:latin typeface="Calibri" panose="020F0502020204030204" charset="0"/>
+                          <a:cs typeface="Calibri" panose="020F0502020204030204" charset="0"/>
                         </a:rPr>
                         <a:t>(Severe)</a:t>
                       </a:r>
-                      <a:endParaRPr lang="en-US" sz="1100" dirty="0">
+                      <a:endParaRPr lang="en-US" sz="1600" dirty="0" smtClean="0">
                         <a:solidFill>
                           <a:srgbClr val="FFFFFF"/>
                         </a:solidFill>
                         <a:latin typeface="Calibri" panose="020F0502020204030204" charset="0"/>
+                        <a:cs typeface="Calibri" panose="020F0502020204030204" charset="0"/>
                       </a:endParaRPr>
                     </a:p>
                   </a:txBody>
@@ -14652,32 +14640,35 @@
                     <a:bodyPr/>
                     <a:p>
                       <a:r>
-                        <a:rPr lang="en-US" sz="1100" dirty="0" smtClean="0">
+                        <a:rPr lang="en-US" sz="1300" dirty="0" smtClean="0">
                           <a:solidFill>
                             <a:schemeClr val="tx1"/>
                           </a:solidFill>
                           <a:latin typeface="Calibri" panose="020F0502020204030204" charset="0"/>
+                          <a:cs typeface="Calibri" panose="020F0502020204030204" charset="0"/>
                         </a:rPr>
                         <a:t> </a:t>
                       </a:r>
-                      <a:endParaRPr lang="en-US" sz="1100" dirty="0">
+                      <a:endParaRPr lang="en-US" sz="1300" dirty="0">
                         <a:solidFill>
                           <a:schemeClr val="tx1"/>
                         </a:solidFill>
                         <a:latin typeface="Calibri" panose="020F0502020204030204" charset="0"/>
-                      </a:endParaRPr>
-                    </a:p>
-                    <a:p>
-                      <a:r>
-                        <a:rPr lang="en-US" sz="1100" baseline="0" dirty="0" smtClean="0">
+                        <a:cs typeface="Calibri" panose="020F0502020204030204" charset="0"/>
+                      </a:endParaRPr>
+                    </a:p>
+                    <a:p>
+                      <a:r>
+                        <a:rPr lang="en-US" sz="1300" baseline="0" dirty="0" smtClean="0">
                           <a:solidFill>
                             <a:schemeClr val="tx1"/>
                           </a:solidFill>
                           <a:latin typeface="Calibri" panose="020F0502020204030204" charset="0"/>
+                          <a:cs typeface="Calibri" panose="020F0502020204030204" charset="0"/>
                         </a:rPr>
                         <a:t>CSRF is found in the modules below:-</a:t>
                       </a:r>
-                      <a:endParaRPr lang="en-US" sz="1100" dirty="0" smtClean="0">
+                      <a:endParaRPr lang="en-US" sz="1300" dirty="0" smtClean="0">
                         <a:solidFill>
                           <a:schemeClr val="tx1"/>
                         </a:solidFill>
@@ -14686,31 +14677,33 @@
                       </a:endParaRPr>
                     </a:p>
                     <a:p>
-                      <a:endParaRPr lang="en-US" sz="1100" dirty="0" smtClean="0">
+                      <a:endParaRPr lang="en-US" sz="1300" dirty="0" smtClean="0">
                         <a:solidFill>
                           <a:schemeClr val="tx1"/>
                         </a:solidFill>
                         <a:latin typeface="Calibri" panose="020F0502020204030204" charset="0"/>
-                      </a:endParaRPr>
-                    </a:p>
-                    <a:p>
-                      <a:r>
-                        <a:rPr lang="en-US" sz="1100" b="1" dirty="0" smtClean="0">
+                        <a:cs typeface="Calibri" panose="020F0502020204030204" charset="0"/>
+                      </a:endParaRPr>
+                    </a:p>
+                    <a:p>
+                      <a:r>
+                        <a:rPr lang="en-US" sz="1300" b="1" dirty="0" smtClean="0">
                           <a:solidFill>
                             <a:schemeClr val="tx1"/>
                           </a:solidFill>
                           <a:latin typeface="Calibri" panose="020F0502020204030204" charset="0"/>
+                          <a:cs typeface="Calibri" panose="020F0502020204030204" charset="0"/>
                         </a:rPr>
                         <a:t>Affected URL :</a:t>
                       </a:r>
-                      <a:endParaRPr lang="en-US" sz="1100" b="0" i="0" u="none" strike="noStrike" dirty="0" smtClean="0">
+                      <a:endParaRPr lang="en-US" sz="1300" b="0" i="0" u="none" strike="noStrike" dirty="0" smtClean="0">
                         <a:solidFill>
                           <a:schemeClr val="tx1"/>
                         </a:solidFill>
                         <a:effectLst/>
                         <a:latin typeface="Calibri" panose="020F0502020204030204" charset="0"/>
                         <a:ea typeface="+mn-ea"/>
-                        <a:cs typeface="+mn-cs"/>
+                        <a:cs typeface="Calibri" panose="020F0502020204030204" charset="0"/>
                         <a:sym typeface="Arial" panose="020B0604020202020204"/>
                       </a:endParaRPr>
                     </a:p>
@@ -14720,19 +14713,21 @@
                         <a:buChar char="•"/>
                       </a:pPr>
                       <a:r>
-                        <a:rPr lang="en-US" sz="1100" b="0" dirty="0" smtClean="0">
+                        <a:rPr lang="en-US" sz="1300" b="0" dirty="0" smtClean="0">
                           <a:solidFill>
                             <a:schemeClr val="tx1"/>
                           </a:solidFill>
                           <a:latin typeface="Calibri" panose="020F0502020204030204" charset="0"/>
-                        </a:rPr>
-                        <a:t>http://52.66.198.61/profile/change_password.php</a:t>
-                      </a:r>
-                      <a:endParaRPr lang="en-US" sz="1100" b="0" dirty="0" smtClean="0">
+                          <a:cs typeface="Calibri" panose="020F0502020204030204" charset="0"/>
+                        </a:rPr>
+                        <a:t>http://35.154.249.93/profile/change_password.php</a:t>
+                      </a:r>
+                      <a:endParaRPr lang="en-US" sz="1300" b="0" dirty="0" smtClean="0">
                         <a:solidFill>
                           <a:schemeClr val="tx1"/>
                         </a:solidFill>
                         <a:latin typeface="Calibri" panose="020F0502020204030204" charset="0"/>
+                        <a:cs typeface="Calibri" panose="020F0502020204030204" charset="0"/>
                       </a:endParaRPr>
                     </a:p>
                     <a:p>
@@ -14752,11 +14747,12 @@
                         <a:buNone/>
                         <a:defRPr/>
                       </a:pPr>
-                      <a:endParaRPr lang="en-US" sz="1100" b="1" dirty="0" smtClean="0">
+                      <a:endParaRPr lang="en-US" sz="1300" b="1" dirty="0" smtClean="0">
                         <a:solidFill>
                           <a:schemeClr val="tx1"/>
                         </a:solidFill>
                         <a:latin typeface="Calibri" panose="020F0502020204030204" charset="0"/>
+                        <a:cs typeface="Calibri" panose="020F0502020204030204" charset="0"/>
                       </a:endParaRPr>
                     </a:p>
                     <a:p>
@@ -14777,37 +14773,41 @@
                         <a:defRPr/>
                       </a:pPr>
                       <a:r>
-                        <a:rPr lang="en-US" sz="1100" b="1" dirty="0" smtClean="0">
+                        <a:rPr lang="en-US" sz="1300" b="1" dirty="0" smtClean="0">
                           <a:solidFill>
                             <a:schemeClr val="tx1"/>
                           </a:solidFill>
                           <a:latin typeface="Calibri" panose="020F0502020204030204" charset="0"/>
+                          <a:cs typeface="Calibri" panose="020F0502020204030204" charset="0"/>
                         </a:rPr>
                         <a:t>Affected</a:t>
                       </a:r>
                       <a:r>
-                        <a:rPr lang="en-US" sz="1100" b="1" baseline="0" dirty="0" smtClean="0">
+                        <a:rPr lang="en-US" sz="1300" b="1" baseline="0" dirty="0" smtClean="0">
                           <a:solidFill>
                             <a:schemeClr val="tx1"/>
                           </a:solidFill>
                           <a:latin typeface="Calibri" panose="020F0502020204030204" charset="0"/>
+                          <a:cs typeface="Calibri" panose="020F0502020204030204" charset="0"/>
                         </a:rPr>
                         <a:t> Parameters</a:t>
                       </a:r>
                       <a:r>
-                        <a:rPr lang="en-US" sz="1100" b="1" dirty="0" smtClean="0">
+                        <a:rPr lang="en-US" sz="1300" b="1" dirty="0" smtClean="0">
                           <a:solidFill>
                             <a:schemeClr val="tx1"/>
                           </a:solidFill>
                           <a:latin typeface="Calibri" panose="020F0502020204030204" charset="0"/>
+                          <a:cs typeface="Calibri" panose="020F0502020204030204" charset="0"/>
                         </a:rPr>
                         <a:t> :</a:t>
                       </a:r>
-                      <a:endParaRPr lang="en-US" sz="1100" b="0" dirty="0" smtClean="0">
+                      <a:endParaRPr lang="en-US" sz="1300" b="0" dirty="0" smtClean="0">
                         <a:solidFill>
                           <a:schemeClr val="tx1"/>
                         </a:solidFill>
                         <a:latin typeface="Calibri" panose="020F0502020204030204" charset="0"/>
+                        <a:cs typeface="Calibri" panose="020F0502020204030204" charset="0"/>
                       </a:endParaRPr>
                     </a:p>
                     <a:p>
@@ -14816,31 +14816,21 @@
                         <a:buChar char="•"/>
                       </a:pPr>
                       <a:r>
-                        <a:rPr lang="en-US" sz="1100" b="0" baseline="0" dirty="0" smtClean="0">
+                        <a:rPr lang="en-US" sz="1300" b="0" baseline="0" dirty="0" smtClean="0">
                           <a:solidFill>
                             <a:schemeClr val="tx1"/>
                           </a:solidFill>
                           <a:latin typeface="Calibri" panose="020F0502020204030204" charset="0"/>
+                          <a:cs typeface="Calibri" panose="020F0502020204030204" charset="0"/>
                         </a:rPr>
                         <a:t>Update(POST)</a:t>
                       </a:r>
-                      <a:endParaRPr lang="en-US" sz="1100" b="0" baseline="0" dirty="0" smtClean="0">
+                      <a:endParaRPr lang="en-US" sz="1300" b="0" dirty="0" smtClean="0">
                         <a:solidFill>
                           <a:schemeClr val="tx1"/>
                         </a:solidFill>
                         <a:latin typeface="Calibri" panose="020F0502020204030204" charset="0"/>
-                      </a:endParaRPr>
-                    </a:p>
-                    <a:p>
-                      <a:pPr indent="0">
-                        <a:buFont typeface="Arial" panose="020B0604020202020204" pitchFamily="34" charset="0"/>
-                        <a:buNone/>
-                      </a:pPr>
-                      <a:endParaRPr lang="en-US" sz="1100" b="0" dirty="0" smtClean="0">
-                        <a:solidFill>
-                          <a:schemeClr val="tx1"/>
-                        </a:solidFill>
-                        <a:latin typeface="Calibri" panose="020F0502020204030204" charset="0"/>
+                        <a:cs typeface="Calibri" panose="020F0502020204030204" charset="0"/>
                       </a:endParaRPr>
                     </a:p>
                     <a:p>
@@ -14848,23 +14838,12 @@
                         <a:buFont typeface="Arial" panose="020B0604020202020204" pitchFamily="34" charset="0"/>
                         <a:buNone/>
                       </a:pPr>
-                      <a:endParaRPr lang="en-US" sz="1100" b="0" dirty="0" smtClean="0">
+                      <a:endParaRPr lang="en-US" sz="1300" b="0" dirty="0" smtClean="0">
                         <a:solidFill>
                           <a:schemeClr val="tx1"/>
                         </a:solidFill>
                         <a:latin typeface="Calibri" panose="020F0502020204030204" charset="0"/>
-                      </a:endParaRPr>
-                    </a:p>
-                    <a:p>
-                      <a:pPr marL="0" indent="0">
-                        <a:buFont typeface="Arial" panose="020B0604020202020204" pitchFamily="34" charset="0"/>
-                        <a:buNone/>
-                      </a:pPr>
-                      <a:endParaRPr lang="en-US" sz="1100" b="0" dirty="0">
-                        <a:solidFill>
-                          <a:schemeClr val="tx1"/>
-                        </a:solidFill>
-                        <a:latin typeface="Calibri" panose="020F0502020204030204" charset="0"/>
+                        <a:cs typeface="Calibri" panose="020F0502020204030204" charset="0"/>
                       </a:endParaRPr>
                     </a:p>
                   </a:txBody>
@@ -14911,7 +14890,7 @@
                   </a:tcPr>
                 </a:tc>
               </a:tr>
-              <a:tr h="2009140">
+              <a:tr h="1397000">
                 <a:tc vMerge="1">
                   <a:tcPr/>
                 </a:tc>
@@ -14920,22 +14899,23 @@
                     <a:bodyPr/>
                     <a:p>
                       <a:r>
-                        <a:rPr lang="en-US" sz="1100" b="1" dirty="0" smtClean="0">
+                        <a:rPr lang="en-US" sz="1300" b="1" dirty="0" smtClean="0">
                           <a:solidFill>
                             <a:schemeClr val="tx1"/>
                           </a:solidFill>
                           <a:latin typeface="Calibri" panose="020F0502020204030204" charset="0"/>
+                          <a:cs typeface="Calibri" panose="020F0502020204030204" charset="0"/>
                         </a:rPr>
                         <a:t>Affected URL :</a:t>
                       </a:r>
-                      <a:endParaRPr lang="en-US" sz="1100" b="0" i="0" u="none" strike="noStrike" dirty="0" smtClean="0">
+                      <a:endParaRPr lang="en-US" sz="1300" b="0" i="0" u="none" strike="noStrike" dirty="0" smtClean="0">
                         <a:solidFill>
                           <a:schemeClr val="tx1"/>
                         </a:solidFill>
                         <a:effectLst/>
                         <a:latin typeface="Calibri" panose="020F0502020204030204" charset="0"/>
                         <a:ea typeface="+mn-ea"/>
-                        <a:cs typeface="+mn-cs"/>
+                        <a:cs typeface="Calibri" panose="020F0502020204030204" charset="0"/>
                         <a:sym typeface="Arial" panose="020B0604020202020204"/>
                       </a:endParaRPr>
                     </a:p>
@@ -14945,7 +14925,7 @@
                         <a:buChar char="•"/>
                       </a:pPr>
                       <a:r>
-                        <a:rPr lang="en-US" sz="1100" b="0" i="0" u="none" strike="noStrike" dirty="0" smtClean="0">
+                        <a:rPr lang="en-US" sz="1300" b="0" i="0" u="none" strike="noStrike" dirty="0" smtClean="0">
                           <a:solidFill>
                             <a:schemeClr val="dk1"/>
                           </a:solidFill>
@@ -14955,9 +14935,9 @@
                           <a:cs typeface="Calibri" panose="020F0502020204030204" charset="0"/>
                           <a:sym typeface="Arial" panose="020B0604020202020204"/>
                         </a:rPr>
-                        <a:t>http://52.66.198.61/cart/cart.php</a:t>
-                      </a:r>
-                      <a:endParaRPr lang="en-US" sz="1100" b="0" i="0" u="none" strike="noStrike" dirty="0" smtClean="0">
+                        <a:t>http://35.154.249.93/cart/cart.php</a:t>
+                      </a:r>
+                      <a:endParaRPr lang="en-US" sz="1300" b="0" i="0" u="none" strike="noStrike" dirty="0" smtClean="0">
                         <a:solidFill>
                           <a:schemeClr val="dk1"/>
                         </a:solidFill>
@@ -14973,11 +14953,12 @@
                         <a:buFont typeface="Arial" panose="020B0604020202020204" pitchFamily="34" charset="0"/>
                         <a:buChar char="•"/>
                       </a:pPr>
-                      <a:endParaRPr lang="en-US" sz="1100" b="0" dirty="0" smtClean="0">
+                      <a:endParaRPr lang="en-US" sz="1300" b="0" dirty="0" smtClean="0">
                         <a:solidFill>
                           <a:schemeClr val="tx1"/>
                         </a:solidFill>
                         <a:latin typeface="Calibri" panose="020F0502020204030204" charset="0"/>
+                        <a:cs typeface="Calibri" panose="020F0502020204030204" charset="0"/>
                       </a:endParaRPr>
                     </a:p>
                     <a:p>
@@ -14998,37 +14979,41 @@
                         <a:defRPr/>
                       </a:pPr>
                       <a:r>
-                        <a:rPr lang="en-US" sz="1100" b="1" dirty="0" smtClean="0">
+                        <a:rPr lang="en-US" sz="1300" b="1" dirty="0" smtClean="0">
                           <a:solidFill>
                             <a:schemeClr val="tx1"/>
                           </a:solidFill>
                           <a:latin typeface="Calibri" panose="020F0502020204030204" charset="0"/>
+                          <a:cs typeface="Calibri" panose="020F0502020204030204" charset="0"/>
                         </a:rPr>
                         <a:t>Affected</a:t>
                       </a:r>
                       <a:r>
-                        <a:rPr lang="en-US" sz="1100" b="1" baseline="0" dirty="0" smtClean="0">
+                        <a:rPr lang="en-US" sz="1300" b="1" baseline="0" dirty="0" smtClean="0">
                           <a:solidFill>
                             <a:schemeClr val="tx1"/>
                           </a:solidFill>
                           <a:latin typeface="Calibri" panose="020F0502020204030204" charset="0"/>
+                          <a:cs typeface="Calibri" panose="020F0502020204030204" charset="0"/>
                         </a:rPr>
                         <a:t> Parameters</a:t>
                       </a:r>
                       <a:r>
-                        <a:rPr lang="en-US" sz="1100" b="1" dirty="0" smtClean="0">
+                        <a:rPr lang="en-US" sz="1300" b="1" dirty="0" smtClean="0">
                           <a:solidFill>
                             <a:schemeClr val="tx1"/>
                           </a:solidFill>
                           <a:latin typeface="Calibri" panose="020F0502020204030204" charset="0"/>
+                          <a:cs typeface="Calibri" panose="020F0502020204030204" charset="0"/>
                         </a:rPr>
                         <a:t> :</a:t>
                       </a:r>
-                      <a:endParaRPr lang="en-US" sz="1100" b="0" dirty="0" smtClean="0">
+                      <a:endParaRPr lang="en-US" sz="1300" b="0" dirty="0" smtClean="0">
                         <a:solidFill>
                           <a:schemeClr val="tx1"/>
                         </a:solidFill>
                         <a:latin typeface="Calibri" panose="020F0502020204030204" charset="0"/>
+                        <a:cs typeface="Calibri" panose="020F0502020204030204" charset="0"/>
                       </a:endParaRPr>
                     </a:p>
                     <a:p>
@@ -15037,19 +15022,21 @@
                         <a:buChar char="•"/>
                       </a:pPr>
                       <a:r>
-                        <a:rPr lang="en-US" sz="1100" b="0" baseline="0" dirty="0" smtClean="0">
+                        <a:rPr lang="en-US" sz="1300" b="0" baseline="0" dirty="0" smtClean="0">
                           <a:solidFill>
                             <a:schemeClr val="tx1"/>
                           </a:solidFill>
                           <a:latin typeface="Calibri" panose="020F0502020204030204" charset="0"/>
+                          <a:cs typeface="Calibri" panose="020F0502020204030204" charset="0"/>
                         </a:rPr>
                         <a:t>Confirm order option(POST)</a:t>
                       </a:r>
-                      <a:endParaRPr lang="en-US" sz="1100" b="0" dirty="0">
+                      <a:endParaRPr lang="en-US" sz="1300" b="0" baseline="0" dirty="0" smtClean="0">
                         <a:solidFill>
                           <a:schemeClr val="tx1"/>
                         </a:solidFill>
                         <a:latin typeface="Calibri" panose="020F0502020204030204" charset="0"/>
+                        <a:cs typeface="Calibri" panose="020F0502020204030204" charset="0"/>
                       </a:endParaRPr>
                     </a:p>
                   </a:txBody>
@@ -15129,36 +15116,31 @@
             <p:ph type="title"/>
           </p:nvPr>
         </p:nvSpPr>
-        <p:spPr/>
+        <p:spPr>
+          <a:xfrm>
+            <a:off x="840105" y="457200"/>
+            <a:ext cx="3931920" cy="709295"/>
+          </a:xfrm>
+        </p:spPr>
         <p:txBody>
           <a:bodyPr/>
           <a:p>
             <a:r>
-              <a:rPr lang="en-US" u="sng">
+              <a:rPr lang="en-US" sz="3200" b="1">
+                <a:ln/>
                 <a:solidFill>
-                  <a:schemeClr val="accent1"/>
+                  <a:schemeClr val="tx1"/>
                 </a:solidFill>
-                <a:effectLst>
-                  <a:outerShdw blurRad="38100" dist="25400" dir="5400000" algn="ctr" rotWithShape="0">
-                    <a:srgbClr val="6E747A">
-                      <a:alpha val="43000"/>
-                    </a:srgbClr>
-                  </a:outerShdw>
-                </a:effectLst>
+                <a:effectLst/>
               </a:rPr>
               <a:t>Observation:</a:t>
             </a:r>
-            <a:endParaRPr lang="en-US" u="sng">
+            <a:endParaRPr lang="en-US" sz="3200" b="1">
+              <a:ln/>
               <a:solidFill>
-                <a:schemeClr val="accent1"/>
+                <a:schemeClr val="tx1"/>
               </a:solidFill>
-              <a:effectLst>
-                <a:outerShdw blurRad="38100" dist="25400" dir="5400000" algn="ctr" rotWithShape="0">
-                  <a:srgbClr val="6E747A">
-                    <a:alpha val="43000"/>
-                  </a:srgbClr>
-                </a:outerShdw>
-              </a:effectLst>
+              <a:effectLst/>
             </a:endParaRPr>
           </a:p>
         </p:txBody>
@@ -15170,13 +15152,13 @@
             <a:spLocks noGrp="1"/>
           </p:cNvSpPr>
           <p:nvPr>
-            <p:ph type="body" idx="1"/>
+            <p:ph type="body" sz="half" idx="2"/>
           </p:nvPr>
         </p:nvSpPr>
         <p:spPr>
           <a:xfrm>
-            <a:off x="838200" y="1545590"/>
-            <a:ext cx="10515600" cy="857885"/>
+            <a:off x="956945" y="1312545"/>
+            <a:ext cx="10413365" cy="775335"/>
           </a:xfrm>
         </p:spPr>
         <p:txBody>
@@ -15189,27 +15171,39 @@
               <a:buNone/>
             </a:pPr>
             <a:r>
-              <a:rPr lang="en-US"/>
+              <a:rPr lang="en-US" sz="2400"/>
               <a:t>We navigate to '</a:t>
             </a:r>
             <a:r>
-              <a:rPr lang="en-US" dirty="0" smtClean="0">
+              <a:rPr lang="en-US" sz="2400" dirty="0" smtClean="0">
                 <a:latin typeface="Calibri" panose="020F0502020204030204" charset="0"/>
                 <a:sym typeface="+mn-ea"/>
               </a:rPr>
-              <a:t>http://52.66.198.61/profile/change_password.php' after logging in to our account.</a:t>
-            </a:r>
-            <a:endParaRPr lang="en-US"/>
+              <a:t>http://35.154.249.93/profile/change_password.php</a:t>
+            </a:r>
+            <a:r>
+              <a:rPr lang="en-US" sz="2400" dirty="0" smtClean="0">
+                <a:latin typeface="Calibri" panose="020F0502020204030204" charset="0"/>
+                <a:sym typeface="+mn-ea"/>
+              </a:rPr>
+              <a:t>' after logging in to our account.</a:t>
+            </a:r>
+            <a:endParaRPr lang="en-US" sz="2400" dirty="0" smtClean="0">
+              <a:latin typeface="Calibri" panose="020F0502020204030204" charset="0"/>
+              <a:sym typeface="+mn-ea"/>
+            </a:endParaRPr>
           </a:p>
         </p:txBody>
       </p:sp>
       <p:pic>
         <p:nvPicPr>
-          <p:cNvPr id="4" name="Picture 3" descr="Change password webpage"/>
+          <p:cNvPr id="5" name="Picture Placeholder 4" descr="observation"/>
           <p:cNvPicPr>
             <a:picLocks noChangeAspect="1"/>
           </p:cNvPicPr>
-          <p:nvPr/>
+          <p:nvPr>
+            <p:ph type="pic" idx="1"/>
+          </p:nvPr>
         </p:nvPicPr>
         <p:blipFill>
           <a:blip r:embed="rId1"/>
@@ -15219,8 +15213,8 @@
         </p:blipFill>
         <p:spPr>
           <a:xfrm>
-            <a:off x="1032510" y="2301240"/>
-            <a:ext cx="9579610" cy="4312920"/>
+            <a:off x="1499870" y="2297430"/>
+            <a:ext cx="9240520" cy="3822700"/>
           </a:xfrm>
           <a:prstGeom prst="rect">
             <a:avLst/>
@@ -15256,15 +15250,32 @@
             <p:ph type="title"/>
           </p:nvPr>
         </p:nvSpPr>
-        <p:spPr/>
+        <p:spPr>
+          <a:xfrm>
+            <a:off x="840105" y="457200"/>
+            <a:ext cx="3931920" cy="618490"/>
+          </a:xfrm>
+        </p:spPr>
         <p:txBody>
           <a:bodyPr/>
           <a:p>
             <a:r>
-              <a:rPr lang="en-US" u="sng"/>
+              <a:rPr lang="en-US" sz="3200" b="1">
+                <a:ln/>
+                <a:solidFill>
+                  <a:schemeClr val="tx1"/>
+                </a:solidFill>
+                <a:effectLst/>
+              </a:rPr>
               <a:t>Observation:</a:t>
             </a:r>
-            <a:endParaRPr lang="en-US" u="sng"/>
+            <a:endParaRPr lang="en-US" sz="3200" b="1">
+              <a:ln/>
+              <a:solidFill>
+                <a:schemeClr val="tx1"/>
+              </a:solidFill>
+              <a:effectLst/>
+            </a:endParaRPr>
           </a:p>
         </p:txBody>
       </p:sp>
@@ -15275,38 +15286,38 @@
             <a:spLocks noGrp="1"/>
           </p:cNvSpPr>
           <p:nvPr>
-            <p:ph type="body" idx="1"/>
+            <p:ph type="body" sz="half" idx="2"/>
           </p:nvPr>
         </p:nvSpPr>
         <p:spPr>
           <a:xfrm>
-            <a:off x="838200" y="1456690"/>
-            <a:ext cx="10515600" cy="888365"/>
+            <a:off x="1029970" y="1195705"/>
+            <a:ext cx="10654030" cy="1078230"/>
           </a:xfrm>
         </p:spPr>
         <p:txBody>
-          <a:bodyPr>
-            <a:normAutofit fontScale="90000"/>
-          </a:bodyPr>
+          <a:bodyPr/>
           <a:p>
             <a:pPr marL="0" indent="0">
               <a:buNone/>
             </a:pPr>
             <a:r>
-              <a:rPr lang="en-US"/>
+              <a:rPr lang="en-US" sz="2400"/>
               <a:t>To check that the update parameter checks the referrer or not ,we intercept it on burpsuite,and send it to repeater for verification.</a:t>
             </a:r>
-            <a:endParaRPr lang="en-US"/>
+            <a:endParaRPr lang="en-US" sz="2400"/>
           </a:p>
         </p:txBody>
       </p:sp>
       <p:pic>
         <p:nvPicPr>
-          <p:cNvPr id="4" name="Picture 3" descr="Burp intercept"/>
+          <p:cNvPr id="11" name="Picture Placeholder 10" descr="observation-burpsuite"/>
           <p:cNvPicPr>
             <a:picLocks noChangeAspect="1"/>
           </p:cNvPicPr>
-          <p:nvPr/>
+          <p:nvPr>
+            <p:ph type="pic" idx="1"/>
+          </p:nvPr>
         </p:nvPicPr>
         <p:blipFill>
           <a:blip r:embed="rId1"/>
@@ -15316,8 +15327,8 @@
         </p:blipFill>
         <p:spPr>
           <a:xfrm>
-            <a:off x="838200" y="2345055"/>
-            <a:ext cx="10058400" cy="4228465"/>
+            <a:off x="1029970" y="2603500"/>
+            <a:ext cx="9961880" cy="3099435"/>
           </a:xfrm>
           <a:prstGeom prst="rect">
             <a:avLst/>
@@ -15358,10 +15369,22 @@
           <a:bodyPr/>
           <a:p>
             <a:r>
-              <a:rPr lang="en-US" u="sng"/>
+              <a:rPr lang="en-US" sz="3200" b="1">
+                <a:ln/>
+                <a:solidFill>
+                  <a:schemeClr val="tx1"/>
+                </a:solidFill>
+                <a:effectLst/>
+              </a:rPr>
               <a:t>Proof Of Concept(PoC):</a:t>
             </a:r>
-            <a:endParaRPr lang="en-US" u="sng"/>
+            <a:endParaRPr lang="en-US" sz="3200" b="1">
+              <a:ln/>
+              <a:solidFill>
+                <a:schemeClr val="tx1"/>
+              </a:solidFill>
+              <a:effectLst/>
+            </a:endParaRPr>
           </a:p>
         </p:txBody>
       </p:sp>
@@ -15377,29 +15400,27 @@
         </p:nvSpPr>
         <p:spPr>
           <a:xfrm>
-            <a:off x="838200" y="1457325"/>
+            <a:off x="1024890" y="1297305"/>
             <a:ext cx="10515600" cy="901700"/>
           </a:xfrm>
         </p:spPr>
         <p:txBody>
-          <a:bodyPr>
-            <a:normAutofit fontScale="90000"/>
-          </a:bodyPr>
+          <a:bodyPr/>
           <a:p>
             <a:pPr marL="0" indent="0">
               <a:buNone/>
             </a:pPr>
             <a:r>
-              <a:rPr lang="en-US"/>
+              <a:rPr lang="en-US" sz="2400"/>
               <a:t>We change the referrer header in repeater and the password and forward the request,we see that it was successful in doing so,thus verifying CSRF.</a:t>
             </a:r>
-            <a:endParaRPr lang="en-US"/>
+            <a:endParaRPr lang="en-US" sz="2400"/>
           </a:p>
         </p:txBody>
       </p:sp>
       <p:pic>
         <p:nvPicPr>
-          <p:cNvPr id="4" name="Picture 3" descr="Changing the field in referrer"/>
+          <p:cNvPr id="4" name="Picture 3" descr="C:\Users\Datagrokr\Documents\program\CEH-Hack-a-thon\reports\Lifestyle Store\vulnerabilities\CSRF\profile-change-password\csrf-vulnerability.pngcsrf-vulnerability"/>
           <p:cNvPicPr>
             <a:picLocks noChangeAspect="1"/>
           </p:cNvPicPr>
@@ -15407,110 +15428,21 @@
         </p:nvPicPr>
         <p:blipFill>
           <a:blip r:embed="rId1"/>
+          <a:srcRect/>
           <a:stretch>
             <a:fillRect/>
           </a:stretch>
         </p:blipFill>
         <p:spPr>
           <a:xfrm>
-            <a:off x="1066800" y="2359025"/>
-            <a:ext cx="10058400" cy="4344035"/>
+            <a:off x="1066800" y="2473960"/>
+            <a:ext cx="10058400" cy="3711575"/>
           </a:xfrm>
           <a:prstGeom prst="rect">
             <a:avLst/>
           </a:prstGeom>
         </p:spPr>
       </p:pic>
-      <p:sp>
-        <p:nvSpPr>
-          <p:cNvPr id="9" name="Rectangle 8"/>
-          <p:cNvSpPr/>
-          <p:nvPr/>
-        </p:nvSpPr>
-        <p:spPr>
-          <a:xfrm>
-            <a:off x="838200" y="4151630"/>
-            <a:ext cx="3600450" cy="345440"/>
-          </a:xfrm>
-          <a:prstGeom prst="rect">
-            <a:avLst/>
-          </a:prstGeom>
-          <a:noFill/>
-          <a:ln w="38100">
-            <a:solidFill>
-              <a:srgbClr val="FF0000"/>
-            </a:solidFill>
-          </a:ln>
-        </p:spPr>
-        <p:style>
-          <a:lnRef idx="2">
-            <a:schemeClr val="accent1">
-              <a:shade val="50000"/>
-            </a:schemeClr>
-          </a:lnRef>
-          <a:fillRef idx="1">
-            <a:schemeClr val="accent1"/>
-          </a:fillRef>
-          <a:effectRef idx="0">
-            <a:schemeClr val="accent1"/>
-          </a:effectRef>
-          <a:fontRef idx="minor">
-            <a:schemeClr val="lt1"/>
-          </a:fontRef>
-        </p:style>
-        <p:txBody>
-          <a:bodyPr rtlCol="0" anchor="ctr"/>
-          <a:p>
-            <a:pPr algn="ctr"/>
-            <a:endParaRPr lang="en-IN"/>
-          </a:p>
-        </p:txBody>
-      </p:sp>
-      <p:sp>
-        <p:nvSpPr>
-          <p:cNvPr id="5" name="Rectangle 4"/>
-          <p:cNvSpPr/>
-          <p:nvPr/>
-        </p:nvSpPr>
-        <p:spPr>
-          <a:xfrm>
-            <a:off x="6264910" y="4614545"/>
-            <a:ext cx="3600450" cy="536575"/>
-          </a:xfrm>
-          <a:prstGeom prst="rect">
-            <a:avLst/>
-          </a:prstGeom>
-          <a:noFill/>
-          <a:ln w="38100">
-            <a:solidFill>
-              <a:srgbClr val="FF0000"/>
-            </a:solidFill>
-          </a:ln>
-        </p:spPr>
-        <p:style>
-          <a:lnRef idx="2">
-            <a:schemeClr val="accent1">
-              <a:shade val="50000"/>
-            </a:schemeClr>
-          </a:lnRef>
-          <a:fillRef idx="1">
-            <a:schemeClr val="accent1"/>
-          </a:fillRef>
-          <a:effectRef idx="0">
-            <a:schemeClr val="accent1"/>
-          </a:effectRef>
-          <a:fontRef idx="minor">
-            <a:schemeClr val="lt1"/>
-          </a:fontRef>
-        </p:style>
-        <p:txBody>
-          <a:bodyPr rtlCol="0" anchor="ctr"/>
-          <a:p>
-            <a:pPr algn="ctr"/>
-            <a:endParaRPr lang="en-IN"/>
-          </a:p>
-        </p:txBody>
-      </p:sp>
     </p:spTree>
   </p:cSld>
   <p:clrMapOvr>
@@ -15542,35 +15474,27 @@
         </p:nvSpPr>
         <p:spPr>
           <a:xfrm>
-            <a:off x="354330" y="-106045"/>
-            <a:ext cx="10515600" cy="1325563"/>
+            <a:off x="840105" y="365125"/>
+            <a:ext cx="10515600" cy="917575"/>
           </a:xfrm>
         </p:spPr>
         <p:txBody>
-          <a:bodyPr>
-            <a:scene3d>
-              <a:camera prst="orthographicFront"/>
-              <a:lightRig rig="soft" dir="t">
-                <a:rot lat="0" lon="0" rev="15600000"/>
-              </a:lightRig>
-            </a:scene3d>
-            <a:sp3d extrusionH="57150" prstMaterial="softEdge">
-              <a:bevelT w="25400" h="38100"/>
-            </a:sp3d>
-          </a:bodyPr>
-          <a:p>
-            <a:r>
-              <a:rPr lang="en-US" u="sng">
+          <a:bodyPr/>
+          <a:p>
+            <a:r>
+              <a:rPr lang="en-US" sz="3200" b="1">
+                <a:ln/>
                 <a:solidFill>
-                  <a:schemeClr val="accent4"/>
+                  <a:schemeClr val="tx1"/>
                 </a:solidFill>
                 <a:effectLst/>
               </a:rPr>
               <a:t>Proof Of Concept(PoC):</a:t>
             </a:r>
-            <a:endParaRPr lang="en-US" u="sng">
+            <a:endParaRPr lang="en-US" sz="3200" b="1">
+              <a:ln/>
               <a:solidFill>
-                <a:schemeClr val="accent4"/>
+                <a:schemeClr val="tx1"/>
               </a:solidFill>
               <a:effectLst/>
             </a:endParaRPr>
@@ -15589,41 +15513,55 @@
         </p:nvSpPr>
         <p:spPr>
           <a:xfrm>
-            <a:off x="354330" y="940435"/>
-            <a:ext cx="10515600" cy="1226185"/>
+            <a:off x="1133475" y="1081405"/>
+            <a:ext cx="10436860" cy="836930"/>
           </a:xfrm>
         </p:spPr>
         <p:txBody>
           <a:bodyPr>
-            <a:normAutofit lnSpcReduction="10000"/>
+            <a:noAutofit/>
           </a:bodyPr>
           <a:p>
             <a:pPr marL="0" indent="0">
               <a:buNone/>
             </a:pPr>
             <a:r>
-              <a:rPr lang="en-US"/>
+              <a:rPr lang="en-US" sz="1800" b="0">
+                <a:solidFill>
+                  <a:schemeClr val="tx1"/>
+                </a:solidFill>
+                <a:latin typeface="Calibri" panose="020F0502020204030204" charset="0"/>
+                <a:cs typeface="Calibri" panose="020F0502020204030204" charset="0"/>
+              </a:rPr>
               <a:t>After creating an html page with img source from confirm button on page '</a:t>
             </a:r>
             <a:r>
-              <a:rPr lang="en-US" dirty="0" smtClean="0">
+              <a:rPr lang="en-US" sz="1800" b="0" dirty="0" smtClean="0">
                 <a:solidFill>
-                  <a:schemeClr val="dk1"/>
+                  <a:schemeClr val="tx1"/>
                 </a:solidFill>
                 <a:effectLst/>
                 <a:latin typeface="Calibri" panose="020F0502020204030204" charset="0"/>
                 <a:cs typeface="Calibri" panose="020F0502020204030204" charset="0"/>
                 <a:sym typeface="Arial" panose="020B0604020202020204"/>
               </a:rPr>
-              <a:t>http://52.66.198.61/cart/cart.php',when we run it and reload out order page,we see our cart as empty and order placed.</a:t>
-            </a:r>
-            <a:endParaRPr lang="en-US"/>
+              <a:t>http://35.154.249.93/cart/cart.php',when we run it and reload out order page,we see our cart as empty and order placed.</a:t>
+            </a:r>
+            <a:endParaRPr lang="en-US" sz="1800" b="0" dirty="0" smtClean="0">
+              <a:solidFill>
+                <a:schemeClr val="tx1"/>
+              </a:solidFill>
+              <a:effectLst/>
+              <a:latin typeface="Calibri" panose="020F0502020204030204" charset="0"/>
+              <a:cs typeface="Calibri" panose="020F0502020204030204" charset="0"/>
+              <a:sym typeface="Arial" panose="020B0604020202020204"/>
+            </a:endParaRPr>
           </a:p>
         </p:txBody>
       </p:sp>
       <p:pic>
         <p:nvPicPr>
-          <p:cNvPr id="4" name="Picture 3" descr="html view"/>
+          <p:cNvPr id="4" name="Picture 3" descr="C:\Users\Datagrokr\Documents\program\CEH-Hack-a-thon\reports\Lifestyle Store\vulnerabilities\CSRF\cart\observation.pngobservation"/>
           <p:cNvPicPr>
             <a:picLocks noChangeAspect="1"/>
           </p:cNvPicPr>
@@ -15631,42 +15569,87 @@
         </p:nvPicPr>
         <p:blipFill>
           <a:blip r:embed="rId1"/>
+          <a:srcRect/>
           <a:stretch>
             <a:fillRect/>
           </a:stretch>
         </p:blipFill>
         <p:spPr>
           <a:xfrm>
-            <a:off x="29845" y="2166620"/>
-            <a:ext cx="7579995" cy="4548505"/>
+            <a:off x="898525" y="2168525"/>
+            <a:ext cx="5347970" cy="3739515"/>
           </a:xfrm>
           <a:prstGeom prst="rect">
             <a:avLst/>
           </a:prstGeom>
+          <a:ln>
+            <a:solidFill>
+              <a:schemeClr val="tx1"/>
+            </a:solidFill>
+          </a:ln>
         </p:spPr>
       </p:pic>
       <p:pic>
         <p:nvPicPr>
-          <p:cNvPr id="5" name="Picture 4" descr="the order placed"/>
+          <p:cNvPr id="9" name="Content Placeholder 8" descr="POC"/>
           <p:cNvPicPr>
             <a:picLocks noChangeAspect="1"/>
           </p:cNvPicPr>
-          <p:nvPr/>
+          <p:nvPr>
+            <p:ph sz="quarter" idx="4"/>
+          </p:nvPr>
         </p:nvPicPr>
         <p:blipFill>
           <a:blip r:embed="rId2"/>
+          <a:srcRect l="-1101" t="-3099" r="12243" b="77773"/>
           <a:stretch>
             <a:fillRect/>
           </a:stretch>
         </p:blipFill>
         <p:spPr>
           <a:xfrm>
-            <a:off x="6929755" y="2166620"/>
-            <a:ext cx="5223510" cy="4548505"/>
+            <a:off x="6381750" y="2138045"/>
+            <a:ext cx="5183505" cy="798830"/>
           </a:xfrm>
           <a:prstGeom prst="rect">
             <a:avLst/>
           </a:prstGeom>
+          <a:ln>
+            <a:solidFill>
+              <a:schemeClr val="tx1"/>
+            </a:solidFill>
+          </a:ln>
+        </p:spPr>
+      </p:pic>
+      <p:pic>
+        <p:nvPicPr>
+          <p:cNvPr id="10" name="Content Placeholder 9" descr="POC1"/>
+          <p:cNvPicPr>
+            <a:picLocks noChangeAspect="1"/>
+          </p:cNvPicPr>
+          <p:nvPr>
+            <p:ph sz="half" idx="2"/>
+          </p:nvPr>
+        </p:nvPicPr>
+        <p:blipFill>
+          <a:blip r:embed="rId3"/>
+          <a:stretch>
+            <a:fillRect/>
+          </a:stretch>
+        </p:blipFill>
+        <p:spPr>
+          <a:xfrm>
+            <a:off x="6396355" y="3275965"/>
+            <a:ext cx="5157470" cy="2565400"/>
+          </a:xfrm>
+          <a:prstGeom prst="rect">
+            <a:avLst/>
+          </a:prstGeom>
+          <a:ln>
+            <a:solidFill>
+              <a:schemeClr val="tx1"/>
+            </a:solidFill>
+          </a:ln>
         </p:spPr>
       </p:pic>
     </p:spTree>
@@ -16510,37 +16493,25 @@
           <a:bodyPr/>
           <a:p>
             <a:r>
-              <a:rPr lang="en-US" u="sng">
-                <a:ln w="22225">
-                  <a:solidFill>
-                    <a:schemeClr val="accent2"/>
-                  </a:solidFill>
-                  <a:prstDash val="solid"/>
-                </a:ln>
+              <a:rPr lang="en-US" sz="3200" b="1">
+                <a:ln/>
                 <a:solidFill>
-                  <a:schemeClr val="accent2">
-                    <a:lumMod val="40000"/>
-                    <a:lumOff val="60000"/>
-                  </a:schemeClr>
+                  <a:schemeClr val="tx1"/>
                 </a:solidFill>
                 <a:effectLst/>
+                <a:latin typeface="Calibri" panose="020F0502020204030204" charset="0"/>
+                <a:cs typeface="Calibri" panose="020F0502020204030204" charset="0"/>
               </a:rPr>
               <a:t>Business Impact (High):</a:t>
             </a:r>
-            <a:endParaRPr lang="en-US" u="sng">
-              <a:ln w="22225">
-                <a:solidFill>
-                  <a:schemeClr val="accent2"/>
-                </a:solidFill>
-                <a:prstDash val="solid"/>
-              </a:ln>
+            <a:endParaRPr lang="en-US" sz="3200" b="1">
+              <a:ln/>
               <a:solidFill>
-                <a:schemeClr val="accent2">
-                  <a:lumMod val="40000"/>
-                  <a:lumOff val="60000"/>
-                </a:schemeClr>
+                <a:schemeClr val="tx1"/>
               </a:solidFill>
               <a:effectLst/>
+              <a:latin typeface="Calibri" panose="020F0502020204030204" charset="0"/>
+              <a:cs typeface="Calibri" panose="020F0502020204030204" charset="0"/>
             </a:endParaRPr>
           </a:p>
         </p:txBody>
@@ -16559,9 +16530,6 @@
         <p:txBody>
           <a:bodyPr/>
           <a:p>
-            <a:pPr marL="0" indent="0">
-              <a:buNone/>
-            </a:pPr>
             <a:r>
               <a:rPr lang="en-US"/>
               <a:t>If the attacker is able to exploit this vulnerability,the he may be able to order many items which the user would cancel later when the sender will send it to him(as its cash on delivery),so unnecessary load of workers can increase incredibly.</a:t>
@@ -16569,9 +16537,6 @@
             <a:endParaRPr lang="en-US"/>
           </a:p>
           <a:p>
-            <a:pPr marL="0" indent="0">
-              <a:buNone/>
-            </a:pPr>
             <a:r>
               <a:rPr lang="en-US"/>
               <a:t>Moreover,the attacker maybe able to change the user's password without his consent,which in itself is highly insecure.</a:t>
@@ -16611,9 +16576,22 @@
         </p:nvSpPr>
         <p:spPr>
           <a:xfrm>
-            <a:off x="705485" y="26035"/>
+            <a:off x="705485" y="159385"/>
             <a:ext cx="4589780" cy="692785"/>
           </a:xfrm>
+          <a:noFill/>
+          <a:ln>
+            <a:noFill/>
+          </a:ln>
+          <a:extLst>
+            <a:ext uri="{909E8E84-426E-40DD-AFC4-6F175D3DCCD1}">
+              <a14:hiddenFill xmlns:a14="http://schemas.microsoft.com/office/drawing/2010/main">
+                <a:solidFill>
+                  <a:schemeClr val="accent2"/>
+                </a:solidFill>
+              </a14:hiddenFill>
+            </a:ext>
+          </a:extLst>
         </p:spPr>
         <p:style>
           <a:lnRef idx="2">
@@ -16632,15 +16610,25 @@
           </a:fontRef>
         </p:style>
         <p:txBody>
-          <a:bodyPr>
-            <a:normAutofit fontScale="90000"/>
-          </a:bodyPr>
-          <a:p>
-            <a:r>
-              <a:rPr lang="en-US" u="sng"/>
+          <a:bodyPr/>
+          <a:p>
+            <a:r>
+              <a:rPr lang="en-US" sz="3200" b="1">
+                <a:ln/>
+                <a:solidFill>
+                  <a:schemeClr val="tx1"/>
+                </a:solidFill>
+                <a:effectLst/>
+              </a:rPr>
               <a:t>Recommendation:</a:t>
             </a:r>
-            <a:endParaRPr lang="en-US" u="sng"/>
+            <a:endParaRPr lang="en-US" sz="3200" b="1">
+              <a:ln/>
+              <a:solidFill>
+                <a:schemeClr val="tx1"/>
+              </a:solidFill>
+              <a:effectLst/>
+            </a:endParaRPr>
           </a:p>
         </p:txBody>
       </p:sp>
@@ -16656,13 +16644,13 @@
         </p:nvSpPr>
         <p:spPr>
           <a:xfrm>
-            <a:off x="838200" y="189230"/>
-            <a:ext cx="10515600" cy="4351338"/>
+            <a:off x="838200" y="731520"/>
+            <a:ext cx="10515600" cy="3889375"/>
           </a:xfrm>
         </p:spPr>
         <p:txBody>
           <a:bodyPr>
-            <a:normAutofit/>
+            <a:normAutofit lnSpcReduction="20000"/>
           </a:bodyPr>
           <a:p>
             <a:endParaRPr lang="en-US"/>
@@ -16707,8 +16695,8 @@
         </p:nvSpPr>
         <p:spPr>
           <a:xfrm>
-            <a:off x="705485" y="4178300"/>
-            <a:ext cx="10515600" cy="1325563"/>
+            <a:off x="812165" y="4368165"/>
+            <a:ext cx="10515600" cy="821055"/>
           </a:xfrm>
           <a:prstGeom prst="rect">
             <a:avLst/>
@@ -16717,15 +16705,6 @@
         <p:txBody>
           <a:bodyPr vert="horz" lIns="91440" tIns="45720" rIns="91440" bIns="45720" rtlCol="0" anchor="ctr">
             <a:normAutofit/>
-            <a:scene3d>
-              <a:camera prst="orthographicFront"/>
-              <a:lightRig rig="soft" dir="t">
-                <a:rot lat="0" lon="0" rev="15600000"/>
-              </a:lightRig>
-            </a:scene3d>
-            <a:sp3d extrusionH="57150" prstMaterial="softEdge">
-              <a:bevelT w="25400" h="38100"/>
-            </a:sp3d>
           </a:bodyPr>
           <a:lstStyle>
             <a:lvl1pPr algn="l" defTabSz="914400" rtl="0" eaLnBrk="1" latinLnBrk="0" hangingPunct="1">
@@ -16748,19 +16727,25 @@
           </a:lstStyle>
           <a:p>
             <a:r>
-              <a:rPr lang="en-US" u="sng">
+              <a:rPr lang="en-US" sz="3200" b="1">
+                <a:ln/>
                 <a:solidFill>
-                  <a:schemeClr val="accent4"/>
+                  <a:schemeClr val="tx1"/>
                 </a:solidFill>
                 <a:effectLst/>
+                <a:latin typeface="Calibri" panose="020F0502020204030204" charset="0"/>
+                <a:cs typeface="Calibri" panose="020F0502020204030204" charset="0"/>
               </a:rPr>
               <a:t>References:</a:t>
             </a:r>
-            <a:endParaRPr lang="en-US" u="sng">
+            <a:endParaRPr lang="en-US" sz="3200" b="1">
+              <a:ln/>
               <a:solidFill>
-                <a:schemeClr val="accent4"/>
+                <a:schemeClr val="tx1"/>
               </a:solidFill>
               <a:effectLst/>
+              <a:latin typeface="Calibri" panose="020F0502020204030204" charset="0"/>
+              <a:cs typeface="Calibri" panose="020F0502020204030204" charset="0"/>
             </a:endParaRPr>
           </a:p>
         </p:txBody>
@@ -16774,7 +16759,7 @@
         <p:spPr>
           <a:xfrm>
             <a:off x="883920" y="5189855"/>
-            <a:ext cx="11263630" cy="1014730"/>
+            <a:ext cx="10469880" cy="922020"/>
           </a:xfrm>
           <a:prstGeom prst="rect">
             <a:avLst/>
@@ -16786,18 +16771,26 @@
             <a:spAutoFit/>
           </a:bodyPr>
           <a:p>
-            <a:r>
-              <a:rPr lang="en-US" sz="2000"/>
-              <a:t>1)https://en.wikipedia.org/wiki/Cross-site_request_forgery#Example_and_characteristics</a:t>
-            </a:r>
-            <a:endParaRPr lang="en-US" sz="2000"/>
-          </a:p>
-          <a:p>
-            <a:r>
-              <a:rPr lang="en-US" sz="2000"/>
-              <a:t>2)https://www.owasp.org/index.php/Cross-Site_Request_Forgery_(CSRF)https://www.owasp.org/index.php/Cross-Site_Request_Forgery_(CSRF)</a:t>
-            </a:r>
-            <a:endParaRPr lang="en-US" sz="2000"/>
+            <a:pPr marL="342900" indent="-342900">
+              <a:buFont typeface="Arial" panose="020B0604020202020204" pitchFamily="34" charset="0"/>
+              <a:buChar char="•"/>
+            </a:pPr>
+            <a:r>
+              <a:rPr lang="en-US"/>
+              <a:t>https://en.wikipedia.org/wiki/Cross-site_request_forgery#Example_and_characteristics</a:t>
+            </a:r>
+            <a:endParaRPr lang="en-US"/>
+          </a:p>
+          <a:p>
+            <a:pPr marL="342900" indent="-342900">
+              <a:buFont typeface="Arial" panose="020B0604020202020204" pitchFamily="34" charset="0"/>
+              <a:buChar char="•"/>
+            </a:pPr>
+            <a:r>
+              <a:rPr lang="en-US"/>
+              <a:t>https://www.owasp.org/index.php/Cross-Site_Request_Forgery_(CSRF)https://www.owasp.org/index.php/Cross-Site_Request_Forgery_(CSRF)</a:t>
+            </a:r>
+            <a:endParaRPr lang="en-US"/>
           </a:p>
         </p:txBody>
       </p:sp>

</xml_diff>

<commit_message>
reports: Crypto Configuration Flaws ppt done
</commit_message>
<xml_diff>
--- a/reports/Lifestyle Store/LifeStyle Store Application Reports.pptx
+++ b/reports/Lifestyle Store/LifeStyle Store Application Reports.pptx
@@ -19656,38 +19656,22 @@
         </p:nvSpPr>
         <p:spPr/>
         <p:txBody>
-          <a:bodyPr>
-            <a:scene3d>
-              <a:camera prst="orthographicFront"/>
-              <a:lightRig rig="soft" dir="t">
-                <a:rot lat="0" lon="0" rev="15600000"/>
-              </a:lightRig>
-            </a:scene3d>
-            <a:sp3d extrusionH="57150" prstMaterial="softEdge">
-              <a:bevelT w="25400" h="38100"/>
-            </a:sp3d>
-          </a:bodyPr>
-          <a:p>
-            <a:r>
-              <a:rPr lang="en-US">
+          <a:bodyPr/>
+          <a:p>
+            <a:r>
+              <a:rPr lang="en-US" sz="3200" b="1">
+                <a:ln/>
                 <a:solidFill>
-                  <a:schemeClr val="accent4"/>
-                </a:solidFill>
-              </a:rPr>
-              <a:t>10)</a:t>
-            </a:r>
-            <a:r>
-              <a:rPr lang="en-US" u="sng">
-                <a:solidFill>
-                  <a:schemeClr val="accent4"/>
+                  <a:schemeClr val="tx1"/>
                 </a:solidFill>
                 <a:effectLst/>
               </a:rPr>
-              <a:t>Crypto Configuration Flaw</a:t>
-            </a:r>
-            <a:endParaRPr lang="en-US" u="sng">
+              <a:t>9. Crypto Configuration Flaw</a:t>
+            </a:r>
+            <a:endParaRPr lang="en-US" sz="3200" b="1">
+              <a:ln/>
               <a:solidFill>
-                <a:schemeClr val="accent4"/>
+                <a:schemeClr val="tx1"/>
               </a:solidFill>
               <a:effectLst/>
             </a:endParaRPr>
@@ -19705,8 +19689,8 @@
           </p:nvPr>
         </p:nvGraphicFramePr>
         <p:xfrm>
-          <a:off x="1294765" y="1841500"/>
-          <a:ext cx="10059035" cy="2560955"/>
+          <a:off x="1521460" y="1894840"/>
+          <a:ext cx="8902700" cy="1628140"/>
         </p:xfrm>
         <a:graphic>
           <a:graphicData uri="http://schemas.openxmlformats.org/drawingml/2006/table">
@@ -19715,8 +19699,8 @@
                 <a:tableStyleId>{5C22544A-7EE6-4342-B048-85BDC9FD1C3A}</a:tableStyleId>
               </a:tblPr>
               <a:tblGrid>
-                <a:gridCol w="1753870"/>
-                <a:gridCol w="8305165"/>
+                <a:gridCol w="2407920"/>
+                <a:gridCol w="6494780"/>
               </a:tblGrid>
               <a:tr h="265430">
                 <a:tc>
@@ -19802,7 +19786,7 @@
                     <a:p>
                       <a:pPr algn="ctr"/>
                       <a:r>
-                        <a:rPr lang="en-IN" sz="1200" dirty="0" smtClean="0">
+                        <a:rPr lang="en-IN" sz="1600" dirty="0" smtClean="0">
                           <a:solidFill>
                             <a:srgbClr val="FFFFFF"/>
                           </a:solidFill>
@@ -19811,7 +19795,7 @@
                         <a:t> </a:t>
                       </a:r>
                       <a:r>
-                        <a:rPr lang="en-US" altLang="en-IN" sz="1200" dirty="0" smtClean="0">
+                        <a:rPr lang="en-US" altLang="en-IN" sz="1600" dirty="0" smtClean="0">
                           <a:solidFill>
                             <a:srgbClr val="FFFFFF"/>
                           </a:solidFill>
@@ -19820,7 +19804,7 @@
                         <a:t>Crypto Configuration Flaw</a:t>
                       </a:r>
                       <a:r>
-                        <a:rPr lang="en-US" sz="1100" dirty="0" smtClean="0">
+                        <a:rPr lang="en-US" sz="1600" dirty="0" smtClean="0">
                           <a:solidFill>
                             <a:srgbClr val="FFFFFF"/>
                           </a:solidFill>
@@ -19828,7 +19812,7 @@
                         </a:rPr>
                         <a:t>(Severe)</a:t>
                       </a:r>
-                      <a:endParaRPr lang="en-US" sz="1100" dirty="0">
+                      <a:endParaRPr lang="en-US" sz="1600" dirty="0" smtClean="0">
                         <a:solidFill>
                           <a:srgbClr val="FFFFFF"/>
                         </a:solidFill>
@@ -19883,7 +19867,7 @@
                     <a:bodyPr/>
                     <a:p>
                       <a:r>
-                        <a:rPr lang="en-US" sz="1100" dirty="0" smtClean="0">
+                        <a:rPr lang="en-US" sz="1200" dirty="0" smtClean="0">
                           <a:solidFill>
                             <a:schemeClr val="tx1"/>
                           </a:solidFill>
@@ -19891,7 +19875,7 @@
                         </a:rPr>
                         <a:t> </a:t>
                       </a:r>
-                      <a:endParaRPr lang="en-US" sz="1100" dirty="0">
+                      <a:endParaRPr lang="en-US" sz="1200" dirty="0">
                         <a:solidFill>
                           <a:schemeClr val="tx1"/>
                         </a:solidFill>
@@ -19900,7 +19884,7 @@
                     </a:p>
                     <a:p>
                       <a:r>
-                        <a:rPr lang="en-US" sz="1100" baseline="0" dirty="0" smtClean="0">
+                        <a:rPr lang="en-US" sz="1200" baseline="0" dirty="0" smtClean="0">
                           <a:solidFill>
                             <a:schemeClr val="tx1"/>
                           </a:solidFill>
@@ -19908,7 +19892,7 @@
                         </a:rPr>
                         <a:t>Cryto Configuration Flaws are found in the modules below:-</a:t>
                       </a:r>
-                      <a:endParaRPr lang="en-US" sz="1100" dirty="0" smtClean="0">
+                      <a:endParaRPr lang="en-US" sz="1200" dirty="0" smtClean="0">
                         <a:solidFill>
                           <a:schemeClr val="tx1"/>
                         </a:solidFill>
@@ -19917,7 +19901,7 @@
                       </a:endParaRPr>
                     </a:p>
                     <a:p>
-                      <a:endParaRPr lang="en-US" sz="1100" dirty="0" smtClean="0">
+                      <a:endParaRPr lang="en-US" sz="1200" dirty="0" smtClean="0">
                         <a:solidFill>
                           <a:schemeClr val="tx1"/>
                         </a:solidFill>
@@ -19926,7 +19910,7 @@
                     </a:p>
                     <a:p>
                       <a:r>
-                        <a:rPr lang="en-US" sz="1100" b="1" dirty="0" smtClean="0">
+                        <a:rPr lang="en-US" sz="1200" b="1" dirty="0" smtClean="0">
                           <a:solidFill>
                             <a:schemeClr val="tx1"/>
                           </a:solidFill>
@@ -19934,7 +19918,7 @@
                         </a:rPr>
                         <a:t>Affected URL :</a:t>
                       </a:r>
-                      <a:endParaRPr lang="en-US" sz="1100" b="0" i="0" u="none" strike="noStrike" dirty="0" smtClean="0">
+                      <a:endParaRPr lang="en-US" sz="1200" b="0" i="0" u="none" strike="noStrike" dirty="0" smtClean="0">
                         <a:solidFill>
                           <a:schemeClr val="tx1"/>
                         </a:solidFill>
@@ -19951,15 +19935,26 @@
                         <a:buChar char="•"/>
                       </a:pPr>
                       <a:r>
-                        <a:rPr lang="en-US" sz="1100" b="0" dirty="0" smtClean="0">
+                        <a:rPr lang="en-US" sz="1200" dirty="0" smtClean="0">
                           <a:solidFill>
                             <a:schemeClr val="tx1"/>
                           </a:solidFill>
                           <a:latin typeface="Calibri" panose="020F0502020204030204" charset="0"/>
-                        </a:rPr>
-                        <a:t>http://52.66.198.61/ (All the webpages ,blogs,forum)</a:t>
-                      </a:r>
-                      <a:endParaRPr lang="en-US" sz="1100" b="0" dirty="0" smtClean="0">
+                          <a:cs typeface="Calibri" panose="020F0502020204030204" charset="0"/>
+                          <a:sym typeface="+mn-ea"/>
+                        </a:rPr>
+                        <a:t>http://13.233.207.87</a:t>
+                      </a:r>
+                      <a:r>
+                        <a:rPr lang="en-US" sz="1200" b="0" dirty="0" smtClean="0">
+                          <a:solidFill>
+                            <a:schemeClr val="tx1"/>
+                          </a:solidFill>
+                          <a:latin typeface="Calibri" panose="020F0502020204030204" charset="0"/>
+                        </a:rPr>
+                        <a:t> (All the webpages ,blogs,forum)</a:t>
+                      </a:r>
+                      <a:endParaRPr lang="en-US" sz="1200" b="0" dirty="0" smtClean="0">
                         <a:solidFill>
                           <a:schemeClr val="tx1"/>
                         </a:solidFill>
@@ -19983,7 +19978,7 @@
                         <a:buNone/>
                         <a:defRPr/>
                       </a:pPr>
-                      <a:endParaRPr lang="en-US" sz="1100" b="1" dirty="0" smtClean="0">
+                      <a:endParaRPr lang="en-US" sz="1200" b="1" dirty="0" smtClean="0">
                         <a:solidFill>
                           <a:schemeClr val="tx1"/>
                         </a:solidFill>
@@ -20007,7 +20002,7 @@
                         <a:buNone/>
                         <a:defRPr/>
                       </a:pPr>
-                      <a:endParaRPr lang="en-US" sz="1100" b="0" dirty="0">
+                      <a:endParaRPr lang="en-US" sz="1200" b="0" dirty="0">
                         <a:solidFill>
                           <a:schemeClr val="tx1"/>
                         </a:solidFill>
@@ -20675,31 +20670,21 @@
           <a:bodyPr/>
           <a:p>
             <a:r>
-              <a:rPr lang="en-US" u="sng">
+              <a:rPr lang="en-US" sz="3600" b="1">
+                <a:ln/>
                 <a:solidFill>
-                  <a:schemeClr val="accent1"/>
+                  <a:schemeClr val="tx1"/>
                 </a:solidFill>
-                <a:effectLst>
-                  <a:outerShdw blurRad="38100" dist="25400" dir="5400000" algn="ctr" rotWithShape="0">
-                    <a:srgbClr val="6E747A">
-                      <a:alpha val="43000"/>
-                    </a:srgbClr>
-                  </a:outerShdw>
-                </a:effectLst>
+                <a:effectLst/>
               </a:rPr>
               <a:t>Observation:</a:t>
             </a:r>
-            <a:endParaRPr lang="en-US" u="sng">
+            <a:endParaRPr lang="en-US" sz="3600" b="1">
+              <a:ln/>
               <a:solidFill>
-                <a:schemeClr val="accent1"/>
+                <a:schemeClr val="tx1"/>
               </a:solidFill>
-              <a:effectLst>
-                <a:outerShdw blurRad="38100" dist="25400" dir="5400000" algn="ctr" rotWithShape="0">
-                  <a:srgbClr val="6E747A">
-                    <a:alpha val="43000"/>
-                  </a:srgbClr>
-                </a:outerShdw>
-              </a:effectLst>
+              <a:effectLst/>
             </a:endParaRPr>
           </a:p>
         </p:txBody>
@@ -20716,7 +20701,7 @@
         </p:nvSpPr>
         <p:spPr>
           <a:xfrm>
-            <a:off x="838200" y="1825625"/>
+            <a:off x="1064895" y="1825625"/>
             <a:ext cx="10515600" cy="1050290"/>
           </a:xfrm>
         </p:spPr>
@@ -20772,31 +20757,26 @@
           <a:bodyPr/>
           <a:p>
             <a:r>
-              <a:rPr lang="en-US" u="sng">
-                <a:ln w="10160">
-                  <a:solidFill>
-                    <a:schemeClr val="accent5"/>
-                  </a:solidFill>
-                  <a:prstDash val="solid"/>
-                </a:ln>
+              <a:rPr lang="en-US" sz="3200" b="1">
+                <a:ln/>
                 <a:solidFill>
-                  <a:srgbClr val="FFFFFF"/>
+                  <a:schemeClr val="tx1"/>
                 </a:solidFill>
-                <a:effectLst>
-                  <a:outerShdw blurRad="38100" dist="22860" dir="5400000" algn="tl" rotWithShape="0">
-                    <a:srgbClr val="000000">
-                      <a:alpha val="30000"/>
-                    </a:srgbClr>
-                  </a:outerShdw>
-                </a:effectLst>
+                <a:effectLst/>
+                <a:latin typeface="Calibri" panose="020F0502020204030204" charset="0"/>
+                <a:cs typeface="Calibri" panose="020F0502020204030204" charset="0"/>
               </a:rPr>
-              <a:t>Recommendation</a:t>
-            </a:r>
-            <a:r>
-              <a:rPr lang="en-US"/>
-              <a:t>:</a:t>
-            </a:r>
-            <a:endParaRPr lang="en-US"/>
+              <a:t>Recommendation:</a:t>
+            </a:r>
+            <a:endParaRPr lang="en-US" sz="3200" b="1">
+              <a:ln/>
+              <a:solidFill>
+                <a:schemeClr val="tx1"/>
+              </a:solidFill>
+              <a:effectLst/>
+              <a:latin typeface="Calibri" panose="020F0502020204030204" charset="0"/>
+              <a:cs typeface="Calibri" panose="020F0502020204030204" charset="0"/>
+            </a:endParaRPr>
           </a:p>
         </p:txBody>
       </p:sp>
@@ -20812,8 +20792,8 @@
         </p:nvSpPr>
         <p:spPr>
           <a:xfrm>
-            <a:off x="838200" y="3696335"/>
-            <a:ext cx="10515600" cy="4351338"/>
+            <a:off x="1244600" y="3349625"/>
+            <a:ext cx="8869045" cy="651510"/>
           </a:xfrm>
         </p:spPr>
         <p:txBody>
@@ -20823,10 +20803,10 @@
               <a:buNone/>
             </a:pPr>
             <a:r>
-              <a:rPr lang="en-US"/>
+              <a:rPr lang="en-US" sz="1800"/>
               <a:t> Use https and not http as the protocol.</a:t>
             </a:r>
-            <a:endParaRPr lang="en-US"/>
+            <a:endParaRPr lang="en-US" sz="1800"/>
           </a:p>
         </p:txBody>
       </p:sp>
@@ -20840,7 +20820,116 @@
         </p:nvSpPr>
         <p:spPr>
           <a:xfrm>
-            <a:off x="926465" y="4084955"/>
+            <a:off x="926465" y="4004945"/>
+            <a:ext cx="10515600" cy="1080770"/>
+          </a:xfrm>
+          <a:prstGeom prst="rect">
+            <a:avLst/>
+          </a:prstGeom>
+        </p:spPr>
+        <p:txBody>
+          <a:bodyPr vert="horz" lIns="91440" tIns="45720" rIns="91440" bIns="45720" rtlCol="0" anchor="ctr">
+            <a:normAutofit/>
+          </a:bodyPr>
+          <a:lstStyle>
+            <a:lvl1pPr algn="l" defTabSz="914400" rtl="0" eaLnBrk="1" latinLnBrk="0" hangingPunct="1">
+              <a:lnSpc>
+                <a:spcPct val="90000"/>
+              </a:lnSpc>
+              <a:spcBef>
+                <a:spcPct val="0"/>
+              </a:spcBef>
+              <a:buNone/>
+              <a:defRPr sz="4400" kern="1200">
+                <a:solidFill>
+                  <a:schemeClr val="tx1"/>
+                </a:solidFill>
+                <a:latin typeface="+mj-lt"/>
+                <a:ea typeface="+mj-ea"/>
+                <a:cs typeface="+mj-cs"/>
+              </a:defRPr>
+            </a:lvl1pPr>
+          </a:lstStyle>
+          <a:p>
+            <a:r>
+              <a:rPr lang="en-US" sz="3200" b="1">
+                <a:ln/>
+                <a:solidFill>
+                  <a:schemeClr val="tx1"/>
+                </a:solidFill>
+                <a:effectLst/>
+                <a:latin typeface="Calibri" panose="020F0502020204030204" charset="0"/>
+                <a:cs typeface="Calibri" panose="020F0502020204030204" charset="0"/>
+              </a:rPr>
+              <a:t>References:</a:t>
+            </a:r>
+            <a:endParaRPr lang="en-US" sz="3200" b="1">
+              <a:ln/>
+              <a:solidFill>
+                <a:schemeClr val="tx1"/>
+              </a:solidFill>
+              <a:effectLst/>
+              <a:latin typeface="Calibri" panose="020F0502020204030204" charset="0"/>
+              <a:cs typeface="Calibri" panose="020F0502020204030204" charset="0"/>
+            </a:endParaRPr>
+          </a:p>
+        </p:txBody>
+      </p:sp>
+      <p:sp>
+        <p:nvSpPr>
+          <p:cNvPr id="5" name="Text Box 4"/>
+          <p:cNvSpPr txBox="1"/>
+          <p:nvPr/>
+        </p:nvSpPr>
+        <p:spPr>
+          <a:xfrm>
+            <a:off x="1313180" y="4944110"/>
+            <a:ext cx="9493885" cy="645160"/>
+          </a:xfrm>
+          <a:prstGeom prst="rect">
+            <a:avLst/>
+          </a:prstGeom>
+          <a:noFill/>
+        </p:spPr>
+        <p:txBody>
+          <a:bodyPr wrap="square" rtlCol="0">
+            <a:spAutoFit/>
+          </a:bodyPr>
+          <a:p>
+            <a:pPr marL="285750" indent="-285750">
+              <a:buFont typeface="Arial" panose="020B0604020202020204" pitchFamily="34" charset="0"/>
+              <a:buChar char="•"/>
+            </a:pPr>
+            <a:r>
+              <a:rPr lang="en-US"/>
+              <a:t>https://www.owasp.org/index.php/Category:Cryptographic_Vulnerability</a:t>
+            </a:r>
+            <a:endParaRPr lang="en-US"/>
+          </a:p>
+          <a:p>
+            <a:pPr marL="285750" indent="-285750">
+              <a:buFont typeface="Arial" panose="020B0604020202020204" pitchFamily="34" charset="0"/>
+              <a:buChar char="•"/>
+            </a:pPr>
+            <a:r>
+              <a:rPr lang="en-US"/>
+              <a:t>https://www.w3.org/Protocols/rfc2616/rfc2616-sec15.html</a:t>
+            </a:r>
+            <a:endParaRPr lang="en-US"/>
+          </a:p>
+        </p:txBody>
+      </p:sp>
+      <p:sp>
+        <p:nvSpPr>
+          <p:cNvPr id="6" name="Title 1"/>
+          <p:cNvSpPr>
+            <a:spLocks noGrp="1"/>
+          </p:cNvSpPr>
+          <p:nvPr/>
+        </p:nvSpPr>
+        <p:spPr>
+          <a:xfrm>
+            <a:off x="812165" y="491490"/>
             <a:ext cx="10515600" cy="1325563"/>
           </a:xfrm>
           <a:prstGeom prst="rect">
@@ -20872,153 +20961,25 @@
           </a:lstStyle>
           <a:p>
             <a:r>
-              <a:rPr lang="en-US" u="sng">
-                <a:ln w="10160">
-                  <a:solidFill>
-                    <a:schemeClr val="accent5"/>
-                  </a:solidFill>
-                  <a:prstDash val="solid"/>
-                </a:ln>
-                <a:solidFill>
-                  <a:srgbClr val="FFFFFF"/>
-                </a:solidFill>
-                <a:effectLst>
-                  <a:outerShdw blurRad="38100" dist="22860" dir="5400000" algn="tl" rotWithShape="0">
-                    <a:srgbClr val="000000">
-                      <a:alpha val="30000"/>
-                    </a:srgbClr>
-                  </a:outerShdw>
-                </a:effectLst>
-              </a:rPr>
-              <a:t>References</a:t>
-            </a:r>
-            <a:r>
-              <a:rPr lang="en-US"/>
-              <a:t>:</a:t>
-            </a:r>
-            <a:endParaRPr lang="en-US"/>
-          </a:p>
-        </p:txBody>
-      </p:sp>
-      <p:sp>
-        <p:nvSpPr>
-          <p:cNvPr id="5" name="Text Box 4"/>
-          <p:cNvSpPr txBox="1"/>
-          <p:nvPr/>
-        </p:nvSpPr>
-        <p:spPr>
-          <a:xfrm>
-            <a:off x="926465" y="5410835"/>
-            <a:ext cx="9493885" cy="645160"/>
-          </a:xfrm>
-          <a:prstGeom prst="rect">
-            <a:avLst/>
-          </a:prstGeom>
-          <a:noFill/>
-        </p:spPr>
-        <p:txBody>
-          <a:bodyPr wrap="square" rtlCol="0">
-            <a:spAutoFit/>
-          </a:bodyPr>
-          <a:p>
-            <a:r>
-              <a:rPr lang="en-US"/>
-              <a:t>1)https://www.owasp.org/index.php/Category:Cryptographic_Vulnerability</a:t>
-            </a:r>
-            <a:endParaRPr lang="en-US"/>
-          </a:p>
-          <a:p>
-            <a:r>
-              <a:rPr lang="en-US"/>
-              <a:t>2)https://www.w3.org/Protocols/rfc2616/rfc2616-sec15.html</a:t>
-            </a:r>
-            <a:endParaRPr lang="en-US"/>
-          </a:p>
-        </p:txBody>
-      </p:sp>
-      <p:sp>
-        <p:nvSpPr>
-          <p:cNvPr id="6" name="Title 1"/>
-          <p:cNvSpPr>
-            <a:spLocks noGrp="1"/>
-          </p:cNvSpPr>
-          <p:nvPr/>
-        </p:nvSpPr>
-        <p:spPr>
-          <a:xfrm>
-            <a:off x="1038860" y="212090"/>
-            <a:ext cx="10515600" cy="1325563"/>
-          </a:xfrm>
-          <a:prstGeom prst="rect">
-            <a:avLst/>
-          </a:prstGeom>
-        </p:spPr>
-        <p:txBody>
-          <a:bodyPr vert="horz" lIns="91440" tIns="45720" rIns="91440" bIns="45720" rtlCol="0" anchor="ctr">
-            <a:normAutofit/>
-            <a:scene3d>
-              <a:camera prst="orthographicFront"/>
-              <a:lightRig rig="threePt" dir="t"/>
-            </a:scene3d>
-          </a:bodyPr>
-          <a:lstStyle>
-            <a:lvl1pPr algn="l" defTabSz="914400" rtl="0" eaLnBrk="1" latinLnBrk="0" hangingPunct="1">
-              <a:lnSpc>
-                <a:spcPct val="90000"/>
-              </a:lnSpc>
-              <a:spcBef>
-                <a:spcPct val="0"/>
-              </a:spcBef>
-              <a:buNone/>
-              <a:defRPr sz="4400" kern="1200">
+              <a:rPr lang="en-US" sz="3200" b="1">
+                <a:ln/>
                 <a:solidFill>
                   <a:schemeClr val="tx1"/>
                 </a:solidFill>
-                <a:latin typeface="+mj-lt"/>
-                <a:ea typeface="+mj-ea"/>
-                <a:cs typeface="+mj-cs"/>
-              </a:defRPr>
-            </a:lvl1pPr>
-          </a:lstStyle>
-          <a:p>
-            <a:r>
-              <a:rPr lang="en-US" u="sng">
-                <a:ln w="10160">
-                  <a:solidFill>
-                    <a:schemeClr val="accent5"/>
-                  </a:solidFill>
-                  <a:prstDash val="solid"/>
-                </a:ln>
-                <a:solidFill>
-                  <a:srgbClr val="FFFFFF"/>
-                </a:solidFill>
-                <a:effectLst>
-                  <a:outerShdw blurRad="38100" dist="22860" dir="5400000" algn="tl" rotWithShape="0">
-                    <a:srgbClr val="000000">
-                      <a:alpha val="30000"/>
-                    </a:srgbClr>
-                  </a:outerShdw>
-                </a:effectLst>
+                <a:effectLst/>
+                <a:latin typeface="Calibri" panose="020F0502020204030204" charset="0"/>
+                <a:cs typeface="Calibri" panose="020F0502020204030204" charset="0"/>
               </a:rPr>
               <a:t>Business Impact(High):</a:t>
             </a:r>
-            <a:endParaRPr lang="en-US" u="sng">
-              <a:ln w="10160">
-                <a:solidFill>
-                  <a:schemeClr val="accent5"/>
-                </a:solidFill>
-                <a:prstDash val="solid"/>
-              </a:ln>
+            <a:endParaRPr lang="en-US" sz="3200" b="1">
+              <a:ln/>
               <a:solidFill>
-                <a:srgbClr val="FFFFFF"/>
+                <a:schemeClr val="tx1"/>
               </a:solidFill>
-              <a:effectLst>
-                <a:outerShdw blurRad="38100" dist="22860" dir="5400000" algn="tl" rotWithShape="0">
-                  <a:srgbClr val="000000">
-                    <a:alpha val="30000"/>
-                  </a:srgbClr>
-                </a:outerShdw>
-              </a:effectLst>
+              <a:effectLst/>
+              <a:latin typeface="Calibri" panose="020F0502020204030204" charset="0"/>
+              <a:cs typeface="Calibri" panose="020F0502020204030204" charset="0"/>
             </a:endParaRPr>
           </a:p>
         </p:txBody>
@@ -21031,7 +20992,7 @@
         </p:nvSpPr>
         <p:spPr>
           <a:xfrm>
-            <a:off x="1045845" y="1429385"/>
+            <a:off x="1179195" y="1576070"/>
             <a:ext cx="10507980" cy="645160"/>
           </a:xfrm>
           <a:prstGeom prst="rect">

</xml_diff>

<commit_message>
reports: Weak Passwords ppt done
</commit_message>
<xml_diff>
--- a/reports/Lifestyle Store/LifeStyle Store Application Reports.pptx
+++ b/reports/Lifestyle Store/LifeStyle Store Application Reports.pptx
@@ -21043,38 +21043,22 @@
         </p:nvSpPr>
         <p:spPr/>
         <p:txBody>
-          <a:bodyPr>
-            <a:scene3d>
-              <a:camera prst="orthographicFront"/>
-              <a:lightRig rig="soft" dir="t">
-                <a:rot lat="0" lon="0" rev="15600000"/>
-              </a:lightRig>
-            </a:scene3d>
-            <a:sp3d extrusionH="57150" prstMaterial="softEdge">
-              <a:bevelT w="25400" h="38100"/>
-            </a:sp3d>
-          </a:bodyPr>
-          <a:p>
-            <a:r>
-              <a:rPr lang="en-US">
+          <a:bodyPr/>
+          <a:p>
+            <a:r>
+              <a:rPr lang="en-US" sz="3200" b="1">
+                <a:ln/>
                 <a:solidFill>
-                  <a:schemeClr val="accent4"/>
-                </a:solidFill>
-              </a:rPr>
-              <a:t>11)</a:t>
-            </a:r>
-            <a:r>
-              <a:rPr lang="en-US" u="sng">
-                <a:solidFill>
-                  <a:schemeClr val="accent4"/>
+                  <a:schemeClr val="tx1"/>
                 </a:solidFill>
                 <a:effectLst/>
               </a:rPr>
-              <a:t>Common Passwords:</a:t>
-            </a:r>
-            <a:endParaRPr lang="en-US" u="sng">
+              <a:t>10. Weak Passwords:</a:t>
+            </a:r>
+            <a:endParaRPr lang="en-US" sz="3200" b="1">
+              <a:ln/>
               <a:solidFill>
-                <a:schemeClr val="accent4"/>
+                <a:schemeClr val="tx1"/>
               </a:solidFill>
               <a:effectLst/>
             </a:endParaRPr>
@@ -21092,8 +21076,8 @@
           </p:nvPr>
         </p:nvGraphicFramePr>
         <p:xfrm>
-          <a:off x="838200" y="1825625"/>
-          <a:ext cx="10515600" cy="1521460"/>
+          <a:off x="1624965" y="1825625"/>
+          <a:ext cx="8801735" cy="1948180"/>
         </p:xfrm>
         <a:graphic>
           <a:graphicData uri="http://schemas.openxmlformats.org/drawingml/2006/table">
@@ -21102,8 +21086,8 @@
                 <a:tableStyleId>{5C22544A-7EE6-4342-B048-85BDC9FD1C3A}</a:tableStyleId>
               </a:tblPr>
               <a:tblGrid>
-                <a:gridCol w="1833245"/>
-                <a:gridCol w="8682355"/>
+                <a:gridCol w="1692910"/>
+                <a:gridCol w="7108825"/>
               </a:tblGrid>
               <a:tr h="265430">
                 <a:tc>
@@ -21111,7 +21095,7 @@
                     <a:bodyPr/>
                     <a:p>
                       <a:pPr algn="ctr"/>
-                      <a:endParaRPr lang="en-US" sz="1200" dirty="0"/>
+                      <a:endParaRPr lang="en-US" sz="1300" dirty="0"/>
                     </a:p>
                   </a:txBody>
                   <a:tcPr marL="82988" marR="82988" marT="41494" marB="41494">
@@ -21148,7 +21132,7 @@
                   <a:txBody>
                     <a:bodyPr/>
                     <a:p>
-                      <a:endParaRPr lang="en-US" sz="1200" dirty="0"/>
+                      <a:endParaRPr lang="en-US" sz="1300" dirty="0"/>
                     </a:p>
                   </a:txBody>
                   <a:tcPr marL="82988" marR="82988" marT="41494" marB="41494">
@@ -21189,7 +21173,7 @@
                     <a:p>
                       <a:pPr algn="ctr"/>
                       <a:r>
-                        <a:rPr lang="en-IN" sz="1200" dirty="0" smtClean="0">
+                        <a:rPr lang="en-IN" sz="1600" dirty="0" smtClean="0">
                           <a:solidFill>
                             <a:srgbClr val="FFFFFF"/>
                           </a:solidFill>
@@ -21198,7 +21182,7 @@
                         <a:t> </a:t>
                       </a:r>
                       <a:r>
-                        <a:rPr lang="en-US" altLang="en-IN" sz="1200" dirty="0" smtClean="0">
+                        <a:rPr lang="en-US" altLang="en-IN" sz="1600" dirty="0" smtClean="0">
                           <a:solidFill>
                             <a:srgbClr val="FFFFFF"/>
                           </a:solidFill>
@@ -21207,7 +21191,7 @@
                         <a:t>Crypto Configuration Flaw</a:t>
                       </a:r>
                       <a:r>
-                        <a:rPr lang="en-US" sz="1100" dirty="0" smtClean="0">
+                        <a:rPr lang="en-US" sz="1600" dirty="0" smtClean="0">
                           <a:solidFill>
                             <a:srgbClr val="FFFFFF"/>
                           </a:solidFill>
@@ -21215,7 +21199,7 @@
                         </a:rPr>
                         <a:t>(Severe)</a:t>
                       </a:r>
-                      <a:endParaRPr lang="en-US" sz="1100" dirty="0">
+                      <a:endParaRPr lang="en-US" sz="1600" dirty="0" smtClean="0">
                         <a:solidFill>
                           <a:srgbClr val="FFFFFF"/>
                         </a:solidFill>
@@ -21270,7 +21254,7 @@
                     <a:bodyPr/>
                     <a:p>
                       <a:r>
-                        <a:rPr lang="en-US" sz="1100" dirty="0" smtClean="0">
+                        <a:rPr lang="en-US" sz="1300" dirty="0" smtClean="0">
                           <a:solidFill>
                             <a:schemeClr val="tx1"/>
                           </a:solidFill>
@@ -21278,7 +21262,7 @@
                         </a:rPr>
                         <a:t> </a:t>
                       </a:r>
-                      <a:endParaRPr lang="en-US" sz="1100" dirty="0">
+                      <a:endParaRPr lang="en-US" sz="1300" dirty="0">
                         <a:solidFill>
                           <a:schemeClr val="tx1"/>
                         </a:solidFill>
@@ -21287,7 +21271,7 @@
                     </a:p>
                     <a:p>
                       <a:r>
-                        <a:rPr lang="en-US" sz="1100" baseline="0" dirty="0" smtClean="0">
+                        <a:rPr lang="en-US" sz="1300" baseline="0" dirty="0" smtClean="0">
                           <a:solidFill>
                             <a:schemeClr val="tx1"/>
                           </a:solidFill>
@@ -21295,7 +21279,7 @@
                         </a:rPr>
                         <a:t>Cryto Configuration Flaws are found in the modules below:-</a:t>
                       </a:r>
-                      <a:endParaRPr lang="en-US" sz="1100" dirty="0" smtClean="0">
+                      <a:endParaRPr lang="en-US" sz="1300" dirty="0" smtClean="0">
                         <a:solidFill>
                           <a:schemeClr val="tx1"/>
                         </a:solidFill>
@@ -21304,7 +21288,7 @@
                       </a:endParaRPr>
                     </a:p>
                     <a:p>
-                      <a:endParaRPr lang="en-US" sz="1100" dirty="0" smtClean="0">
+                      <a:endParaRPr lang="en-US" sz="1300" dirty="0" smtClean="0">
                         <a:solidFill>
                           <a:schemeClr val="tx1"/>
                         </a:solidFill>
@@ -21313,7 +21297,7 @@
                     </a:p>
                     <a:p>
                       <a:r>
-                        <a:rPr lang="en-US" sz="1100" b="1" dirty="0" smtClean="0">
+                        <a:rPr lang="en-US" sz="1300" b="1" dirty="0" smtClean="0">
                           <a:solidFill>
                             <a:schemeClr val="tx1"/>
                           </a:solidFill>
@@ -21321,7 +21305,7 @@
                         </a:rPr>
                         <a:t>Affected URL :</a:t>
                       </a:r>
-                      <a:endParaRPr lang="en-US" sz="1100" b="0" i="0" u="none" strike="noStrike" dirty="0" smtClean="0">
+                      <a:endParaRPr lang="en-US" sz="1300" b="0" i="0" u="none" strike="noStrike" dirty="0" smtClean="0">
                         <a:solidFill>
                           <a:schemeClr val="tx1"/>
                         </a:solidFill>
@@ -21338,15 +21322,15 @@
                         <a:buChar char="•"/>
                       </a:pPr>
                       <a:r>
-                        <a:rPr lang="en-US" sz="1100" b="0" dirty="0" smtClean="0">
+                        <a:rPr lang="en-US" sz="1300" b="0" dirty="0" smtClean="0">
                           <a:solidFill>
                             <a:schemeClr val="tx1"/>
                           </a:solidFill>
                           <a:latin typeface="Calibri" panose="020F0502020204030204" charset="0"/>
                         </a:rPr>
-                        <a:t>http://52.66.198.61/login/seller.php</a:t>
-                      </a:r>
-                      <a:endParaRPr lang="en-US" sz="1100" b="0" dirty="0" smtClean="0">
+                        <a:t>http://13.232.248.46/wondercms/loginURL</a:t>
+                      </a:r>
+                      <a:endParaRPr lang="en-US" sz="1300" b="0" dirty="0" smtClean="0">
                         <a:solidFill>
                           <a:schemeClr val="tx1"/>
                         </a:solidFill>
@@ -21359,15 +21343,15 @@
                         <a:buChar char="•"/>
                       </a:pPr>
                       <a:r>
-                        <a:rPr lang="en-US" sz="1100" b="0" dirty="0" smtClean="0">
+                        <a:rPr lang="en-US" sz="1300" b="0" dirty="0" smtClean="0">
                           <a:solidFill>
                             <a:schemeClr val="tx1"/>
                           </a:solidFill>
                           <a:latin typeface="Calibri" panose="020F0502020204030204" charset="0"/>
                         </a:rPr>
-                        <a:t>http://52.66.198.61/wondercms/</a:t>
-                      </a:r>
-                      <a:endParaRPr lang="en-US" sz="1100" b="0" dirty="0" smtClean="0">
+                        <a:t>http://13.232.248.46/login/seller.php</a:t>
+                      </a:r>
+                      <a:endParaRPr lang="en-US" sz="1300" b="0" dirty="0" smtClean="0">
                         <a:solidFill>
                           <a:schemeClr val="tx1"/>
                         </a:solidFill>
@@ -21391,7 +21375,7 @@
                         <a:buNone/>
                         <a:defRPr/>
                       </a:pPr>
-                      <a:endParaRPr lang="en-US" sz="1100" b="1" dirty="0" smtClean="0">
+                      <a:endParaRPr lang="en-US" sz="1300" b="1" dirty="0" smtClean="0">
                         <a:solidFill>
                           <a:schemeClr val="tx1"/>
                         </a:solidFill>
@@ -21415,7 +21399,7 @@
                         <a:buNone/>
                         <a:defRPr/>
                       </a:pPr>
-                      <a:endParaRPr lang="en-US" sz="1100" b="0" dirty="0">
+                      <a:endParaRPr lang="en-US" sz="1300" b="0" dirty="0">
                         <a:solidFill>
                           <a:schemeClr val="tx1"/>
                         </a:solidFill>
@@ -21508,10 +21492,22 @@
           <a:bodyPr/>
           <a:p>
             <a:r>
-              <a:rPr lang="en-US" u="sng"/>
+              <a:rPr lang="en-US" sz="3200" b="1">
+                <a:ln/>
+                <a:solidFill>
+                  <a:schemeClr val="tx1"/>
+                </a:solidFill>
+                <a:effectLst/>
+              </a:rPr>
               <a:t>Observation:</a:t>
             </a:r>
-            <a:endParaRPr lang="en-US" u="sng"/>
+            <a:endParaRPr lang="en-US" sz="3200" b="1">
+              <a:ln/>
+              <a:solidFill>
+                <a:schemeClr val="tx1"/>
+              </a:solidFill>
+              <a:effectLst/>
+            </a:endParaRPr>
           </a:p>
         </p:txBody>
       </p:sp>
@@ -21527,7 +21523,7 @@
         </p:nvSpPr>
         <p:spPr>
           <a:xfrm>
-            <a:off x="838200" y="1544955"/>
+            <a:off x="958215" y="1531620"/>
             <a:ext cx="10516235" cy="1241425"/>
           </a:xfrm>
         </p:spPr>
@@ -21549,7 +21545,7 @@
       </p:sp>
       <p:pic>
         <p:nvPicPr>
-          <p:cNvPr id="4" name="Content Placeholder 3" descr="Capture"/>
+          <p:cNvPr id="4" name="Content Placeholder 3" descr="C:\Users\Datagrokr\Documents\program\CEH-Hack-a-thon\reports\Lifestyle Store\vulnerabilities\Weak Password\Blog\observation.pngobservation"/>
           <p:cNvPicPr>
             <a:picLocks noChangeAspect="1"/>
           </p:cNvPicPr>
@@ -21559,23 +21555,29 @@
         </p:nvPicPr>
         <p:blipFill>
           <a:blip r:embed="rId1"/>
+          <a:srcRect/>
           <a:stretch>
             <a:fillRect/>
           </a:stretch>
         </p:blipFill>
         <p:spPr>
           <a:xfrm>
-            <a:off x="1007110" y="3169285"/>
-            <a:ext cx="4467225" cy="1485900"/>
+            <a:off x="958215" y="2993390"/>
+            <a:ext cx="5078730" cy="2315210"/>
           </a:xfrm>
           <a:prstGeom prst="rect">
             <a:avLst/>
           </a:prstGeom>
+          <a:ln>
+            <a:solidFill>
+              <a:schemeClr val="tx1"/>
+            </a:solidFill>
+          </a:ln>
         </p:spPr>
       </p:pic>
       <p:pic>
         <p:nvPicPr>
-          <p:cNvPr id="5" name="Picture 4" descr="Capture"/>
+          <p:cNvPr id="5" name="Picture 4" descr="C:\Users\Datagrokr\Documents\program\CEH-Hack-a-thon\reports\Lifestyle Store\vulnerabilities\Weak Password\Seller\userlist.txt.pnguserlist.txt"/>
           <p:cNvPicPr>
             <a:picLocks noChangeAspect="1"/>
           </p:cNvPicPr>
@@ -21583,18 +21585,24 @@
         </p:nvPicPr>
         <p:blipFill>
           <a:blip r:embed="rId2"/>
+          <a:srcRect/>
           <a:stretch>
             <a:fillRect/>
           </a:stretch>
         </p:blipFill>
         <p:spPr>
           <a:xfrm>
-            <a:off x="6188710" y="3169920"/>
-            <a:ext cx="4811395" cy="1485900"/>
+            <a:off x="6293485" y="2996565"/>
+            <a:ext cx="5360035" cy="2288540"/>
           </a:xfrm>
           <a:prstGeom prst="rect">
             <a:avLst/>
           </a:prstGeom>
+          <a:ln>
+            <a:solidFill>
+              <a:schemeClr val="tx1"/>
+            </a:solidFill>
+          </a:ln>
         </p:spPr>
       </p:pic>
     </p:spTree>
@@ -21627,7 +21635,7 @@
         </p:nvSpPr>
         <p:spPr>
           <a:xfrm>
-            <a:off x="1056640" y="55245"/>
+            <a:off x="936625" y="335280"/>
             <a:ext cx="10515600" cy="1002030"/>
           </a:xfrm>
         </p:spPr>
@@ -21635,37 +21643,25 @@
           <a:bodyPr/>
           <a:p>
             <a:r>
-              <a:rPr lang="en-US" u="sng">
-                <a:ln w="22225">
-                  <a:solidFill>
-                    <a:schemeClr val="accent2"/>
-                  </a:solidFill>
-                  <a:prstDash val="solid"/>
-                </a:ln>
+              <a:rPr lang="en-US" sz="3200" b="1">
+                <a:ln/>
                 <a:solidFill>
-                  <a:schemeClr val="accent2">
-                    <a:lumMod val="40000"/>
-                    <a:lumOff val="60000"/>
-                  </a:schemeClr>
+                  <a:schemeClr val="tx1"/>
                 </a:solidFill>
                 <a:effectLst/>
+                <a:latin typeface="Calibri" panose="020F0502020204030204" charset="0"/>
+                <a:cs typeface="Calibri" panose="020F0502020204030204" charset="0"/>
               </a:rPr>
               <a:t>Business Impact(High):</a:t>
             </a:r>
-            <a:endParaRPr lang="en-US" u="sng">
-              <a:ln w="22225">
-                <a:solidFill>
-                  <a:schemeClr val="accent2"/>
-                </a:solidFill>
-                <a:prstDash val="solid"/>
-              </a:ln>
+            <a:endParaRPr lang="en-US" sz="3200" b="1">
+              <a:ln/>
               <a:solidFill>
-                <a:schemeClr val="accent2">
-                  <a:lumMod val="40000"/>
-                  <a:lumOff val="60000"/>
-                </a:schemeClr>
+                <a:schemeClr val="tx1"/>
               </a:solidFill>
               <a:effectLst/>
+              <a:latin typeface="Calibri" panose="020F0502020204030204" charset="0"/>
+              <a:cs typeface="Calibri" panose="020F0502020204030204" charset="0"/>
             </a:endParaRPr>
           </a:p>
         </p:txBody>
@@ -21678,7 +21674,7 @@
         </p:nvSpPr>
         <p:spPr>
           <a:xfrm>
-            <a:off x="1149350" y="929640"/>
+            <a:off x="1149350" y="1169670"/>
             <a:ext cx="10629265" cy="645160"/>
           </a:xfrm>
           <a:prstGeom prst="rect">
@@ -21709,7 +21705,7 @@
         </p:nvSpPr>
         <p:spPr>
           <a:xfrm>
-            <a:off x="1000125" y="1574800"/>
+            <a:off x="1000125" y="1734820"/>
             <a:ext cx="10515600" cy="1002030"/>
           </a:xfrm>
           <a:prstGeom prst="rect">
@@ -21741,37 +21737,25 @@
           </a:lstStyle>
           <a:p>
             <a:r>
-              <a:rPr lang="en-US" u="sng">
-                <a:ln w="22225">
-                  <a:solidFill>
-                    <a:schemeClr val="accent2"/>
-                  </a:solidFill>
-                  <a:prstDash val="solid"/>
-                </a:ln>
+              <a:rPr lang="en-US" sz="3200" b="1">
+                <a:ln/>
                 <a:solidFill>
-                  <a:schemeClr val="accent2">
-                    <a:lumMod val="40000"/>
-                    <a:lumOff val="60000"/>
-                  </a:schemeClr>
+                  <a:schemeClr val="tx1"/>
                 </a:solidFill>
                 <a:effectLst/>
+                <a:latin typeface="Calibri" panose="020F0502020204030204" charset="0"/>
+                <a:cs typeface="Calibri" panose="020F0502020204030204" charset="0"/>
               </a:rPr>
               <a:t>Recommendation:</a:t>
             </a:r>
-            <a:endParaRPr lang="en-US" u="sng">
-              <a:ln w="22225">
-                <a:solidFill>
-                  <a:schemeClr val="accent2"/>
-                </a:solidFill>
-                <a:prstDash val="solid"/>
-              </a:ln>
+            <a:endParaRPr lang="en-US" sz="3200" b="1">
+              <a:ln/>
               <a:solidFill>
-                <a:schemeClr val="accent2">
-                  <a:lumMod val="40000"/>
-                  <a:lumOff val="60000"/>
-                </a:schemeClr>
+                <a:schemeClr val="tx1"/>
               </a:solidFill>
               <a:effectLst/>
+              <a:latin typeface="Calibri" panose="020F0502020204030204" charset="0"/>
+              <a:cs typeface="Calibri" panose="020F0502020204030204" charset="0"/>
             </a:endParaRPr>
           </a:p>
         </p:txBody>
@@ -21784,8 +21768,8 @@
         </p:nvSpPr>
         <p:spPr>
           <a:xfrm>
-            <a:off x="1208405" y="2462530"/>
-            <a:ext cx="10231120" cy="2861310"/>
+            <a:off x="1208405" y="2569210"/>
+            <a:ext cx="10231120" cy="2081530"/>
           </a:xfrm>
           <a:prstGeom prst="rect">
             <a:avLst/>
@@ -21797,46 +21781,82 @@
             <a:spAutoFit/>
           </a:bodyPr>
           <a:p>
+            <a:pPr marL="342900" indent="-342900">
+              <a:lnSpc>
+                <a:spcPct val="90000"/>
+              </a:lnSpc>
+              <a:buAutoNum type="arabicPeriod"/>
+            </a:pPr>
             <a:r>
               <a:rPr lang="en-US"/>
-              <a:t>1)There should be password strength check at every creation of an account.</a:t>
+              <a:t>There should be password strength check at every creation of an account.</a:t>
             </a:r>
             <a:endParaRPr lang="en-US"/>
           </a:p>
           <a:p>
+            <a:pPr marL="342900" indent="-342900">
+              <a:lnSpc>
+                <a:spcPct val="90000"/>
+              </a:lnSpc>
+              <a:buAutoNum type="arabicPeriod"/>
+            </a:pPr>
             <a:endParaRPr lang="en-US"/>
           </a:p>
           <a:p>
+            <a:pPr marL="342900" indent="-342900">
+              <a:lnSpc>
+                <a:spcPct val="90000"/>
+              </a:lnSpc>
+              <a:buAutoNum type="arabicPeriod"/>
+            </a:pPr>
             <a:r>
               <a:rPr lang="en-US"/>
-              <a:t>2)There must be a minimum of 8 characters long password with a mixture of numbers,alphanumerics,special characters,etc.</a:t>
+              <a:t>There must be a minimum of 8 characters long password with a mixture of numbers,alphanumerics,special characters,etc.</a:t>
             </a:r>
             <a:endParaRPr lang="en-US"/>
           </a:p>
           <a:p>
+            <a:pPr marL="342900" indent="-342900">
+              <a:lnSpc>
+                <a:spcPct val="90000"/>
+              </a:lnSpc>
+              <a:buAutoNum type="arabicPeriod"/>
+            </a:pPr>
             <a:endParaRPr lang="en-US"/>
           </a:p>
           <a:p>
+            <a:pPr marL="342900" indent="-342900">
+              <a:lnSpc>
+                <a:spcPct val="90000"/>
+              </a:lnSpc>
+              <a:buAutoNum type="arabicPeriod"/>
+            </a:pPr>
             <a:r>
               <a:rPr lang="en-US"/>
-              <a:t>3)There should be no repetition of password,neither on change nor reset.</a:t>
+              <a:t>There should be no repetition of password,neither on change nor reset.</a:t>
             </a:r>
             <a:endParaRPr lang="en-US"/>
           </a:p>
           <a:p>
+            <a:pPr marL="342900" indent="-342900">
+              <a:lnSpc>
+                <a:spcPct val="90000"/>
+              </a:lnSpc>
+              <a:buAutoNum type="arabicPeriod"/>
+            </a:pPr>
             <a:endParaRPr lang="en-US"/>
           </a:p>
           <a:p>
+            <a:pPr marL="342900" indent="-342900">
+              <a:lnSpc>
+                <a:spcPct val="90000"/>
+              </a:lnSpc>
+              <a:buAutoNum type="arabicPeriod"/>
+            </a:pPr>
             <a:r>
               <a:rPr lang="en-US"/>
-              <a:t>4)The password should not be stored on the web,rather should be hashed and stored.</a:t>
-            </a:r>
-            <a:endParaRPr lang="en-US"/>
-          </a:p>
-          <a:p>
-            <a:endParaRPr lang="en-US"/>
-          </a:p>
-          <a:p>
+              <a:t>The password should not be stored on the web,rather should be hashed and stored.</a:t>
+            </a:r>
             <a:endParaRPr lang="en-US"/>
           </a:p>
         </p:txBody>
@@ -21851,7 +21871,7 @@
         </p:nvSpPr>
         <p:spPr>
           <a:xfrm>
-            <a:off x="1066165" y="4808855"/>
+            <a:off x="1066165" y="4688840"/>
             <a:ext cx="10515600" cy="1002030"/>
           </a:xfrm>
           <a:prstGeom prst="rect">
@@ -21883,37 +21903,25 @@
           </a:lstStyle>
           <a:p>
             <a:r>
-              <a:rPr lang="en-US" u="sng">
-                <a:ln w="22225">
-                  <a:solidFill>
-                    <a:schemeClr val="accent2"/>
-                  </a:solidFill>
-                  <a:prstDash val="solid"/>
-                </a:ln>
+              <a:rPr lang="en-US" sz="3200" b="1">
+                <a:ln/>
                 <a:solidFill>
-                  <a:schemeClr val="accent2">
-                    <a:lumMod val="40000"/>
-                    <a:lumOff val="60000"/>
-                  </a:schemeClr>
+                  <a:schemeClr val="tx1"/>
                 </a:solidFill>
                 <a:effectLst/>
+                <a:latin typeface="Calibri" panose="020F0502020204030204" charset="0"/>
+                <a:cs typeface="Calibri" panose="020F0502020204030204" charset="0"/>
               </a:rPr>
               <a:t>References:</a:t>
             </a:r>
-            <a:endParaRPr lang="en-US" u="sng">
-              <a:ln w="22225">
-                <a:solidFill>
-                  <a:schemeClr val="accent2"/>
-                </a:solidFill>
-                <a:prstDash val="solid"/>
-              </a:ln>
+            <a:endParaRPr lang="en-US" sz="3200" b="1">
+              <a:ln/>
               <a:solidFill>
-                <a:schemeClr val="accent2">
-                  <a:lumMod val="40000"/>
-                  <a:lumOff val="60000"/>
-                </a:schemeClr>
+                <a:schemeClr val="tx1"/>
               </a:solidFill>
               <a:effectLst/>
+              <a:latin typeface="Calibri" panose="020F0502020204030204" charset="0"/>
+              <a:cs typeface="Calibri" panose="020F0502020204030204" charset="0"/>
             </a:endParaRPr>
           </a:p>
         </p:txBody>
@@ -21926,8 +21934,8 @@
         </p:nvSpPr>
         <p:spPr>
           <a:xfrm>
-            <a:off x="1208405" y="5810885"/>
-            <a:ext cx="10437495" cy="922020"/>
+            <a:off x="1208405" y="5530850"/>
+            <a:ext cx="10437495" cy="837565"/>
           </a:xfrm>
           <a:prstGeom prst="rect">
             <a:avLst/>
@@ -21939,19 +21947,40 @@
             <a:spAutoFit/>
           </a:bodyPr>
           <a:p>
+            <a:pPr marL="285750" indent="-285750">
+              <a:lnSpc>
+                <a:spcPct val="90000"/>
+              </a:lnSpc>
+              <a:buFont typeface="Arial" panose="020B0604020202020204" pitchFamily="34" charset="0"/>
+              <a:buChar char="•"/>
+            </a:pPr>
             <a:r>
               <a:rPr lang="en-US"/>
-              <a:t>1)https://www.acunetix.com/blog/articles/weak-password-vulnerability-common-think/</a:t>
+              <a:t>https://www.acunetix.com/blog/articles/weak-password-vulnerability-common-think/</a:t>
             </a:r>
             <a:endParaRPr lang="en-US"/>
           </a:p>
           <a:p>
+            <a:pPr marL="285750" indent="-285750">
+              <a:lnSpc>
+                <a:spcPct val="90000"/>
+              </a:lnSpc>
+              <a:buFont typeface="Arial" panose="020B0604020202020204" pitchFamily="34" charset="0"/>
+              <a:buChar char="•"/>
+            </a:pPr>
             <a:endParaRPr lang="en-US"/>
           </a:p>
           <a:p>
+            <a:pPr marL="285750" indent="-285750">
+              <a:lnSpc>
+                <a:spcPct val="90000"/>
+              </a:lnSpc>
+              <a:buFont typeface="Arial" panose="020B0604020202020204" pitchFamily="34" charset="0"/>
+              <a:buChar char="•"/>
+            </a:pPr>
             <a:r>
               <a:rPr lang="en-US"/>
-              <a:t>2)https://www.owasp.org/index.php/Testing_for_Weak_password_policy_(OTG-AUTHN-007)</a:t>
+              <a:t>https://www.owasp.org/index.php/Testing_for_Weak_password_policy_(OTG-AUTHN-007)</a:t>
             </a:r>
             <a:endParaRPr lang="en-US"/>
           </a:p>

</xml_diff>

<commit_message>
reports: Open redirection ppt done
</commit_message>
<xml_diff>
--- a/reports/Lifestyle Store/LifeStyle Store Application Reports.pptx
+++ b/reports/Lifestyle Store/LifeStyle Store Application Reports.pptx
@@ -5458,7 +5458,7 @@
             </a:r>
             <a:r>
               <a:rPr lang="en-US" altLang="en-IN" dirty="0" smtClean="0"/>
-              <a:t>6296440247</a:t>
+              <a:t>8011806053</a:t>
             </a:r>
             <a:endParaRPr lang="en-US" altLang="en-IN" dirty="0" smtClean="0"/>
           </a:p>
@@ -5519,7 +5519,6 @@
           <a:p>
             <a:r>
               <a:rPr lang="en-IN" b="1" dirty="0" smtClean="0">
-                <a:ln/>
                 <a:solidFill>
                   <a:schemeClr val="tx1"/>
                 </a:solidFill>
@@ -5528,7 +5527,6 @@
               <a:t>Business Impact –  High</a:t>
             </a:r>
             <a:endParaRPr lang="en-IN" b="1" dirty="0" smtClean="0">
-              <a:ln/>
               <a:solidFill>
                 <a:schemeClr val="tx1"/>
               </a:solidFill>
@@ -5665,7 +5663,6 @@
           <a:p>
             <a:r>
               <a:rPr lang="en-IN" sz="3200" b="1" dirty="0" smtClean="0">
-                <a:ln/>
                 <a:solidFill>
                   <a:schemeClr val="tx1"/>
                 </a:solidFill>
@@ -5674,7 +5671,6 @@
               <a:t>Recommendation</a:t>
             </a:r>
             <a:endParaRPr lang="en-IN" sz="3200" b="1" dirty="0" smtClean="0">
-              <a:ln/>
               <a:solidFill>
                 <a:schemeClr val="tx1"/>
               </a:solidFill>
@@ -5863,7 +5859,6 @@
           <a:p>
             <a:r>
               <a:rPr lang="en-IN" sz="3200" b="1" dirty="0" smtClean="0">
-                <a:ln/>
                 <a:solidFill>
                   <a:schemeClr val="tx1"/>
                 </a:solidFill>
@@ -5872,7 +5867,6 @@
               <a:t>References</a:t>
             </a:r>
             <a:endParaRPr lang="en-IN" sz="3200" b="1" dirty="0" smtClean="0">
-              <a:ln/>
               <a:solidFill>
                 <a:schemeClr val="tx1"/>
               </a:solidFill>
@@ -6485,7 +6479,6 @@
           <a:p>
             <a:r>
               <a:rPr lang="en-US" sz="3200" b="1">
-                <a:ln/>
                 <a:solidFill>
                   <a:schemeClr val="tx1"/>
                 </a:solidFill>
@@ -6494,7 +6487,6 @@
               <a:t>Observation:</a:t>
             </a:r>
             <a:endParaRPr lang="en-US" sz="3200" b="1" u="sng">
-              <a:ln/>
               <a:solidFill>
                 <a:schemeClr val="tx1"/>
               </a:solidFill>
@@ -6624,7 +6616,6 @@
           <a:p>
             <a:r>
               <a:rPr lang="en-US" sz="3200" b="1">
-                <a:ln/>
                 <a:solidFill>
                   <a:schemeClr val="tx1"/>
                 </a:solidFill>
@@ -6633,7 +6624,6 @@
               <a:t>Proof of Concept(PoC):</a:t>
             </a:r>
             <a:endParaRPr lang="en-US" sz="3200" b="1">
-              <a:ln/>
               <a:solidFill>
                 <a:schemeClr val="tx1"/>
               </a:solidFill>
@@ -6731,7 +6721,6 @@
           <a:p>
             <a:r>
               <a:rPr lang="en-US" sz="3200" b="1">
-                <a:ln/>
                 <a:solidFill>
                   <a:schemeClr val="tx1"/>
                 </a:solidFill>
@@ -6742,7 +6731,6 @@
               <a:t>Business Impact(High):</a:t>
             </a:r>
             <a:endParaRPr lang="en-US" sz="3200" b="1">
-              <a:ln/>
               <a:solidFill>
                 <a:schemeClr val="tx1"/>
               </a:solidFill>
@@ -6839,7 +6827,6 @@
           <a:p>
             <a:r>
               <a:rPr lang="en-US" sz="3200" b="1">
-                <a:ln/>
                 <a:solidFill>
                   <a:schemeClr val="tx1"/>
                 </a:solidFill>
@@ -6848,7 +6835,6 @@
               <a:t>Recommendations:</a:t>
             </a:r>
             <a:endParaRPr lang="en-US" sz="3200" b="1">
-              <a:ln/>
               <a:solidFill>
                 <a:schemeClr val="tx1"/>
               </a:solidFill>
@@ -6964,7 +6950,6 @@
           <a:p>
             <a:r>
               <a:rPr lang="en-US" sz="3200" b="1">
-                <a:ln/>
                 <a:solidFill>
                   <a:schemeClr val="tx1"/>
                 </a:solidFill>
@@ -6973,7 +6958,6 @@
               <a:t>References:</a:t>
             </a:r>
             <a:endParaRPr lang="en-US" sz="3200" b="1">
-              <a:ln/>
               <a:solidFill>
                 <a:schemeClr val="tx1"/>
               </a:solidFill>
@@ -7216,7 +7200,6 @@
           <a:p>
             <a:r>
               <a:rPr lang="en-US" sz="4000" b="1">
-                <a:ln/>
                 <a:solidFill>
                   <a:schemeClr val="tx1"/>
                 </a:solidFill>
@@ -7225,7 +7208,6 @@
               <a:t>3. File Inclusion Vulnerabilities</a:t>
             </a:r>
             <a:endParaRPr lang="en-US" sz="4000" b="1" u="sng">
-              <a:ln/>
               <a:solidFill>
                 <a:schemeClr val="tx1"/>
               </a:solidFill>
@@ -7640,7 +7622,6 @@
           <a:p>
             <a:r>
               <a:rPr lang="en-US" sz="3200" b="1">
-                <a:ln/>
                 <a:solidFill>
                   <a:schemeClr val="tx1"/>
                 </a:solidFill>
@@ -7649,7 +7630,6 @@
               <a:t>Observation:</a:t>
             </a:r>
             <a:endParaRPr lang="en-US" sz="3200" b="1">
-              <a:ln/>
               <a:solidFill>
                 <a:schemeClr val="tx1"/>
               </a:solidFill>
@@ -7754,7 +7734,6 @@
           <a:p>
             <a:r>
               <a:rPr lang="en-US" sz="3200" b="1">
-                <a:ln/>
                 <a:solidFill>
                   <a:schemeClr val="tx1"/>
                 </a:solidFill>
@@ -7763,7 +7742,6 @@
               <a:t>Proof Of Concept(PoC):</a:t>
             </a:r>
             <a:endParaRPr lang="en-US" sz="3200" b="1">
-              <a:ln/>
               <a:solidFill>
                 <a:schemeClr val="tx1"/>
               </a:solidFill>
@@ -7870,7 +7848,6 @@
           <a:p>
             <a:r>
               <a:rPr lang="en-US" sz="3200" b="1">
-                <a:ln/>
                 <a:solidFill>
                   <a:schemeClr val="tx1"/>
                 </a:solidFill>
@@ -7879,7 +7856,6 @@
               <a:t>Business Impact(Extremely High):</a:t>
             </a:r>
             <a:endParaRPr lang="en-US" sz="3200" b="1">
-              <a:ln/>
               <a:solidFill>
                 <a:schemeClr val="tx1"/>
               </a:solidFill>
@@ -7978,7 +7954,6 @@
           <a:p>
             <a:r>
               <a:rPr lang="en-US" sz="3200" b="1">
-                <a:ln/>
                 <a:solidFill>
                   <a:schemeClr val="tx1"/>
                 </a:solidFill>
@@ -7987,7 +7962,6 @@
               <a:t>Recommendation:</a:t>
             </a:r>
             <a:endParaRPr lang="en-US" sz="3200" b="1">
-              <a:ln/>
               <a:solidFill>
                 <a:schemeClr val="tx1"/>
               </a:solidFill>
@@ -8186,7 +8160,6 @@
           <a:p>
             <a:r>
               <a:rPr lang="en-US" sz="4000" b="1">
-                <a:ln/>
                 <a:solidFill>
                   <a:schemeClr val="tx1"/>
                 </a:solidFill>
@@ -8197,7 +8170,6 @@
               <a:t>4. Forced Browsing Flaws</a:t>
             </a:r>
             <a:endParaRPr lang="en-US" sz="4000" b="1">
-              <a:ln/>
               <a:solidFill>
                 <a:schemeClr val="tx1"/>
               </a:solidFill>
@@ -8652,7 +8624,6 @@
           <a:p>
             <a:r>
               <a:rPr lang="en-US" sz="3200" b="1">
-                <a:ln/>
                 <a:solidFill>
                   <a:schemeClr val="tx1"/>
                 </a:solidFill>
@@ -8661,7 +8632,6 @@
               <a:t>Observation:</a:t>
             </a:r>
             <a:endParaRPr lang="en-US" sz="3200" b="1">
-              <a:ln/>
               <a:solidFill>
                 <a:schemeClr val="tx1"/>
               </a:solidFill>
@@ -8789,7 +8759,6 @@
           <a:p>
             <a:r>
               <a:rPr lang="en-IN" b="1" dirty="0" smtClean="0">
-                <a:ln/>
                 <a:solidFill>
                   <a:schemeClr val="tx1"/>
                 </a:solidFill>
@@ -8801,7 +8770,6 @@
             </a:r>
             <a:r>
               <a:rPr lang="en-US" altLang="en-IN" b="1" dirty="0" smtClean="0">
-                <a:ln/>
                 <a:solidFill>
                   <a:schemeClr val="tx1"/>
                 </a:solidFill>
@@ -8812,7 +8780,6 @@
               <a:t>:</a:t>
             </a:r>
             <a:endParaRPr lang="en-US" altLang="en-IN" b="1" dirty="0" smtClean="0">
-              <a:ln/>
               <a:solidFill>
                 <a:schemeClr val="tx1"/>
               </a:solidFill>
@@ -9001,7 +8968,6 @@
               <a:t>Proof Of Concept(PoC):</a:t>
             </a:r>
             <a:endParaRPr lang="en-US" altLang="en-IN" sz="3200" b="1" dirty="0" smtClean="0">
-              <a:ln/>
               <a:solidFill>
                 <a:schemeClr val="tx1"/>
               </a:solidFill>
@@ -9116,7 +9082,6 @@
           <a:p>
             <a:r>
               <a:rPr lang="en-IN" sz="4000" b="1" dirty="0" smtClean="0">
-                <a:ln/>
                 <a:solidFill>
                   <a:schemeClr val="tx1"/>
                 </a:solidFill>
@@ -9126,7 +9091,6 @@
               <a:t>Vulnerability Statistics</a:t>
             </a:r>
             <a:endParaRPr lang="en-IN" sz="4000" b="1" dirty="0" smtClean="0">
-              <a:ln/>
               <a:solidFill>
                 <a:schemeClr val="tx1"/>
               </a:solidFill>
@@ -9431,7 +9395,6 @@
           <a:p>
             <a:r>
               <a:rPr lang="en-US" sz="3200" b="1">
-                <a:ln/>
                 <a:solidFill>
                   <a:schemeClr val="tx1"/>
                 </a:solidFill>
@@ -9442,7 +9405,6 @@
               <a:t>Business Impact:Extremely High</a:t>
             </a:r>
             <a:endParaRPr lang="en-US" sz="3200" b="1">
-              <a:ln/>
               <a:solidFill>
                 <a:schemeClr val="tx1"/>
               </a:solidFill>
@@ -9576,7 +9538,6 @@
           <a:p>
             <a:r>
               <a:rPr lang="en-US" sz="3200" b="1">
-                <a:ln/>
                 <a:solidFill>
                   <a:schemeClr val="tx1"/>
                 </a:solidFill>
@@ -9585,7 +9546,6 @@
               <a:t>Recommendation:</a:t>
             </a:r>
             <a:endParaRPr lang="en-US" sz="3200" b="1">
-              <a:ln/>
               <a:solidFill>
                 <a:schemeClr val="tx1"/>
               </a:solidFill>
@@ -9712,7 +9672,6 @@
           <a:p>
             <a:r>
               <a:rPr lang="en-US" sz="3200" b="1">
-                <a:ln/>
                 <a:solidFill>
                   <a:schemeClr val="tx1"/>
                 </a:solidFill>
@@ -9721,7 +9680,6 @@
               <a:t>References:</a:t>
             </a:r>
             <a:endParaRPr lang="en-US" sz="3200" b="1">
-              <a:ln/>
               <a:solidFill>
                 <a:schemeClr val="tx1"/>
               </a:solidFill>
@@ -9828,7 +9786,6 @@
           <a:p>
             <a:r>
               <a:rPr lang="en-US" b="1">
-                <a:ln/>
                 <a:solidFill>
                   <a:schemeClr val="tx1"/>
                 </a:solidFill>
@@ -9837,7 +9794,6 @@
               <a:t>5. Command Execution Vulnerability:</a:t>
             </a:r>
             <a:endParaRPr lang="en-US" b="1">
-              <a:ln/>
               <a:solidFill>
                 <a:schemeClr val="tx1"/>
               </a:solidFill>
@@ -10300,7 +10256,6 @@
           <a:p>
             <a:r>
               <a:rPr lang="en-US" b="1">
-                <a:ln/>
                 <a:solidFill>
                   <a:schemeClr val="tx1"/>
                 </a:solidFill>
@@ -10309,7 +10264,6 @@
               <a:t>Observation:</a:t>
             </a:r>
             <a:endParaRPr lang="en-US" b="1">
-              <a:ln/>
               <a:solidFill>
                 <a:schemeClr val="tx1"/>
               </a:solidFill>
@@ -10418,7 +10372,6 @@
           <a:p>
             <a:r>
               <a:rPr lang="en-US" sz="3200" b="1">
-                <a:ln/>
                 <a:solidFill>
                   <a:schemeClr val="tx1"/>
                 </a:solidFill>
@@ -10427,7 +10380,6 @@
               <a:t>Proof Of Concept(PoC):</a:t>
             </a:r>
             <a:endParaRPr lang="en-US" sz="3200" b="1">
-              <a:ln/>
               <a:solidFill>
                 <a:schemeClr val="tx1"/>
               </a:solidFill>
@@ -10556,7 +10508,6 @@
           <a:p>
             <a:r>
               <a:rPr lang="en-US" b="1">
-                <a:ln/>
                 <a:solidFill>
                   <a:schemeClr val="tx1"/>
                 </a:solidFill>
@@ -10565,7 +10516,6 @@
               <a:t>Business Impact(High):</a:t>
             </a:r>
             <a:endParaRPr lang="en-US" b="1">
-              <a:ln/>
               <a:solidFill>
                 <a:schemeClr val="tx1"/>
               </a:solidFill>
@@ -10883,7 +10833,6 @@
           <a:p>
             <a:r>
               <a:rPr lang="en-US" sz="3200" b="1">
-                <a:ln/>
                 <a:solidFill>
                   <a:schemeClr val="tx1"/>
                 </a:solidFill>
@@ -10893,7 +10842,6 @@
               <a:t>6. Cross Site Scripting(XSS):</a:t>
             </a:r>
             <a:endParaRPr lang="en-US" sz="3200" b="1" dirty="0">
-              <a:ln/>
               <a:solidFill>
                 <a:schemeClr val="tx1"/>
               </a:solidFill>
@@ -12221,7 +12169,6 @@
           <a:p>
             <a:r>
               <a:rPr lang="en-US" sz="3200" b="1">
-                <a:ln/>
                 <a:solidFill>
                   <a:schemeClr val="tx1"/>
                 </a:solidFill>
@@ -12230,7 +12177,6 @@
               <a:t>Observation:</a:t>
             </a:r>
             <a:endParaRPr lang="en-US" sz="3200" b="1">
-              <a:ln/>
               <a:solidFill>
                 <a:schemeClr val="tx1"/>
               </a:solidFill>
@@ -12371,7 +12317,7 @@
         </p:nvGraphicFramePr>
         <p:xfrm>
           <a:off x="1826421" y="1285447"/>
-          <a:ext cx="7675880" cy="4852670"/>
+          <a:ext cx="7676058" cy="4852670"/>
         </p:xfrm>
         <a:graphic>
           <a:graphicData uri="http://schemas.openxmlformats.org/drawingml/2006/table">
@@ -14151,7 +14097,6 @@
           <a:p>
             <a:r>
               <a:rPr lang="en-US" sz="3200" b="1">
-                <a:ln/>
                 <a:solidFill>
                   <a:schemeClr val="tx1"/>
                 </a:solidFill>
@@ -14160,7 +14105,6 @@
               <a:t>Proof Of Concept(PoC):</a:t>
             </a:r>
             <a:endParaRPr lang="en-US" sz="3200" b="1">
-              <a:ln/>
               <a:solidFill>
                 <a:schemeClr val="tx1"/>
               </a:solidFill>
@@ -14258,7 +14202,6 @@
           <a:p>
             <a:r>
               <a:rPr lang="en-US" sz="3200" b="1">
-                <a:ln/>
                 <a:solidFill>
                   <a:schemeClr val="tx1"/>
                 </a:solidFill>
@@ -14267,7 +14210,6 @@
               <a:t>Proof Of Concept(Poc):</a:t>
             </a:r>
             <a:endParaRPr lang="en-US" sz="3200" b="1">
-              <a:ln/>
               <a:solidFill>
                 <a:schemeClr val="tx1"/>
               </a:solidFill>
@@ -14311,15 +14253,7 @@
                 <a:cs typeface="Calibri" panose="020F0502020204030204" charset="0"/>
                 <a:sym typeface="+mn-ea"/>
               </a:rPr>
-              <a:t>http://35.154.249.93/profile/16/edit/</a:t>
-            </a:r>
-            <a:r>
-              <a:rPr lang="en-US" sz="2400" dirty="0" smtClean="0">
-                <a:latin typeface="Calibri" panose="020F0502020204030204" charset="0"/>
-                <a:cs typeface="Calibri" panose="020F0502020204030204" charset="0"/>
-                <a:sym typeface="+mn-ea"/>
-              </a:rPr>
-              <a:t>'</a:t>
+              <a:t>http://35.154.249.93/profile/16/edit/'</a:t>
             </a:r>
             <a:r>
               <a:rPr lang="en-US" sz="2400">
@@ -14395,7 +14329,6 @@
           <a:p>
             <a:r>
               <a:rPr lang="en-US" sz="3200" b="1">
-                <a:ln/>
                 <a:solidFill>
                   <a:schemeClr val="tx1"/>
                 </a:solidFill>
@@ -14404,7 +14337,6 @@
               <a:t>Proof Of Concept(PoC):</a:t>
             </a:r>
             <a:endParaRPr lang="en-US" sz="3200" b="1">
-              <a:ln/>
               <a:solidFill>
                 <a:schemeClr val="tx1"/>
               </a:solidFill>
@@ -14520,7 +14452,6 @@
           <a:p>
             <a:r>
               <a:rPr lang="en-IN" sz="3200" b="1" dirty="0" smtClean="0">
-                <a:ln/>
                 <a:solidFill>
                   <a:schemeClr val="tx1"/>
                 </a:solidFill>
@@ -14531,7 +14462,6 @@
               <a:t>Business Impact – High</a:t>
             </a:r>
             <a:endParaRPr lang="en-IN" sz="3200" b="1" dirty="0" smtClean="0">
-              <a:ln/>
               <a:solidFill>
                 <a:schemeClr val="tx1"/>
               </a:solidFill>
@@ -14692,7 +14622,6 @@
           <a:p>
             <a:r>
               <a:rPr lang="en-IN" sz="3200" b="1" dirty="0" smtClean="0">
-                <a:ln/>
                 <a:solidFill>
                   <a:schemeClr val="tx1"/>
                 </a:solidFill>
@@ -14701,7 +14630,6 @@
               <a:t>Recommendation</a:t>
             </a:r>
             <a:endParaRPr lang="en-IN" sz="3200" b="1" dirty="0" smtClean="0">
-              <a:ln/>
               <a:solidFill>
                 <a:schemeClr val="tx1"/>
               </a:solidFill>
@@ -14912,7 +14840,6 @@
           <a:p>
             <a:r>
               <a:rPr lang="en-IN" sz="3200" b="1" dirty="0" smtClean="0">
-                <a:ln/>
                 <a:solidFill>
                   <a:schemeClr val="tx1"/>
                 </a:solidFill>
@@ -14921,7 +14848,6 @@
               <a:t>References:</a:t>
             </a:r>
             <a:endParaRPr lang="en-IN" sz="3200" b="1" dirty="0" smtClean="0">
-              <a:ln/>
               <a:solidFill>
                 <a:schemeClr val="tx1"/>
               </a:solidFill>
@@ -14965,7 +14891,6 @@
           <a:p>
             <a:r>
               <a:rPr lang="en-US" sz="3200" b="1">
-                <a:ln/>
                 <a:solidFill>
                   <a:schemeClr val="tx1"/>
                 </a:solidFill>
@@ -14974,7 +14899,6 @@
               <a:t>7. Cross Site Request Forgery(CSRF):</a:t>
             </a:r>
             <a:endParaRPr lang="en-US" sz="3200" b="1">
-              <a:ln/>
               <a:solidFill>
                 <a:schemeClr val="tx1"/>
               </a:solidFill>
@@ -15669,7 +15593,6 @@
           <a:p>
             <a:r>
               <a:rPr lang="en-US" sz="3200" b="1">
-                <a:ln/>
                 <a:solidFill>
                   <a:schemeClr val="tx1"/>
                 </a:solidFill>
@@ -15678,7 +15601,6 @@
               <a:t>Observation:</a:t>
             </a:r>
             <a:endParaRPr lang="en-US" sz="3200" b="1">
-              <a:ln/>
               <a:solidFill>
                 <a:schemeClr val="tx1"/>
               </a:solidFill>
@@ -15721,14 +15643,7 @@
                 <a:latin typeface="Calibri" panose="020F0502020204030204" charset="0"/>
                 <a:sym typeface="+mn-ea"/>
               </a:rPr>
-              <a:t>http://35.154.249.93/profile/change_password.php</a:t>
-            </a:r>
-            <a:r>
-              <a:rPr lang="en-US" sz="2400" dirty="0" smtClean="0">
-                <a:latin typeface="Calibri" panose="020F0502020204030204" charset="0"/>
-                <a:sym typeface="+mn-ea"/>
-              </a:rPr>
-              <a:t>' after logging in to our account.</a:t>
+              <a:t>http://35.154.249.93/profile/change_password.php' after logging in to our account.</a:t>
             </a:r>
             <a:endParaRPr lang="en-US" sz="2400" dirty="0" smtClean="0">
               <a:latin typeface="Calibri" panose="020F0502020204030204" charset="0"/>
@@ -15803,7 +15718,6 @@
           <a:p>
             <a:r>
               <a:rPr lang="en-US" sz="3200" b="1">
-                <a:ln/>
                 <a:solidFill>
                   <a:schemeClr val="tx1"/>
                 </a:solidFill>
@@ -15812,7 +15726,6 @@
               <a:t>Observation:</a:t>
             </a:r>
             <a:endParaRPr lang="en-US" sz="3200" b="1">
-              <a:ln/>
               <a:solidFill>
                 <a:schemeClr val="tx1"/>
               </a:solidFill>
@@ -15912,7 +15825,6 @@
           <a:p>
             <a:r>
               <a:rPr lang="en-US" sz="3200" b="1">
-                <a:ln/>
                 <a:solidFill>
                   <a:schemeClr val="tx1"/>
                 </a:solidFill>
@@ -15921,7 +15833,6 @@
               <a:t>Proof Of Concept(PoC):</a:t>
             </a:r>
             <a:endParaRPr lang="en-US" sz="3200" b="1">
-              <a:ln/>
               <a:solidFill>
                 <a:schemeClr val="tx1"/>
               </a:solidFill>
@@ -16025,7 +15936,6 @@
           <a:p>
             <a:r>
               <a:rPr lang="en-US" sz="3200" b="1">
-                <a:ln/>
                 <a:solidFill>
                   <a:schemeClr val="tx1"/>
                 </a:solidFill>
@@ -16034,7 +15944,6 @@
               <a:t>Proof Of Concept(PoC):</a:t>
             </a:r>
             <a:endParaRPr lang="en-US" sz="3200" b="1">
-              <a:ln/>
               <a:solidFill>
                 <a:schemeClr val="tx1"/>
               </a:solidFill>
@@ -17036,7 +16945,6 @@
           <a:p>
             <a:r>
               <a:rPr lang="en-US" sz="3200" b="1">
-                <a:ln/>
                 <a:solidFill>
                   <a:schemeClr val="tx1"/>
                 </a:solidFill>
@@ -17047,7 +16955,6 @@
               <a:t>Business Impact (High):</a:t>
             </a:r>
             <a:endParaRPr lang="en-US" sz="3200" b="1">
-              <a:ln/>
               <a:solidFill>
                 <a:schemeClr val="tx1"/>
               </a:solidFill>
@@ -17156,7 +17063,6 @@
           <a:p>
             <a:r>
               <a:rPr lang="en-US" sz="3200" b="1">
-                <a:ln/>
                 <a:solidFill>
                   <a:schemeClr val="tx1"/>
                 </a:solidFill>
@@ -17165,7 +17071,6 @@
               <a:t>Recommendation:</a:t>
             </a:r>
             <a:endParaRPr lang="en-US" sz="3200" b="1">
-              <a:ln/>
               <a:solidFill>
                 <a:schemeClr val="tx1"/>
               </a:solidFill>
@@ -17270,7 +17175,6 @@
           <a:p>
             <a:r>
               <a:rPr lang="en-US" sz="3200" b="1">
-                <a:ln/>
                 <a:solidFill>
                   <a:schemeClr val="tx1"/>
                 </a:solidFill>
@@ -17281,7 +17185,6 @@
               <a:t>References:</a:t>
             </a:r>
             <a:endParaRPr lang="en-US" sz="3200" b="1">
-              <a:ln/>
               <a:solidFill>
                 <a:schemeClr val="tx1"/>
               </a:solidFill>
@@ -17371,7 +17274,6 @@
           <a:p>
             <a:r>
               <a:rPr lang="en-US" sz="3200" b="1">
-                <a:ln/>
                 <a:solidFill>
                   <a:schemeClr val="tx1"/>
                 </a:solidFill>
@@ -17380,7 +17282,6 @@
               <a:t>8. Rate Limiting Flaws:</a:t>
             </a:r>
             <a:endParaRPr lang="en-US" sz="3200" b="1">
-              <a:ln/>
               <a:solidFill>
                 <a:schemeClr val="tx1"/>
               </a:solidFill>
@@ -18938,7 +18839,6 @@
           <a:p>
             <a:r>
               <a:rPr lang="en-US" sz="3200" b="1">
-                <a:ln/>
                 <a:solidFill>
                   <a:schemeClr val="tx1"/>
                 </a:solidFill>
@@ -18948,7 +18848,6 @@
             </a:r>
             <a:br>
               <a:rPr lang="en-US" sz="3200" b="1">
-                <a:ln/>
                 <a:solidFill>
                   <a:schemeClr val="tx1"/>
                 </a:solidFill>
@@ -18957,7 +18856,6 @@
             </a:br>
             <a:r>
               <a:rPr lang="en-US" sz="3200" b="1">
-                <a:ln/>
                 <a:solidFill>
                   <a:schemeClr val="tx1"/>
                 </a:solidFill>
@@ -18967,7 +18865,6 @@
             </a:r>
             <a:r>
               <a:rPr lang="en-US" sz="2400">
-                <a:ln/>
                 <a:solidFill>
                   <a:schemeClr val="tx1"/>
                 </a:solidFill>
@@ -18978,7 +18875,6 @@
               <a:t>Navigate to the URL http://13.233.207.87/reset_password/admin.php</a:t>
             </a:r>
             <a:endParaRPr lang="en-US" sz="2400">
-              <a:ln/>
               <a:solidFill>
                 <a:schemeClr val="tx1"/>
               </a:solidFill>
@@ -19061,7 +18957,6 @@
               <a:t>Proof Of Concept(PoC):</a:t>
             </a:r>
             <a:endParaRPr lang="en-US" sz="3200" b="1">
-              <a:ln/>
               <a:solidFill>
                 <a:schemeClr val="tx1"/>
               </a:solidFill>
@@ -19197,7 +19092,6 @@
           <a:p>
             <a:r>
               <a:rPr lang="en-US" sz="3200" b="1">
-                <a:ln/>
                 <a:solidFill>
                   <a:schemeClr val="tx1"/>
                 </a:solidFill>
@@ -19206,7 +19100,6 @@
               <a:t>Observation:</a:t>
             </a:r>
             <a:endParaRPr lang="en-US" sz="3200" b="1">
-              <a:ln/>
               <a:solidFill>
                 <a:schemeClr val="tx1"/>
               </a:solidFill>
@@ -19282,7 +19175,6 @@
           <a:p>
             <a:r>
               <a:rPr lang="en-US" sz="3200" b="1">
-                <a:ln/>
                 <a:solidFill>
                   <a:schemeClr val="tx1"/>
                 </a:solidFill>
@@ -19294,7 +19186,6 @@
             </a:r>
             <a:br>
               <a:rPr lang="en-US" sz="3200" b="1">
-                <a:ln/>
                 <a:solidFill>
                   <a:schemeClr val="tx1"/>
                 </a:solidFill>
@@ -19304,7 +19195,6 @@
               </a:rPr>
             </a:br>
             <a:endParaRPr lang="en-US" sz="3200" b="1">
-              <a:ln/>
               <a:solidFill>
                 <a:schemeClr val="tx1"/>
               </a:solidFill>
@@ -19384,7 +19274,6 @@
           <a:p>
             <a:r>
               <a:rPr lang="en-US" sz="3200" b="1">
-                <a:ln/>
                 <a:solidFill>
                   <a:schemeClr val="tx1"/>
                 </a:solidFill>
@@ -19395,7 +19284,6 @@
               <a:t>Recommendation:</a:t>
             </a:r>
             <a:endParaRPr lang="en-US" sz="3200" b="1">
-              <a:ln/>
               <a:solidFill>
                 <a:schemeClr val="tx1"/>
               </a:solidFill>
@@ -19553,7 +19441,6 @@
           <a:p>
             <a:r>
               <a:rPr lang="en-US" sz="3200" b="1">
-                <a:ln/>
                 <a:solidFill>
                   <a:schemeClr val="tx1"/>
                 </a:solidFill>
@@ -19564,7 +19451,6 @@
               <a:t>References:</a:t>
             </a:r>
             <a:endParaRPr lang="en-US" sz="3200" b="1">
-              <a:ln/>
               <a:solidFill>
                 <a:schemeClr val="tx1"/>
               </a:solidFill>
@@ -19660,7 +19546,6 @@
           <a:p>
             <a:r>
               <a:rPr lang="en-US" sz="3200" b="1">
-                <a:ln/>
                 <a:solidFill>
                   <a:schemeClr val="tx1"/>
                 </a:solidFill>
@@ -19669,7 +19554,6 @@
               <a:t>9. Crypto Configuration Flaw</a:t>
             </a:r>
             <a:endParaRPr lang="en-US" sz="3200" b="1">
-              <a:ln/>
               <a:solidFill>
                 <a:schemeClr val="tx1"/>
               </a:solidFill>
@@ -20671,7 +20555,6 @@
           <a:p>
             <a:r>
               <a:rPr lang="en-US" sz="3600" b="1">
-                <a:ln/>
                 <a:solidFill>
                   <a:schemeClr val="tx1"/>
                 </a:solidFill>
@@ -20680,7 +20563,6 @@
               <a:t>Observation:</a:t>
             </a:r>
             <a:endParaRPr lang="en-US" sz="3600" b="1">
-              <a:ln/>
               <a:solidFill>
                 <a:schemeClr val="tx1"/>
               </a:solidFill>
@@ -20758,7 +20640,6 @@
           <a:p>
             <a:r>
               <a:rPr lang="en-US" sz="3200" b="1">
-                <a:ln/>
                 <a:solidFill>
                   <a:schemeClr val="tx1"/>
                 </a:solidFill>
@@ -20769,7 +20650,6 @@
               <a:t>Recommendation:</a:t>
             </a:r>
             <a:endParaRPr lang="en-US" sz="3200" b="1">
-              <a:ln/>
               <a:solidFill>
                 <a:schemeClr val="tx1"/>
               </a:solidFill>
@@ -20853,7 +20733,6 @@
           <a:p>
             <a:r>
               <a:rPr lang="en-US" sz="3200" b="1">
-                <a:ln/>
                 <a:solidFill>
                   <a:schemeClr val="tx1"/>
                 </a:solidFill>
@@ -20864,7 +20743,6 @@
               <a:t>References:</a:t>
             </a:r>
             <a:endParaRPr lang="en-US" sz="3200" b="1">
-              <a:ln/>
               <a:solidFill>
                 <a:schemeClr val="tx1"/>
               </a:solidFill>
@@ -20962,7 +20840,6 @@
           <a:p>
             <a:r>
               <a:rPr lang="en-US" sz="3200" b="1">
-                <a:ln/>
                 <a:solidFill>
                   <a:schemeClr val="tx1"/>
                 </a:solidFill>
@@ -20973,7 +20850,6 @@
               <a:t>Business Impact(High):</a:t>
             </a:r>
             <a:endParaRPr lang="en-US" sz="3200" b="1">
-              <a:ln/>
               <a:solidFill>
                 <a:schemeClr val="tx1"/>
               </a:solidFill>
@@ -21047,7 +20923,6 @@
           <a:p>
             <a:r>
               <a:rPr lang="en-US" sz="3200" b="1">
-                <a:ln/>
                 <a:solidFill>
                   <a:schemeClr val="tx1"/>
                 </a:solidFill>
@@ -21056,7 +20931,6 @@
               <a:t>10. Weak Passwords:</a:t>
             </a:r>
             <a:endParaRPr lang="en-US" sz="3200" b="1">
-              <a:ln/>
               <a:solidFill>
                 <a:schemeClr val="tx1"/>
               </a:solidFill>
@@ -21493,7 +21367,6 @@
           <a:p>
             <a:r>
               <a:rPr lang="en-US" sz="3200" b="1">
-                <a:ln/>
                 <a:solidFill>
                   <a:schemeClr val="tx1"/>
                 </a:solidFill>
@@ -21502,7 +21375,6 @@
               <a:t>Observation:</a:t>
             </a:r>
             <a:endParaRPr lang="en-US" sz="3200" b="1">
-              <a:ln/>
               <a:solidFill>
                 <a:schemeClr val="tx1"/>
               </a:solidFill>
@@ -21644,7 +21516,6 @@
           <a:p>
             <a:r>
               <a:rPr lang="en-US" sz="3200" b="1">
-                <a:ln/>
                 <a:solidFill>
                   <a:schemeClr val="tx1"/>
                 </a:solidFill>
@@ -21655,7 +21526,6 @@
               <a:t>Business Impact(High):</a:t>
             </a:r>
             <a:endParaRPr lang="en-US" sz="3200" b="1">
-              <a:ln/>
               <a:solidFill>
                 <a:schemeClr val="tx1"/>
               </a:solidFill>
@@ -21738,7 +21608,6 @@
           <a:p>
             <a:r>
               <a:rPr lang="en-US" sz="3200" b="1">
-                <a:ln/>
                 <a:solidFill>
                   <a:schemeClr val="tx1"/>
                 </a:solidFill>
@@ -21749,7 +21618,6 @@
               <a:t>Recommendation:</a:t>
             </a:r>
             <a:endParaRPr lang="en-US" sz="3200" b="1">
-              <a:ln/>
               <a:solidFill>
                 <a:schemeClr val="tx1"/>
               </a:solidFill>
@@ -21904,7 +21772,6 @@
           <a:p>
             <a:r>
               <a:rPr lang="en-US" sz="3200" b="1">
-                <a:ln/>
                 <a:solidFill>
                   <a:schemeClr val="tx1"/>
                 </a:solidFill>
@@ -21915,7 +21782,6 @@
               <a:t>References:</a:t>
             </a:r>
             <a:endParaRPr lang="en-US" sz="3200" b="1">
-              <a:ln/>
               <a:solidFill>
                 <a:schemeClr val="tx1"/>
               </a:solidFill>
@@ -22019,47 +21885,19 @@
           <a:bodyPr/>
           <a:p>
             <a:r>
-              <a:rPr lang="en-US"/>
-              <a:t>12)</a:t>
-            </a:r>
-            <a:r>
-              <a:rPr lang="en-US" u="sng">
-                <a:ln w="10160">
-                  <a:solidFill>
-                    <a:schemeClr val="accent5"/>
-                  </a:solidFill>
-                  <a:prstDash val="solid"/>
-                </a:ln>
+              <a:rPr lang="en-US" sz="3200" b="1">
                 <a:solidFill>
-                  <a:srgbClr val="FFFFFF"/>
+                  <a:schemeClr val="tx1"/>
                 </a:solidFill>
-                <a:effectLst>
-                  <a:outerShdw blurRad="38100" dist="22860" dir="5400000" algn="tl" rotWithShape="0">
-                    <a:srgbClr val="000000">
-                      <a:alpha val="30000"/>
-                    </a:srgbClr>
-                  </a:outerShdw>
-                </a:effectLst>
+                <a:effectLst/>
               </a:rPr>
-              <a:t>Open Redirection:</a:t>
-            </a:r>
-            <a:endParaRPr lang="en-US" u="sng">
-              <a:ln w="10160">
-                <a:solidFill>
-                  <a:schemeClr val="accent5"/>
-                </a:solidFill>
-                <a:prstDash val="solid"/>
-              </a:ln>
+              <a:t>11. Open Redirection:</a:t>
+            </a:r>
+            <a:endParaRPr lang="en-US" sz="3200" b="1">
               <a:solidFill>
-                <a:srgbClr val="FFFFFF"/>
+                <a:schemeClr val="tx1"/>
               </a:solidFill>
-              <a:effectLst>
-                <a:outerShdw blurRad="38100" dist="22860" dir="5400000" algn="tl" rotWithShape="0">
-                  <a:srgbClr val="000000">
-                    <a:alpha val="30000"/>
-                  </a:srgbClr>
-                </a:outerShdw>
-              </a:effectLst>
+              <a:effectLst/>
             </a:endParaRPr>
           </a:p>
         </p:txBody>
@@ -22075,8 +21913,8 @@
           </p:nvPr>
         </p:nvGraphicFramePr>
         <p:xfrm>
-          <a:off x="838200" y="1825625"/>
-          <a:ext cx="10515600" cy="2707640"/>
+          <a:off x="1198245" y="1852295"/>
+          <a:ext cx="9713595" cy="2277745"/>
         </p:xfrm>
         <a:graphic>
           <a:graphicData uri="http://schemas.openxmlformats.org/drawingml/2006/table">
@@ -22085,16 +21923,19 @@
                 <a:tableStyleId>{5C22544A-7EE6-4342-B048-85BDC9FD1C3A}</a:tableStyleId>
               </a:tblPr>
               <a:tblGrid>
-                <a:gridCol w="1833245"/>
-                <a:gridCol w="8682355"/>
+                <a:gridCol w="1884045"/>
+                <a:gridCol w="7829550"/>
               </a:tblGrid>
-              <a:tr h="327660">
+              <a:tr h="280670">
                 <a:tc>
                   <a:txBody>
                     <a:bodyPr/>
                     <a:p>
                       <a:pPr algn="ctr"/>
-                      <a:endParaRPr lang="en-US" sz="1200" dirty="0"/>
+                      <a:endParaRPr lang="en-US" sz="1300" dirty="0">
+                        <a:latin typeface="Calibri" panose="020F0502020204030204" charset="0"/>
+                        <a:cs typeface="Calibri" panose="020F0502020204030204" charset="0"/>
+                      </a:endParaRPr>
                     </a:p>
                   </a:txBody>
                   <a:tcPr marL="82988" marR="82988" marT="41494" marB="41494">
@@ -22131,7 +21972,10 @@
                   <a:txBody>
                     <a:bodyPr/>
                     <a:p>
-                      <a:endParaRPr lang="en-US" sz="1200" dirty="0"/>
+                      <a:endParaRPr lang="en-US" sz="1300" dirty="0">
+                        <a:latin typeface="Calibri" panose="020F0502020204030204" charset="0"/>
+                        <a:cs typeface="Calibri" panose="020F0502020204030204" charset="0"/>
+                      </a:endParaRPr>
                     </a:p>
                   </a:txBody>
                   <a:tcPr marL="82988" marR="82988" marT="41494" marB="41494">
@@ -22165,44 +22009,48 @@
                   </a:tcPr>
                 </a:tc>
               </a:tr>
-              <a:tr h="2379980">
+              <a:tr h="1997075">
                 <a:tc>
                   <a:txBody>
                     <a:bodyPr/>
                     <a:p>
                       <a:pPr algn="ctr"/>
                       <a:r>
-                        <a:rPr lang="en-IN" sz="1200" dirty="0" smtClean="0">
+                        <a:rPr lang="en-IN" sz="1600" dirty="0" smtClean="0">
                           <a:solidFill>
                             <a:srgbClr val="FFFFFF"/>
                           </a:solidFill>
                           <a:latin typeface="Calibri" panose="020F0502020204030204" charset="0"/>
+                          <a:cs typeface="Calibri" panose="020F0502020204030204" charset="0"/>
                         </a:rPr>
                         <a:t> </a:t>
                       </a:r>
                       <a:r>
-                        <a:rPr lang="en-US" altLang="en-IN" sz="1200" dirty="0" smtClean="0">
+                        <a:rPr lang="en-US" altLang="en-IN" sz="1600" dirty="0" smtClean="0">
                           <a:solidFill>
                             <a:srgbClr val="FFFFFF"/>
                           </a:solidFill>
                           <a:latin typeface="Calibri" panose="020F0502020204030204" charset="0"/>
+                          <a:cs typeface="Calibri" panose="020F0502020204030204" charset="0"/>
                         </a:rPr>
                         <a:t>Open Redirection</a:t>
                       </a:r>
                       <a:r>
-                        <a:rPr lang="en-US" sz="1100" dirty="0" smtClean="0">
+                        <a:rPr lang="en-US" sz="1600" dirty="0" smtClean="0">
                           <a:solidFill>
                             <a:srgbClr val="FFFFFF"/>
                           </a:solidFill>
                           <a:latin typeface="Calibri" panose="020F0502020204030204" charset="0"/>
+                          <a:cs typeface="Calibri" panose="020F0502020204030204" charset="0"/>
                         </a:rPr>
                         <a:t>(Severe)</a:t>
                       </a:r>
-                      <a:endParaRPr lang="en-US" sz="1100" dirty="0">
+                      <a:endParaRPr lang="en-US" sz="1600" dirty="0" smtClean="0">
                         <a:solidFill>
                           <a:srgbClr val="FFFFFF"/>
                         </a:solidFill>
                         <a:latin typeface="Calibri" panose="020F0502020204030204" charset="0"/>
+                        <a:cs typeface="Calibri" panose="020F0502020204030204" charset="0"/>
                       </a:endParaRPr>
                     </a:p>
                   </a:txBody>
@@ -22253,32 +22101,35 @@
                     <a:bodyPr/>
                     <a:p>
                       <a:r>
-                        <a:rPr lang="en-US" sz="1100" dirty="0" smtClean="0">
+                        <a:rPr lang="en-US" sz="1300" dirty="0" smtClean="0">
                           <a:solidFill>
                             <a:schemeClr val="tx1"/>
                           </a:solidFill>
                           <a:latin typeface="Calibri" panose="020F0502020204030204" charset="0"/>
+                          <a:cs typeface="Calibri" panose="020F0502020204030204" charset="0"/>
                         </a:rPr>
                         <a:t> </a:t>
                       </a:r>
-                      <a:endParaRPr lang="en-US" sz="1100" dirty="0">
+                      <a:endParaRPr lang="en-US" sz="1300" dirty="0">
                         <a:solidFill>
                           <a:schemeClr val="tx1"/>
                         </a:solidFill>
                         <a:latin typeface="Calibri" panose="020F0502020204030204" charset="0"/>
-                      </a:endParaRPr>
-                    </a:p>
-                    <a:p>
-                      <a:r>
-                        <a:rPr lang="en-US" sz="1100" baseline="0" dirty="0" smtClean="0">
+                        <a:cs typeface="Calibri" panose="020F0502020204030204" charset="0"/>
+                      </a:endParaRPr>
+                    </a:p>
+                    <a:p>
+                      <a:r>
+                        <a:rPr lang="en-US" sz="1300" baseline="0" dirty="0" smtClean="0">
                           <a:solidFill>
                             <a:schemeClr val="tx1"/>
                           </a:solidFill>
                           <a:latin typeface="Calibri" panose="020F0502020204030204" charset="0"/>
+                          <a:cs typeface="Calibri" panose="020F0502020204030204" charset="0"/>
                         </a:rPr>
                         <a:t>Open Redirection vulnerability are found in the module below:-</a:t>
                       </a:r>
-                      <a:endParaRPr lang="en-US" sz="1100" dirty="0" smtClean="0">
+                      <a:endParaRPr lang="en-US" sz="1300" dirty="0" smtClean="0">
                         <a:solidFill>
                           <a:schemeClr val="tx1"/>
                         </a:solidFill>
@@ -22287,31 +22138,33 @@
                       </a:endParaRPr>
                     </a:p>
                     <a:p>
-                      <a:endParaRPr lang="en-US" sz="1100" dirty="0" smtClean="0">
+                      <a:endParaRPr lang="en-US" sz="1300" dirty="0" smtClean="0">
                         <a:solidFill>
                           <a:schemeClr val="tx1"/>
                         </a:solidFill>
                         <a:latin typeface="Calibri" panose="020F0502020204030204" charset="0"/>
-                      </a:endParaRPr>
-                    </a:p>
-                    <a:p>
-                      <a:r>
-                        <a:rPr lang="en-US" sz="1100" b="1" dirty="0" smtClean="0">
+                        <a:cs typeface="Calibri" panose="020F0502020204030204" charset="0"/>
+                      </a:endParaRPr>
+                    </a:p>
+                    <a:p>
+                      <a:r>
+                        <a:rPr lang="en-US" sz="1300" b="1" dirty="0" smtClean="0">
                           <a:solidFill>
                             <a:schemeClr val="tx1"/>
                           </a:solidFill>
                           <a:latin typeface="Calibri" panose="020F0502020204030204" charset="0"/>
+                          <a:cs typeface="Calibri" panose="020F0502020204030204" charset="0"/>
                         </a:rPr>
                         <a:t>Affected URL :</a:t>
                       </a:r>
-                      <a:endParaRPr lang="en-US" sz="1100" b="0" i="0" u="none" strike="noStrike" dirty="0" smtClean="0">
+                      <a:endParaRPr lang="en-US" sz="1300" b="0" i="0" u="none" strike="noStrike" dirty="0" smtClean="0">
                         <a:solidFill>
                           <a:schemeClr val="tx1"/>
                         </a:solidFill>
                         <a:effectLst/>
                         <a:latin typeface="Calibri" panose="020F0502020204030204" charset="0"/>
                         <a:ea typeface="+mn-ea"/>
-                        <a:cs typeface="+mn-cs"/>
+                        <a:cs typeface="Calibri" panose="020F0502020204030204" charset="0"/>
                         <a:sym typeface="Arial" panose="020B0604020202020204"/>
                       </a:endParaRPr>
                     </a:p>
@@ -22321,19 +22174,21 @@
                         <a:buChar char="•"/>
                       </a:pPr>
                       <a:r>
-                        <a:rPr lang="en-US" sz="1100" b="0" dirty="0" smtClean="0">
+                        <a:rPr lang="en-US" sz="1300" b="0" dirty="0" smtClean="0">
                           <a:solidFill>
                             <a:schemeClr val="tx1"/>
                           </a:solidFill>
                           <a:latin typeface="Calibri" panose="020F0502020204030204" charset="0"/>
-                        </a:rPr>
-                        <a:t>http://52.66.198.61/products/details.php?p_id=5</a:t>
-                      </a:r>
-                      <a:endParaRPr lang="en-US" sz="1100" b="0" dirty="0" smtClean="0">
+                          <a:cs typeface="Calibri" panose="020F0502020204030204" charset="0"/>
+                        </a:rPr>
+                        <a:t>http://35.154.249.93/products/details.php?p_id=5</a:t>
+                      </a:r>
+                      <a:endParaRPr lang="en-US" sz="1300" b="0" dirty="0" smtClean="0">
                         <a:solidFill>
                           <a:schemeClr val="tx1"/>
                         </a:solidFill>
                         <a:latin typeface="Calibri" panose="020F0502020204030204" charset="0"/>
+                        <a:cs typeface="Calibri" panose="020F0502020204030204" charset="0"/>
                       </a:endParaRPr>
                     </a:p>
                     <a:p>
@@ -22341,11 +22196,12 @@
                         <a:buFont typeface="Arial" panose="020B0604020202020204" pitchFamily="34" charset="0"/>
                         <a:buNone/>
                       </a:pPr>
-                      <a:endParaRPr lang="en-US" sz="1100" b="0" dirty="0" smtClean="0">
+                      <a:endParaRPr lang="en-US" sz="1300" b="0" dirty="0" smtClean="0">
                         <a:solidFill>
                           <a:schemeClr val="tx1"/>
                         </a:solidFill>
                         <a:latin typeface="Calibri" panose="020F0502020204030204" charset="0"/>
+                        <a:cs typeface="Calibri" panose="020F0502020204030204" charset="0"/>
                       </a:endParaRPr>
                     </a:p>
                     <a:p>
@@ -22354,19 +22210,21 @@
                         <a:buNone/>
                       </a:pPr>
                       <a:r>
-                        <a:rPr lang="en-US" sz="1100" b="0" dirty="0" smtClean="0">
+                        <a:rPr lang="en-US" sz="1300" b="0" dirty="0" smtClean="0">
                           <a:solidFill>
                             <a:schemeClr val="tx1"/>
                           </a:solidFill>
                           <a:latin typeface="Calibri" panose="020F0502020204030204" charset="0"/>
+                          <a:cs typeface="Calibri" panose="020F0502020204030204" charset="0"/>
                         </a:rPr>
                         <a:t>Affected parameter :</a:t>
                       </a:r>
-                      <a:endParaRPr lang="en-US" sz="1100" b="0" dirty="0" smtClean="0">
+                      <a:endParaRPr lang="en-US" sz="1300" b="0" dirty="0" smtClean="0">
                         <a:solidFill>
                           <a:schemeClr val="tx1"/>
                         </a:solidFill>
                         <a:latin typeface="Calibri" panose="020F0502020204030204" charset="0"/>
+                        <a:cs typeface="Calibri" panose="020F0502020204030204" charset="0"/>
                       </a:endParaRPr>
                     </a:p>
                     <a:p>
@@ -22375,19 +22233,21 @@
                         <a:buChar char="•"/>
                       </a:pPr>
                       <a:r>
-                        <a:rPr lang="en-US" sz="1100" b="0" dirty="0" smtClean="0">
+                        <a:rPr lang="en-US" sz="1300" b="0" dirty="0" smtClean="0">
                           <a:solidFill>
                             <a:schemeClr val="tx1"/>
                           </a:solidFill>
                           <a:latin typeface="Calibri" panose="020F0502020204030204" charset="0"/>
+                          <a:cs typeface="Calibri" panose="020F0502020204030204" charset="0"/>
                         </a:rPr>
                         <a:t>url (Brand Website)</a:t>
                       </a:r>
-                      <a:endParaRPr lang="en-US" sz="1100" b="0" dirty="0" smtClean="0">
+                      <a:endParaRPr lang="en-US" sz="1300" b="0" dirty="0" smtClean="0">
                         <a:solidFill>
                           <a:schemeClr val="tx1"/>
                         </a:solidFill>
                         <a:latin typeface="Calibri" panose="020F0502020204030204" charset="0"/>
+                        <a:cs typeface="Calibri" panose="020F0502020204030204" charset="0"/>
                       </a:endParaRPr>
                     </a:p>
                     <a:p>
@@ -22395,59 +22255,12 @@
                         <a:buFont typeface="Arial" panose="020B0604020202020204" pitchFamily="34" charset="0"/>
                         <a:buChar char="•"/>
                       </a:pPr>
-                      <a:endParaRPr lang="en-US" sz="1100" b="0" dirty="0" smtClean="0">
+                      <a:endParaRPr lang="en-US" sz="1300" b="0" dirty="0">
                         <a:solidFill>
                           <a:schemeClr val="tx1"/>
                         </a:solidFill>
                         <a:latin typeface="Calibri" panose="020F0502020204030204" charset="0"/>
-                      </a:endParaRPr>
-                    </a:p>
-                    <a:p>
-                      <a:pPr marL="0" marR="0" indent="0" defTabSz="914400" eaLnBrk="1" fontAlgn="auto" latinLnBrk="0" hangingPunct="1">
-                        <a:lnSpc>
-                          <a:spcPct val="100000"/>
-                        </a:lnSpc>
-                        <a:spcBef>
-                          <a:spcPts val="0"/>
-                        </a:spcBef>
-                        <a:spcAft>
-                          <a:spcPts val="0"/>
-                        </a:spcAft>
-                        <a:buClrTx/>
-                        <a:buSzTx/>
-                        <a:buFont typeface="Arial" panose="020B0604020202020204" pitchFamily="34" charset="0"/>
-                        <a:buNone/>
-                        <a:defRPr/>
-                      </a:pPr>
-                      <a:endParaRPr lang="en-US" sz="1100" b="1" dirty="0" smtClean="0">
-                        <a:solidFill>
-                          <a:schemeClr val="tx1"/>
-                        </a:solidFill>
-                        <a:latin typeface="Calibri" panose="020F0502020204030204" charset="0"/>
-                      </a:endParaRPr>
-                    </a:p>
-                    <a:p>
-                      <a:pPr marL="0" marR="0" indent="0" defTabSz="914400" eaLnBrk="1" fontAlgn="auto" latinLnBrk="0" hangingPunct="1">
-                        <a:lnSpc>
-                          <a:spcPct val="100000"/>
-                        </a:lnSpc>
-                        <a:spcBef>
-                          <a:spcPts val="0"/>
-                        </a:spcBef>
-                        <a:spcAft>
-                          <a:spcPts val="0"/>
-                        </a:spcAft>
-                        <a:buClrTx/>
-                        <a:buSzTx/>
-                        <a:buFont typeface="Arial" panose="020B0604020202020204" pitchFamily="34" charset="0"/>
-                        <a:buNone/>
-                        <a:defRPr/>
-                      </a:pPr>
-                      <a:endParaRPr lang="en-US" sz="1100" b="0" dirty="0">
-                        <a:solidFill>
-                          <a:schemeClr val="tx1"/>
-                        </a:solidFill>
-                        <a:latin typeface="Calibri" panose="020F0502020204030204" charset="0"/>
+                        <a:cs typeface="Calibri" panose="020F0502020204030204" charset="0"/>
                       </a:endParaRPr>
                     </a:p>
                   </a:txBody>
@@ -22531,34 +22344,18 @@
           <a:bodyPr/>
           <a:p>
             <a:r>
-              <a:rPr lang="en-US" u="sng">
-                <a:gradFill>
-                  <a:gsLst>
-                    <a:gs pos="21000">
-                      <a:srgbClr val="53575C"/>
-                    </a:gs>
-                    <a:gs pos="88000">
-                      <a:srgbClr val="C5C7CA"/>
-                    </a:gs>
-                  </a:gsLst>
-                  <a:lin ang="5400000"/>
-                </a:gradFill>
+              <a:rPr lang="en-US" sz="3200" b="1">
+                <a:solidFill>
+                  <a:schemeClr val="tx1"/>
+                </a:solidFill>
                 <a:effectLst/>
               </a:rPr>
               <a:t>Observation:</a:t>
             </a:r>
-            <a:endParaRPr lang="en-US" u="sng">
-              <a:gradFill>
-                <a:gsLst>
-                  <a:gs pos="21000">
-                    <a:srgbClr val="53575C"/>
-                  </a:gs>
-                  <a:gs pos="88000">
-                    <a:srgbClr val="C5C7CA"/>
-                  </a:gs>
-                </a:gsLst>
-                <a:lin ang="5400000"/>
-              </a:gradFill>
+            <a:endParaRPr lang="en-US" sz="3200" b="1">
+              <a:solidFill>
+                <a:schemeClr val="tx1"/>
+              </a:solidFill>
               <a:effectLst/>
             </a:endParaRPr>
           </a:p>
@@ -22576,7 +22373,7 @@
         </p:nvSpPr>
         <p:spPr>
           <a:xfrm>
-            <a:off x="838200" y="1516380"/>
+            <a:off x="1078230" y="1303020"/>
             <a:ext cx="10414635" cy="951230"/>
           </a:xfrm>
         </p:spPr>
@@ -22587,16 +22384,16 @@
               <a:buNone/>
             </a:pPr>
             <a:r>
-              <a:rPr lang="en-US"/>
+              <a:rPr lang="en-US" sz="2400"/>
               <a:t>When we view any product ,and click on “Brand Website” tab as shown,then we get redirected to it openly as GET parameter.</a:t>
             </a:r>
-            <a:endParaRPr lang="en-US"/>
+            <a:endParaRPr lang="en-US" sz="2400"/>
           </a:p>
         </p:txBody>
       </p:sp>
       <p:pic>
         <p:nvPicPr>
-          <p:cNvPr id="5" name="Content Placeholder 4" descr="Capture"/>
+          <p:cNvPr id="5" name="Content Placeholder 4" descr="C:\Users\Datagrokr\Documents\program\CEH-Hack-a-thon\reports\Lifestyle Store\vulnerabilities\Open Redirection\Details.php\observation.pngobservation"/>
           <p:cNvPicPr>
             <a:picLocks noChangeAspect="1"/>
           </p:cNvPicPr>
@@ -22606,23 +22403,29 @@
         </p:nvPicPr>
         <p:blipFill>
           <a:blip r:embed="rId1"/>
+          <a:srcRect/>
           <a:stretch>
             <a:fillRect/>
           </a:stretch>
         </p:blipFill>
         <p:spPr>
           <a:xfrm>
-            <a:off x="838200" y="2689860"/>
-            <a:ext cx="4928235" cy="2887980"/>
+            <a:off x="838200" y="2860040"/>
+            <a:ext cx="5118100" cy="2646680"/>
           </a:xfrm>
           <a:prstGeom prst="rect">
             <a:avLst/>
           </a:prstGeom>
+          <a:ln>
+            <a:solidFill>
+              <a:schemeClr val="tx1"/>
+            </a:solidFill>
+          </a:ln>
         </p:spPr>
       </p:pic>
       <p:pic>
         <p:nvPicPr>
-          <p:cNvPr id="6" name="Picture 5" descr="Capture2"/>
+          <p:cNvPr id="6" name="Picture 5" descr="C:\Users\Datagrokr\Documents\program\CEH-Hack-a-thon\reports\Lifestyle Store\vulnerabilities\Open Redirection\Details.php\observation1.pngobservation1"/>
           <p:cNvPicPr>
             <a:picLocks noChangeAspect="1"/>
           </p:cNvPicPr>
@@ -22630,18 +22433,24 @@
         </p:nvPicPr>
         <p:blipFill>
           <a:blip r:embed="rId2"/>
+          <a:srcRect/>
           <a:stretch>
             <a:fillRect/>
           </a:stretch>
         </p:blipFill>
         <p:spPr>
           <a:xfrm>
-            <a:off x="6029325" y="2689860"/>
-            <a:ext cx="5897245" cy="3162300"/>
+            <a:off x="6341745" y="2881630"/>
+            <a:ext cx="5398135" cy="2504440"/>
           </a:xfrm>
           <a:prstGeom prst="rect">
             <a:avLst/>
           </a:prstGeom>
+          <a:ln>
+            <a:solidFill>
+              <a:schemeClr val="tx1"/>
+            </a:solidFill>
+          </a:ln>
         </p:spPr>
       </p:pic>
     </p:spTree>
@@ -22674,20 +22483,18 @@
         </p:nvSpPr>
         <p:spPr>
           <a:xfrm>
-            <a:off x="42545" y="380365"/>
-            <a:ext cx="5334000" cy="1325880"/>
+            <a:off x="749300" y="367030"/>
+            <a:ext cx="5334000" cy="1040765"/>
           </a:xfrm>
         </p:spPr>
         <p:txBody>
-          <a:bodyPr>
-            <a:normAutofit fontScale="90000"/>
-          </a:bodyPr>
-          <a:p>
-            <a:r>
-              <a:rPr lang="en-US" u="sng"/>
+          <a:bodyPr/>
+          <a:p>
+            <a:r>
+              <a:rPr lang="en-US" sz="3200" b="1"/>
               <a:t>Proof Of Concept(PoC):</a:t>
             </a:r>
-            <a:endParaRPr lang="en-US" u="sng"/>
+            <a:endParaRPr lang="en-US" sz="3200" b="1"/>
           </a:p>
         </p:txBody>
       </p:sp>
@@ -22703,82 +22510,321 @@
         </p:nvSpPr>
         <p:spPr>
           <a:xfrm>
-            <a:off x="42545" y="1589405"/>
-            <a:ext cx="5181600" cy="4351338"/>
+            <a:off x="1120775" y="1216025"/>
+            <a:ext cx="10699115" cy="841375"/>
           </a:xfrm>
         </p:spPr>
         <p:txBody>
-          <a:bodyPr>
-            <a:normAutofit/>
-          </a:bodyPr>
+          <a:bodyPr/>
           <a:p>
             <a:pPr marL="0" indent="0">
               <a:buNone/>
             </a:pPr>
             <a:r>
-              <a:rPr lang="en-US"/>
-              <a:t>We can change the url after redirect to be redirected anywhere(such as ,google.com)</a:t>
-            </a:r>
-            <a:endParaRPr lang="en-US"/>
+              <a:rPr lang="en-US" sz="2400"/>
+              <a:t>We can intercept the request in burp suite and change the redirect URL and click on forward.</a:t>
+            </a:r>
+            <a:endParaRPr lang="en-US" sz="2400"/>
           </a:p>
           <a:p>
             <a:pPr marL="0" indent="0">
               <a:buNone/>
             </a:pPr>
-            <a:r>
-              <a:rPr lang="en-US"/>
-              <a:t>as shown in the</a:t>
-            </a:r>
-            <a:r>
-              <a:rPr lang="en-US">
-                <a:sym typeface="+mn-ea"/>
-              </a:rPr>
-              <a:t> video.</a:t>
-            </a:r>
-            <a:endParaRPr lang="en-US"/>
-          </a:p>
-          <a:p>
-            <a:pPr marL="0" indent="0">
-              <a:buNone/>
-            </a:pPr>
-            <a:endParaRPr lang="en-US"/>
+            <a:endParaRPr lang="en-US" sz="2400"/>
           </a:p>
         </p:txBody>
       </p:sp>
       <p:pic>
         <p:nvPicPr>
-          <p:cNvPr id="5" name="after changing the redirect url to google">
-            <a:hlinkClick r:id="" action="ppaction://media"/>
-          </p:cNvPr>
+          <p:cNvPr id="6" name="Content Placeholder 5" descr="observation_request-burpsuite"/>
           <p:cNvPicPr>
             <a:picLocks noChangeAspect="1"/>
           </p:cNvPicPr>
           <p:nvPr>
             <p:ph sz="half" idx="2"/>
-            <a:videoFile r:link="rId1"/>
-            <p:extLst>
-              <p:ext uri="{DAA4B4D4-6D71-4841-9C94-3DE7FCFB9230}">
-                <p14:media xmlns:p14="http://schemas.microsoft.com/office/powerpoint/2010/main" r:embed="rId2"/>
-              </p:ext>
-            </p:extLst>
           </p:nvPr>
         </p:nvPicPr>
         <p:blipFill>
-          <a:blip r:embed="rId3"/>
+          <a:blip r:embed="rId1"/>
           <a:stretch>
             <a:fillRect/>
           </a:stretch>
         </p:blipFill>
         <p:spPr>
           <a:xfrm>
-            <a:off x="5224145" y="246380"/>
-            <a:ext cx="6866890" cy="5824220"/>
+            <a:off x="1259840" y="2153285"/>
+            <a:ext cx="5181600" cy="1001395"/>
+          </a:xfrm>
+          <a:prstGeom prst="rect">
+            <a:avLst/>
+          </a:prstGeom>
+          <a:ln>
+            <a:solidFill>
+              <a:schemeClr val="tx1"/>
+            </a:solidFill>
+          </a:ln>
+        </p:spPr>
+      </p:pic>
+      <p:pic>
+        <p:nvPicPr>
+          <p:cNvPr id="7" name="Picture 6" descr="POC"/>
+          <p:cNvPicPr>
+            <a:picLocks noChangeAspect="1"/>
+          </p:cNvPicPr>
+          <p:nvPr/>
+        </p:nvPicPr>
+        <p:blipFill>
+          <a:blip r:embed="rId2"/>
+          <a:stretch>
+            <a:fillRect/>
+          </a:stretch>
+        </p:blipFill>
+        <p:spPr>
+          <a:xfrm>
+            <a:off x="1259840" y="3362325"/>
+            <a:ext cx="10058400" cy="2204085"/>
+          </a:xfrm>
+          <a:prstGeom prst="rect">
+            <a:avLst/>
+          </a:prstGeom>
+          <a:ln>
+            <a:solidFill>
+              <a:schemeClr val="tx1"/>
+            </a:solidFill>
+          </a:ln>
+        </p:spPr>
+      </p:pic>
+      <p:pic>
+        <p:nvPicPr>
+          <p:cNvPr id="8" name="Picture 7" descr="POC1"/>
+          <p:cNvPicPr>
+            <a:picLocks noChangeAspect="1"/>
+          </p:cNvPicPr>
+          <p:nvPr/>
+        </p:nvPicPr>
+        <p:blipFill>
+          <a:blip r:embed="rId3"/>
+          <a:srcRect l="13202" r="20803" b="24496"/>
+          <a:stretch>
+            <a:fillRect/>
+          </a:stretch>
+        </p:blipFill>
+        <p:spPr>
+          <a:xfrm>
+            <a:off x="5528310" y="3691255"/>
+            <a:ext cx="5783580" cy="2642235"/>
+          </a:xfrm>
+          <a:prstGeom prst="rect">
+            <a:avLst/>
+          </a:prstGeom>
+          <a:ln>
+            <a:solidFill>
+              <a:schemeClr val="tx1"/>
+            </a:solidFill>
+          </a:ln>
+        </p:spPr>
+      </p:pic>
+      <p:sp>
+        <p:nvSpPr>
+          <p:cNvPr id="9" name="Text Box 8"/>
+          <p:cNvSpPr txBox="1"/>
+          <p:nvPr/>
+        </p:nvSpPr>
+        <p:spPr>
+          <a:xfrm>
+            <a:off x="5768340" y="2392045"/>
+            <a:ext cx="585470" cy="460375"/>
           </a:xfrm>
           <a:prstGeom prst="rect">
             <a:avLst/>
           </a:prstGeom>
         </p:spPr>
-      </p:pic>
+        <p:style>
+          <a:lnRef idx="2">
+            <a:schemeClr val="accent2">
+              <a:shade val="50000"/>
+            </a:schemeClr>
+          </a:lnRef>
+          <a:fillRef idx="1">
+            <a:schemeClr val="accent2"/>
+          </a:fillRef>
+          <a:effectRef idx="0">
+            <a:schemeClr val="accent2"/>
+          </a:effectRef>
+          <a:fontRef idx="minor">
+            <a:schemeClr val="lt1"/>
+          </a:fontRef>
+        </p:style>
+        <p:txBody>
+          <a:bodyPr wrap="square" rtlCol="0">
+            <a:spAutoFit/>
+          </a:bodyPr>
+          <a:p>
+            <a:pPr algn="ctr"/>
+            <a:r>
+              <a:rPr lang="en-US" sz="2400">
+                <a:solidFill>
+                  <a:schemeClr val="bg1"/>
+                </a:solidFill>
+                <a:effectLst>
+                  <a:outerShdw blurRad="38100" dist="19050" dir="2700000" algn="tl" rotWithShape="0">
+                    <a:schemeClr val="dk1">
+                      <a:alpha val="40000"/>
+                    </a:schemeClr>
+                  </a:outerShdw>
+                </a:effectLst>
+              </a:rPr>
+              <a:t>1</a:t>
+            </a:r>
+            <a:endParaRPr lang="en-US" sz="2400">
+              <a:solidFill>
+                <a:schemeClr val="bg1"/>
+              </a:solidFill>
+              <a:effectLst>
+                <a:outerShdw blurRad="38100" dist="19050" dir="2700000" algn="tl" rotWithShape="0">
+                  <a:schemeClr val="dk1">
+                    <a:alpha val="40000"/>
+                  </a:schemeClr>
+                </a:outerShdw>
+              </a:effectLst>
+            </a:endParaRPr>
+          </a:p>
+        </p:txBody>
+      </p:sp>
+      <p:sp>
+        <p:nvSpPr>
+          <p:cNvPr id="10" name="Text Box 9"/>
+          <p:cNvSpPr txBox="1"/>
+          <p:nvPr/>
+        </p:nvSpPr>
+        <p:spPr>
+          <a:xfrm>
+            <a:off x="4289425" y="4782185"/>
+            <a:ext cx="585470" cy="460375"/>
+          </a:xfrm>
+          <a:prstGeom prst="rect">
+            <a:avLst/>
+          </a:prstGeom>
+        </p:spPr>
+        <p:style>
+          <a:lnRef idx="2">
+            <a:schemeClr val="accent2">
+              <a:shade val="50000"/>
+            </a:schemeClr>
+          </a:lnRef>
+          <a:fillRef idx="1">
+            <a:schemeClr val="accent2"/>
+          </a:fillRef>
+          <a:effectRef idx="0">
+            <a:schemeClr val="accent2"/>
+          </a:effectRef>
+          <a:fontRef idx="minor">
+            <a:schemeClr val="lt1"/>
+          </a:fontRef>
+        </p:style>
+        <p:txBody>
+          <a:bodyPr wrap="square" rtlCol="0">
+            <a:spAutoFit/>
+          </a:bodyPr>
+          <a:p>
+            <a:pPr algn="ctr"/>
+            <a:r>
+              <a:rPr lang="en-US" sz="2400">
+                <a:solidFill>
+                  <a:schemeClr val="bg1"/>
+                </a:solidFill>
+                <a:effectLst>
+                  <a:outerShdw blurRad="38100" dist="19050" dir="2700000" algn="tl" rotWithShape="0">
+                    <a:schemeClr val="dk1">
+                      <a:alpha val="40000"/>
+                    </a:schemeClr>
+                  </a:outerShdw>
+                </a:effectLst>
+              </a:rPr>
+              <a:t>2</a:t>
+            </a:r>
+            <a:endParaRPr lang="en-US" sz="2400">
+              <a:solidFill>
+                <a:schemeClr val="bg1"/>
+              </a:solidFill>
+              <a:effectLst>
+                <a:outerShdw blurRad="38100" dist="19050" dir="2700000" algn="tl" rotWithShape="0">
+                  <a:schemeClr val="dk1">
+                    <a:alpha val="40000"/>
+                  </a:schemeClr>
+                </a:outerShdw>
+              </a:effectLst>
+            </a:endParaRPr>
+          </a:p>
+        </p:txBody>
+      </p:sp>
+      <p:sp>
+        <p:nvSpPr>
+          <p:cNvPr id="11" name="Text Box 10"/>
+          <p:cNvSpPr txBox="1"/>
+          <p:nvPr/>
+        </p:nvSpPr>
+        <p:spPr>
+          <a:xfrm>
+            <a:off x="6902450" y="5242560"/>
+            <a:ext cx="585470" cy="460375"/>
+          </a:xfrm>
+          <a:prstGeom prst="rect">
+            <a:avLst/>
+          </a:prstGeom>
+        </p:spPr>
+        <p:style>
+          <a:lnRef idx="2">
+            <a:schemeClr val="accent2">
+              <a:shade val="50000"/>
+            </a:schemeClr>
+          </a:lnRef>
+          <a:fillRef idx="1">
+            <a:schemeClr val="accent2"/>
+          </a:fillRef>
+          <a:effectRef idx="0">
+            <a:schemeClr val="accent2"/>
+          </a:effectRef>
+          <a:fontRef idx="minor">
+            <a:schemeClr val="lt1"/>
+          </a:fontRef>
+        </p:style>
+        <p:txBody>
+          <a:bodyPr wrap="square" rtlCol="0">
+            <a:spAutoFit/>
+          </a:bodyPr>
+          <a:p>
+            <a:pPr algn="ctr"/>
+            <a:r>
+              <a:rPr lang="en-US" sz="2400">
+                <a:solidFill>
+                  <a:schemeClr val="bg1"/>
+                </a:solidFill>
+                <a:effectLst>
+                  <a:outerShdw blurRad="38100" dist="19050" dir="2700000" algn="tl" rotWithShape="0">
+                    <a:schemeClr val="dk1">
+                      <a:alpha val="40000"/>
+                    </a:schemeClr>
+                  </a:outerShdw>
+                </a:effectLst>
+              </a:rPr>
+              <a:t>3</a:t>
+            </a:r>
+            <a:endParaRPr lang="en-US" sz="2400">
+              <a:solidFill>
+                <a:schemeClr val="bg1"/>
+              </a:solidFill>
+              <a:effectLst>
+                <a:outerShdw blurRad="38100" dist="19050" dir="2700000" algn="tl" rotWithShape="0">
+                  <a:schemeClr val="dk1">
+                    <a:alpha val="40000"/>
+                  </a:schemeClr>
+                </a:outerShdw>
+              </a:effectLst>
+            </a:endParaRPr>
+          </a:p>
+        </p:txBody>
+      </p:sp>
     </p:spTree>
   </p:cSld>
   <p:clrMapOvr>
@@ -22787,92 +22833,7 @@
   <p:timing>
     <p:tnLst>
       <p:par>
-        <p:cTn id="1" dur="indefinite" restart="never" nodeType="tmRoot">
-          <p:childTnLst>
-            <p:video fullScrn="0">
-              <p:cMediaNode>
-                <p:cTn id="2" fill="hold" display="1">
-                  <p:stCondLst>
-                    <p:cond delay="indefinite"/>
-                  </p:stCondLst>
-                  <p:endCondLst>
-                    <p:cond evt="onNext">
-                      <p:tgtEl>
-                        <p:sldTgt/>
-                      </p:tgtEl>
-                    </p:cond>
-                    <p:cond evt="onPrev">
-                      <p:tgtEl>
-                        <p:sldTgt/>
-                      </p:tgtEl>
-                    </p:cond>
-                  </p:endCondLst>
-                </p:cTn>
-                <p:tgtEl>
-                  <p:spTgt spid="5"/>
-                </p:tgtEl>
-              </p:cMediaNode>
-            </p:video>
-            <p:seq concurrent="1" nextAc="seek">
-              <p:cTn id="3" restart="whenNotActive" fill="hold" evtFilter="cancelBubble" nodeType="interactiveSeq">
-                <p:stCondLst>
-                  <p:cond evt="onClick" delay="0">
-                    <p:tgtEl>
-                      <p:spTgt spid="5"/>
-                    </p:tgtEl>
-                  </p:cond>
-                </p:stCondLst>
-                <p:endSync evt="end" delay="0">
-                  <p:rtn val="all"/>
-                </p:endSync>
-                <p:childTnLst>
-                  <p:par>
-                    <p:cTn id="4" fill="hold">
-                      <p:stCondLst>
-                        <p:cond delay="0"/>
-                      </p:stCondLst>
-                      <p:childTnLst>
-                        <p:par>
-                          <p:cTn id="5" fill="hold">
-                            <p:stCondLst>
-                              <p:cond delay="0"/>
-                            </p:stCondLst>
-                            <p:childTnLst>
-                              <p:par>
-                                <p:cTn id="6" presetID="2" presetClass="mediacall" presetSubtype="0" fill="hold" nodeType="clickEffect">
-                                  <p:stCondLst>
-                                    <p:cond delay="0"/>
-                                  </p:stCondLst>
-                                  <p:childTnLst>
-                                    <p:cmd type="call" cmd="togglePause">
-                                      <p:cBhvr additive="base">
-                                        <p:cTn id="7" dur="1" fill="hold"/>
-                                        <p:tgtEl>
-                                          <p:spTgt spid="5"/>
-                                        </p:tgtEl>
-                                      </p:cBhvr>
-                                    </p:cmd>
-                                  </p:childTnLst>
-                                </p:cTn>
-                              </p:par>
-                            </p:childTnLst>
-                          </p:cTn>
-                        </p:par>
-                      </p:childTnLst>
-                    </p:cTn>
-                  </p:par>
-                </p:childTnLst>
-              </p:cTn>
-              <p:nextCondLst>
-                <p:cond evt="onClick" delay="0">
-                  <p:tgtEl>
-                    <p:spTgt spid="5"/>
-                  </p:tgtEl>
-                </p:cond>
-              </p:nextCondLst>
-            </p:seq>
-          </p:childTnLst>
-        </p:cTn>
+        <p:cTn id="1" dur="indefinite" restart="never" nodeType="tmRoot"/>
       </p:par>
     </p:tnLst>
   </p:timing>
@@ -22901,45 +22862,26 @@
         </p:nvSpPr>
         <p:spPr/>
         <p:txBody>
-          <a:bodyPr>
-            <a:scene3d>
-              <a:camera prst="orthographicFront"/>
-              <a:lightRig rig="threePt" dir="t"/>
-            </a:scene3d>
-          </a:bodyPr>
-          <a:p>
-            <a:r>
-              <a:rPr lang="en-US" u="sng">
-                <a:ln w="22225">
-                  <a:solidFill>
-                    <a:schemeClr val="accent2"/>
-                  </a:solidFill>
-                  <a:prstDash val="solid"/>
-                </a:ln>
+          <a:bodyPr/>
+          <a:p>
+            <a:r>
+              <a:rPr lang="en-US" sz="3200" b="1">
                 <a:solidFill>
-                  <a:schemeClr val="accent2">
-                    <a:lumMod val="40000"/>
-                    <a:lumOff val="60000"/>
-                  </a:schemeClr>
+                  <a:schemeClr val="tx1"/>
                 </a:solidFill>
                 <a:effectLst/>
+                <a:latin typeface="Calibri" panose="020F0502020204030204" charset="0"/>
+                <a:cs typeface="Calibri" panose="020F0502020204030204" charset="0"/>
               </a:rPr>
               <a:t>Business Impact(High):</a:t>
             </a:r>
-            <a:endParaRPr lang="en-US" u="sng">
-              <a:ln w="22225">
-                <a:solidFill>
-                  <a:schemeClr val="accent2"/>
-                </a:solidFill>
-                <a:prstDash val="solid"/>
-              </a:ln>
+            <a:endParaRPr lang="en-US" sz="3200" b="1">
               <a:solidFill>
-                <a:schemeClr val="accent2">
-                  <a:lumMod val="40000"/>
-                  <a:lumOff val="60000"/>
-                </a:schemeClr>
+                <a:schemeClr val="tx1"/>
               </a:solidFill>
               <a:effectLst/>
+              <a:latin typeface="Calibri" panose="020F0502020204030204" charset="0"/>
+              <a:cs typeface="Calibri" panose="020F0502020204030204" charset="0"/>
             </a:endParaRPr>
           </a:p>
         </p:txBody>
@@ -22956,8 +22898,8 @@
         </p:nvSpPr>
         <p:spPr>
           <a:xfrm>
-            <a:off x="838200" y="1691005"/>
-            <a:ext cx="10827385" cy="4486275"/>
+            <a:off x="984885" y="1570990"/>
+            <a:ext cx="10395585" cy="1452245"/>
           </a:xfrm>
         </p:spPr>
         <p:txBody>
@@ -22967,22 +22909,22 @@
               <a:buNone/>
             </a:pPr>
             <a:r>
-              <a:rPr lang="en-US"/>
+              <a:rPr lang="en-US" sz="2400"/>
               <a:t>If the attacker changes the url to some malicious website looking similar to the given website, he can take the credentials and even credit card details on checkout from the user trust.</a:t>
             </a:r>
-            <a:endParaRPr lang="en-US"/>
+            <a:endParaRPr lang="en-US" sz="2400"/>
           </a:p>
           <a:p>
             <a:pPr marL="0" indent="0">
               <a:buNone/>
             </a:pPr>
-            <a:endParaRPr lang="en-US"/>
+            <a:endParaRPr lang="en-US" sz="2400"/>
           </a:p>
           <a:p>
             <a:pPr marL="0" indent="0">
               <a:buNone/>
             </a:pPr>
-            <a:endParaRPr lang="en-US"/>
+            <a:endParaRPr lang="en-US" sz="2400"/>
           </a:p>
         </p:txBody>
       </p:sp>
@@ -23024,25 +22966,22 @@
           <a:bodyPr/>
           <a:p>
             <a:r>
-              <a:rPr lang="en-US" u="sng">
+              <a:rPr lang="en-US" sz="3200" b="1">
+                <a:ln/>
                 <a:solidFill>
-                  <a:schemeClr val="accent1"/>
+                  <a:schemeClr val="tx1"/>
                 </a:solidFill>
-                <a:effectLst>
-                  <a:outerShdw blurRad="38100" dist="25400" dir="5400000" algn="ctr" rotWithShape="0">
-                    <a:srgbClr val="6E747A">
-                      <a:alpha val="43000"/>
-                    </a:srgbClr>
-                  </a:outerShdw>
-                </a:effectLst>
+                <a:effectLst/>
               </a:rPr>
-              <a:t>Recommendation</a:t>
-            </a:r>
-            <a:r>
-              <a:rPr lang="en-US"/>
-              <a:t>:</a:t>
-            </a:r>
-            <a:endParaRPr lang="en-US"/>
+              <a:t>Recommendation:</a:t>
+            </a:r>
+            <a:endParaRPr lang="en-US" sz="3200" b="1">
+              <a:ln/>
+              <a:solidFill>
+                <a:schemeClr val="tx1"/>
+              </a:solidFill>
+              <a:effectLst/>
+            </a:endParaRPr>
           </a:p>
         </p:txBody>
       </p:sp>
@@ -23077,13 +23016,29 @@
             <a:endParaRPr lang="en-US"/>
           </a:p>
           <a:p>
+            <a:pPr marL="342900" indent="-342900">
+              <a:buAutoNum type="arabicPeriod"/>
+            </a:pPr>
+            <a:r>
+              <a:rPr lang="en-US"/>
+              <a:t> Remove the redirection function from the application, and replace links to it with direct links to the relevant target URLs.</a:t>
+            </a:r>
+            <a:endParaRPr lang="en-US"/>
+          </a:p>
+          <a:p>
+            <a:pPr marL="342900" indent="-342900">
+              <a:buAutoNum type="arabicPeriod"/>
+            </a:pPr>
+            <a:r>
+              <a:rPr lang="en-US"/>
+              <a:t> Maintain a server-side list of all URLs that are permitted for redirection. Instead of passing the target URL as a parameter to the redirector, pass an index into this list.</a:t>
+            </a:r>
+            <a:endParaRPr lang="en-US"/>
+          </a:p>
+          <a:p>
             <a:pPr marL="0" indent="0">
               <a:buNone/>
             </a:pPr>
-            <a:r>
-              <a:rPr lang="en-US"/>
-              <a:t>1) Remove the redirection function from the application, and replace links to it with direct links to the relevant target URLs.</a:t>
-            </a:r>
             <a:endParaRPr lang="en-US"/>
           </a:p>
           <a:p>
@@ -23092,47 +23047,37 @@
             </a:pPr>
             <a:r>
               <a:rPr lang="en-US"/>
-              <a:t>2) Maintain a server-side list of all URLs that are permitted for redirection. Instead of passing the target URL as a parameter to the redirector, pass an index into this list.</a:t>
+              <a:t>If it is considered unavoidable for the redirection function to receive user-controllable input and incorporate this into the redirection target, one of the following measures should be used to minimize the risk of redirection attacks:</a:t>
             </a:r>
             <a:endParaRPr lang="en-US"/>
           </a:p>
           <a:p>
-            <a:pPr marL="0" indent="0">
-              <a:buNone/>
+            <a:pPr marL="342900" indent="-342900">
+              <a:buAutoNum type="arabicPeriod"/>
             </a:pPr>
             <a:r>
               <a:rPr lang="en-US"/>
-              <a:t>If it is considered unavoidable for the redirection function to receive user-controllable input and incorporate this into the redirection target, one of the following measures should be used to minimize the risk of redirection attacks:</a:t>
+              <a:t> The application should use relative URLs in all of its redirects, and the redirection function should strictly validate that the URL received is a relative URL.</a:t>
             </a:r>
             <a:endParaRPr lang="en-US"/>
           </a:p>
           <a:p>
-            <a:pPr marL="0" indent="0">
-              <a:buNone/>
+            <a:pPr marL="342900" indent="-342900">
+              <a:buAutoNum type="arabicPeriod"/>
             </a:pPr>
             <a:r>
               <a:rPr lang="en-US"/>
-              <a:t> 1)The application should use relative URLs in all of its redirects, and the redirection function should strictly validate that the URL received is a relative URL.</a:t>
+              <a:t> The application should use URLs relative to the web root for all of its redirects, and the redirection function should validate that the URL received starts with a slash character. It should then prepend http://yourdomainname.com to the URL before issuing the redirect.</a:t>
             </a:r>
             <a:endParaRPr lang="en-US"/>
           </a:p>
           <a:p>
-            <a:pPr marL="0" indent="0">
-              <a:buNone/>
+            <a:pPr marL="342900" indent="-342900">
+              <a:buAutoNum type="arabicPeriod"/>
             </a:pPr>
             <a:r>
               <a:rPr lang="en-US"/>
-              <a:t> 2) The application should use URLs relative to the web root for all of its redirects, and the redirection function should validate that the URL received starts with a slash character. It should then prepend http://yourdomainname.com to the URL before issuing the redirect.</a:t>
-            </a:r>
-            <a:endParaRPr lang="en-US"/>
-          </a:p>
-          <a:p>
-            <a:pPr marL="0" indent="0">
-              <a:buNone/>
-            </a:pPr>
-            <a:r>
-              <a:rPr lang="en-US"/>
-              <a:t> 3)The application should use absolute URLs for all of its redirects, and the redirection function should verify that the user-supplied URL begins with http://yourdomainname.com/ before issuing the redirect.</a:t>
+              <a:t> The application should use absolute URLs for all of its redirects, and the redirection function should verify that the user-supplied URL begins with http://yourdomainname.com/ before issuing the redirect.</a:t>
             </a:r>
             <a:endParaRPr lang="en-US"/>
           </a:p>
@@ -23177,7 +23122,6 @@
           <a:p>
             <a:r>
               <a:rPr lang="en-IN" b="1" dirty="0" smtClean="0">
-                <a:ln/>
                 <a:solidFill>
                   <a:schemeClr val="tx1"/>
                 </a:solidFill>
@@ -23186,7 +23130,6 @@
               <a:t>Observation</a:t>
             </a:r>
             <a:endParaRPr lang="en-IN" b="1" dirty="0" smtClean="0">
-              <a:ln/>
               <a:solidFill>
                 <a:schemeClr val="tx1"/>
               </a:solidFill>
@@ -23291,30 +23234,22 @@
         </p:nvSpPr>
         <p:spPr/>
         <p:txBody>
-          <a:bodyPr>
-            <a:scene3d>
-              <a:camera prst="orthographicFront"/>
-              <a:lightRig rig="soft" dir="t">
-                <a:rot lat="0" lon="0" rev="15600000"/>
-              </a:lightRig>
-            </a:scene3d>
-            <a:sp3d extrusionH="57150" prstMaterial="softEdge">
-              <a:bevelT w="25400" h="38100"/>
-            </a:sp3d>
-          </a:bodyPr>
-          <a:p>
-            <a:r>
-              <a:rPr lang="en-US" u="sng">
+          <a:bodyPr/>
+          <a:p>
+            <a:r>
+              <a:rPr lang="en-US" sz="3200" b="1">
+                <a:ln/>
                 <a:solidFill>
-                  <a:schemeClr val="accent4"/>
+                  <a:schemeClr val="tx1"/>
                 </a:solidFill>
                 <a:effectLst/>
               </a:rPr>
               <a:t>References:</a:t>
             </a:r>
-            <a:endParaRPr lang="en-US" u="sng">
+            <a:endParaRPr lang="en-US" sz="3200" b="1">
+              <a:ln/>
               <a:solidFill>
-                <a:schemeClr val="accent4"/>
+                <a:schemeClr val="tx1"/>
               </a:solidFill>
               <a:effectLst/>
             </a:endParaRPr>
@@ -23334,24 +23269,24 @@
         <p:spPr>
           <a:xfrm>
             <a:off x="838200" y="1825625"/>
-            <a:ext cx="10841355" cy="4351655"/>
+            <a:ext cx="10841355" cy="1704975"/>
           </a:xfrm>
         </p:spPr>
         <p:txBody>
           <a:bodyPr/>
           <a:p>
             <a:r>
-              <a:rPr lang="en-US"/>
+              <a:rPr lang="en-US" sz="2400"/>
               <a:t>https://portswigger.net/kb/issues/00500100_open-redirection-reflected</a:t>
             </a:r>
-            <a:endParaRPr lang="en-US"/>
-          </a:p>
-          <a:p>
-            <a:r>
-              <a:rPr lang="en-US"/>
+            <a:endParaRPr lang="en-US" sz="2400"/>
+          </a:p>
+          <a:p>
+            <a:r>
+              <a:rPr lang="en-US" sz="2400"/>
               <a:t>https://www.owasp.org/index.php/Testing_for_Client_Side_URL_Redirect_(OTG-CLIENT-004)</a:t>
             </a:r>
-            <a:endParaRPr lang="en-US"/>
+            <a:endParaRPr lang="en-US" sz="2400"/>
           </a:p>
         </p:txBody>
       </p:sp>
@@ -26047,7 +25982,6 @@
           <a:p>
             <a:r>
               <a:rPr lang="en-IN" sz="3200" b="1" dirty="0" smtClean="0">
-                <a:ln/>
                 <a:solidFill>
                   <a:schemeClr val="tx1"/>
                 </a:solidFill>
@@ -26056,7 +25990,6 @@
               <a:t>Observation</a:t>
             </a:r>
             <a:endParaRPr lang="en-IN" sz="3200" b="1" dirty="0" smtClean="0">
-              <a:ln/>
               <a:solidFill>
                 <a:schemeClr val="tx1"/>
               </a:solidFill>

</xml_diff>

<commit_message>
reports: IDOR ppt done
</commit_message>
<xml_diff>
--- a/reports/Lifestyle Store/LifeStyle Store Application Reports.pptx
+++ b/reports/Lifestyle Store/LifeStyle Store Application Reports.pptx
@@ -96,34 +96,33 @@
     <p:sldId id="488" r:id="rId89"/>
     <p:sldId id="489" r:id="rId90"/>
     <p:sldId id="490" r:id="rId91"/>
-    <p:sldId id="491" r:id="rId92"/>
-    <p:sldId id="492" r:id="rId93"/>
-    <p:sldId id="493" r:id="rId94"/>
-    <p:sldId id="352" r:id="rId95"/>
-    <p:sldId id="355" r:id="rId96"/>
-    <p:sldId id="356" r:id="rId97"/>
-    <p:sldId id="357" r:id="rId98"/>
-    <p:sldId id="358" r:id="rId99"/>
-    <p:sldId id="359" r:id="rId100"/>
-    <p:sldId id="360" r:id="rId101"/>
-    <p:sldId id="361" r:id="rId102"/>
-    <p:sldId id="364" r:id="rId103"/>
-    <p:sldId id="365" r:id="rId104"/>
-    <p:sldId id="366" r:id="rId105"/>
-    <p:sldId id="367" r:id="rId106"/>
-    <p:sldId id="368" r:id="rId107"/>
-    <p:sldId id="369" r:id="rId108"/>
-    <p:sldId id="370" r:id="rId109"/>
-    <p:sldId id="371" r:id="rId110"/>
-    <p:sldId id="372" r:id="rId111"/>
-    <p:sldId id="373" r:id="rId112"/>
-    <p:sldId id="374" r:id="rId113"/>
-    <p:sldId id="375" r:id="rId114"/>
-    <p:sldId id="376" r:id="rId115"/>
-    <p:sldId id="377" r:id="rId116"/>
-    <p:sldId id="378" r:id="rId117"/>
-    <p:sldId id="380" r:id="rId118"/>
-    <p:sldId id="381" r:id="rId119"/>
+    <p:sldId id="492" r:id="rId92"/>
+    <p:sldId id="493" r:id="rId93"/>
+    <p:sldId id="352" r:id="rId94"/>
+    <p:sldId id="355" r:id="rId95"/>
+    <p:sldId id="356" r:id="rId96"/>
+    <p:sldId id="357" r:id="rId97"/>
+    <p:sldId id="358" r:id="rId98"/>
+    <p:sldId id="359" r:id="rId99"/>
+    <p:sldId id="360" r:id="rId100"/>
+    <p:sldId id="361" r:id="rId101"/>
+    <p:sldId id="364" r:id="rId102"/>
+    <p:sldId id="365" r:id="rId103"/>
+    <p:sldId id="366" r:id="rId104"/>
+    <p:sldId id="367" r:id="rId105"/>
+    <p:sldId id="368" r:id="rId106"/>
+    <p:sldId id="369" r:id="rId107"/>
+    <p:sldId id="370" r:id="rId108"/>
+    <p:sldId id="371" r:id="rId109"/>
+    <p:sldId id="372" r:id="rId110"/>
+    <p:sldId id="373" r:id="rId111"/>
+    <p:sldId id="374" r:id="rId112"/>
+    <p:sldId id="375" r:id="rId113"/>
+    <p:sldId id="376" r:id="rId114"/>
+    <p:sldId id="377" r:id="rId115"/>
+    <p:sldId id="378" r:id="rId116"/>
+    <p:sldId id="380" r:id="rId117"/>
+    <p:sldId id="381" r:id="rId118"/>
   </p:sldIdLst>
   <p:sldSz cx="12192000" cy="6858000"/>
   <p:notesSz cx="6858000" cy="9144000"/>
@@ -4126,518 +4125,6 @@
         <p:cNvGrpSpPr/>
         <p:nvPr/>
       </p:nvGrpSpPr>
-      <p:grpSpPr>
-        <a:xfrm>
-          <a:off x="0" y="0"/>
-          <a:ext cx="0" cy="0"/>
-          <a:chOff x="0" y="0"/>
-          <a:chExt cx="0" cy="0"/>
-        </a:xfrm>
-      </p:grpSpPr>
-      <p:sp>
-        <p:nvSpPr>
-          <p:cNvPr id="4" name="Slide Number Placeholder 3"/>
-          <p:cNvSpPr>
-            <a:spLocks noGrp="1"/>
-          </p:cNvSpPr>
-          <p:nvPr>
-            <p:ph type="sldNum" sz="quarter" idx="2"/>
-          </p:nvPr>
-        </p:nvSpPr>
-        <p:spPr/>
-        <p:txBody>
-          <a:bodyPr/>
-          <a:lstStyle/>
-          <a:p>
-            <a:pPr lvl="0"/>
-            <a:fld id="{86CB4B4D-7CA3-9044-876B-883B54F8677D}" type="slidenum">
-              <a:rPr lang="uk-UA" smtClean="0"/>
-            </a:fld>
-            <a:endParaRPr lang="uk-UA"/>
-          </a:p>
-        </p:txBody>
-      </p:sp>
-      <p:sp>
-        <p:nvSpPr>
-          <p:cNvPr id="3" name="Title 2"/>
-          <p:cNvSpPr>
-            <a:spLocks noGrp="1"/>
-          </p:cNvSpPr>
-          <p:nvPr>
-            <p:ph type="title"/>
-          </p:nvPr>
-        </p:nvSpPr>
-        <p:spPr>
-          <a:xfrm>
-            <a:off x="800100" y="488950"/>
-            <a:ext cx="10515600" cy="1325563"/>
-          </a:xfrm>
-        </p:spPr>
-        <p:txBody>
-          <a:bodyPr>
-            <a:normAutofit/>
-          </a:bodyPr>
-          <a:lstStyle/>
-          <a:p>
-            <a:r>
-              <a:rPr lang="en-US">
-                <a:sym typeface="+mn-ea"/>
-              </a:rPr>
-              <a:t>16)</a:t>
-            </a:r>
-            <a:r>
-              <a:rPr lang="en-US" u="sng">
-                <a:gradFill>
-                  <a:gsLst>
-                    <a:gs pos="21000">
-                      <a:srgbClr val="53575C"/>
-                    </a:gs>
-                    <a:gs pos="88000">
-                      <a:srgbClr val="C5C7CA"/>
-                    </a:gs>
-                  </a:gsLst>
-                  <a:lin ang="5400000"/>
-                </a:gradFill>
-                <a:effectLst/>
-                <a:sym typeface="+mn-ea"/>
-              </a:rPr>
-              <a:t>Improper Server Side Filter</a:t>
-            </a:r>
-            <a:endParaRPr lang="en-IN" dirty="0" smtClean="0"/>
-          </a:p>
-        </p:txBody>
-      </p:sp>
-      <p:graphicFrame>
-        <p:nvGraphicFramePr>
-          <p:cNvPr id="6" name="Table 5"/>
-          <p:cNvGraphicFramePr>
-            <a:graphicFrameLocks noGrp="1"/>
-          </p:cNvGraphicFramePr>
-          <p:nvPr/>
-        </p:nvGraphicFramePr>
-        <p:xfrm>
-          <a:off x="1751173" y="2188740"/>
-          <a:ext cx="8109380" cy="2821929"/>
-        </p:xfrm>
-        <a:graphic>
-          <a:graphicData uri="http://schemas.openxmlformats.org/drawingml/2006/table">
-            <a:tbl>
-              <a:tblPr firstRow="1" bandRow="1">
-                <a:tableStyleId>{5C22544A-7EE6-4342-B048-85BDC9FD1C3A}</a:tableStyleId>
-              </a:tblPr>
-              <a:tblGrid>
-                <a:gridCol w="1413562"/>
-                <a:gridCol w="6695818"/>
-              </a:tblGrid>
-              <a:tr h="415290">
-                <a:tc>
-                  <a:txBody>
-                    <a:bodyPr/>
-                    <a:lstStyle/>
-                    <a:p>
-                      <a:pPr algn="ctr"/>
-                      <a:endParaRPr lang="en-US" sz="1600" dirty="0"/>
-                    </a:p>
-                  </a:txBody>
-                  <a:tcPr marL="82988" marR="82988" marT="41494" marB="41494">
-                    <a:lnL w="12700" cmpd="sng">
-                      <a:noFill/>
-                    </a:lnL>
-                    <a:lnR w="12700" cmpd="sng">
-                      <a:noFill/>
-                    </a:lnR>
-                    <a:lnT w="12700" cmpd="sng">
-                      <a:noFill/>
-                    </a:lnT>
-                    <a:lnB w="12700" cap="flat" cmpd="sng" algn="ctr">
-                      <a:solidFill>
-                        <a:schemeClr val="tx1"/>
-                      </a:solidFill>
-                      <a:prstDash val="solid"/>
-                      <a:round/>
-                      <a:headEnd type="none" w="med" len="med"/>
-                      <a:tailEnd type="none" w="med" len="med"/>
-                    </a:lnB>
-                    <a:lnTlToBr w="12700" cmpd="sng">
-                      <a:noFill/>
-                      <a:prstDash val="solid"/>
-                    </a:lnTlToBr>
-                    <a:lnBlToTr w="12700" cmpd="sng">
-                      <a:noFill/>
-                      <a:prstDash val="solid"/>
-                    </a:lnBlToTr>
-                    <a:noFill/>
-                  </a:tcPr>
-                </a:tc>
-                <a:tc>
-                  <a:txBody>
-                    <a:bodyPr/>
-                    <a:lstStyle/>
-                    <a:p>
-                      <a:endParaRPr lang="en-US" sz="1600" dirty="0"/>
-                    </a:p>
-                  </a:txBody>
-                  <a:tcPr marL="82988" marR="82988" marT="41494" marB="41494">
-                    <a:lnL w="12700" cmpd="sng">
-                      <a:noFill/>
-                    </a:lnL>
-                    <a:lnR w="12700" cmpd="sng">
-                      <a:noFill/>
-                    </a:lnR>
-                    <a:lnT w="12700" cmpd="sng">
-                      <a:noFill/>
-                    </a:lnT>
-                    <a:lnB w="12700" cap="flat" cmpd="sng" algn="ctr">
-                      <a:solidFill>
-                        <a:schemeClr val="tx1"/>
-                      </a:solidFill>
-                      <a:prstDash val="solid"/>
-                      <a:round/>
-                      <a:headEnd type="none" w="med" len="med"/>
-                      <a:tailEnd type="none" w="med" len="med"/>
-                    </a:lnB>
-                    <a:lnTlToBr w="12700" cmpd="sng">
-                      <a:noFill/>
-                      <a:prstDash val="solid"/>
-                    </a:lnTlToBr>
-                    <a:lnBlToTr w="12700" cmpd="sng">
-                      <a:noFill/>
-                      <a:prstDash val="solid"/>
-                    </a:lnBlToTr>
-                    <a:noFill/>
-                  </a:tcPr>
-                </a:tc>
-              </a:tr>
-              <a:tr h="2406639">
-                <a:tc>
-                  <a:txBody>
-                    <a:bodyPr/>
-                    <a:lstStyle/>
-                    <a:p>
-                      <a:pPr algn="ctr"/>
-                      <a:r>
-                        <a:rPr lang="en-US" altLang="en-IN" sz="1600" dirty="0" smtClean="0">
-                          <a:solidFill>
-                            <a:schemeClr val="tx1"/>
-                          </a:solidFill>
-                          <a:latin typeface="Calibri" panose="020F0502020204030204" charset="0"/>
-                        </a:rPr>
-                        <a:t>Improper Server Side Filter</a:t>
-                      </a:r>
-                      <a:r>
-                        <a:rPr lang="en-IN" sz="1600" dirty="0" smtClean="0">
-                          <a:solidFill>
-                            <a:schemeClr val="tx1"/>
-                          </a:solidFill>
-                          <a:latin typeface="Calibri" panose="020F0502020204030204" charset="0"/>
-                        </a:rPr>
-                        <a:t> </a:t>
-                      </a:r>
-                      <a:r>
-                        <a:rPr lang="en-US" sz="1300" dirty="0" smtClean="0">
-                          <a:solidFill>
-                            <a:schemeClr val="tx1"/>
-                          </a:solidFill>
-                          <a:latin typeface="Calibri" panose="020F0502020204030204" charset="0"/>
-                        </a:rPr>
-                        <a:t>(Low)</a:t>
-                      </a:r>
-                      <a:endParaRPr lang="en-US" sz="1300" dirty="0">
-                        <a:solidFill>
-                          <a:schemeClr val="tx1"/>
-                        </a:solidFill>
-                        <a:latin typeface="Calibri" panose="020F0502020204030204" charset="0"/>
-                      </a:endParaRPr>
-                    </a:p>
-                  </a:txBody>
-                  <a:tcPr marL="82988" marR="82988" marT="41494" marB="41494" anchor="ctr">
-                    <a:lnL w="12700" cap="flat" cmpd="sng" algn="ctr">
-                      <a:solidFill>
-                        <a:schemeClr val="tx1"/>
-                      </a:solidFill>
-                      <a:prstDash val="solid"/>
-                      <a:round/>
-                      <a:headEnd type="none" w="med" len="med"/>
-                      <a:tailEnd type="none" w="med" len="med"/>
-                    </a:lnL>
-                    <a:lnR w="12700" cap="flat" cmpd="sng" algn="ctr">
-                      <a:solidFill>
-                        <a:schemeClr val="tx1"/>
-                      </a:solidFill>
-                      <a:prstDash val="solid"/>
-                      <a:round/>
-                      <a:headEnd type="none" w="med" len="med"/>
-                      <a:tailEnd type="none" w="med" len="med"/>
-                    </a:lnR>
-                    <a:lnT w="12700" cap="flat" cmpd="sng" algn="ctr">
-                      <a:solidFill>
-                        <a:schemeClr val="tx1"/>
-                      </a:solidFill>
-                      <a:prstDash val="solid"/>
-                      <a:round/>
-                      <a:headEnd type="none" w="med" len="med"/>
-                      <a:tailEnd type="none" w="med" len="med"/>
-                    </a:lnT>
-                    <a:lnB w="12700" cap="flat" cmpd="sng" algn="ctr">
-                      <a:solidFill>
-                        <a:schemeClr val="tx1"/>
-                      </a:solidFill>
-                      <a:prstDash val="solid"/>
-                      <a:round/>
-                      <a:headEnd type="none" w="med" len="med"/>
-                      <a:tailEnd type="none" w="med" len="med"/>
-                    </a:lnB>
-                    <a:solidFill>
-                      <a:srgbClr val="92D050"/>
-                    </a:solidFill>
-                  </a:tcPr>
-                </a:tc>
-                <a:tc>
-                  <a:txBody>
-                    <a:bodyPr/>
-                    <a:lstStyle/>
-                    <a:p>
-                      <a:r>
-                        <a:rPr lang="en-US" sz="1300" dirty="0" smtClean="0">
-                          <a:solidFill>
-                            <a:schemeClr val="tx1"/>
-                          </a:solidFill>
-                          <a:latin typeface="Calibri" panose="020F0502020204030204" charset="0"/>
-                        </a:rPr>
-                        <a:t> </a:t>
-                      </a:r>
-                      <a:endParaRPr lang="en-US" sz="1300" dirty="0">
-                        <a:solidFill>
-                          <a:schemeClr val="tx1"/>
-                        </a:solidFill>
-                        <a:latin typeface="Calibri" panose="020F0502020204030204" charset="0"/>
-                      </a:endParaRPr>
-                    </a:p>
-                    <a:p>
-                      <a:r>
-                        <a:rPr lang="en-US" sz="1300" baseline="0" dirty="0" smtClean="0">
-                          <a:solidFill>
-                            <a:schemeClr val="tx1"/>
-                          </a:solidFill>
-                          <a:latin typeface="Calibri" panose="020F0502020204030204" charset="0"/>
-                        </a:rPr>
-                        <a:t>Below mentioned </a:t>
-                      </a:r>
-                      <a:r>
-                        <a:rPr lang="en-US" sz="1300" baseline="0" dirty="0" err="1" smtClean="0">
-                          <a:solidFill>
-                            <a:schemeClr val="tx1"/>
-                          </a:solidFill>
-                          <a:latin typeface="Calibri" panose="020F0502020204030204" charset="0"/>
-                        </a:rPr>
-                        <a:t>urls</a:t>
-                      </a:r>
-                      <a:r>
-                        <a:rPr lang="en-US" sz="1300" baseline="0" dirty="0" smtClean="0">
-                          <a:solidFill>
-                            <a:schemeClr val="tx1"/>
-                          </a:solidFill>
-                          <a:latin typeface="Calibri" panose="020F0502020204030204" charset="0"/>
-                        </a:rPr>
-                        <a:t> have improper server side filter</a:t>
-                      </a:r>
-                      <a:endParaRPr lang="en-US" sz="1300" dirty="0" smtClean="0">
-                        <a:solidFill>
-                          <a:schemeClr val="tx1"/>
-                        </a:solidFill>
-                        <a:latin typeface="Calibri" panose="020F0502020204030204" charset="0"/>
-                        <a:cs typeface="Calibri" panose="020F0502020204030204" charset="0"/>
-                      </a:endParaRPr>
-                    </a:p>
-                    <a:p>
-                      <a:endParaRPr lang="en-US" sz="1300" dirty="0" smtClean="0">
-                        <a:solidFill>
-                          <a:schemeClr val="tx1"/>
-                        </a:solidFill>
-                        <a:latin typeface="Calibri" panose="020F0502020204030204" charset="0"/>
-                      </a:endParaRPr>
-                    </a:p>
-                    <a:p>
-                      <a:r>
-                        <a:rPr lang="en-US" sz="1300" b="1" dirty="0" smtClean="0">
-                          <a:solidFill>
-                            <a:schemeClr val="tx1"/>
-                          </a:solidFill>
-                          <a:latin typeface="Calibri" panose="020F0502020204030204" charset="0"/>
-                        </a:rPr>
-                        <a:t>Affected URL :</a:t>
-                      </a:r>
-                      <a:endParaRPr lang="en-US" sz="1300" b="0" i="0" u="none" strike="noStrike" dirty="0" smtClean="0">
-                        <a:solidFill>
-                          <a:schemeClr val="tx1"/>
-                        </a:solidFill>
-                        <a:effectLst/>
-                        <a:latin typeface="Calibri" panose="020F0502020204030204" charset="0"/>
-                        <a:ea typeface="+mn-ea"/>
-                        <a:cs typeface="+mn-cs"/>
-                        <a:sym typeface="Arial" panose="020B0604020202020204"/>
-                      </a:endParaRPr>
-                    </a:p>
-                    <a:p>
-                      <a:pPr marL="285750" indent="-285750">
-                        <a:buFont typeface="Arial" panose="020B0604020202020204" pitchFamily="34" charset="0"/>
-                        <a:buChar char="•"/>
-                      </a:pPr>
-                      <a:r>
-                        <a:rPr lang="en-US" sz="1300" b="0" dirty="0" smtClean="0">
-                          <a:solidFill>
-                            <a:schemeClr val="tx1"/>
-                          </a:solidFill>
-                          <a:latin typeface="Calibri" panose="020F0502020204030204" charset="0"/>
-                        </a:rPr>
-                        <a:t>http://13.233.108.21/profile/16/edit/</a:t>
-                      </a:r>
-                      <a:endParaRPr lang="en-US" sz="1300" b="0" dirty="0" smtClean="0">
-                        <a:solidFill>
-                          <a:schemeClr val="tx1"/>
-                        </a:solidFill>
-                        <a:latin typeface="Calibri" panose="020F0502020204030204" charset="0"/>
-                      </a:endParaRPr>
-                    </a:p>
-                    <a:p>
-                      <a:pPr indent="0">
-                        <a:buFont typeface="Arial" panose="020B0604020202020204" pitchFamily="34" charset="0"/>
-                        <a:buNone/>
-                      </a:pPr>
-                      <a:r>
-                        <a:rPr lang="en-US" sz="1300" b="1" dirty="0" smtClean="0">
-                          <a:solidFill>
-                            <a:schemeClr val="tx1"/>
-                          </a:solidFill>
-                          <a:latin typeface="Calibri" panose="020F0502020204030204" charset="0"/>
-                        </a:rPr>
-                        <a:t>Affected parameter:</a:t>
-                      </a:r>
-                      <a:endParaRPr lang="en-US" sz="1300" b="0" dirty="0" smtClean="0">
-                        <a:solidFill>
-                          <a:schemeClr val="tx1"/>
-                        </a:solidFill>
-                        <a:latin typeface="Calibri" panose="020F0502020204030204" charset="0"/>
-                      </a:endParaRPr>
-                    </a:p>
-                    <a:p>
-                      <a:pPr marL="285750" indent="-285750">
-                        <a:buFont typeface="Arial" panose="020B0604020202020204" pitchFamily="34" charset="0"/>
-                        <a:buChar char="•"/>
-                      </a:pPr>
-                      <a:r>
-                        <a:rPr lang="en-US" sz="1300" b="0" dirty="0" smtClean="0">
-                          <a:solidFill>
-                            <a:schemeClr val="tx1"/>
-                          </a:solidFill>
-                          <a:latin typeface="Calibri" panose="020F0502020204030204" charset="0"/>
-                        </a:rPr>
-                        <a:t>Contact Number</a:t>
-                      </a:r>
-                      <a:endParaRPr lang="en-US" sz="1300" b="0" dirty="0" smtClean="0">
-                        <a:solidFill>
-                          <a:schemeClr val="tx1"/>
-                        </a:solidFill>
-                        <a:latin typeface="Calibri" panose="020F0502020204030204" charset="0"/>
-                      </a:endParaRPr>
-                    </a:p>
-                    <a:p>
-                      <a:pPr marL="285750" indent="-285750">
-                        <a:buFont typeface="Arial" panose="020B0604020202020204" pitchFamily="34" charset="0"/>
-                        <a:buChar char="•"/>
-                      </a:pPr>
-                      <a:endParaRPr lang="en-US" sz="1300" b="0" dirty="0" smtClean="0">
-                        <a:solidFill>
-                          <a:schemeClr val="tx1"/>
-                        </a:solidFill>
-                        <a:latin typeface="Calibri" panose="020F0502020204030204" charset="0"/>
-                      </a:endParaRPr>
-                    </a:p>
-                    <a:p>
-                      <a:pPr marL="285750" indent="-285750">
-                        <a:buFont typeface="Arial" panose="020B0604020202020204" pitchFamily="34" charset="0"/>
-                        <a:buChar char="•"/>
-                      </a:pPr>
-                      <a:endParaRPr lang="en-US" sz="1300" b="0" dirty="0">
-                        <a:solidFill>
-                          <a:schemeClr val="tx1"/>
-                        </a:solidFill>
-                        <a:latin typeface="Calibri" panose="020F0502020204030204" charset="0"/>
-                      </a:endParaRPr>
-                    </a:p>
-                  </a:txBody>
-                  <a:tcPr marL="82988" marR="82988" marT="41494" marB="41494">
-                    <a:lnL w="12700" cap="flat" cmpd="sng" algn="ctr">
-                      <a:solidFill>
-                        <a:schemeClr val="tx1"/>
-                      </a:solidFill>
-                      <a:prstDash val="solid"/>
-                      <a:round/>
-                      <a:headEnd type="none" w="med" len="med"/>
-                      <a:tailEnd type="none" w="med" len="med"/>
-                    </a:lnL>
-                    <a:lnR w="12700" cap="flat" cmpd="sng" algn="ctr">
-                      <a:solidFill>
-                        <a:schemeClr val="tx1"/>
-                      </a:solidFill>
-                      <a:prstDash val="solid"/>
-                      <a:round/>
-                      <a:headEnd type="none" w="med" len="med"/>
-                      <a:tailEnd type="none" w="med" len="med"/>
-                    </a:lnR>
-                    <a:lnT w="12700" cap="flat" cmpd="sng" algn="ctr">
-                      <a:solidFill>
-                        <a:schemeClr val="tx1"/>
-                      </a:solidFill>
-                      <a:prstDash val="solid"/>
-                      <a:round/>
-                      <a:headEnd type="none" w="med" len="med"/>
-                      <a:tailEnd type="none" w="med" len="med"/>
-                    </a:lnT>
-                    <a:lnB w="12700" cap="flat" cmpd="sng" algn="ctr">
-                      <a:solidFill>
-                        <a:schemeClr val="tx1"/>
-                      </a:solidFill>
-                      <a:prstDash val="solid"/>
-                      <a:round/>
-                      <a:headEnd type="none" w="med" len="med"/>
-                      <a:tailEnd type="none" w="med" len="med"/>
-                    </a:lnB>
-                    <a:solidFill>
-                      <a:schemeClr val="bg1"/>
-                    </a:solidFill>
-                  </a:tcPr>
-                </a:tc>
-              </a:tr>
-            </a:tbl>
-          </a:graphicData>
-        </a:graphic>
-      </p:graphicFrame>
-    </p:spTree>
-  </p:cSld>
-  <p:clrMapOvr>
-    <a:masterClrMapping/>
-  </p:clrMapOvr>
-  <p:transition spd="med"/>
-  <p:timing>
-    <p:tnLst>
-      <p:par>
-        <p:cTn id="1" dur="indefinite" restart="never" nodeType="tmRoot"/>
-      </p:par>
-    </p:tnLst>
-  </p:timing>
-</p:sld>
-</file>
-
-<file path=ppt/slides/slide101.xml><?xml version="1.0" encoding="utf-8"?>
-<p:sld xmlns:a="http://schemas.openxmlformats.org/drawingml/2006/main" xmlns:r="http://schemas.openxmlformats.org/officeDocument/2006/relationships" xmlns:p="http://schemas.openxmlformats.org/presentationml/2006/main">
-  <p:cSld>
-    <p:spTree>
-      <p:nvGrpSpPr>
-        <p:cNvPr id="1" name=""/>
-        <p:cNvGrpSpPr/>
-        <p:nvPr/>
-      </p:nvGrpSpPr>
       <p:grpSpPr/>
       <p:sp>
         <p:nvSpPr>
@@ -4754,7 +4241,7 @@
 </p:sld>
 </file>
 
-<file path=ppt/slides/slide102.xml><?xml version="1.0" encoding="utf-8"?>
+<file path=ppt/slides/slide101.xml><?xml version="1.0" encoding="utf-8"?>
 <p:sld xmlns:a="http://schemas.openxmlformats.org/drawingml/2006/main" xmlns:r="http://schemas.openxmlformats.org/officeDocument/2006/relationships" xmlns:p="http://schemas.openxmlformats.org/presentationml/2006/main">
   <p:cSld>
     <p:spTree>
@@ -4914,7 +4401,7 @@
 </p:sld>
 </file>
 
-<file path=ppt/slides/slide103.xml><?xml version="1.0" encoding="utf-8"?>
+<file path=ppt/slides/slide102.xml><?xml version="1.0" encoding="utf-8"?>
 <p:sld xmlns:a="http://schemas.openxmlformats.org/drawingml/2006/main" xmlns:r="http://schemas.openxmlformats.org/officeDocument/2006/relationships" xmlns:p="http://schemas.openxmlformats.org/presentationml/2006/main">
   <p:cSld>
     <p:spTree>
@@ -5142,7 +4629,7 @@
 </p:sld>
 </file>
 
-<file path=ppt/slides/slide104.xml><?xml version="1.0" encoding="utf-8"?>
+<file path=ppt/slides/slide103.xml><?xml version="1.0" encoding="utf-8"?>
 <p:sld xmlns:a="http://schemas.openxmlformats.org/drawingml/2006/main" xmlns:r="http://schemas.openxmlformats.org/officeDocument/2006/relationships" xmlns:p="http://schemas.openxmlformats.org/presentationml/2006/main">
   <p:cSld>
     <p:spTree>
@@ -5244,7 +4731,7 @@
 </p:sld>
 </file>
 
-<file path=ppt/slides/slide105.xml><?xml version="1.0" encoding="utf-8"?>
+<file path=ppt/slides/slide104.xml><?xml version="1.0" encoding="utf-8"?>
 <p:sld xmlns:a="http://schemas.openxmlformats.org/drawingml/2006/main" xmlns:r="http://schemas.openxmlformats.org/officeDocument/2006/relationships" xmlns:p="http://schemas.openxmlformats.org/presentationml/2006/main">
   <p:cSld>
     <p:spTree>
@@ -5980,7 +5467,7 @@
 </p:sld>
 </file>
 
-<file path=ppt/slides/slide106.xml><?xml version="1.0" encoding="utf-8"?>
+<file path=ppt/slides/slide105.xml><?xml version="1.0" encoding="utf-8"?>
 <p:sld xmlns:a="http://schemas.openxmlformats.org/drawingml/2006/main" xmlns:r="http://schemas.openxmlformats.org/officeDocument/2006/relationships" xmlns:p="http://schemas.openxmlformats.org/presentationml/2006/main">
   <p:cSld>
     <p:spTree>
@@ -6101,7 +5588,7 @@
 </p:sld>
 </file>
 
-<file path=ppt/slides/slide107.xml><?xml version="1.0" encoding="utf-8"?>
+<file path=ppt/slides/slide106.xml><?xml version="1.0" encoding="utf-8"?>
 <p:sld xmlns:a="http://schemas.openxmlformats.org/drawingml/2006/main" xmlns:r="http://schemas.openxmlformats.org/officeDocument/2006/relationships" xmlns:p="http://schemas.openxmlformats.org/presentationml/2006/main">
   <p:cSld>
     <p:spTree>
@@ -6244,7 +5731,7 @@
 </p:sld>
 </file>
 
-<file path=ppt/slides/slide108.xml><?xml version="1.0" encoding="utf-8"?>
+<file path=ppt/slides/slide107.xml><?xml version="1.0" encoding="utf-8"?>
 <p:sld xmlns:a="http://schemas.openxmlformats.org/drawingml/2006/main" xmlns:r="http://schemas.openxmlformats.org/officeDocument/2006/relationships" xmlns:p="http://schemas.openxmlformats.org/presentationml/2006/main">
   <p:cSld>
     <p:spTree>
@@ -6509,7 +5996,7 @@
 </p:sld>
 </file>
 
-<file path=ppt/slides/slide109.xml><?xml version="1.0" encoding="utf-8"?>
+<file path=ppt/slides/slide108.xml><?xml version="1.0" encoding="utf-8"?>
 <p:sld xmlns:a="http://schemas.openxmlformats.org/drawingml/2006/main" xmlns:r="http://schemas.openxmlformats.org/officeDocument/2006/relationships" xmlns:p="http://schemas.openxmlformats.org/presentationml/2006/main">
   <p:cSld>
     <p:spTree>
@@ -6592,6 +6079,547 @@
           </a:p>
         </p:txBody>
       </p:sp>
+    </p:spTree>
+  </p:cSld>
+  <p:clrMapOvr>
+    <a:masterClrMapping/>
+  </p:clrMapOvr>
+</p:sld>
+</file>
+
+<file path=ppt/slides/slide109.xml><?xml version="1.0" encoding="utf-8"?>
+<p:sld xmlns:a="http://schemas.openxmlformats.org/drawingml/2006/main" xmlns:r="http://schemas.openxmlformats.org/officeDocument/2006/relationships" xmlns:p="http://schemas.openxmlformats.org/presentationml/2006/main">
+  <p:cSld>
+    <p:spTree>
+      <p:nvGrpSpPr>
+        <p:cNvPr id="1" name=""/>
+        <p:cNvGrpSpPr/>
+        <p:nvPr/>
+      </p:nvGrpSpPr>
+      <p:grpSpPr/>
+      <p:sp>
+        <p:nvSpPr>
+          <p:cNvPr id="2" name="Title 1"/>
+          <p:cNvSpPr>
+            <a:spLocks noGrp="1"/>
+          </p:cNvSpPr>
+          <p:nvPr>
+            <p:ph type="title"/>
+          </p:nvPr>
+        </p:nvSpPr>
+        <p:spPr/>
+        <p:txBody>
+          <a:bodyPr/>
+          <a:p>
+            <a:r>
+              <a:rPr lang="en-US"/>
+              <a:t>18.</a:t>
+            </a:r>
+            <a:r>
+              <a:rPr lang="en-US" u="sng">
+                <a:solidFill>
+                  <a:schemeClr val="accent1"/>
+                </a:solidFill>
+                <a:effectLst>
+                  <a:outerShdw blurRad="38100" dist="25400" dir="5400000" algn="ctr" rotWithShape="0">
+                    <a:srgbClr val="6E747A">
+                      <a:alpha val="43000"/>
+                    </a:srgbClr>
+                  </a:outerShdw>
+                </a:effectLst>
+              </a:rPr>
+              <a:t>Default Debug Pages</a:t>
+            </a:r>
+            <a:endParaRPr lang="en-US" u="sng">
+              <a:solidFill>
+                <a:schemeClr val="accent1"/>
+              </a:solidFill>
+              <a:effectLst>
+                <a:outerShdw blurRad="38100" dist="25400" dir="5400000" algn="ctr" rotWithShape="0">
+                  <a:srgbClr val="6E747A">
+                    <a:alpha val="43000"/>
+                  </a:srgbClr>
+                </a:outerShdw>
+              </a:effectLst>
+            </a:endParaRPr>
+          </a:p>
+        </p:txBody>
+      </p:sp>
+      <p:graphicFrame>
+        <p:nvGraphicFramePr>
+          <p:cNvPr id="6" name="Content Placeholder 5"/>
+          <p:cNvGraphicFramePr>
+            <a:graphicFrameLocks noGrp="1"/>
+          </p:cNvGraphicFramePr>
+          <p:nvPr>
+            <p:ph idx="1"/>
+          </p:nvPr>
+        </p:nvGraphicFramePr>
+        <p:xfrm>
+          <a:off x="838200" y="1825625"/>
+          <a:ext cx="10515600" cy="2821940"/>
+        </p:xfrm>
+        <a:graphic>
+          <a:graphicData uri="http://schemas.openxmlformats.org/drawingml/2006/table">
+            <a:tbl>
+              <a:tblPr firstRow="1" bandRow="1">
+                <a:tableStyleId>{5C22544A-7EE6-4342-B048-85BDC9FD1C3A}</a:tableStyleId>
+              </a:tblPr>
+              <a:tblGrid>
+                <a:gridCol w="1832610"/>
+                <a:gridCol w="8682990"/>
+              </a:tblGrid>
+              <a:tr h="415290">
+                <a:tc>
+                  <a:txBody>
+                    <a:bodyPr/>
+                    <a:p>
+                      <a:pPr algn="ctr"/>
+                      <a:endParaRPr lang="en-US" sz="1600" dirty="0"/>
+                    </a:p>
+                  </a:txBody>
+                  <a:tcPr marL="82988" marR="82988" marT="41494" marB="41494">
+                    <a:lnL w="12700" cmpd="sng">
+                      <a:noFill/>
+                    </a:lnL>
+                    <a:lnR w="12700" cmpd="sng">
+                      <a:noFill/>
+                    </a:lnR>
+                    <a:lnT w="12700" cmpd="sng">
+                      <a:noFill/>
+                    </a:lnT>
+                    <a:lnB w="12700" cap="flat" cmpd="sng" algn="ctr">
+                      <a:solidFill>
+                        <a:schemeClr val="tx1"/>
+                      </a:solidFill>
+                      <a:prstDash val="solid"/>
+                      <a:round/>
+                      <a:headEnd type="none" w="med" len="med"/>
+                      <a:tailEnd type="none" w="med" len="med"/>
+                    </a:lnB>
+                    <a:lnTlToBr w="12700" cmpd="sng">
+                      <a:noFill/>
+                      <a:prstDash val="solid"/>
+                    </a:lnTlToBr>
+                    <a:lnBlToTr w="12700" cmpd="sng">
+                      <a:noFill/>
+                      <a:prstDash val="solid"/>
+                    </a:lnBlToTr>
+                    <a:noFill/>
+                  </a:tcPr>
+                </a:tc>
+                <a:tc>
+                  <a:txBody>
+                    <a:bodyPr/>
+                    <a:p>
+                      <a:endParaRPr lang="en-US" sz="1600" dirty="0"/>
+                    </a:p>
+                  </a:txBody>
+                  <a:tcPr marL="82988" marR="82988" marT="41494" marB="41494">
+                    <a:lnL w="12700" cmpd="sng">
+                      <a:noFill/>
+                    </a:lnL>
+                    <a:lnR w="12700" cmpd="sng">
+                      <a:noFill/>
+                    </a:lnR>
+                    <a:lnT w="12700" cmpd="sng">
+                      <a:noFill/>
+                    </a:lnT>
+                    <a:lnB w="12700" cap="flat" cmpd="sng" algn="ctr">
+                      <a:solidFill>
+                        <a:schemeClr val="tx1"/>
+                      </a:solidFill>
+                      <a:prstDash val="solid"/>
+                      <a:round/>
+                      <a:headEnd type="none" w="med" len="med"/>
+                      <a:tailEnd type="none" w="med" len="med"/>
+                    </a:lnB>
+                    <a:lnTlToBr w="12700" cmpd="sng">
+                      <a:noFill/>
+                      <a:prstDash val="solid"/>
+                    </a:lnTlToBr>
+                    <a:lnBlToTr w="12700" cmpd="sng">
+                      <a:noFill/>
+                      <a:prstDash val="solid"/>
+                    </a:lnBlToTr>
+                    <a:noFill/>
+                  </a:tcPr>
+                </a:tc>
+              </a:tr>
+              <a:tr h="2406639">
+                <a:tc>
+                  <a:txBody>
+                    <a:bodyPr/>
+                    <a:p>
+                      <a:pPr algn="ctr"/>
+                      <a:r>
+                        <a:rPr lang="en-US" altLang="en-IN" sz="1600" dirty="0" smtClean="0">
+                          <a:solidFill>
+                            <a:schemeClr val="tx1"/>
+                          </a:solidFill>
+                          <a:latin typeface="Calibri" panose="020F0502020204030204" charset="0"/>
+                        </a:rPr>
+                        <a:t>Default Debug Pages</a:t>
+                      </a:r>
+                      <a:r>
+                        <a:rPr lang="en-IN" sz="1600" dirty="0" smtClean="0">
+                          <a:solidFill>
+                            <a:schemeClr val="tx1"/>
+                          </a:solidFill>
+                          <a:latin typeface="Calibri" panose="020F0502020204030204" charset="0"/>
+                        </a:rPr>
+                        <a:t> </a:t>
+                      </a:r>
+                      <a:r>
+                        <a:rPr lang="en-US" sz="1300" dirty="0" smtClean="0">
+                          <a:solidFill>
+                            <a:schemeClr val="tx1"/>
+                          </a:solidFill>
+                          <a:latin typeface="Calibri" panose="020F0502020204030204" charset="0"/>
+                        </a:rPr>
+                        <a:t>(Low)</a:t>
+                      </a:r>
+                      <a:endParaRPr lang="en-US" sz="1300" dirty="0">
+                        <a:solidFill>
+                          <a:schemeClr val="tx1"/>
+                        </a:solidFill>
+                        <a:latin typeface="Calibri" panose="020F0502020204030204" charset="0"/>
+                      </a:endParaRPr>
+                    </a:p>
+                  </a:txBody>
+                  <a:tcPr marL="82988" marR="82988" marT="41494" marB="41494" anchor="ctr">
+                    <a:lnL w="12700" cap="flat" cmpd="sng" algn="ctr">
+                      <a:solidFill>
+                        <a:schemeClr val="tx1"/>
+                      </a:solidFill>
+                      <a:prstDash val="solid"/>
+                      <a:round/>
+                      <a:headEnd type="none" w="med" len="med"/>
+                      <a:tailEnd type="none" w="med" len="med"/>
+                    </a:lnL>
+                    <a:lnR w="12700" cap="flat" cmpd="sng" algn="ctr">
+                      <a:solidFill>
+                        <a:schemeClr val="tx1"/>
+                      </a:solidFill>
+                      <a:prstDash val="solid"/>
+                      <a:round/>
+                      <a:headEnd type="none" w="med" len="med"/>
+                      <a:tailEnd type="none" w="med" len="med"/>
+                    </a:lnR>
+                    <a:lnT w="12700" cap="flat" cmpd="sng" algn="ctr">
+                      <a:solidFill>
+                        <a:schemeClr val="tx1"/>
+                      </a:solidFill>
+                      <a:prstDash val="solid"/>
+                      <a:round/>
+                      <a:headEnd type="none" w="med" len="med"/>
+                      <a:tailEnd type="none" w="med" len="med"/>
+                    </a:lnT>
+                    <a:lnB w="12700" cap="flat" cmpd="sng" algn="ctr">
+                      <a:solidFill>
+                        <a:schemeClr val="tx1"/>
+                      </a:solidFill>
+                      <a:prstDash val="solid"/>
+                      <a:round/>
+                      <a:headEnd type="none" w="med" len="med"/>
+                      <a:tailEnd type="none" w="med" len="med"/>
+                    </a:lnB>
+                    <a:solidFill>
+                      <a:srgbClr val="92D050"/>
+                    </a:solidFill>
+                  </a:tcPr>
+                </a:tc>
+                <a:tc>
+                  <a:txBody>
+                    <a:bodyPr/>
+                    <a:p>
+                      <a:r>
+                        <a:rPr lang="en-US" sz="1300" dirty="0" smtClean="0">
+                          <a:solidFill>
+                            <a:schemeClr val="tx1"/>
+                          </a:solidFill>
+                          <a:latin typeface="Calibri" panose="020F0502020204030204" charset="0"/>
+                        </a:rPr>
+                        <a:t> </a:t>
+                      </a:r>
+                      <a:endParaRPr lang="en-US" sz="1300" dirty="0">
+                        <a:solidFill>
+                          <a:schemeClr val="tx1"/>
+                        </a:solidFill>
+                        <a:latin typeface="Calibri" panose="020F0502020204030204" charset="0"/>
+                      </a:endParaRPr>
+                    </a:p>
+                    <a:p>
+                      <a:r>
+                        <a:rPr lang="en-US" sz="1300" baseline="0" dirty="0" smtClean="0">
+                          <a:solidFill>
+                            <a:schemeClr val="tx1"/>
+                          </a:solidFill>
+                          <a:latin typeface="Calibri" panose="020F0502020204030204" charset="0"/>
+                        </a:rPr>
+                        <a:t>Below mentioned </a:t>
+                      </a:r>
+                      <a:r>
+                        <a:rPr lang="en-US" sz="1300" baseline="0" dirty="0" err="1" smtClean="0">
+                          <a:solidFill>
+                            <a:schemeClr val="tx1"/>
+                          </a:solidFill>
+                          <a:latin typeface="Calibri" panose="020F0502020204030204" charset="0"/>
+                        </a:rPr>
+                        <a:t>urls</a:t>
+                      </a:r>
+                      <a:r>
+                        <a:rPr lang="en-US" sz="1300" baseline="0" dirty="0" smtClean="0">
+                          <a:solidFill>
+                            <a:schemeClr val="tx1"/>
+                          </a:solidFill>
+                          <a:latin typeface="Calibri" panose="020F0502020204030204" charset="0"/>
+                        </a:rPr>
+                        <a:t> have improper server side filter</a:t>
+                      </a:r>
+                      <a:endParaRPr lang="en-US" sz="1300" dirty="0" smtClean="0">
+                        <a:solidFill>
+                          <a:schemeClr val="tx1"/>
+                        </a:solidFill>
+                        <a:latin typeface="Calibri" panose="020F0502020204030204" charset="0"/>
+                        <a:cs typeface="Calibri" panose="020F0502020204030204" charset="0"/>
+                      </a:endParaRPr>
+                    </a:p>
+                    <a:p>
+                      <a:endParaRPr lang="en-US" sz="1300" dirty="0" smtClean="0">
+                        <a:solidFill>
+                          <a:schemeClr val="tx1"/>
+                        </a:solidFill>
+                        <a:latin typeface="Calibri" panose="020F0502020204030204" charset="0"/>
+                      </a:endParaRPr>
+                    </a:p>
+                    <a:p>
+                      <a:r>
+                        <a:rPr lang="en-US" sz="1300" b="1" dirty="0" smtClean="0">
+                          <a:solidFill>
+                            <a:schemeClr val="tx1"/>
+                          </a:solidFill>
+                          <a:latin typeface="Calibri" panose="020F0502020204030204" charset="0"/>
+                        </a:rPr>
+                        <a:t>Affected URL :</a:t>
+                      </a:r>
+                      <a:endParaRPr lang="en-US" sz="1300" b="0" i="0" u="none" strike="noStrike" dirty="0" smtClean="0">
+                        <a:solidFill>
+                          <a:schemeClr val="tx1"/>
+                        </a:solidFill>
+                        <a:effectLst/>
+                        <a:latin typeface="Calibri" panose="020F0502020204030204" charset="0"/>
+                        <a:ea typeface="+mn-ea"/>
+                        <a:cs typeface="+mn-cs"/>
+                        <a:sym typeface="Arial" panose="020B0604020202020204"/>
+                      </a:endParaRPr>
+                    </a:p>
+                    <a:p>
+                      <a:pPr marL="285750" indent="-285750">
+                        <a:buFont typeface="Arial" panose="020B0604020202020204" pitchFamily="34" charset="0"/>
+                        <a:buChar char="•"/>
+                      </a:pPr>
+                      <a:r>
+                        <a:rPr lang="en-US" sz="1300" b="0" i="0" u="none" strike="noStrike" dirty="0" smtClean="0">
+                          <a:solidFill>
+                            <a:schemeClr val="dk1"/>
+                          </a:solidFill>
+                          <a:effectLst/>
+                          <a:latin typeface="Calibri" panose="020F0502020204030204" charset="0"/>
+                          <a:ea typeface="+mn-ea"/>
+                          <a:cs typeface="Calibri" panose="020F0502020204030204" charset="0"/>
+                          <a:sym typeface="Arial" panose="020B0604020202020204"/>
+                        </a:rPr>
+                        <a:t>http://35.154.118.58/</a:t>
+                      </a:r>
+                      <a:endParaRPr lang="en-US" sz="1300" b="0" i="0" u="none" strike="noStrike" dirty="0" smtClean="0">
+                        <a:solidFill>
+                          <a:schemeClr val="dk1"/>
+                        </a:solidFill>
+                        <a:effectLst/>
+                        <a:latin typeface="Calibri" panose="020F0502020204030204" charset="0"/>
+                        <a:ea typeface="+mn-ea"/>
+                        <a:cs typeface="Calibri" panose="020F0502020204030204" charset="0"/>
+                        <a:sym typeface="Arial" panose="020B0604020202020204"/>
+                      </a:endParaRPr>
+                    </a:p>
+                    <a:p>
+                      <a:pPr marL="0" indent="0">
+                        <a:buFont typeface="Arial" panose="020B0604020202020204" pitchFamily="34" charset="0"/>
+                        <a:buNone/>
+                      </a:pPr>
+                      <a:endParaRPr lang="en-US" sz="1300" b="0" dirty="0" smtClean="0">
+                        <a:solidFill>
+                          <a:schemeClr val="tx1"/>
+                        </a:solidFill>
+                        <a:latin typeface="Calibri" panose="020F0502020204030204" charset="0"/>
+                      </a:endParaRPr>
+                    </a:p>
+                    <a:p>
+                      <a:pPr marL="285750" indent="-285750">
+                        <a:buFont typeface="Arial" panose="020B0604020202020204" pitchFamily="34" charset="0"/>
+                        <a:buChar char="•"/>
+                      </a:pPr>
+                      <a:endParaRPr lang="en-US" sz="1300" b="0" dirty="0" smtClean="0">
+                        <a:solidFill>
+                          <a:schemeClr val="tx1"/>
+                        </a:solidFill>
+                        <a:latin typeface="Calibri" panose="020F0502020204030204" charset="0"/>
+                      </a:endParaRPr>
+                    </a:p>
+                    <a:p>
+                      <a:pPr indent="0">
+                        <a:buFont typeface="Arial" panose="020B0604020202020204" pitchFamily="34" charset="0"/>
+                        <a:buNone/>
+                      </a:pPr>
+                      <a:r>
+                        <a:rPr lang="en-US" sz="1300" b="0" dirty="0">
+                          <a:solidFill>
+                            <a:schemeClr val="tx1"/>
+                          </a:solidFill>
+                          <a:latin typeface="Calibri" panose="020F0502020204030204" charset="0"/>
+                        </a:rPr>
+                        <a:t>Default pages available:</a:t>
+                      </a:r>
+                      <a:endParaRPr lang="en-US" sz="1300" b="0" dirty="0">
+                        <a:solidFill>
+                          <a:schemeClr val="tx1"/>
+                        </a:solidFill>
+                        <a:latin typeface="Calibri" panose="020F0502020204030204" charset="0"/>
+                      </a:endParaRPr>
+                    </a:p>
+                    <a:p>
+                      <a:pPr marL="285750" indent="-285750">
+                        <a:buFont typeface="Arial" panose="020B0604020202020204" pitchFamily="34" charset="0"/>
+                        <a:buChar char="•"/>
+                      </a:pPr>
+                      <a:r>
+                        <a:rPr lang="en-US" sz="1300" b="0" dirty="0">
+                          <a:solidFill>
+                            <a:schemeClr val="tx1"/>
+                          </a:solidFill>
+                          <a:latin typeface="Calibri" panose="020F0502020204030204" charset="0"/>
+                        </a:rPr>
+                        <a:t>robots.txt</a:t>
+                      </a:r>
+                      <a:endParaRPr lang="en-US" sz="1300" b="0" dirty="0">
+                        <a:solidFill>
+                          <a:schemeClr val="tx1"/>
+                        </a:solidFill>
+                        <a:latin typeface="Calibri" panose="020F0502020204030204" charset="0"/>
+                      </a:endParaRPr>
+                    </a:p>
+                    <a:p>
+                      <a:pPr marL="285750" indent="-285750">
+                        <a:buFont typeface="Arial" panose="020B0604020202020204" pitchFamily="34" charset="0"/>
+                        <a:buChar char="•"/>
+                      </a:pPr>
+                      <a:r>
+                        <a:rPr lang="en-US" sz="1300" b="0" dirty="0">
+                          <a:solidFill>
+                            <a:schemeClr val="tx1"/>
+                          </a:solidFill>
+                          <a:latin typeface="Calibri" panose="020F0502020204030204" charset="0"/>
+                        </a:rPr>
+                        <a:t>sever-status</a:t>
+                      </a:r>
+                      <a:endParaRPr lang="en-US" sz="1300" b="0" dirty="0">
+                        <a:solidFill>
+                          <a:schemeClr val="tx1"/>
+                        </a:solidFill>
+                        <a:latin typeface="Calibri" panose="020F0502020204030204" charset="0"/>
+                      </a:endParaRPr>
+                    </a:p>
+                    <a:p>
+                      <a:pPr marL="285750" indent="-285750">
+                        <a:buFont typeface="Arial" panose="020B0604020202020204" pitchFamily="34" charset="0"/>
+                        <a:buChar char="•"/>
+                      </a:pPr>
+                      <a:r>
+                        <a:rPr lang="en-US" sz="1300" b="0" dirty="0">
+                          <a:solidFill>
+                            <a:schemeClr val="tx1"/>
+                          </a:solidFill>
+                          <a:latin typeface="Calibri" panose="020F0502020204030204" charset="0"/>
+                        </a:rPr>
+                        <a:t>phpinfo.php</a:t>
+                      </a:r>
+                      <a:endParaRPr lang="en-US" sz="1300" b="0" dirty="0">
+                        <a:solidFill>
+                          <a:schemeClr val="tx1"/>
+                        </a:solidFill>
+                        <a:latin typeface="Calibri" panose="020F0502020204030204" charset="0"/>
+                      </a:endParaRPr>
+                    </a:p>
+                    <a:p>
+                      <a:pPr marL="285750" indent="-285750">
+                        <a:buFont typeface="Arial" panose="020B0604020202020204" pitchFamily="34" charset="0"/>
+                        <a:buChar char="•"/>
+                      </a:pPr>
+                      <a:r>
+                        <a:rPr lang="en-US" sz="1300" b="0" dirty="0">
+                          <a:solidFill>
+                            <a:schemeClr val="tx1"/>
+                          </a:solidFill>
+                          <a:latin typeface="Calibri" panose="020F0502020204030204" charset="0"/>
+                        </a:rPr>
+                        <a:t>userlist.txt</a:t>
+                      </a:r>
+                      <a:endParaRPr lang="en-US" sz="1300" b="0" dirty="0">
+                        <a:solidFill>
+                          <a:schemeClr val="tx1"/>
+                        </a:solidFill>
+                        <a:latin typeface="Calibri" panose="020F0502020204030204" charset="0"/>
+                      </a:endParaRPr>
+                    </a:p>
+                  </a:txBody>
+                  <a:tcPr marL="82988" marR="82988" marT="41494" marB="41494">
+                    <a:lnL w="12700" cap="flat" cmpd="sng" algn="ctr">
+                      <a:solidFill>
+                        <a:schemeClr val="tx1"/>
+                      </a:solidFill>
+                      <a:prstDash val="solid"/>
+                      <a:round/>
+                      <a:headEnd type="none" w="med" len="med"/>
+                      <a:tailEnd type="none" w="med" len="med"/>
+                    </a:lnL>
+                    <a:lnR w="12700" cap="flat" cmpd="sng" algn="ctr">
+                      <a:solidFill>
+                        <a:schemeClr val="tx1"/>
+                      </a:solidFill>
+                      <a:prstDash val="solid"/>
+                      <a:round/>
+                      <a:headEnd type="none" w="med" len="med"/>
+                      <a:tailEnd type="none" w="med" len="med"/>
+                    </a:lnR>
+                    <a:lnT w="12700" cap="flat" cmpd="sng" algn="ctr">
+                      <a:solidFill>
+                        <a:schemeClr val="tx1"/>
+                      </a:solidFill>
+                      <a:prstDash val="solid"/>
+                      <a:round/>
+                      <a:headEnd type="none" w="med" len="med"/>
+                      <a:tailEnd type="none" w="med" len="med"/>
+                    </a:lnT>
+                    <a:lnB w="12700" cap="flat" cmpd="sng" algn="ctr">
+                      <a:solidFill>
+                        <a:schemeClr val="tx1"/>
+                      </a:solidFill>
+                      <a:prstDash val="solid"/>
+                      <a:round/>
+                      <a:headEnd type="none" w="med" len="med"/>
+                      <a:tailEnd type="none" w="med" len="med"/>
+                    </a:lnB>
+                    <a:solidFill>
+                      <a:schemeClr val="bg1"/>
+                    </a:solidFill>
+                  </a:tcPr>
+                </a:tc>
+              </a:tr>
+            </a:tbl>
+          </a:graphicData>
+        </a:graphic>
+      </p:graphicFrame>
     </p:spTree>
   </p:cSld>
   <p:clrMapOvr>
@@ -6774,547 +6802,6 @@
           <a:bodyPr/>
           <a:p>
             <a:r>
-              <a:rPr lang="en-US"/>
-              <a:t>18.</a:t>
-            </a:r>
-            <a:r>
-              <a:rPr lang="en-US" u="sng">
-                <a:solidFill>
-                  <a:schemeClr val="accent1"/>
-                </a:solidFill>
-                <a:effectLst>
-                  <a:outerShdw blurRad="38100" dist="25400" dir="5400000" algn="ctr" rotWithShape="0">
-                    <a:srgbClr val="6E747A">
-                      <a:alpha val="43000"/>
-                    </a:srgbClr>
-                  </a:outerShdw>
-                </a:effectLst>
-              </a:rPr>
-              <a:t>Default Debug Pages</a:t>
-            </a:r>
-            <a:endParaRPr lang="en-US" u="sng">
-              <a:solidFill>
-                <a:schemeClr val="accent1"/>
-              </a:solidFill>
-              <a:effectLst>
-                <a:outerShdw blurRad="38100" dist="25400" dir="5400000" algn="ctr" rotWithShape="0">
-                  <a:srgbClr val="6E747A">
-                    <a:alpha val="43000"/>
-                  </a:srgbClr>
-                </a:outerShdw>
-              </a:effectLst>
-            </a:endParaRPr>
-          </a:p>
-        </p:txBody>
-      </p:sp>
-      <p:graphicFrame>
-        <p:nvGraphicFramePr>
-          <p:cNvPr id="6" name="Content Placeholder 5"/>
-          <p:cNvGraphicFramePr>
-            <a:graphicFrameLocks noGrp="1"/>
-          </p:cNvGraphicFramePr>
-          <p:nvPr>
-            <p:ph idx="1"/>
-          </p:nvPr>
-        </p:nvGraphicFramePr>
-        <p:xfrm>
-          <a:off x="838200" y="1825625"/>
-          <a:ext cx="10515600" cy="2821940"/>
-        </p:xfrm>
-        <a:graphic>
-          <a:graphicData uri="http://schemas.openxmlformats.org/drawingml/2006/table">
-            <a:tbl>
-              <a:tblPr firstRow="1" bandRow="1">
-                <a:tableStyleId>{5C22544A-7EE6-4342-B048-85BDC9FD1C3A}</a:tableStyleId>
-              </a:tblPr>
-              <a:tblGrid>
-                <a:gridCol w="1832610"/>
-                <a:gridCol w="8682990"/>
-              </a:tblGrid>
-              <a:tr h="415290">
-                <a:tc>
-                  <a:txBody>
-                    <a:bodyPr/>
-                    <a:p>
-                      <a:pPr algn="ctr"/>
-                      <a:endParaRPr lang="en-US" sz="1600" dirty="0"/>
-                    </a:p>
-                  </a:txBody>
-                  <a:tcPr marL="82988" marR="82988" marT="41494" marB="41494">
-                    <a:lnL w="12700" cmpd="sng">
-                      <a:noFill/>
-                    </a:lnL>
-                    <a:lnR w="12700" cmpd="sng">
-                      <a:noFill/>
-                    </a:lnR>
-                    <a:lnT w="12700" cmpd="sng">
-                      <a:noFill/>
-                    </a:lnT>
-                    <a:lnB w="12700" cap="flat" cmpd="sng" algn="ctr">
-                      <a:solidFill>
-                        <a:schemeClr val="tx1"/>
-                      </a:solidFill>
-                      <a:prstDash val="solid"/>
-                      <a:round/>
-                      <a:headEnd type="none" w="med" len="med"/>
-                      <a:tailEnd type="none" w="med" len="med"/>
-                    </a:lnB>
-                    <a:lnTlToBr w="12700" cmpd="sng">
-                      <a:noFill/>
-                      <a:prstDash val="solid"/>
-                    </a:lnTlToBr>
-                    <a:lnBlToTr w="12700" cmpd="sng">
-                      <a:noFill/>
-                      <a:prstDash val="solid"/>
-                    </a:lnBlToTr>
-                    <a:noFill/>
-                  </a:tcPr>
-                </a:tc>
-                <a:tc>
-                  <a:txBody>
-                    <a:bodyPr/>
-                    <a:p>
-                      <a:endParaRPr lang="en-US" sz="1600" dirty="0"/>
-                    </a:p>
-                  </a:txBody>
-                  <a:tcPr marL="82988" marR="82988" marT="41494" marB="41494">
-                    <a:lnL w="12700" cmpd="sng">
-                      <a:noFill/>
-                    </a:lnL>
-                    <a:lnR w="12700" cmpd="sng">
-                      <a:noFill/>
-                    </a:lnR>
-                    <a:lnT w="12700" cmpd="sng">
-                      <a:noFill/>
-                    </a:lnT>
-                    <a:lnB w="12700" cap="flat" cmpd="sng" algn="ctr">
-                      <a:solidFill>
-                        <a:schemeClr val="tx1"/>
-                      </a:solidFill>
-                      <a:prstDash val="solid"/>
-                      <a:round/>
-                      <a:headEnd type="none" w="med" len="med"/>
-                      <a:tailEnd type="none" w="med" len="med"/>
-                    </a:lnB>
-                    <a:lnTlToBr w="12700" cmpd="sng">
-                      <a:noFill/>
-                      <a:prstDash val="solid"/>
-                    </a:lnTlToBr>
-                    <a:lnBlToTr w="12700" cmpd="sng">
-                      <a:noFill/>
-                      <a:prstDash val="solid"/>
-                    </a:lnBlToTr>
-                    <a:noFill/>
-                  </a:tcPr>
-                </a:tc>
-              </a:tr>
-              <a:tr h="2406639">
-                <a:tc>
-                  <a:txBody>
-                    <a:bodyPr/>
-                    <a:p>
-                      <a:pPr algn="ctr"/>
-                      <a:r>
-                        <a:rPr lang="en-US" altLang="en-IN" sz="1600" dirty="0" smtClean="0">
-                          <a:solidFill>
-                            <a:schemeClr val="tx1"/>
-                          </a:solidFill>
-                          <a:latin typeface="Calibri" panose="020F0502020204030204" charset="0"/>
-                        </a:rPr>
-                        <a:t>Default Debug Pages</a:t>
-                      </a:r>
-                      <a:r>
-                        <a:rPr lang="en-IN" sz="1600" dirty="0" smtClean="0">
-                          <a:solidFill>
-                            <a:schemeClr val="tx1"/>
-                          </a:solidFill>
-                          <a:latin typeface="Calibri" panose="020F0502020204030204" charset="0"/>
-                        </a:rPr>
-                        <a:t> </a:t>
-                      </a:r>
-                      <a:r>
-                        <a:rPr lang="en-US" sz="1300" dirty="0" smtClean="0">
-                          <a:solidFill>
-                            <a:schemeClr val="tx1"/>
-                          </a:solidFill>
-                          <a:latin typeface="Calibri" panose="020F0502020204030204" charset="0"/>
-                        </a:rPr>
-                        <a:t>(Low)</a:t>
-                      </a:r>
-                      <a:endParaRPr lang="en-US" sz="1300" dirty="0">
-                        <a:solidFill>
-                          <a:schemeClr val="tx1"/>
-                        </a:solidFill>
-                        <a:latin typeface="Calibri" panose="020F0502020204030204" charset="0"/>
-                      </a:endParaRPr>
-                    </a:p>
-                  </a:txBody>
-                  <a:tcPr marL="82988" marR="82988" marT="41494" marB="41494" anchor="ctr">
-                    <a:lnL w="12700" cap="flat" cmpd="sng" algn="ctr">
-                      <a:solidFill>
-                        <a:schemeClr val="tx1"/>
-                      </a:solidFill>
-                      <a:prstDash val="solid"/>
-                      <a:round/>
-                      <a:headEnd type="none" w="med" len="med"/>
-                      <a:tailEnd type="none" w="med" len="med"/>
-                    </a:lnL>
-                    <a:lnR w="12700" cap="flat" cmpd="sng" algn="ctr">
-                      <a:solidFill>
-                        <a:schemeClr val="tx1"/>
-                      </a:solidFill>
-                      <a:prstDash val="solid"/>
-                      <a:round/>
-                      <a:headEnd type="none" w="med" len="med"/>
-                      <a:tailEnd type="none" w="med" len="med"/>
-                    </a:lnR>
-                    <a:lnT w="12700" cap="flat" cmpd="sng" algn="ctr">
-                      <a:solidFill>
-                        <a:schemeClr val="tx1"/>
-                      </a:solidFill>
-                      <a:prstDash val="solid"/>
-                      <a:round/>
-                      <a:headEnd type="none" w="med" len="med"/>
-                      <a:tailEnd type="none" w="med" len="med"/>
-                    </a:lnT>
-                    <a:lnB w="12700" cap="flat" cmpd="sng" algn="ctr">
-                      <a:solidFill>
-                        <a:schemeClr val="tx1"/>
-                      </a:solidFill>
-                      <a:prstDash val="solid"/>
-                      <a:round/>
-                      <a:headEnd type="none" w="med" len="med"/>
-                      <a:tailEnd type="none" w="med" len="med"/>
-                    </a:lnB>
-                    <a:solidFill>
-                      <a:srgbClr val="92D050"/>
-                    </a:solidFill>
-                  </a:tcPr>
-                </a:tc>
-                <a:tc>
-                  <a:txBody>
-                    <a:bodyPr/>
-                    <a:p>
-                      <a:r>
-                        <a:rPr lang="en-US" sz="1300" dirty="0" smtClean="0">
-                          <a:solidFill>
-                            <a:schemeClr val="tx1"/>
-                          </a:solidFill>
-                          <a:latin typeface="Calibri" panose="020F0502020204030204" charset="0"/>
-                        </a:rPr>
-                        <a:t> </a:t>
-                      </a:r>
-                      <a:endParaRPr lang="en-US" sz="1300" dirty="0">
-                        <a:solidFill>
-                          <a:schemeClr val="tx1"/>
-                        </a:solidFill>
-                        <a:latin typeface="Calibri" panose="020F0502020204030204" charset="0"/>
-                      </a:endParaRPr>
-                    </a:p>
-                    <a:p>
-                      <a:r>
-                        <a:rPr lang="en-US" sz="1300" baseline="0" dirty="0" smtClean="0">
-                          <a:solidFill>
-                            <a:schemeClr val="tx1"/>
-                          </a:solidFill>
-                          <a:latin typeface="Calibri" panose="020F0502020204030204" charset="0"/>
-                        </a:rPr>
-                        <a:t>Below mentioned </a:t>
-                      </a:r>
-                      <a:r>
-                        <a:rPr lang="en-US" sz="1300" baseline="0" dirty="0" err="1" smtClean="0">
-                          <a:solidFill>
-                            <a:schemeClr val="tx1"/>
-                          </a:solidFill>
-                          <a:latin typeface="Calibri" panose="020F0502020204030204" charset="0"/>
-                        </a:rPr>
-                        <a:t>urls</a:t>
-                      </a:r>
-                      <a:r>
-                        <a:rPr lang="en-US" sz="1300" baseline="0" dirty="0" smtClean="0">
-                          <a:solidFill>
-                            <a:schemeClr val="tx1"/>
-                          </a:solidFill>
-                          <a:latin typeface="Calibri" panose="020F0502020204030204" charset="0"/>
-                        </a:rPr>
-                        <a:t> have improper server side filter</a:t>
-                      </a:r>
-                      <a:endParaRPr lang="en-US" sz="1300" dirty="0" smtClean="0">
-                        <a:solidFill>
-                          <a:schemeClr val="tx1"/>
-                        </a:solidFill>
-                        <a:latin typeface="Calibri" panose="020F0502020204030204" charset="0"/>
-                        <a:cs typeface="Calibri" panose="020F0502020204030204" charset="0"/>
-                      </a:endParaRPr>
-                    </a:p>
-                    <a:p>
-                      <a:endParaRPr lang="en-US" sz="1300" dirty="0" smtClean="0">
-                        <a:solidFill>
-                          <a:schemeClr val="tx1"/>
-                        </a:solidFill>
-                        <a:latin typeface="Calibri" panose="020F0502020204030204" charset="0"/>
-                      </a:endParaRPr>
-                    </a:p>
-                    <a:p>
-                      <a:r>
-                        <a:rPr lang="en-US" sz="1300" b="1" dirty="0" smtClean="0">
-                          <a:solidFill>
-                            <a:schemeClr val="tx1"/>
-                          </a:solidFill>
-                          <a:latin typeface="Calibri" panose="020F0502020204030204" charset="0"/>
-                        </a:rPr>
-                        <a:t>Affected URL :</a:t>
-                      </a:r>
-                      <a:endParaRPr lang="en-US" sz="1300" b="0" i="0" u="none" strike="noStrike" dirty="0" smtClean="0">
-                        <a:solidFill>
-                          <a:schemeClr val="tx1"/>
-                        </a:solidFill>
-                        <a:effectLst/>
-                        <a:latin typeface="Calibri" panose="020F0502020204030204" charset="0"/>
-                        <a:ea typeface="+mn-ea"/>
-                        <a:cs typeface="+mn-cs"/>
-                        <a:sym typeface="Arial" panose="020B0604020202020204"/>
-                      </a:endParaRPr>
-                    </a:p>
-                    <a:p>
-                      <a:pPr marL="285750" indent="-285750">
-                        <a:buFont typeface="Arial" panose="020B0604020202020204" pitchFamily="34" charset="0"/>
-                        <a:buChar char="•"/>
-                      </a:pPr>
-                      <a:r>
-                        <a:rPr lang="en-US" sz="1300" b="0" i="0" u="none" strike="noStrike" dirty="0" smtClean="0">
-                          <a:solidFill>
-                            <a:schemeClr val="dk1"/>
-                          </a:solidFill>
-                          <a:effectLst/>
-                          <a:latin typeface="Calibri" panose="020F0502020204030204" charset="0"/>
-                          <a:ea typeface="+mn-ea"/>
-                          <a:cs typeface="Calibri" panose="020F0502020204030204" charset="0"/>
-                          <a:sym typeface="Arial" panose="020B0604020202020204"/>
-                        </a:rPr>
-                        <a:t>http://35.154.118.58/</a:t>
-                      </a:r>
-                      <a:endParaRPr lang="en-US" sz="1300" b="0" i="0" u="none" strike="noStrike" dirty="0" smtClean="0">
-                        <a:solidFill>
-                          <a:schemeClr val="dk1"/>
-                        </a:solidFill>
-                        <a:effectLst/>
-                        <a:latin typeface="Calibri" panose="020F0502020204030204" charset="0"/>
-                        <a:ea typeface="+mn-ea"/>
-                        <a:cs typeface="Calibri" panose="020F0502020204030204" charset="0"/>
-                        <a:sym typeface="Arial" panose="020B0604020202020204"/>
-                      </a:endParaRPr>
-                    </a:p>
-                    <a:p>
-                      <a:pPr marL="0" indent="0">
-                        <a:buFont typeface="Arial" panose="020B0604020202020204" pitchFamily="34" charset="0"/>
-                        <a:buNone/>
-                      </a:pPr>
-                      <a:endParaRPr lang="en-US" sz="1300" b="0" dirty="0" smtClean="0">
-                        <a:solidFill>
-                          <a:schemeClr val="tx1"/>
-                        </a:solidFill>
-                        <a:latin typeface="Calibri" panose="020F0502020204030204" charset="0"/>
-                      </a:endParaRPr>
-                    </a:p>
-                    <a:p>
-                      <a:pPr marL="285750" indent="-285750">
-                        <a:buFont typeface="Arial" panose="020B0604020202020204" pitchFamily="34" charset="0"/>
-                        <a:buChar char="•"/>
-                      </a:pPr>
-                      <a:endParaRPr lang="en-US" sz="1300" b="0" dirty="0" smtClean="0">
-                        <a:solidFill>
-                          <a:schemeClr val="tx1"/>
-                        </a:solidFill>
-                        <a:latin typeface="Calibri" panose="020F0502020204030204" charset="0"/>
-                      </a:endParaRPr>
-                    </a:p>
-                    <a:p>
-                      <a:pPr indent="0">
-                        <a:buFont typeface="Arial" panose="020B0604020202020204" pitchFamily="34" charset="0"/>
-                        <a:buNone/>
-                      </a:pPr>
-                      <a:r>
-                        <a:rPr lang="en-US" sz="1300" b="0" dirty="0">
-                          <a:solidFill>
-                            <a:schemeClr val="tx1"/>
-                          </a:solidFill>
-                          <a:latin typeface="Calibri" panose="020F0502020204030204" charset="0"/>
-                        </a:rPr>
-                        <a:t>Default pages available:</a:t>
-                      </a:r>
-                      <a:endParaRPr lang="en-US" sz="1300" b="0" dirty="0">
-                        <a:solidFill>
-                          <a:schemeClr val="tx1"/>
-                        </a:solidFill>
-                        <a:latin typeface="Calibri" panose="020F0502020204030204" charset="0"/>
-                      </a:endParaRPr>
-                    </a:p>
-                    <a:p>
-                      <a:pPr marL="285750" indent="-285750">
-                        <a:buFont typeface="Arial" panose="020B0604020202020204" pitchFamily="34" charset="0"/>
-                        <a:buChar char="•"/>
-                      </a:pPr>
-                      <a:r>
-                        <a:rPr lang="en-US" sz="1300" b="0" dirty="0">
-                          <a:solidFill>
-                            <a:schemeClr val="tx1"/>
-                          </a:solidFill>
-                          <a:latin typeface="Calibri" panose="020F0502020204030204" charset="0"/>
-                        </a:rPr>
-                        <a:t>robots.txt</a:t>
-                      </a:r>
-                      <a:endParaRPr lang="en-US" sz="1300" b="0" dirty="0">
-                        <a:solidFill>
-                          <a:schemeClr val="tx1"/>
-                        </a:solidFill>
-                        <a:latin typeface="Calibri" panose="020F0502020204030204" charset="0"/>
-                      </a:endParaRPr>
-                    </a:p>
-                    <a:p>
-                      <a:pPr marL="285750" indent="-285750">
-                        <a:buFont typeface="Arial" panose="020B0604020202020204" pitchFamily="34" charset="0"/>
-                        <a:buChar char="•"/>
-                      </a:pPr>
-                      <a:r>
-                        <a:rPr lang="en-US" sz="1300" b="0" dirty="0">
-                          <a:solidFill>
-                            <a:schemeClr val="tx1"/>
-                          </a:solidFill>
-                          <a:latin typeface="Calibri" panose="020F0502020204030204" charset="0"/>
-                        </a:rPr>
-                        <a:t>sever-status</a:t>
-                      </a:r>
-                      <a:endParaRPr lang="en-US" sz="1300" b="0" dirty="0">
-                        <a:solidFill>
-                          <a:schemeClr val="tx1"/>
-                        </a:solidFill>
-                        <a:latin typeface="Calibri" panose="020F0502020204030204" charset="0"/>
-                      </a:endParaRPr>
-                    </a:p>
-                    <a:p>
-                      <a:pPr marL="285750" indent="-285750">
-                        <a:buFont typeface="Arial" panose="020B0604020202020204" pitchFamily="34" charset="0"/>
-                        <a:buChar char="•"/>
-                      </a:pPr>
-                      <a:r>
-                        <a:rPr lang="en-US" sz="1300" b="0" dirty="0">
-                          <a:solidFill>
-                            <a:schemeClr val="tx1"/>
-                          </a:solidFill>
-                          <a:latin typeface="Calibri" panose="020F0502020204030204" charset="0"/>
-                        </a:rPr>
-                        <a:t>phpinfo.php</a:t>
-                      </a:r>
-                      <a:endParaRPr lang="en-US" sz="1300" b="0" dirty="0">
-                        <a:solidFill>
-                          <a:schemeClr val="tx1"/>
-                        </a:solidFill>
-                        <a:latin typeface="Calibri" panose="020F0502020204030204" charset="0"/>
-                      </a:endParaRPr>
-                    </a:p>
-                    <a:p>
-                      <a:pPr marL="285750" indent="-285750">
-                        <a:buFont typeface="Arial" panose="020B0604020202020204" pitchFamily="34" charset="0"/>
-                        <a:buChar char="•"/>
-                      </a:pPr>
-                      <a:r>
-                        <a:rPr lang="en-US" sz="1300" b="0" dirty="0">
-                          <a:solidFill>
-                            <a:schemeClr val="tx1"/>
-                          </a:solidFill>
-                          <a:latin typeface="Calibri" panose="020F0502020204030204" charset="0"/>
-                        </a:rPr>
-                        <a:t>userlist.txt</a:t>
-                      </a:r>
-                      <a:endParaRPr lang="en-US" sz="1300" b="0" dirty="0">
-                        <a:solidFill>
-                          <a:schemeClr val="tx1"/>
-                        </a:solidFill>
-                        <a:latin typeface="Calibri" panose="020F0502020204030204" charset="0"/>
-                      </a:endParaRPr>
-                    </a:p>
-                  </a:txBody>
-                  <a:tcPr marL="82988" marR="82988" marT="41494" marB="41494">
-                    <a:lnL w="12700" cap="flat" cmpd="sng" algn="ctr">
-                      <a:solidFill>
-                        <a:schemeClr val="tx1"/>
-                      </a:solidFill>
-                      <a:prstDash val="solid"/>
-                      <a:round/>
-                      <a:headEnd type="none" w="med" len="med"/>
-                      <a:tailEnd type="none" w="med" len="med"/>
-                    </a:lnL>
-                    <a:lnR w="12700" cap="flat" cmpd="sng" algn="ctr">
-                      <a:solidFill>
-                        <a:schemeClr val="tx1"/>
-                      </a:solidFill>
-                      <a:prstDash val="solid"/>
-                      <a:round/>
-                      <a:headEnd type="none" w="med" len="med"/>
-                      <a:tailEnd type="none" w="med" len="med"/>
-                    </a:lnR>
-                    <a:lnT w="12700" cap="flat" cmpd="sng" algn="ctr">
-                      <a:solidFill>
-                        <a:schemeClr val="tx1"/>
-                      </a:solidFill>
-                      <a:prstDash val="solid"/>
-                      <a:round/>
-                      <a:headEnd type="none" w="med" len="med"/>
-                      <a:tailEnd type="none" w="med" len="med"/>
-                    </a:lnT>
-                    <a:lnB w="12700" cap="flat" cmpd="sng" algn="ctr">
-                      <a:solidFill>
-                        <a:schemeClr val="tx1"/>
-                      </a:solidFill>
-                      <a:prstDash val="solid"/>
-                      <a:round/>
-                      <a:headEnd type="none" w="med" len="med"/>
-                      <a:tailEnd type="none" w="med" len="med"/>
-                    </a:lnB>
-                    <a:solidFill>
-                      <a:schemeClr val="bg1"/>
-                    </a:solidFill>
-                  </a:tcPr>
-                </a:tc>
-              </a:tr>
-            </a:tbl>
-          </a:graphicData>
-        </a:graphic>
-      </p:graphicFrame>
-    </p:spTree>
-  </p:cSld>
-  <p:clrMapOvr>
-    <a:masterClrMapping/>
-  </p:clrMapOvr>
-</p:sld>
-</file>
-
-<file path=ppt/slides/slide111.xml><?xml version="1.0" encoding="utf-8"?>
-<p:sld xmlns:a="http://schemas.openxmlformats.org/drawingml/2006/main" xmlns:r="http://schemas.openxmlformats.org/officeDocument/2006/relationships" xmlns:p="http://schemas.openxmlformats.org/presentationml/2006/main">
-  <p:cSld>
-    <p:spTree>
-      <p:nvGrpSpPr>
-        <p:cNvPr id="1" name=""/>
-        <p:cNvGrpSpPr/>
-        <p:nvPr/>
-      </p:nvGrpSpPr>
-      <p:grpSpPr/>
-      <p:sp>
-        <p:nvSpPr>
-          <p:cNvPr id="2" name="Title 1"/>
-          <p:cNvSpPr>
-            <a:spLocks noGrp="1"/>
-          </p:cNvSpPr>
-          <p:nvPr>
-            <p:ph type="title"/>
-          </p:nvPr>
-        </p:nvSpPr>
-        <p:spPr/>
-        <p:txBody>
-          <a:bodyPr/>
-          <a:p>
-            <a:r>
               <a:rPr lang="en-US" u="sng">
                 <a:ln w="22225">
                   <a:solidFill>
@@ -7400,6 +6887,133 @@
           <a:xfrm>
             <a:off x="2079625" y="2816225"/>
             <a:ext cx="7702550" cy="1970405"/>
+          </a:xfrm>
+          <a:prstGeom prst="rect">
+            <a:avLst/>
+          </a:prstGeom>
+        </p:spPr>
+      </p:pic>
+    </p:spTree>
+  </p:cSld>
+  <p:clrMapOvr>
+    <a:masterClrMapping/>
+  </p:clrMapOvr>
+</p:sld>
+</file>
+
+<file path=ppt/slides/slide111.xml><?xml version="1.0" encoding="utf-8"?>
+<p:sld xmlns:a="http://schemas.openxmlformats.org/drawingml/2006/main" xmlns:r="http://schemas.openxmlformats.org/officeDocument/2006/relationships" xmlns:p="http://schemas.openxmlformats.org/presentationml/2006/main">
+  <p:cSld>
+    <p:spTree>
+      <p:nvGrpSpPr>
+        <p:cNvPr id="1" name=""/>
+        <p:cNvGrpSpPr/>
+        <p:nvPr/>
+      </p:nvGrpSpPr>
+      <p:grpSpPr/>
+      <p:sp>
+        <p:nvSpPr>
+          <p:cNvPr id="3" name="Content Placeholder 2"/>
+          <p:cNvSpPr>
+            <a:spLocks noGrp="1"/>
+          </p:cNvSpPr>
+          <p:nvPr>
+            <p:ph idx="1"/>
+          </p:nvPr>
+        </p:nvSpPr>
+        <p:spPr>
+          <a:xfrm>
+            <a:off x="838200" y="1015365"/>
+            <a:ext cx="10515600" cy="563880"/>
+          </a:xfrm>
+        </p:spPr>
+        <p:txBody>
+          <a:bodyPr/>
+          <a:p>
+            <a:pPr marL="0" indent="0">
+              <a:buNone/>
+            </a:pPr>
+            <a:r>
+              <a:rPr lang="en-US"/>
+              <a:t>When we entered phpinfo.php at the end ,we got:</a:t>
+            </a:r>
+            <a:endParaRPr lang="en-US"/>
+          </a:p>
+        </p:txBody>
+      </p:sp>
+      <p:sp>
+        <p:nvSpPr>
+          <p:cNvPr id="4" name="Title 3"/>
+          <p:cNvSpPr>
+            <a:spLocks noGrp="1"/>
+          </p:cNvSpPr>
+          <p:nvPr>
+            <p:ph type="title"/>
+          </p:nvPr>
+        </p:nvSpPr>
+        <p:spPr>
+          <a:xfrm>
+            <a:off x="838200" y="-17145"/>
+            <a:ext cx="10515600" cy="1325563"/>
+          </a:xfrm>
+        </p:spPr>
+        <p:txBody>
+          <a:bodyPr/>
+          <a:p>
+            <a:r>
+              <a:rPr lang="en-US" u="sng">
+                <a:ln w="22225">
+                  <a:solidFill>
+                    <a:schemeClr val="accent2"/>
+                  </a:solidFill>
+                  <a:prstDash val="solid"/>
+                </a:ln>
+                <a:solidFill>
+                  <a:schemeClr val="accent2">
+                    <a:lumMod val="40000"/>
+                    <a:lumOff val="60000"/>
+                  </a:schemeClr>
+                </a:solidFill>
+                <a:effectLst/>
+              </a:rPr>
+              <a:t>Proof Of Concept(PoC):</a:t>
+            </a:r>
+            <a:endParaRPr lang="en-US" u="sng">
+              <a:ln w="22225">
+                <a:solidFill>
+                  <a:schemeClr val="accent2"/>
+                </a:solidFill>
+                <a:prstDash val="solid"/>
+              </a:ln>
+              <a:solidFill>
+                <a:schemeClr val="accent2">
+                  <a:lumMod val="40000"/>
+                  <a:lumOff val="60000"/>
+                </a:schemeClr>
+              </a:solidFill>
+              <a:effectLst/>
+            </a:endParaRPr>
+          </a:p>
+        </p:txBody>
+      </p:sp>
+      <p:pic>
+        <p:nvPicPr>
+          <p:cNvPr id="5" name="Picture 4" descr="version detected"/>
+          <p:cNvPicPr>
+            <a:picLocks noChangeAspect="1"/>
+          </p:cNvPicPr>
+          <p:nvPr/>
+        </p:nvPicPr>
+        <p:blipFill>
+          <a:blip r:embed="rId1"/>
+          <a:stretch>
+            <a:fillRect/>
+          </a:stretch>
+        </p:blipFill>
+        <p:spPr>
+          <a:xfrm>
+            <a:off x="838200" y="1579245"/>
+            <a:ext cx="10058400" cy="5061585"/>
           </a:xfrm>
           <a:prstGeom prst="rect">
             <a:avLst/>
@@ -7436,19 +7050,21 @@
         </p:nvSpPr>
         <p:spPr>
           <a:xfrm>
-            <a:off x="838200" y="1015365"/>
-            <a:ext cx="10515600" cy="563880"/>
+            <a:off x="838200" y="1825625"/>
+            <a:ext cx="10515600" cy="504190"/>
           </a:xfrm>
         </p:spPr>
         <p:txBody>
-          <a:bodyPr/>
+          <a:bodyPr>
+            <a:normAutofit lnSpcReduction="20000"/>
+          </a:bodyPr>
           <a:p>
             <a:pPr marL="0" indent="0">
               <a:buNone/>
             </a:pPr>
             <a:r>
               <a:rPr lang="en-US"/>
-              <a:t>When we entered phpinfo.php at the end ,we got:</a:t>
+              <a:t>When we entered server-info at the end of index URL:</a:t>
             </a:r>
             <a:endParaRPr lang="en-US"/>
           </a:p>
@@ -7464,12 +7080,7 @@
             <p:ph type="title"/>
           </p:nvPr>
         </p:nvSpPr>
-        <p:spPr>
-          <a:xfrm>
-            <a:off x="838200" y="-17145"/>
-            <a:ext cx="10515600" cy="1325563"/>
-          </a:xfrm>
-        </p:spPr>
+        <p:spPr/>
         <p:txBody>
           <a:bodyPr/>
           <a:p>
@@ -7511,7 +7122,7 @@
       </p:sp>
       <p:pic>
         <p:nvPicPr>
-          <p:cNvPr id="5" name="Picture 4" descr="version detected"/>
+          <p:cNvPr id="5" name="Picture 4" descr="server status"/>
           <p:cNvPicPr>
             <a:picLocks noChangeAspect="1"/>
           </p:cNvPicPr>
@@ -7525,8 +7136,8 @@
         </p:blipFill>
         <p:spPr>
           <a:xfrm>
-            <a:off x="838200" y="1579245"/>
-            <a:ext cx="10058400" cy="5061585"/>
+            <a:off x="1194435" y="2329815"/>
+            <a:ext cx="8395335" cy="4453255"/>
           </a:xfrm>
           <a:prstGeom prst="rect">
             <a:avLst/>
@@ -7564,130 +7175,6 @@
         <p:spPr>
           <a:xfrm>
             <a:off x="838200" y="1825625"/>
-            <a:ext cx="10515600" cy="504190"/>
-          </a:xfrm>
-        </p:spPr>
-        <p:txBody>
-          <a:bodyPr>
-            <a:normAutofit lnSpcReduction="20000"/>
-          </a:bodyPr>
-          <a:p>
-            <a:pPr marL="0" indent="0">
-              <a:buNone/>
-            </a:pPr>
-            <a:r>
-              <a:rPr lang="en-US"/>
-              <a:t>When we entered server-info at the end of index URL:</a:t>
-            </a:r>
-            <a:endParaRPr lang="en-US"/>
-          </a:p>
-        </p:txBody>
-      </p:sp>
-      <p:sp>
-        <p:nvSpPr>
-          <p:cNvPr id="4" name="Title 3"/>
-          <p:cNvSpPr>
-            <a:spLocks noGrp="1"/>
-          </p:cNvSpPr>
-          <p:nvPr>
-            <p:ph type="title"/>
-          </p:nvPr>
-        </p:nvSpPr>
-        <p:spPr/>
-        <p:txBody>
-          <a:bodyPr/>
-          <a:p>
-            <a:r>
-              <a:rPr lang="en-US" u="sng">
-                <a:ln w="22225">
-                  <a:solidFill>
-                    <a:schemeClr val="accent2"/>
-                  </a:solidFill>
-                  <a:prstDash val="solid"/>
-                </a:ln>
-                <a:solidFill>
-                  <a:schemeClr val="accent2">
-                    <a:lumMod val="40000"/>
-                    <a:lumOff val="60000"/>
-                  </a:schemeClr>
-                </a:solidFill>
-                <a:effectLst/>
-              </a:rPr>
-              <a:t>Proof Of Concept(PoC):</a:t>
-            </a:r>
-            <a:endParaRPr lang="en-US" u="sng">
-              <a:ln w="22225">
-                <a:solidFill>
-                  <a:schemeClr val="accent2"/>
-                </a:solidFill>
-                <a:prstDash val="solid"/>
-              </a:ln>
-              <a:solidFill>
-                <a:schemeClr val="accent2">
-                  <a:lumMod val="40000"/>
-                  <a:lumOff val="60000"/>
-                </a:schemeClr>
-              </a:solidFill>
-              <a:effectLst/>
-            </a:endParaRPr>
-          </a:p>
-        </p:txBody>
-      </p:sp>
-      <p:pic>
-        <p:nvPicPr>
-          <p:cNvPr id="5" name="Picture 4" descr="server status"/>
-          <p:cNvPicPr>
-            <a:picLocks noChangeAspect="1"/>
-          </p:cNvPicPr>
-          <p:nvPr/>
-        </p:nvPicPr>
-        <p:blipFill>
-          <a:blip r:embed="rId1"/>
-          <a:stretch>
-            <a:fillRect/>
-          </a:stretch>
-        </p:blipFill>
-        <p:spPr>
-          <a:xfrm>
-            <a:off x="1194435" y="2329815"/>
-            <a:ext cx="8395335" cy="4453255"/>
-          </a:xfrm>
-          <a:prstGeom prst="rect">
-            <a:avLst/>
-          </a:prstGeom>
-        </p:spPr>
-      </p:pic>
-    </p:spTree>
-  </p:cSld>
-  <p:clrMapOvr>
-    <a:masterClrMapping/>
-  </p:clrMapOvr>
-</p:sld>
-</file>
-
-<file path=ppt/slides/slide114.xml><?xml version="1.0" encoding="utf-8"?>
-<p:sld xmlns:a="http://schemas.openxmlformats.org/drawingml/2006/main" xmlns:r="http://schemas.openxmlformats.org/officeDocument/2006/relationships" xmlns:p="http://schemas.openxmlformats.org/presentationml/2006/main">
-  <p:cSld>
-    <p:spTree>
-      <p:nvGrpSpPr>
-        <p:cNvPr id="1" name=""/>
-        <p:cNvGrpSpPr/>
-        <p:nvPr/>
-      </p:nvGrpSpPr>
-      <p:grpSpPr/>
-      <p:sp>
-        <p:nvSpPr>
-          <p:cNvPr id="3" name="Content Placeholder 2"/>
-          <p:cNvSpPr>
-            <a:spLocks noGrp="1"/>
-          </p:cNvSpPr>
-          <p:nvPr>
-            <p:ph idx="1"/>
-          </p:nvPr>
-        </p:nvSpPr>
-        <p:spPr>
-          <a:xfrm>
-            <a:off x="838200" y="1825625"/>
             <a:ext cx="10515600" cy="533400"/>
           </a:xfrm>
         </p:spPr>
@@ -7787,7 +7274,7 @@
 </p:sld>
 </file>
 
-<file path=ppt/slides/slide115.xml><?xml version="1.0" encoding="utf-8"?>
+<file path=ppt/slides/slide114.xml><?xml version="1.0" encoding="utf-8"?>
 <p:sld xmlns:a="http://schemas.openxmlformats.org/drawingml/2006/main" xmlns:r="http://schemas.openxmlformats.org/officeDocument/2006/relationships" xmlns:p="http://schemas.openxmlformats.org/presentationml/2006/main">
   <p:cSld>
     <p:spTree>
@@ -8127,7 +7614,7 @@
 </p:sld>
 </file>
 
-<file path=ppt/slides/slide116.xml><?xml version="1.0" encoding="utf-8"?>
+<file path=ppt/slides/slide115.xml><?xml version="1.0" encoding="utf-8"?>
 <p:sld xmlns:a="http://schemas.openxmlformats.org/drawingml/2006/main" xmlns:r="http://schemas.openxmlformats.org/officeDocument/2006/relationships" xmlns:p="http://schemas.openxmlformats.org/presentationml/2006/main">
   <p:cSld>
     <p:spTree>
@@ -29723,39 +29210,19 @@
           <a:bodyPr/>
           <a:p>
             <a:r>
-              <a:rPr lang="en-US"/>
-              <a:t>5)</a:t>
-            </a:r>
-            <a:r>
-              <a:rPr lang="en-US" u="sng">
-                <a:ln w="22225">
-                  <a:solidFill>
-                    <a:schemeClr val="accent2"/>
-                  </a:solidFill>
-                  <a:prstDash val="solid"/>
-                </a:ln>
+              <a:rPr lang="en-US" sz="3200" b="1">
+                <a:ln/>
                 <a:solidFill>
-                  <a:schemeClr val="accent2">
-                    <a:lumMod val="40000"/>
-                    <a:lumOff val="60000"/>
-                  </a:schemeClr>
+                  <a:schemeClr val="tx1"/>
                 </a:solidFill>
                 <a:effectLst/>
               </a:rPr>
-              <a:t>Unauthorised access to customer details</a:t>
-            </a:r>
-            <a:endParaRPr lang="en-US" u="sng">
-              <a:ln w="22225">
-                <a:solidFill>
-                  <a:schemeClr val="accent2"/>
-                </a:solidFill>
-                <a:prstDash val="solid"/>
-              </a:ln>
+              <a:t>15. IDOR</a:t>
+            </a:r>
+            <a:endParaRPr lang="en-US" sz="3200" b="1">
+              <a:ln/>
               <a:solidFill>
-                <a:schemeClr val="accent2">
-                  <a:lumMod val="40000"/>
-                  <a:lumOff val="60000"/>
-                </a:schemeClr>
+                <a:schemeClr val="tx1"/>
               </a:solidFill>
               <a:effectLst/>
             </a:endParaRPr>
@@ -29764,17 +29231,17 @@
       </p:sp>
       <p:graphicFrame>
         <p:nvGraphicFramePr>
-          <p:cNvPr id="6" name="Content Placeholder 5"/>
+          <p:cNvPr id="3" name="Content Placeholder 2"/>
           <p:cNvGraphicFramePr>
             <a:graphicFrameLocks noGrp="1"/>
           </p:cNvGraphicFramePr>
           <p:nvPr>
-            <p:ph idx="1"/>
+            <p:ph sz="half" idx="2"/>
           </p:nvPr>
         </p:nvGraphicFramePr>
         <p:xfrm>
-          <a:off x="838200" y="1825625"/>
-          <a:ext cx="10515600" cy="3649345"/>
+          <a:off x="2057400" y="1978025"/>
+          <a:ext cx="8279765" cy="3280410"/>
         </p:xfrm>
         <a:graphic>
           <a:graphicData uri="http://schemas.openxmlformats.org/drawingml/2006/table">
@@ -29783,10 +29250,10 @@
                 <a:tableStyleId>{5C22544A-7EE6-4342-B048-85BDC9FD1C3A}</a:tableStyleId>
               </a:tblPr>
               <a:tblGrid>
-                <a:gridCol w="1832610"/>
-                <a:gridCol w="8682990"/>
+                <a:gridCol w="1442720"/>
+                <a:gridCol w="6837045"/>
               </a:tblGrid>
-              <a:tr h="527050">
+              <a:tr h="326390">
                 <a:tc>
                   <a:txBody>
                     <a:bodyPr/>
@@ -29863,42 +29330,42 @@
                   </a:tcPr>
                 </a:tc>
               </a:tr>
-              <a:tr h="3122295">
+              <a:tr h="2954020">
                 <a:tc>
                   <a:txBody>
                     <a:bodyPr/>
                     <a:p>
                       <a:pPr algn="ctr"/>
                       <a:r>
-                        <a:rPr lang="en-US" sz="1600" dirty="0">
+                        <a:rPr lang="en-US" altLang="en-IN" sz="1600" dirty="0" smtClean="0">
                           <a:solidFill>
-                            <a:srgbClr val="FFFFFF"/>
+                            <a:schemeClr val="tx1"/>
                           </a:solidFill>
                           <a:latin typeface="Calibri" panose="020F0502020204030204" charset="0"/>
                         </a:rPr>
-                        <a:t>Unauthorised access to customer details</a:t>
-                      </a:r>
-                      <a:endParaRPr lang="en-US" sz="1600" dirty="0">
-                        <a:solidFill>
-                          <a:srgbClr val="FFFFFF"/>
-                        </a:solidFill>
-                        <a:latin typeface="Calibri" panose="020F0502020204030204" charset="0"/>
-                      </a:endParaRPr>
-                    </a:p>
-                    <a:p>
-                      <a:pPr algn="ctr"/>
-                      <a:r>
-                        <a:rPr lang="en-US" sz="1300" dirty="0">
+                        <a:t>IDOR</a:t>
+                      </a:r>
+                      <a:r>
+                        <a:rPr lang="en-IN" sz="1600" dirty="0" smtClean="0">
                           <a:solidFill>
-                            <a:srgbClr val="FFFFFF"/>
+                            <a:schemeClr val="tx1"/>
                           </a:solidFill>
                           <a:latin typeface="Calibri" panose="020F0502020204030204" charset="0"/>
                         </a:rPr>
-                        <a:t>(Critical)</a:t>
+                        <a:t> </a:t>
+                      </a:r>
+                      <a:r>
+                        <a:rPr lang="en-US" sz="1300" dirty="0" smtClean="0">
+                          <a:solidFill>
+                            <a:schemeClr val="tx1"/>
+                          </a:solidFill>
+                          <a:latin typeface="Calibri" panose="020F0502020204030204" charset="0"/>
+                        </a:rPr>
+                        <a:t>(Moderate)</a:t>
                       </a:r>
                       <a:endParaRPr lang="en-US" sz="1300" dirty="0">
                         <a:solidFill>
-                          <a:srgbClr val="FFFFFF"/>
+                          <a:schemeClr val="tx1"/>
                         </a:solidFill>
                         <a:latin typeface="Calibri" panose="020F0502020204030204" charset="0"/>
                       </a:endParaRPr>
@@ -29942,7 +29409,7 @@
                       <a:tailEnd type="none" w="med" len="med"/>
                     </a:lnB>
                     <a:solidFill>
-                      <a:srgbClr val="C00000"/>
+                      <a:srgbClr val="FFFF00"/>
                     </a:solidFill>
                   </a:tcPr>
                 </a:tc>
@@ -29974,17 +29441,8 @@
                           </a:solidFill>
                           <a:latin typeface="Calibri" panose="020F0502020204030204" charset="0"/>
                         </a:rPr>
-                        <a:t>Below mentioned URL is vulnerable to IDOR(Displaying customer details)</a:t>
-                      </a:r>
-                      <a:endParaRPr lang="en-US" sz="1300" dirty="0" smtClean="0">
-                        <a:solidFill>
-                          <a:schemeClr val="tx1"/>
-                        </a:solidFill>
-                        <a:latin typeface="Calibri" panose="020F0502020204030204" charset="0"/>
-                        <a:cs typeface="Calibri" panose="020F0502020204030204" charset="0"/>
-                      </a:endParaRPr>
-                    </a:p>
-                    <a:p>
+                        <a:t>Below mentioned parameters are vulnerable to IDOR (Displaying Customer Details)</a:t>
+                      </a:r>
                       <a:endParaRPr lang="en-US" sz="1300" dirty="0" smtClean="0">
                         <a:solidFill>
                           <a:schemeClr val="tx1"/>
@@ -30029,7 +29487,7 @@
                           <a:cs typeface="Calibri" panose="020F0502020204030204" charset="0"/>
                           <a:sym typeface="Arial" panose="020B0604020202020204"/>
                         </a:rPr>
-                        <a:t>http://52.66.198.61/profile/16/edit/</a:t>
+                        <a:t>http://13.233.207.87/profile/16/edit/</a:t>
                       </a:r>
                       <a:endParaRPr lang="en-US" sz="1300" b="0" i="0" u="none" strike="noStrike" dirty="0" smtClean="0">
                         <a:solidFill>
@@ -30058,7 +29516,7 @@
                           <a:cs typeface="Calibri" panose="020F0502020204030204" charset="0"/>
                           <a:sym typeface="Arial" panose="020B0604020202020204"/>
                         </a:rPr>
-                        <a:t>http://52.66.198.61/orders/orders.php?customer=16</a:t>
+                        <a:t>http://13.233.207.87/orders/orders.php?customer=17</a:t>
                       </a:r>
                       <a:endParaRPr lang="en-US" sz="1300" b="0" i="0" u="none" strike="noStrike" dirty="0" smtClean="0">
                         <a:solidFill>
@@ -30072,9 +29530,9 @@
                       </a:endParaRPr>
                     </a:p>
                     <a:p>
-                      <a:pPr marL="285750" indent="-285750">
+                      <a:pPr indent="0">
                         <a:buFont typeface="Arial" panose="020B0604020202020204" pitchFamily="34" charset="0"/>
-                        <a:buChar char="•"/>
+                        <a:buNone/>
                       </a:pPr>
                       <a:endParaRPr lang="en-US" sz="1300" b="0" dirty="0" smtClean="0">
                         <a:solidFill>
@@ -30106,32 +29564,16 @@
                             <a:schemeClr val="tx1"/>
                           </a:solidFill>
                           <a:latin typeface="Calibri" panose="020F0502020204030204" charset="0"/>
-                        </a:rPr>
-                        <a:t>Affected</a:t>
-                      </a:r>
-                      <a:r>
-                        <a:rPr lang="en-US" sz="1300" b="1" baseline="0" dirty="0" smtClean="0">
-                          <a:solidFill>
-                            <a:schemeClr val="tx1"/>
-                          </a:solidFill>
-                          <a:latin typeface="Calibri" panose="020F0502020204030204" charset="0"/>
-                        </a:rPr>
-                        <a:t> Parameters</a:t>
-                      </a:r>
-                      <a:r>
-                        <a:rPr lang="en-US" sz="1300" b="1" dirty="0" smtClean="0">
-                          <a:solidFill>
-                            <a:schemeClr val="tx1"/>
-                          </a:solidFill>
-                          <a:latin typeface="Calibri" panose="020F0502020204030204" charset="0"/>
-                        </a:rPr>
-                        <a:t> :</a:t>
+                          <a:sym typeface="+mn-ea"/>
+                        </a:rPr>
+                        <a:t>Affected Parameters :</a:t>
                       </a:r>
                       <a:endParaRPr lang="en-US" sz="1300" b="0" dirty="0" smtClean="0">
                         <a:solidFill>
                           <a:schemeClr val="tx1"/>
                         </a:solidFill>
                         <a:latin typeface="Calibri" panose="020F0502020204030204" charset="0"/>
+                        <a:sym typeface="+mn-ea"/>
                       </a:endParaRPr>
                     </a:p>
                     <a:p>
@@ -30140,11 +29582,12 @@
                         <a:buChar char="•"/>
                       </a:pPr>
                       <a:r>
-                        <a:rPr lang="en-US" sz="1300" b="0" dirty="0" smtClean="0">
+                        <a:rPr lang="en-US" sz="1300" dirty="0" smtClean="0">
                           <a:solidFill>
                             <a:schemeClr val="tx1"/>
                           </a:solidFill>
                           <a:latin typeface="Calibri" panose="020F0502020204030204" charset="0"/>
+                          <a:sym typeface="+mn-ea"/>
                         </a:rPr>
                         <a:t>user_id(POST parameter)</a:t>
                       </a:r>
@@ -30153,6 +29596,7 @@
                           <a:schemeClr val="tx1"/>
                         </a:solidFill>
                         <a:latin typeface="Calibri" panose="020F0502020204030204" charset="0"/>
+                        <a:sym typeface="+mn-ea"/>
                       </a:endParaRPr>
                     </a:p>
                     <a:p>
@@ -30161,11 +29605,12 @@
                         <a:buChar char="•"/>
                       </a:pPr>
                       <a:r>
-                        <a:rPr lang="en-US" sz="1300" b="0" dirty="0" smtClean="0">
+                        <a:rPr lang="en-US" sz="1300" dirty="0" smtClean="0">
                           <a:solidFill>
                             <a:schemeClr val="tx1"/>
                           </a:solidFill>
                           <a:latin typeface="Calibri" panose="020F0502020204030204" charset="0"/>
+                          <a:sym typeface="+mn-ea"/>
                         </a:rPr>
                         <a:t>customer(GET parameter)</a:t>
                       </a:r>
@@ -30174,6 +29619,7 @@
                           <a:schemeClr val="tx1"/>
                         </a:solidFill>
                         <a:latin typeface="Calibri" panose="020F0502020204030204" charset="0"/>
+                        <a:sym typeface="+mn-ea"/>
                       </a:endParaRPr>
                     </a:p>
                     <a:p>
@@ -30186,6 +29632,7 @@
                           <a:schemeClr val="tx1"/>
                         </a:solidFill>
                         <a:latin typeface="Calibri" panose="020F0502020204030204" charset="0"/>
+                        <a:sym typeface="+mn-ea"/>
                       </a:endParaRPr>
                     </a:p>
                     <a:p>
@@ -30211,6 +29658,7 @@
                             <a:schemeClr val="tx1"/>
                           </a:solidFill>
                           <a:latin typeface="Calibri" panose="020F0502020204030204" charset="0"/>
+                          <a:sym typeface="+mn-ea"/>
                         </a:rPr>
                         <a:t>Payload:</a:t>
                       </a:r>
@@ -30219,6 +29667,7 @@
                           <a:schemeClr val="tx1"/>
                         </a:solidFill>
                         <a:latin typeface="Calibri" panose="020F0502020204030204" charset="0"/>
+                        <a:sym typeface="+mn-ea"/>
                       </a:endParaRPr>
                     </a:p>
                     <a:p>
@@ -30239,15 +29688,28 @@
                         <a:defRPr/>
                       </a:pPr>
                       <a:r>
-                        <a:rPr lang="en-US" sz="1300" b="0" dirty="0" smtClean="0">
+                        <a:rPr lang="en-US" sz="1300" dirty="0" smtClean="0">
                           <a:solidFill>
                             <a:schemeClr val="tx1"/>
                           </a:solidFill>
                           <a:uFillTx/>
                           <a:latin typeface="Calibri" panose="020F0502020204030204" charset="0"/>
+                          <a:sym typeface="+mn-ea"/>
                         </a:rPr>
                         <a:t>Changing user_id from 16 to 15 in the url itself</a:t>
                       </a:r>
+                      <a:endParaRPr lang="en-US" sz="1300" b="0" dirty="0" smtClean="0">
+                        <a:solidFill>
+                          <a:schemeClr val="tx1"/>
+                        </a:solidFill>
+                        <a:latin typeface="Calibri" panose="020F0502020204030204" charset="0"/>
+                      </a:endParaRPr>
+                    </a:p>
+                    <a:p>
+                      <a:pPr marL="285750" indent="-285750">
+                        <a:buFont typeface="Arial" panose="020B0604020202020204" pitchFamily="34" charset="0"/>
+                        <a:buChar char="•"/>
+                      </a:pPr>
                       <a:endParaRPr lang="en-US" sz="1300" b="0" dirty="0" smtClean="0">
                         <a:solidFill>
                           <a:schemeClr val="tx1"/>
@@ -30375,24 +29837,24 @@
         </p:nvSpPr>
         <p:spPr>
           <a:xfrm>
-            <a:off x="838200" y="-135255"/>
+            <a:off x="838200" y="29845"/>
             <a:ext cx="10515600" cy="1325563"/>
           </a:xfrm>
         </p:spPr>
         <p:txBody>
-          <a:bodyPr>
-            <a:scene3d>
-              <a:camera prst="orthographicFront"/>
-              <a:lightRig rig="soft" dir="t">
-                <a:rot lat="0" lon="0" rev="15600000"/>
-              </a:lightRig>
-            </a:scene3d>
-            <a:sp3d extrusionH="57150" prstMaterial="softEdge">
-              <a:bevelT w="25400" h="38100"/>
-            </a:sp3d>
-          </a:bodyPr>
+          <a:bodyPr/>
           <a:lstStyle/>
           <a:p>
+            <a:r>
+              <a:rPr lang="en-US" altLang="en-IN" sz="3200" b="1" dirty="0">
+                <a:ln/>
+                <a:solidFill>
+                  <a:schemeClr val="tx1"/>
+                </a:solidFill>
+                <a:effectLst/>
+              </a:rPr>
+              <a:t>Observation</a:t>
+            </a:r>
             <a:r>
               <a:rPr lang="en-US" altLang="en-IN" u="sng" dirty="0">
                 <a:solidFill>
@@ -30400,7 +29862,7 @@
                 </a:solidFill>
                 <a:effectLst/>
               </a:rPr>
-              <a:t>Observation:</a:t>
+              <a:t>:</a:t>
             </a:r>
             <a:endParaRPr lang="en-US" altLang="en-IN" u="sng" dirty="0">
               <a:solidFill>
@@ -30419,7 +29881,7 @@
         </p:nvSpPr>
         <p:spPr>
           <a:xfrm>
-            <a:off x="838200" y="939165"/>
+            <a:off x="1181100" y="1104265"/>
             <a:ext cx="10673715" cy="368300"/>
           </a:xfrm>
           <a:prstGeom prst="rect">
@@ -30434,7 +29896,7 @@
           <a:p>
             <a:r>
               <a:rPr lang="en-US"/>
-              <a:t>When the user_id was changed from 16 to 15, we got the entire details of user_id 15:</a:t>
+              <a:t>User detail of user id 17 is displaying</a:t>
             </a:r>
             <a:endParaRPr lang="en-US"/>
           </a:p>
@@ -30442,7 +29904,7 @@
       </p:sp>
       <p:pic>
         <p:nvPicPr>
-          <p:cNvPr id="5" name="Content Placeholder 4" descr="When i was editing"/>
+          <p:cNvPr id="5" name="Content Placeholder 4" descr="C:\Users\Datagrokr\Documents\program\CEH-Hack-a-thon\reports\Lifestyle Store\vulnerabilities\IDOR\profile-edit\observation.pngobservation"/>
           <p:cNvPicPr>
             <a:picLocks noChangeAspect="1"/>
           </p:cNvPicPr>
@@ -30452,136 +29914,21 @@
         </p:nvPicPr>
         <p:blipFill>
           <a:blip r:embed="rId1"/>
+          <a:srcRect/>
           <a:stretch>
             <a:fillRect/>
           </a:stretch>
         </p:blipFill>
         <p:spPr>
           <a:xfrm>
-            <a:off x="838200" y="1424940"/>
-            <a:ext cx="5181600" cy="4623435"/>
+            <a:off x="1485900" y="1619250"/>
+            <a:ext cx="9152890" cy="4603750"/>
           </a:xfrm>
           <a:prstGeom prst="rect">
             <a:avLst/>
           </a:prstGeom>
         </p:spPr>
       </p:pic>
-      <p:sp>
-        <p:nvSpPr>
-          <p:cNvPr id="9" name="Rectangle 8"/>
-          <p:cNvSpPr/>
-          <p:nvPr/>
-        </p:nvSpPr>
-        <p:spPr>
-          <a:xfrm>
-            <a:off x="1975485" y="1424940"/>
-            <a:ext cx="1103630" cy="332740"/>
-          </a:xfrm>
-          <a:prstGeom prst="rect">
-            <a:avLst/>
-          </a:prstGeom>
-          <a:noFill/>
-          <a:ln w="38100">
-            <a:solidFill>
-              <a:srgbClr val="FF0000"/>
-            </a:solidFill>
-          </a:ln>
-        </p:spPr>
-        <p:style>
-          <a:lnRef idx="2">
-            <a:schemeClr val="accent1">
-              <a:shade val="50000"/>
-            </a:schemeClr>
-          </a:lnRef>
-          <a:fillRef idx="1">
-            <a:schemeClr val="accent1"/>
-          </a:fillRef>
-          <a:effectRef idx="0">
-            <a:schemeClr val="accent1"/>
-          </a:effectRef>
-          <a:fontRef idx="minor">
-            <a:schemeClr val="lt1"/>
-          </a:fontRef>
-        </p:style>
-        <p:txBody>
-          <a:bodyPr rtlCol="0" anchor="ctr"/>
-          <a:p>
-            <a:pPr algn="ctr"/>
-            <a:endParaRPr lang="en-IN"/>
-          </a:p>
-        </p:txBody>
-      </p:sp>
-      <p:pic>
-        <p:nvPicPr>
-          <p:cNvPr id="7" name="Content Placeholder 6" descr="IDOR - got the details of the other account with profile no. 15"/>
-          <p:cNvPicPr>
-            <a:picLocks noChangeAspect="1"/>
-          </p:cNvPicPr>
-          <p:nvPr>
-            <p:ph sz="half" idx="2"/>
-          </p:nvPr>
-        </p:nvPicPr>
-        <p:blipFill>
-          <a:blip r:embed="rId2"/>
-          <a:stretch>
-            <a:fillRect/>
-          </a:stretch>
-        </p:blipFill>
-        <p:spPr>
-          <a:xfrm>
-            <a:off x="6172200" y="1426210"/>
-            <a:ext cx="5181600" cy="4639945"/>
-          </a:xfrm>
-          <a:prstGeom prst="rect">
-            <a:avLst/>
-          </a:prstGeom>
-        </p:spPr>
-      </p:pic>
-      <p:sp>
-        <p:nvSpPr>
-          <p:cNvPr id="8" name="Rectangle 7"/>
-          <p:cNvSpPr/>
-          <p:nvPr/>
-        </p:nvSpPr>
-        <p:spPr>
-          <a:xfrm>
-            <a:off x="7268845" y="1424940"/>
-            <a:ext cx="955675" cy="332740"/>
-          </a:xfrm>
-          <a:prstGeom prst="rect">
-            <a:avLst/>
-          </a:prstGeom>
-          <a:noFill/>
-          <a:ln w="38100">
-            <a:solidFill>
-              <a:srgbClr val="FF0000"/>
-            </a:solidFill>
-          </a:ln>
-        </p:spPr>
-        <p:style>
-          <a:lnRef idx="2">
-            <a:schemeClr val="accent1">
-              <a:shade val="50000"/>
-            </a:schemeClr>
-          </a:lnRef>
-          <a:fillRef idx="1">
-            <a:schemeClr val="accent1"/>
-          </a:fillRef>
-          <a:effectRef idx="0">
-            <a:schemeClr val="accent1"/>
-          </a:effectRef>
-          <a:fontRef idx="minor">
-            <a:schemeClr val="lt1"/>
-          </a:fontRef>
-        </p:style>
-        <p:txBody>
-          <a:bodyPr rtlCol="0" anchor="ctr"/>
-          <a:p>
-            <a:pPr algn="ctr"/>
-            <a:endParaRPr lang="en-IN"/>
-          </a:p>
-        </p:txBody>
-      </p:sp>
     </p:spTree>
   </p:cSld>
   <p:clrMapOvr>
@@ -30623,31 +29970,21 @@
           <a:bodyPr/>
           <a:p>
             <a:r>
-              <a:rPr lang="en-US" u="sng">
+              <a:rPr lang="en-US" sz="3200" b="1">
+                <a:ln/>
                 <a:solidFill>
-                  <a:schemeClr val="accent1"/>
+                  <a:schemeClr val="tx1"/>
                 </a:solidFill>
-                <a:effectLst>
-                  <a:outerShdw blurRad="38100" dist="25400" dir="5400000" algn="ctr" rotWithShape="0">
-                    <a:srgbClr val="6E747A">
-                      <a:alpha val="43000"/>
-                    </a:srgbClr>
-                  </a:outerShdw>
-                </a:effectLst>
+                <a:effectLst/>
               </a:rPr>
               <a:t>Proof Of Concept(PoC):</a:t>
             </a:r>
-            <a:endParaRPr lang="en-US" u="sng">
+            <a:endParaRPr lang="en-US" sz="3200" b="1">
+              <a:ln/>
               <a:solidFill>
-                <a:schemeClr val="accent1"/>
+                <a:schemeClr val="tx1"/>
               </a:solidFill>
-              <a:effectLst>
-                <a:outerShdw blurRad="38100" dist="25400" dir="5400000" algn="ctr" rotWithShape="0">
-                  <a:srgbClr val="6E747A">
-                    <a:alpha val="43000"/>
-                  </a:srgbClr>
-                </a:outerShdw>
-              </a:effectLst>
+              <a:effectLst/>
             </a:endParaRPr>
           </a:p>
         </p:txBody>
@@ -30664,13 +30001,13 @@
         </p:nvSpPr>
         <p:spPr>
           <a:xfrm>
-            <a:off x="838200" y="1442085"/>
-            <a:ext cx="9648825" cy="607695"/>
+            <a:off x="1257300" y="1442085"/>
+            <a:ext cx="9877425" cy="607695"/>
           </a:xfrm>
         </p:spPr>
         <p:txBody>
           <a:bodyPr>
-            <a:normAutofit fontScale="90000"/>
+            <a:normAutofit fontScale="60000"/>
           </a:bodyPr>
           <a:p>
             <a:pPr marL="0" indent="0">
@@ -30678,7 +30015,7 @@
             </a:pPr>
             <a:r>
               <a:rPr lang="en-US"/>
-              <a:t>Even users with user_id 10 and others are accessible in editing section.</a:t>
+              <a:t>Gain information of another user by Change the URL parameter from "http://13.233.207.87/profile/17/edit/" to "http://13.233.207.87/profile/16/edit/".</a:t>
             </a:r>
             <a:endParaRPr lang="en-US"/>
           </a:p>
@@ -30686,7 +30023,7 @@
       </p:sp>
       <p:pic>
         <p:nvPicPr>
-          <p:cNvPr id="5" name="Content Placeholder 4" descr="Even profile 10 and many more"/>
+          <p:cNvPr id="5" name="Content Placeholder 4" descr="C:\Users\Datagrokr\Documents\program\CEH-Hack-a-thon\reports\Lifestyle Store\vulnerabilities\IDOR\profile-edit\POC.pngPOC"/>
           <p:cNvPicPr>
             <a:picLocks noChangeAspect="1"/>
           </p:cNvPicPr>
@@ -30696,14 +30033,15 @@
         </p:nvPicPr>
         <p:blipFill>
           <a:blip r:embed="rId1"/>
+          <a:srcRect/>
           <a:stretch>
             <a:fillRect/>
           </a:stretch>
         </p:blipFill>
         <p:spPr>
           <a:xfrm>
-            <a:off x="1854200" y="2049145"/>
-            <a:ext cx="8542020" cy="4425950"/>
+            <a:off x="1854200" y="2102803"/>
+            <a:ext cx="8542020" cy="4318635"/>
           </a:xfrm>
           <a:prstGeom prst="rect">
             <a:avLst/>
@@ -30788,299 +30126,60 @@
           <a:bodyPr/>
           <a:p>
             <a:r>
-              <a:rPr lang="en-US" u="sng">
-                <a:ln w="22225">
-                  <a:solidFill>
-                    <a:schemeClr val="accent2"/>
-                  </a:solidFill>
-                  <a:prstDash val="solid"/>
-                </a:ln>
+              <a:rPr lang="en-US" sz="3200" b="1">
+                <a:ln/>
                 <a:solidFill>
-                  <a:schemeClr val="accent2">
-                    <a:lumMod val="40000"/>
-                    <a:lumOff val="60000"/>
-                  </a:schemeClr>
+                  <a:schemeClr val="tx1"/>
                 </a:solidFill>
                 <a:effectLst/>
+                <a:latin typeface="+mn-lt"/>
+                <a:cs typeface="+mn-lt"/>
               </a:rPr>
-              <a:t>Proof Of Concept(PoC):</a:t>
-            </a:r>
-            <a:endParaRPr lang="en-US" u="sng">
-              <a:ln w="22225">
-                <a:solidFill>
-                  <a:schemeClr val="accent2"/>
-                </a:solidFill>
-                <a:prstDash val="solid"/>
-              </a:ln>
+              <a:t>Business Impact(High):</a:t>
+            </a:r>
+            <a:endParaRPr lang="en-US" sz="3200" b="1">
+              <a:ln/>
               <a:solidFill>
-                <a:schemeClr val="accent2">
-                  <a:lumMod val="40000"/>
-                  <a:lumOff val="60000"/>
-                </a:schemeClr>
+                <a:schemeClr val="tx1"/>
               </a:solidFill>
               <a:effectLst/>
+              <a:latin typeface="+mn-lt"/>
+              <a:cs typeface="+mn-lt"/>
             </a:endParaRPr>
           </a:p>
         </p:txBody>
       </p:sp>
       <p:sp>
         <p:nvSpPr>
-          <p:cNvPr id="5" name="Text Box 4"/>
-          <p:cNvSpPr txBox="1"/>
-          <p:nvPr/>
+          <p:cNvPr id="3" name="Content Placeholder 2"/>
+          <p:cNvSpPr>
+            <a:spLocks noGrp="1"/>
+          </p:cNvSpPr>
+          <p:nvPr>
+            <p:ph sz="half" idx="1"/>
+          </p:nvPr>
         </p:nvSpPr>
         <p:spPr>
           <a:xfrm>
-            <a:off x="1045845" y="1622425"/>
-            <a:ext cx="10806430" cy="368300"/>
+            <a:off x="838200" y="1825625"/>
+            <a:ext cx="10621010" cy="4351655"/>
           </a:xfrm>
-          <a:prstGeom prst="rect">
-            <a:avLst/>
-          </a:prstGeom>
-          <a:noFill/>
         </p:spPr>
         <p:txBody>
-          <a:bodyPr wrap="square" rtlCol="0">
-            <a:spAutoFit/>
-          </a:bodyPr>
+          <a:bodyPr/>
           <a:p>
             <a:r>
               <a:rPr lang="en-US"/>
-              <a:t>We can even look at the orders of other customers,other than the logged in account.</a:t>
+              <a:t>Taking the advantage of this vulnerability,if the attacker can get these sensitive data of multiple users,it would be become one step easier for them to login to their accout after getting their username.</a:t>
             </a:r>
             <a:endParaRPr lang="en-US"/>
           </a:p>
-        </p:txBody>
-      </p:sp>
-      <p:pic>
-        <p:nvPicPr>
-          <p:cNvPr id="6" name="Content Placeholder 5" descr="This is  y page"/>
-          <p:cNvPicPr>
-            <a:picLocks noChangeAspect="1"/>
-          </p:cNvPicPr>
-          <p:nvPr>
-            <p:ph sz="half" idx="1"/>
-          </p:nvPr>
-        </p:nvPicPr>
-        <p:blipFill>
-          <a:blip r:embed="rId1"/>
-          <a:stretch>
-            <a:fillRect/>
-          </a:stretch>
-        </p:blipFill>
-        <p:spPr>
-          <a:xfrm>
-            <a:off x="838200" y="2134870"/>
-            <a:ext cx="5074920" cy="4444365"/>
-          </a:xfrm>
-          <a:prstGeom prst="rect">
-            <a:avLst/>
-          </a:prstGeom>
-        </p:spPr>
-      </p:pic>
-      <p:sp>
-        <p:nvSpPr>
-          <p:cNvPr id="9" name="Rectangle 8"/>
-          <p:cNvSpPr/>
-          <p:nvPr/>
-        </p:nvSpPr>
-        <p:spPr>
-          <a:xfrm>
-            <a:off x="2402840" y="2134870"/>
-            <a:ext cx="1103630" cy="332740"/>
-          </a:xfrm>
-          <a:prstGeom prst="rect">
-            <a:avLst/>
-          </a:prstGeom>
-          <a:noFill/>
-          <a:ln w="38100">
-            <a:solidFill>
-              <a:srgbClr val="FF0000"/>
-            </a:solidFill>
-          </a:ln>
-        </p:spPr>
-        <p:style>
-          <a:lnRef idx="2">
-            <a:schemeClr val="accent1">
-              <a:shade val="50000"/>
-            </a:schemeClr>
-          </a:lnRef>
-          <a:fillRef idx="1">
-            <a:schemeClr val="accent1"/>
-          </a:fillRef>
-          <a:effectRef idx="0">
-            <a:schemeClr val="accent1"/>
-          </a:effectRef>
-          <a:fontRef idx="minor">
-            <a:schemeClr val="lt1"/>
-          </a:fontRef>
-        </p:style>
-        <p:txBody>
-          <a:bodyPr rtlCol="0" anchor="ctr"/>
-          <a:p>
-            <a:pPr algn="ctr"/>
-            <a:endParaRPr lang="en-IN"/>
-          </a:p>
-        </p:txBody>
-      </p:sp>
-      <p:sp>
-        <p:nvSpPr>
-          <p:cNvPr id="7" name="Rectangle 6"/>
-          <p:cNvSpPr/>
-          <p:nvPr/>
-        </p:nvSpPr>
-        <p:spPr>
-          <a:xfrm>
-            <a:off x="2034540" y="5170170"/>
-            <a:ext cx="1059815" cy="744855"/>
-          </a:xfrm>
-          <a:prstGeom prst="rect">
-            <a:avLst/>
-          </a:prstGeom>
-          <a:noFill/>
-          <a:ln w="38100">
-            <a:solidFill>
-              <a:srgbClr val="FF0000"/>
-            </a:solidFill>
-          </a:ln>
-        </p:spPr>
-        <p:style>
-          <a:lnRef idx="2">
-            <a:schemeClr val="accent1">
-              <a:shade val="50000"/>
-            </a:schemeClr>
-          </a:lnRef>
-          <a:fillRef idx="1">
-            <a:schemeClr val="accent1"/>
-          </a:fillRef>
-          <a:effectRef idx="0">
-            <a:schemeClr val="accent1"/>
-          </a:effectRef>
-          <a:fontRef idx="minor">
-            <a:schemeClr val="lt1"/>
-          </a:fontRef>
-        </p:style>
-        <p:txBody>
-          <a:bodyPr rtlCol="0" anchor="ctr"/>
-          <a:p>
-            <a:pPr algn="ctr"/>
-            <a:endParaRPr lang="en-IN"/>
-          </a:p>
-        </p:txBody>
-      </p:sp>
-      <p:pic>
-        <p:nvPicPr>
-          <p:cNvPr id="8" name="Content Placeholder 7" descr="this is customer no. 14 order and details"/>
-          <p:cNvPicPr>
-            <a:picLocks noChangeAspect="1"/>
-          </p:cNvPicPr>
-          <p:nvPr>
-            <p:ph sz="half" idx="2"/>
-          </p:nvPr>
-        </p:nvPicPr>
-        <p:blipFill>
-          <a:blip r:embed="rId2"/>
-          <a:stretch>
-            <a:fillRect/>
-          </a:stretch>
-        </p:blipFill>
-        <p:spPr>
-          <a:xfrm>
-            <a:off x="6172200" y="2135505"/>
-            <a:ext cx="5181600" cy="4443095"/>
-          </a:xfrm>
-          <a:prstGeom prst="rect">
-            <a:avLst/>
-          </a:prstGeom>
-        </p:spPr>
-      </p:pic>
-      <p:sp>
-        <p:nvSpPr>
-          <p:cNvPr id="10" name="Rectangle 9"/>
-          <p:cNvSpPr/>
-          <p:nvPr/>
-        </p:nvSpPr>
-        <p:spPr>
-          <a:xfrm>
-            <a:off x="7666355" y="2135505"/>
-            <a:ext cx="1103630" cy="332740"/>
-          </a:xfrm>
-          <a:prstGeom prst="rect">
-            <a:avLst/>
-          </a:prstGeom>
-          <a:noFill/>
-          <a:ln w="38100">
-            <a:solidFill>
-              <a:srgbClr val="FF0000"/>
-            </a:solidFill>
-          </a:ln>
-        </p:spPr>
-        <p:style>
-          <a:lnRef idx="2">
-            <a:schemeClr val="accent1">
-              <a:shade val="50000"/>
-            </a:schemeClr>
-          </a:lnRef>
-          <a:fillRef idx="1">
-            <a:schemeClr val="accent1"/>
-          </a:fillRef>
-          <a:effectRef idx="0">
-            <a:schemeClr val="accent1"/>
-          </a:effectRef>
-          <a:fontRef idx="minor">
-            <a:schemeClr val="lt1"/>
-          </a:fontRef>
-        </p:style>
-        <p:txBody>
-          <a:bodyPr rtlCol="0" anchor="ctr"/>
-          <a:p>
-            <a:pPr algn="ctr"/>
-            <a:endParaRPr lang="en-IN"/>
-          </a:p>
-        </p:txBody>
-      </p:sp>
-      <p:sp>
-        <p:nvSpPr>
-          <p:cNvPr id="11" name="Rectangle 10"/>
-          <p:cNvSpPr/>
-          <p:nvPr/>
-        </p:nvSpPr>
-        <p:spPr>
-          <a:xfrm>
-            <a:off x="7400925" y="5022215"/>
-            <a:ext cx="1103630" cy="613410"/>
-          </a:xfrm>
-          <a:prstGeom prst="rect">
-            <a:avLst/>
-          </a:prstGeom>
-          <a:noFill/>
-          <a:ln w="38100">
-            <a:solidFill>
-              <a:srgbClr val="FF0000"/>
-            </a:solidFill>
-          </a:ln>
-        </p:spPr>
-        <p:style>
-          <a:lnRef idx="2">
-            <a:schemeClr val="accent1">
-              <a:shade val="50000"/>
-            </a:schemeClr>
-          </a:lnRef>
-          <a:fillRef idx="1">
-            <a:schemeClr val="accent1"/>
-          </a:fillRef>
-          <a:effectRef idx="0">
-            <a:schemeClr val="accent1"/>
-          </a:effectRef>
-          <a:fontRef idx="minor">
-            <a:schemeClr val="lt1"/>
-          </a:fontRef>
-        </p:style>
-        <p:txBody>
-          <a:bodyPr rtlCol="0" anchor="ctr"/>
-          <a:p>
-            <a:pPr algn="ctr"/>
-            <a:endParaRPr lang="en-IN"/>
+          <a:p>
+            <a:r>
+              <a:rPr lang="en-US"/>
+              <a:t>The revealed data includes(name,username,email,address,phone number,etc.) are sufficient for performing a full fledge social engineering attack on the user.</a:t>
+            </a:r>
+            <a:endParaRPr lang="en-US"/>
           </a:p>
         </p:txBody>
       </p:sp>
@@ -31193,108 +30292,6 @@
         <p:cNvGrpSpPr/>
         <p:nvPr/>
       </p:nvGrpSpPr>
-      <p:grpSpPr/>
-      <p:sp>
-        <p:nvSpPr>
-          <p:cNvPr id="2" name="Title 1"/>
-          <p:cNvSpPr>
-            <a:spLocks noGrp="1"/>
-          </p:cNvSpPr>
-          <p:nvPr>
-            <p:ph type="title"/>
-          </p:nvPr>
-        </p:nvSpPr>
-        <p:spPr/>
-        <p:txBody>
-          <a:bodyPr/>
-          <a:p>
-            <a:r>
-              <a:rPr lang="en-US" u="sng">
-                <a:solidFill>
-                  <a:schemeClr val="accent1"/>
-                </a:solidFill>
-                <a:effectLst>
-                  <a:outerShdw blurRad="38100" dist="25400" dir="5400000" algn="ctr" rotWithShape="0">
-                    <a:srgbClr val="6E747A">
-                      <a:alpha val="43000"/>
-                    </a:srgbClr>
-                  </a:outerShdw>
-                </a:effectLst>
-              </a:rPr>
-              <a:t>Business Impact(High):</a:t>
-            </a:r>
-            <a:endParaRPr lang="en-US" u="sng">
-              <a:solidFill>
-                <a:schemeClr val="accent1"/>
-              </a:solidFill>
-              <a:effectLst>
-                <a:outerShdw blurRad="38100" dist="25400" dir="5400000" algn="ctr" rotWithShape="0">
-                  <a:srgbClr val="6E747A">
-                    <a:alpha val="43000"/>
-                  </a:srgbClr>
-                </a:outerShdw>
-              </a:effectLst>
-            </a:endParaRPr>
-          </a:p>
-        </p:txBody>
-      </p:sp>
-      <p:sp>
-        <p:nvSpPr>
-          <p:cNvPr id="3" name="Content Placeholder 2"/>
-          <p:cNvSpPr>
-            <a:spLocks noGrp="1"/>
-          </p:cNvSpPr>
-          <p:nvPr>
-            <p:ph sz="half" idx="1"/>
-          </p:nvPr>
-        </p:nvSpPr>
-        <p:spPr>
-          <a:xfrm>
-            <a:off x="838200" y="1825625"/>
-            <a:ext cx="10621010" cy="4351655"/>
-          </a:xfrm>
-        </p:spPr>
-        <p:txBody>
-          <a:bodyPr/>
-          <a:p>
-            <a:pPr marL="0" indent="0">
-              <a:buNone/>
-            </a:pPr>
-            <a:r>
-              <a:rPr lang="en-US"/>
-              <a:t>Taking the advantage of this vulnerability,if the attacker can get these sensitive data of multiple users,it would be become one step easier for them to login to their accout after getting their username.</a:t>
-            </a:r>
-            <a:endParaRPr lang="en-US"/>
-          </a:p>
-          <a:p>
-            <a:pPr marL="0" indent="0">
-              <a:buNone/>
-            </a:pPr>
-            <a:r>
-              <a:rPr lang="en-US"/>
-              <a:t>The revealed data includes(name,username,email,address,phone number,etc.) are sufficient for performing a full fledge social engineering attack on the user.</a:t>
-            </a:r>
-            <a:endParaRPr lang="en-US"/>
-          </a:p>
-        </p:txBody>
-      </p:sp>
-    </p:spTree>
-  </p:cSld>
-  <p:clrMapOvr>
-    <a:masterClrMapping/>
-  </p:clrMapOvr>
-</p:sld>
-</file>
-
-<file path=ppt/slides/slide91.xml><?xml version="1.0" encoding="utf-8"?>
-<p:sld xmlns:a="http://schemas.openxmlformats.org/drawingml/2006/main" xmlns:r="http://schemas.openxmlformats.org/officeDocument/2006/relationships" xmlns:p="http://schemas.openxmlformats.org/presentationml/2006/main">
-  <p:cSld>
-    <p:spTree>
-      <p:nvGrpSpPr>
-        <p:cNvPr id="1" name=""/>
-        <p:cNvGrpSpPr/>
-        <p:nvPr/>
-      </p:nvGrpSpPr>
       <p:grpSpPr>
         <a:xfrm>
           <a:off x="0" y="0"/>
@@ -31319,55 +30316,37 @@
           <a:lstStyle/>
           <a:p>
             <a:r>
-              <a:rPr lang="en-IN" u="sng" dirty="0" smtClean="0">
-                <a:ln w="22225">
-                  <a:solidFill>
-                    <a:schemeClr val="accent2"/>
-                  </a:solidFill>
-                  <a:prstDash val="solid"/>
-                </a:ln>
+              <a:rPr lang="en-IN" sz="3200" b="1" dirty="0" smtClean="0">
+                <a:ln/>
                 <a:solidFill>
-                  <a:schemeClr val="accent2">
-                    <a:lumMod val="40000"/>
-                    <a:lumOff val="60000"/>
-                  </a:schemeClr>
+                  <a:schemeClr val="tx1"/>
                 </a:solidFill>
                 <a:effectLst/>
+                <a:latin typeface="+mn-lt"/>
+                <a:cs typeface="+mn-lt"/>
               </a:rPr>
               <a:t>Recommendation</a:t>
             </a:r>
             <a:r>
-              <a:rPr lang="en-US" altLang="en-IN" u="sng" dirty="0" smtClean="0">
-                <a:ln w="22225">
-                  <a:solidFill>
-                    <a:schemeClr val="accent2"/>
-                  </a:solidFill>
-                  <a:prstDash val="solid"/>
-                </a:ln>
+              <a:rPr lang="en-US" altLang="en-IN" sz="3200" b="1" dirty="0" smtClean="0">
+                <a:ln/>
                 <a:solidFill>
-                  <a:schemeClr val="accent2">
-                    <a:lumMod val="40000"/>
-                    <a:lumOff val="60000"/>
-                  </a:schemeClr>
+                  <a:schemeClr val="tx1"/>
                 </a:solidFill>
                 <a:effectLst/>
+                <a:latin typeface="+mn-lt"/>
+                <a:cs typeface="+mn-lt"/>
               </a:rPr>
               <a:t>:</a:t>
             </a:r>
-            <a:endParaRPr lang="en-US" altLang="en-IN" u="sng" dirty="0" smtClean="0">
-              <a:ln w="22225">
-                <a:solidFill>
-                  <a:schemeClr val="accent2"/>
-                </a:solidFill>
-                <a:prstDash val="solid"/>
-              </a:ln>
+            <a:endParaRPr lang="en-US" altLang="en-IN" sz="3200" b="1" u="sng" dirty="0" smtClean="0">
+              <a:ln/>
               <a:solidFill>
-                <a:schemeClr val="accent2">
-                  <a:lumMod val="40000"/>
-                  <a:lumOff val="60000"/>
-                </a:schemeClr>
+                <a:schemeClr val="tx1"/>
               </a:solidFill>
               <a:effectLst/>
+              <a:latin typeface="+mn-lt"/>
+              <a:cs typeface="+mn-lt"/>
             </a:endParaRPr>
           </a:p>
         </p:txBody>
@@ -31384,8 +30363,8 @@
         </p:nvSpPr>
         <p:spPr>
           <a:xfrm>
-            <a:off x="838200" y="1515074"/>
-            <a:ext cx="10515600" cy="4351338"/>
+            <a:off x="1117600" y="1515110"/>
+            <a:ext cx="10515600" cy="2174875"/>
           </a:xfrm>
         </p:spPr>
         <p:txBody>
@@ -31457,8 +30436,8 @@
         </p:nvSpPr>
         <p:spPr>
           <a:xfrm>
-            <a:off x="838200" y="4960513"/>
-            <a:ext cx="11353800" cy="923330"/>
+            <a:off x="1587500" y="4655820"/>
+            <a:ext cx="9763125" cy="922020"/>
           </a:xfrm>
           <a:prstGeom prst="rect">
             <a:avLst/>
@@ -31470,6 +30449,10 @@
           </a:bodyPr>
           <a:lstStyle/>
           <a:p>
+            <a:pPr marL="285750" indent="-285750">
+              <a:buFont typeface="Arial" panose="020B0604020202020204" pitchFamily="34" charset="0"/>
+              <a:buChar char="•"/>
+            </a:pPr>
             <a:r>
               <a:rPr lang="en-IN" i="1" dirty="0" smtClean="0">
                 <a:latin typeface="Calibri" panose="020F0502020204030204" charset="0"/>
@@ -31485,6 +30468,10 @@
             </a:endParaRPr>
           </a:p>
           <a:p>
+            <a:pPr marL="285750" indent="-285750">
+              <a:buFont typeface="Arial" panose="020B0604020202020204" pitchFamily="34" charset="0"/>
+              <a:buChar char="•"/>
+            </a:pPr>
             <a:r>
               <a:rPr lang="en-IN" i="1" dirty="0" smtClean="0">
                 <a:latin typeface="Calibri" panose="020F0502020204030204" charset="0"/>
@@ -31500,6 +30487,10 @@
             </a:endParaRPr>
           </a:p>
           <a:p>
+            <a:pPr marL="285750" indent="-285750">
+              <a:buFont typeface="Arial" panose="020B0604020202020204" pitchFamily="34" charset="0"/>
+              <a:buChar char="•"/>
+            </a:pPr>
             <a:endParaRPr lang="en-IN" i="1" dirty="0"/>
           </a:p>
         </p:txBody>
@@ -31544,37 +30535,25 @@
           </a:lstStyle>
           <a:p>
             <a:r>
-              <a:rPr lang="en-IN" u="sng" dirty="0" smtClean="0">
-                <a:ln w="22225">
-                  <a:solidFill>
-                    <a:schemeClr val="accent2"/>
-                  </a:solidFill>
-                  <a:prstDash val="solid"/>
-                </a:ln>
+              <a:rPr lang="en-IN" sz="3200" b="1" dirty="0" smtClean="0">
+                <a:ln/>
                 <a:solidFill>
-                  <a:schemeClr val="accent2">
-                    <a:lumMod val="40000"/>
-                    <a:lumOff val="60000"/>
-                  </a:schemeClr>
+                  <a:schemeClr val="tx1"/>
                 </a:solidFill>
                 <a:effectLst/>
+                <a:latin typeface="+mn-lt"/>
+                <a:cs typeface="+mn-lt"/>
               </a:rPr>
               <a:t>References:</a:t>
             </a:r>
-            <a:endParaRPr lang="en-IN" u="sng" dirty="0" smtClean="0">
-              <a:ln w="22225">
-                <a:solidFill>
-                  <a:schemeClr val="accent2"/>
-                </a:solidFill>
-                <a:prstDash val="solid"/>
-              </a:ln>
+            <a:endParaRPr lang="en-IN" sz="3200" b="1" dirty="0" smtClean="0">
+              <a:ln/>
               <a:solidFill>
-                <a:schemeClr val="accent2">
-                  <a:lumMod val="40000"/>
-                  <a:lumOff val="60000"/>
-                </a:schemeClr>
+                <a:schemeClr val="tx1"/>
               </a:solidFill>
               <a:effectLst/>
+              <a:latin typeface="+mn-lt"/>
+              <a:cs typeface="+mn-lt"/>
             </a:endParaRPr>
           </a:p>
         </p:txBody>
@@ -31588,7 +30567,7 @@
 </p:sld>
 </file>
 
-<file path=ppt/slides/slide92.xml><?xml version="1.0" encoding="utf-8"?>
+<file path=ppt/slides/slide91.xml><?xml version="1.0" encoding="utf-8"?>
 <p:sld xmlns:a="http://schemas.openxmlformats.org/drawingml/2006/main" xmlns:r="http://schemas.openxmlformats.org/officeDocument/2006/relationships" xmlns:p="http://schemas.openxmlformats.org/presentationml/2006/main">
   <p:cSld>
     <p:spTree>
@@ -32035,7 +31014,7 @@
 </p:sld>
 </file>
 
-<file path=ppt/slides/slide93.xml><?xml version="1.0" encoding="utf-8"?>
+<file path=ppt/slides/slide92.xml><?xml version="1.0" encoding="utf-8"?>
 <p:sld xmlns:a="http://schemas.openxmlformats.org/drawingml/2006/main" xmlns:r="http://schemas.openxmlformats.org/officeDocument/2006/relationships" xmlns:p="http://schemas.openxmlformats.org/presentationml/2006/main">
   <p:cSld>
     <p:spTree>
@@ -32154,6 +31133,98 @@
 </p:sld>
 </file>
 
+<file path=ppt/slides/slide93.xml><?xml version="1.0" encoding="utf-8"?>
+<p:sld xmlns:a="http://schemas.openxmlformats.org/drawingml/2006/main" xmlns:r="http://schemas.openxmlformats.org/officeDocument/2006/relationships" xmlns:p="http://schemas.openxmlformats.org/presentationml/2006/main">
+  <p:cSld>
+    <p:spTree>
+      <p:nvGrpSpPr>
+        <p:cNvPr id="1" name=""/>
+        <p:cNvGrpSpPr/>
+        <p:nvPr/>
+      </p:nvGrpSpPr>
+      <p:grpSpPr/>
+      <p:sp>
+        <p:nvSpPr>
+          <p:cNvPr id="2" name="Title 1"/>
+          <p:cNvSpPr>
+            <a:spLocks noGrp="1"/>
+          </p:cNvSpPr>
+          <p:nvPr>
+            <p:ph type="title"/>
+          </p:nvPr>
+        </p:nvSpPr>
+        <p:spPr/>
+        <p:txBody>
+          <a:bodyPr/>
+          <a:p>
+            <a:r>
+              <a:rPr lang="en-US" u="sng">
+                <a:solidFill>
+                  <a:schemeClr val="accent1"/>
+                </a:solidFill>
+                <a:effectLst>
+                  <a:outerShdw blurRad="38100" dist="25400" dir="5400000" algn="ctr" rotWithShape="0">
+                    <a:srgbClr val="6E747A">
+                      <a:alpha val="43000"/>
+                    </a:srgbClr>
+                  </a:outerShdw>
+                </a:effectLst>
+              </a:rPr>
+              <a:t>Business Impact(Moderate):</a:t>
+            </a:r>
+            <a:endParaRPr lang="en-US" u="sng">
+              <a:solidFill>
+                <a:schemeClr val="accent1"/>
+              </a:solidFill>
+              <a:effectLst>
+                <a:outerShdw blurRad="38100" dist="25400" dir="5400000" algn="ctr" rotWithShape="0">
+                  <a:srgbClr val="6E747A">
+                    <a:alpha val="43000"/>
+                  </a:srgbClr>
+                </a:outerShdw>
+              </a:effectLst>
+            </a:endParaRPr>
+          </a:p>
+        </p:txBody>
+      </p:sp>
+      <p:sp>
+        <p:nvSpPr>
+          <p:cNvPr id="3" name="Content Placeholder 2"/>
+          <p:cNvSpPr>
+            <a:spLocks noGrp="1"/>
+          </p:cNvSpPr>
+          <p:nvPr>
+            <p:ph sz="half" idx="1"/>
+          </p:nvPr>
+        </p:nvSpPr>
+        <p:spPr>
+          <a:xfrm>
+            <a:off x="838200" y="1825625"/>
+            <a:ext cx="10710545" cy="4351655"/>
+          </a:xfrm>
+        </p:spPr>
+        <p:txBody>
+          <a:bodyPr/>
+          <a:p>
+            <a:pPr marL="0" indent="0">
+              <a:buNone/>
+            </a:pPr>
+            <a:r>
+              <a:rPr lang="en-US"/>
+              <a:t>There is no direct business impact in this case ,but this amount of information can definitely lead to social engineering attacks on the seller and can indirectly harm the business.</a:t>
+            </a:r>
+            <a:endParaRPr lang="en-US"/>
+          </a:p>
+        </p:txBody>
+      </p:sp>
+    </p:spTree>
+  </p:cSld>
+  <p:clrMapOvr>
+    <a:masterClrMapping/>
+  </p:clrMapOvr>
+</p:sld>
+</file>
+
 <file path=ppt/slides/slide94.xml><?xml version="1.0" encoding="utf-8"?>
 <p:sld xmlns:a="http://schemas.openxmlformats.org/drawingml/2006/main" xmlns:r="http://schemas.openxmlformats.org/officeDocument/2006/relationships" xmlns:p="http://schemas.openxmlformats.org/presentationml/2006/main">
   <p:cSld>
@@ -32179,32 +31250,14 @@
           <a:bodyPr/>
           <a:p>
             <a:r>
-              <a:rPr lang="en-US" u="sng">
-                <a:solidFill>
-                  <a:schemeClr val="accent1"/>
-                </a:solidFill>
-                <a:effectLst>
-                  <a:outerShdw blurRad="38100" dist="25400" dir="5400000" algn="ctr" rotWithShape="0">
-                    <a:srgbClr val="6E747A">
-                      <a:alpha val="43000"/>
-                    </a:srgbClr>
-                  </a:outerShdw>
-                </a:effectLst>
-              </a:rPr>
-              <a:t>Business Impact(Moderate):</a:t>
-            </a:r>
-            <a:endParaRPr lang="en-US" u="sng">
-              <a:solidFill>
-                <a:schemeClr val="accent1"/>
-              </a:solidFill>
-              <a:effectLst>
-                <a:outerShdw blurRad="38100" dist="25400" dir="5400000" algn="ctr" rotWithShape="0">
-                  <a:srgbClr val="6E747A">
-                    <a:alpha val="43000"/>
-                  </a:srgbClr>
-                </a:outerShdw>
-              </a:effectLst>
-            </a:endParaRPr>
+              <a:rPr lang="en-US" u="sng"/>
+              <a:t>Recommendation</a:t>
+            </a:r>
+            <a:r>
+              <a:rPr lang="en-US"/>
+              <a:t>:</a:t>
+            </a:r>
+            <a:endParaRPr lang="en-US"/>
           </a:p>
         </p:txBody>
       </p:sp>
@@ -32221,7 +31274,7 @@
         <p:spPr>
           <a:xfrm>
             <a:off x="838200" y="1825625"/>
-            <a:ext cx="10710545" cy="4351655"/>
+            <a:ext cx="11195685" cy="4351655"/>
           </a:xfrm>
         </p:spPr>
         <p:txBody>
@@ -32232,7 +31285,7 @@
             </a:pPr>
             <a:r>
               <a:rPr lang="en-US"/>
-              <a:t>There is no direct business impact in this case ,but this amount of information can definitely lead to social engineering attacks on the seller and can indirectly harm the business.</a:t>
+              <a:t>Only name and email is sufficient as far as the query or help is concerned.</a:t>
             </a:r>
             <a:endParaRPr lang="en-US"/>
           </a:p>
@@ -32268,80 +31321,6 @@
         </p:nvSpPr>
         <p:spPr/>
         <p:txBody>
-          <a:bodyPr/>
-          <a:p>
-            <a:r>
-              <a:rPr lang="en-US" u="sng"/>
-              <a:t>Recommendation</a:t>
-            </a:r>
-            <a:r>
-              <a:rPr lang="en-US"/>
-              <a:t>:</a:t>
-            </a:r>
-            <a:endParaRPr lang="en-US"/>
-          </a:p>
-        </p:txBody>
-      </p:sp>
-      <p:sp>
-        <p:nvSpPr>
-          <p:cNvPr id="3" name="Content Placeholder 2"/>
-          <p:cNvSpPr>
-            <a:spLocks noGrp="1"/>
-          </p:cNvSpPr>
-          <p:nvPr>
-            <p:ph sz="half" idx="1"/>
-          </p:nvPr>
-        </p:nvSpPr>
-        <p:spPr>
-          <a:xfrm>
-            <a:off x="838200" y="1825625"/>
-            <a:ext cx="11195685" cy="4351655"/>
-          </a:xfrm>
-        </p:spPr>
-        <p:txBody>
-          <a:bodyPr/>
-          <a:p>
-            <a:pPr marL="0" indent="0">
-              <a:buNone/>
-            </a:pPr>
-            <a:r>
-              <a:rPr lang="en-US"/>
-              <a:t>Only name and email is sufficient as far as the query or help is concerned.</a:t>
-            </a:r>
-            <a:endParaRPr lang="en-US"/>
-          </a:p>
-        </p:txBody>
-      </p:sp>
-    </p:spTree>
-  </p:cSld>
-  <p:clrMapOvr>
-    <a:masterClrMapping/>
-  </p:clrMapOvr>
-</p:sld>
-</file>
-
-<file path=ppt/slides/slide96.xml><?xml version="1.0" encoding="utf-8"?>
-<p:sld xmlns:a="http://schemas.openxmlformats.org/drawingml/2006/main" xmlns:r="http://schemas.openxmlformats.org/officeDocument/2006/relationships" xmlns:p="http://schemas.openxmlformats.org/presentationml/2006/main">
-  <p:cSld>
-    <p:spTree>
-      <p:nvGrpSpPr>
-        <p:cNvPr id="1" name=""/>
-        <p:cNvGrpSpPr/>
-        <p:nvPr/>
-      </p:nvGrpSpPr>
-      <p:grpSpPr/>
-      <p:sp>
-        <p:nvSpPr>
-          <p:cNvPr id="2" name="Title 1"/>
-          <p:cNvSpPr>
-            <a:spLocks noGrp="1"/>
-          </p:cNvSpPr>
-          <p:nvPr>
-            <p:ph type="title"/>
-          </p:nvPr>
-        </p:nvSpPr>
-        <p:spPr/>
-        <p:txBody>
           <a:bodyPr>
             <a:scene3d>
               <a:camera prst="orthographicFront"/>
@@ -32751,7 +31730,7 @@
 </p:sld>
 </file>
 
-<file path=ppt/slides/slide97.xml><?xml version="1.0" encoding="utf-8"?>
+<file path=ppt/slides/slide96.xml><?xml version="1.0" encoding="utf-8"?>
 <p:sld xmlns:a="http://schemas.openxmlformats.org/drawingml/2006/main" xmlns:r="http://schemas.openxmlformats.org/officeDocument/2006/relationships" xmlns:p="http://schemas.openxmlformats.org/presentationml/2006/main">
   <p:cSld>
     <p:spTree>
@@ -32907,7 +31886,7 @@
 </p:sld>
 </file>
 
-<file path=ppt/slides/slide98.xml><?xml version="1.0" encoding="utf-8"?>
+<file path=ppt/slides/slide97.xml><?xml version="1.0" encoding="utf-8"?>
 <p:sld xmlns:a="http://schemas.openxmlformats.org/drawingml/2006/main" xmlns:r="http://schemas.openxmlformats.org/officeDocument/2006/relationships" xmlns:p="http://schemas.openxmlformats.org/presentationml/2006/main">
   <p:cSld>
     <p:spTree>
@@ -32995,7 +31974,7 @@
 </p:sld>
 </file>
 
-<file path=ppt/slides/slide99.xml><?xml version="1.0" encoding="utf-8"?>
+<file path=ppt/slides/slide98.xml><?xml version="1.0" encoding="utf-8"?>
 <p:sld xmlns:a="http://schemas.openxmlformats.org/drawingml/2006/main" xmlns:r="http://schemas.openxmlformats.org/officeDocument/2006/relationships" xmlns:p="http://schemas.openxmlformats.org/presentationml/2006/main">
   <p:cSld>
     <p:spTree>
@@ -33210,6 +32189,518 @@
   <p:clrMapOvr>
     <a:masterClrMapping/>
   </p:clrMapOvr>
+</p:sld>
+</file>
+
+<file path=ppt/slides/slide99.xml><?xml version="1.0" encoding="utf-8"?>
+<p:sld xmlns:a="http://schemas.openxmlformats.org/drawingml/2006/main" xmlns:r="http://schemas.openxmlformats.org/officeDocument/2006/relationships" xmlns:p="http://schemas.openxmlformats.org/presentationml/2006/main">
+  <p:cSld>
+    <p:spTree>
+      <p:nvGrpSpPr>
+        <p:cNvPr id="1" name=""/>
+        <p:cNvGrpSpPr/>
+        <p:nvPr/>
+      </p:nvGrpSpPr>
+      <p:grpSpPr>
+        <a:xfrm>
+          <a:off x="0" y="0"/>
+          <a:ext cx="0" cy="0"/>
+          <a:chOff x="0" y="0"/>
+          <a:chExt cx="0" cy="0"/>
+        </a:xfrm>
+      </p:grpSpPr>
+      <p:sp>
+        <p:nvSpPr>
+          <p:cNvPr id="4" name="Slide Number Placeholder 3"/>
+          <p:cNvSpPr>
+            <a:spLocks noGrp="1"/>
+          </p:cNvSpPr>
+          <p:nvPr>
+            <p:ph type="sldNum" sz="quarter" idx="2"/>
+          </p:nvPr>
+        </p:nvSpPr>
+        <p:spPr/>
+        <p:txBody>
+          <a:bodyPr/>
+          <a:lstStyle/>
+          <a:p>
+            <a:pPr lvl="0"/>
+            <a:fld id="{86CB4B4D-7CA3-9044-876B-883B54F8677D}" type="slidenum">
+              <a:rPr lang="uk-UA" smtClean="0"/>
+            </a:fld>
+            <a:endParaRPr lang="uk-UA"/>
+          </a:p>
+        </p:txBody>
+      </p:sp>
+      <p:sp>
+        <p:nvSpPr>
+          <p:cNvPr id="3" name="Title 2"/>
+          <p:cNvSpPr>
+            <a:spLocks noGrp="1"/>
+          </p:cNvSpPr>
+          <p:nvPr>
+            <p:ph type="title"/>
+          </p:nvPr>
+        </p:nvSpPr>
+        <p:spPr>
+          <a:xfrm>
+            <a:off x="800100" y="488950"/>
+            <a:ext cx="10515600" cy="1325563"/>
+          </a:xfrm>
+        </p:spPr>
+        <p:txBody>
+          <a:bodyPr>
+            <a:normAutofit/>
+          </a:bodyPr>
+          <a:lstStyle/>
+          <a:p>
+            <a:r>
+              <a:rPr lang="en-US">
+                <a:sym typeface="+mn-ea"/>
+              </a:rPr>
+              <a:t>16)</a:t>
+            </a:r>
+            <a:r>
+              <a:rPr lang="en-US" u="sng">
+                <a:gradFill>
+                  <a:gsLst>
+                    <a:gs pos="21000">
+                      <a:srgbClr val="53575C"/>
+                    </a:gs>
+                    <a:gs pos="88000">
+                      <a:srgbClr val="C5C7CA"/>
+                    </a:gs>
+                  </a:gsLst>
+                  <a:lin ang="5400000"/>
+                </a:gradFill>
+                <a:effectLst/>
+                <a:sym typeface="+mn-ea"/>
+              </a:rPr>
+              <a:t>Improper Server Side Filter</a:t>
+            </a:r>
+            <a:endParaRPr lang="en-IN" dirty="0" smtClean="0"/>
+          </a:p>
+        </p:txBody>
+      </p:sp>
+      <p:graphicFrame>
+        <p:nvGraphicFramePr>
+          <p:cNvPr id="6" name="Table 5"/>
+          <p:cNvGraphicFramePr>
+            <a:graphicFrameLocks noGrp="1"/>
+          </p:cNvGraphicFramePr>
+          <p:nvPr/>
+        </p:nvGraphicFramePr>
+        <p:xfrm>
+          <a:off x="1751173" y="2188740"/>
+          <a:ext cx="8109380" cy="2821929"/>
+        </p:xfrm>
+        <a:graphic>
+          <a:graphicData uri="http://schemas.openxmlformats.org/drawingml/2006/table">
+            <a:tbl>
+              <a:tblPr firstRow="1" bandRow="1">
+                <a:tableStyleId>{5C22544A-7EE6-4342-B048-85BDC9FD1C3A}</a:tableStyleId>
+              </a:tblPr>
+              <a:tblGrid>
+                <a:gridCol w="1413562"/>
+                <a:gridCol w="6695818"/>
+              </a:tblGrid>
+              <a:tr h="415290">
+                <a:tc>
+                  <a:txBody>
+                    <a:bodyPr/>
+                    <a:lstStyle/>
+                    <a:p>
+                      <a:pPr algn="ctr"/>
+                      <a:endParaRPr lang="en-US" sz="1600" dirty="0"/>
+                    </a:p>
+                  </a:txBody>
+                  <a:tcPr marL="82988" marR="82988" marT="41494" marB="41494">
+                    <a:lnL w="12700" cmpd="sng">
+                      <a:noFill/>
+                    </a:lnL>
+                    <a:lnR w="12700" cmpd="sng">
+                      <a:noFill/>
+                    </a:lnR>
+                    <a:lnT w="12700" cmpd="sng">
+                      <a:noFill/>
+                    </a:lnT>
+                    <a:lnB w="12700" cap="flat" cmpd="sng" algn="ctr">
+                      <a:solidFill>
+                        <a:schemeClr val="tx1"/>
+                      </a:solidFill>
+                      <a:prstDash val="solid"/>
+                      <a:round/>
+                      <a:headEnd type="none" w="med" len="med"/>
+                      <a:tailEnd type="none" w="med" len="med"/>
+                    </a:lnB>
+                    <a:lnTlToBr w="12700" cmpd="sng">
+                      <a:noFill/>
+                      <a:prstDash val="solid"/>
+                    </a:lnTlToBr>
+                    <a:lnBlToTr w="12700" cmpd="sng">
+                      <a:noFill/>
+                      <a:prstDash val="solid"/>
+                    </a:lnBlToTr>
+                    <a:noFill/>
+                  </a:tcPr>
+                </a:tc>
+                <a:tc>
+                  <a:txBody>
+                    <a:bodyPr/>
+                    <a:lstStyle/>
+                    <a:p>
+                      <a:endParaRPr lang="en-US" sz="1600" dirty="0"/>
+                    </a:p>
+                  </a:txBody>
+                  <a:tcPr marL="82988" marR="82988" marT="41494" marB="41494">
+                    <a:lnL w="12700" cmpd="sng">
+                      <a:noFill/>
+                    </a:lnL>
+                    <a:lnR w="12700" cmpd="sng">
+                      <a:noFill/>
+                    </a:lnR>
+                    <a:lnT w="12700" cmpd="sng">
+                      <a:noFill/>
+                    </a:lnT>
+                    <a:lnB w="12700" cap="flat" cmpd="sng" algn="ctr">
+                      <a:solidFill>
+                        <a:schemeClr val="tx1"/>
+                      </a:solidFill>
+                      <a:prstDash val="solid"/>
+                      <a:round/>
+                      <a:headEnd type="none" w="med" len="med"/>
+                      <a:tailEnd type="none" w="med" len="med"/>
+                    </a:lnB>
+                    <a:lnTlToBr w="12700" cmpd="sng">
+                      <a:noFill/>
+                      <a:prstDash val="solid"/>
+                    </a:lnTlToBr>
+                    <a:lnBlToTr w="12700" cmpd="sng">
+                      <a:noFill/>
+                      <a:prstDash val="solid"/>
+                    </a:lnBlToTr>
+                    <a:noFill/>
+                  </a:tcPr>
+                </a:tc>
+              </a:tr>
+              <a:tr h="2406639">
+                <a:tc>
+                  <a:txBody>
+                    <a:bodyPr/>
+                    <a:lstStyle/>
+                    <a:p>
+                      <a:pPr algn="ctr"/>
+                      <a:r>
+                        <a:rPr lang="en-US" altLang="en-IN" sz="1600" dirty="0" smtClean="0">
+                          <a:solidFill>
+                            <a:schemeClr val="tx1"/>
+                          </a:solidFill>
+                          <a:latin typeface="Calibri" panose="020F0502020204030204" charset="0"/>
+                        </a:rPr>
+                        <a:t>Improper Server Side Filter</a:t>
+                      </a:r>
+                      <a:r>
+                        <a:rPr lang="en-IN" sz="1600" dirty="0" smtClean="0">
+                          <a:solidFill>
+                            <a:schemeClr val="tx1"/>
+                          </a:solidFill>
+                          <a:latin typeface="Calibri" panose="020F0502020204030204" charset="0"/>
+                        </a:rPr>
+                        <a:t> </a:t>
+                      </a:r>
+                      <a:r>
+                        <a:rPr lang="en-US" sz="1300" dirty="0" smtClean="0">
+                          <a:solidFill>
+                            <a:schemeClr val="tx1"/>
+                          </a:solidFill>
+                          <a:latin typeface="Calibri" panose="020F0502020204030204" charset="0"/>
+                        </a:rPr>
+                        <a:t>(Low)</a:t>
+                      </a:r>
+                      <a:endParaRPr lang="en-US" sz="1300" dirty="0">
+                        <a:solidFill>
+                          <a:schemeClr val="tx1"/>
+                        </a:solidFill>
+                        <a:latin typeface="Calibri" panose="020F0502020204030204" charset="0"/>
+                      </a:endParaRPr>
+                    </a:p>
+                  </a:txBody>
+                  <a:tcPr marL="82988" marR="82988" marT="41494" marB="41494" anchor="ctr">
+                    <a:lnL w="12700" cap="flat" cmpd="sng" algn="ctr">
+                      <a:solidFill>
+                        <a:schemeClr val="tx1"/>
+                      </a:solidFill>
+                      <a:prstDash val="solid"/>
+                      <a:round/>
+                      <a:headEnd type="none" w="med" len="med"/>
+                      <a:tailEnd type="none" w="med" len="med"/>
+                    </a:lnL>
+                    <a:lnR w="12700" cap="flat" cmpd="sng" algn="ctr">
+                      <a:solidFill>
+                        <a:schemeClr val="tx1"/>
+                      </a:solidFill>
+                      <a:prstDash val="solid"/>
+                      <a:round/>
+                      <a:headEnd type="none" w="med" len="med"/>
+                      <a:tailEnd type="none" w="med" len="med"/>
+                    </a:lnR>
+                    <a:lnT w="12700" cap="flat" cmpd="sng" algn="ctr">
+                      <a:solidFill>
+                        <a:schemeClr val="tx1"/>
+                      </a:solidFill>
+                      <a:prstDash val="solid"/>
+                      <a:round/>
+                      <a:headEnd type="none" w="med" len="med"/>
+                      <a:tailEnd type="none" w="med" len="med"/>
+                    </a:lnT>
+                    <a:lnB w="12700" cap="flat" cmpd="sng" algn="ctr">
+                      <a:solidFill>
+                        <a:schemeClr val="tx1"/>
+                      </a:solidFill>
+                      <a:prstDash val="solid"/>
+                      <a:round/>
+                      <a:headEnd type="none" w="med" len="med"/>
+                      <a:tailEnd type="none" w="med" len="med"/>
+                    </a:lnB>
+                    <a:solidFill>
+                      <a:srgbClr val="92D050"/>
+                    </a:solidFill>
+                  </a:tcPr>
+                </a:tc>
+                <a:tc>
+                  <a:txBody>
+                    <a:bodyPr/>
+                    <a:lstStyle/>
+                    <a:p>
+                      <a:r>
+                        <a:rPr lang="en-US" sz="1300" dirty="0" smtClean="0">
+                          <a:solidFill>
+                            <a:schemeClr val="tx1"/>
+                          </a:solidFill>
+                          <a:latin typeface="Calibri" panose="020F0502020204030204" charset="0"/>
+                        </a:rPr>
+                        <a:t> </a:t>
+                      </a:r>
+                      <a:endParaRPr lang="en-US" sz="1300" dirty="0">
+                        <a:solidFill>
+                          <a:schemeClr val="tx1"/>
+                        </a:solidFill>
+                        <a:latin typeface="Calibri" panose="020F0502020204030204" charset="0"/>
+                      </a:endParaRPr>
+                    </a:p>
+                    <a:p>
+                      <a:r>
+                        <a:rPr lang="en-US" sz="1300" baseline="0" dirty="0" smtClean="0">
+                          <a:solidFill>
+                            <a:schemeClr val="tx1"/>
+                          </a:solidFill>
+                          <a:latin typeface="Calibri" panose="020F0502020204030204" charset="0"/>
+                        </a:rPr>
+                        <a:t>Below mentioned </a:t>
+                      </a:r>
+                      <a:r>
+                        <a:rPr lang="en-US" sz="1300" baseline="0" dirty="0" err="1" smtClean="0">
+                          <a:solidFill>
+                            <a:schemeClr val="tx1"/>
+                          </a:solidFill>
+                          <a:latin typeface="Calibri" panose="020F0502020204030204" charset="0"/>
+                        </a:rPr>
+                        <a:t>urls</a:t>
+                      </a:r>
+                      <a:r>
+                        <a:rPr lang="en-US" sz="1300" baseline="0" dirty="0" smtClean="0">
+                          <a:solidFill>
+                            <a:schemeClr val="tx1"/>
+                          </a:solidFill>
+                          <a:latin typeface="Calibri" panose="020F0502020204030204" charset="0"/>
+                        </a:rPr>
+                        <a:t> have improper server side filter</a:t>
+                      </a:r>
+                      <a:endParaRPr lang="en-US" sz="1300" dirty="0" smtClean="0">
+                        <a:solidFill>
+                          <a:schemeClr val="tx1"/>
+                        </a:solidFill>
+                        <a:latin typeface="Calibri" panose="020F0502020204030204" charset="0"/>
+                        <a:cs typeface="Calibri" panose="020F0502020204030204" charset="0"/>
+                      </a:endParaRPr>
+                    </a:p>
+                    <a:p>
+                      <a:endParaRPr lang="en-US" sz="1300" dirty="0" smtClean="0">
+                        <a:solidFill>
+                          <a:schemeClr val="tx1"/>
+                        </a:solidFill>
+                        <a:latin typeface="Calibri" panose="020F0502020204030204" charset="0"/>
+                      </a:endParaRPr>
+                    </a:p>
+                    <a:p>
+                      <a:r>
+                        <a:rPr lang="en-US" sz="1300" b="1" dirty="0" smtClean="0">
+                          <a:solidFill>
+                            <a:schemeClr val="tx1"/>
+                          </a:solidFill>
+                          <a:latin typeface="Calibri" panose="020F0502020204030204" charset="0"/>
+                        </a:rPr>
+                        <a:t>Affected URL :</a:t>
+                      </a:r>
+                      <a:endParaRPr lang="en-US" sz="1300" b="0" i="0" u="none" strike="noStrike" dirty="0" smtClean="0">
+                        <a:solidFill>
+                          <a:schemeClr val="tx1"/>
+                        </a:solidFill>
+                        <a:effectLst/>
+                        <a:latin typeface="Calibri" panose="020F0502020204030204" charset="0"/>
+                        <a:ea typeface="+mn-ea"/>
+                        <a:cs typeface="+mn-cs"/>
+                        <a:sym typeface="Arial" panose="020B0604020202020204"/>
+                      </a:endParaRPr>
+                    </a:p>
+                    <a:p>
+                      <a:pPr marL="285750" indent="-285750">
+                        <a:buFont typeface="Arial" panose="020B0604020202020204" pitchFamily="34" charset="0"/>
+                        <a:buChar char="•"/>
+                      </a:pPr>
+                      <a:r>
+                        <a:rPr lang="en-US" sz="1300" b="0" dirty="0" smtClean="0">
+                          <a:solidFill>
+                            <a:schemeClr val="tx1"/>
+                          </a:solidFill>
+                          <a:latin typeface="Calibri" panose="020F0502020204030204" charset="0"/>
+                        </a:rPr>
+                        <a:t>http://13.233.108.21/profile/16/edit/</a:t>
+                      </a:r>
+                      <a:endParaRPr lang="en-US" sz="1300" b="0" dirty="0" smtClean="0">
+                        <a:solidFill>
+                          <a:schemeClr val="tx1"/>
+                        </a:solidFill>
+                        <a:latin typeface="Calibri" panose="020F0502020204030204" charset="0"/>
+                      </a:endParaRPr>
+                    </a:p>
+                    <a:p>
+                      <a:pPr indent="0">
+                        <a:buFont typeface="Arial" panose="020B0604020202020204" pitchFamily="34" charset="0"/>
+                        <a:buNone/>
+                      </a:pPr>
+                      <a:r>
+                        <a:rPr lang="en-US" sz="1300" b="1" dirty="0" smtClean="0">
+                          <a:solidFill>
+                            <a:schemeClr val="tx1"/>
+                          </a:solidFill>
+                          <a:latin typeface="Calibri" panose="020F0502020204030204" charset="0"/>
+                        </a:rPr>
+                        <a:t>Affected parameter:</a:t>
+                      </a:r>
+                      <a:endParaRPr lang="en-US" sz="1300" b="0" dirty="0" smtClean="0">
+                        <a:solidFill>
+                          <a:schemeClr val="tx1"/>
+                        </a:solidFill>
+                        <a:latin typeface="Calibri" panose="020F0502020204030204" charset="0"/>
+                      </a:endParaRPr>
+                    </a:p>
+                    <a:p>
+                      <a:pPr marL="285750" indent="-285750">
+                        <a:buFont typeface="Arial" panose="020B0604020202020204" pitchFamily="34" charset="0"/>
+                        <a:buChar char="•"/>
+                      </a:pPr>
+                      <a:r>
+                        <a:rPr lang="en-US" sz="1300" b="0" dirty="0" smtClean="0">
+                          <a:solidFill>
+                            <a:schemeClr val="tx1"/>
+                          </a:solidFill>
+                          <a:latin typeface="Calibri" panose="020F0502020204030204" charset="0"/>
+                        </a:rPr>
+                        <a:t>Contact Number</a:t>
+                      </a:r>
+                      <a:endParaRPr lang="en-US" sz="1300" b="0" dirty="0" smtClean="0">
+                        <a:solidFill>
+                          <a:schemeClr val="tx1"/>
+                        </a:solidFill>
+                        <a:latin typeface="Calibri" panose="020F0502020204030204" charset="0"/>
+                      </a:endParaRPr>
+                    </a:p>
+                    <a:p>
+                      <a:pPr marL="285750" indent="-285750">
+                        <a:buFont typeface="Arial" panose="020B0604020202020204" pitchFamily="34" charset="0"/>
+                        <a:buChar char="•"/>
+                      </a:pPr>
+                      <a:endParaRPr lang="en-US" sz="1300" b="0" dirty="0" smtClean="0">
+                        <a:solidFill>
+                          <a:schemeClr val="tx1"/>
+                        </a:solidFill>
+                        <a:latin typeface="Calibri" panose="020F0502020204030204" charset="0"/>
+                      </a:endParaRPr>
+                    </a:p>
+                    <a:p>
+                      <a:pPr marL="285750" indent="-285750">
+                        <a:buFont typeface="Arial" panose="020B0604020202020204" pitchFamily="34" charset="0"/>
+                        <a:buChar char="•"/>
+                      </a:pPr>
+                      <a:endParaRPr lang="en-US" sz="1300" b="0" dirty="0">
+                        <a:solidFill>
+                          <a:schemeClr val="tx1"/>
+                        </a:solidFill>
+                        <a:latin typeface="Calibri" panose="020F0502020204030204" charset="0"/>
+                      </a:endParaRPr>
+                    </a:p>
+                  </a:txBody>
+                  <a:tcPr marL="82988" marR="82988" marT="41494" marB="41494">
+                    <a:lnL w="12700" cap="flat" cmpd="sng" algn="ctr">
+                      <a:solidFill>
+                        <a:schemeClr val="tx1"/>
+                      </a:solidFill>
+                      <a:prstDash val="solid"/>
+                      <a:round/>
+                      <a:headEnd type="none" w="med" len="med"/>
+                      <a:tailEnd type="none" w="med" len="med"/>
+                    </a:lnL>
+                    <a:lnR w="12700" cap="flat" cmpd="sng" algn="ctr">
+                      <a:solidFill>
+                        <a:schemeClr val="tx1"/>
+                      </a:solidFill>
+                      <a:prstDash val="solid"/>
+                      <a:round/>
+                      <a:headEnd type="none" w="med" len="med"/>
+                      <a:tailEnd type="none" w="med" len="med"/>
+                    </a:lnR>
+                    <a:lnT w="12700" cap="flat" cmpd="sng" algn="ctr">
+                      <a:solidFill>
+                        <a:schemeClr val="tx1"/>
+                      </a:solidFill>
+                      <a:prstDash val="solid"/>
+                      <a:round/>
+                      <a:headEnd type="none" w="med" len="med"/>
+                      <a:tailEnd type="none" w="med" len="med"/>
+                    </a:lnT>
+                    <a:lnB w="12700" cap="flat" cmpd="sng" algn="ctr">
+                      <a:solidFill>
+                        <a:schemeClr val="tx1"/>
+                      </a:solidFill>
+                      <a:prstDash val="solid"/>
+                      <a:round/>
+                      <a:headEnd type="none" w="med" len="med"/>
+                      <a:tailEnd type="none" w="med" len="med"/>
+                    </a:lnB>
+                    <a:solidFill>
+                      <a:schemeClr val="bg1"/>
+                    </a:solidFill>
+                  </a:tcPr>
+                </a:tc>
+              </a:tr>
+            </a:tbl>
+          </a:graphicData>
+        </a:graphic>
+      </p:graphicFrame>
+    </p:spTree>
+  </p:cSld>
+  <p:clrMapOvr>
+    <a:masterClrMapping/>
+  </p:clrMapOvr>
+  <p:transition spd="med"/>
+  <p:timing>
+    <p:tnLst>
+      <p:par>
+        <p:cTn id="1" dur="indefinite" restart="never" nodeType="tmRoot"/>
+      </p:par>
+    </p:tnLst>
+  </p:timing>
 </p:sld>
 </file>
 

</xml_diff>

<commit_message>
reports: PII leakage ppt done
</commit_message>
<xml_diff>
--- a/reports/Lifestyle Store/LifeStyle Store Application Reports.pptx
+++ b/reports/Lifestyle Store/LifeStyle Store Application Reports.pptx
@@ -100,29 +100,30 @@
     <p:sldId id="493" r:id="rId93"/>
     <p:sldId id="352" r:id="rId94"/>
     <p:sldId id="355" r:id="rId95"/>
-    <p:sldId id="356" r:id="rId96"/>
-    <p:sldId id="357" r:id="rId97"/>
-    <p:sldId id="358" r:id="rId98"/>
-    <p:sldId id="359" r:id="rId99"/>
-    <p:sldId id="360" r:id="rId100"/>
-    <p:sldId id="361" r:id="rId101"/>
-    <p:sldId id="364" r:id="rId102"/>
-    <p:sldId id="365" r:id="rId103"/>
-    <p:sldId id="366" r:id="rId104"/>
-    <p:sldId id="367" r:id="rId105"/>
-    <p:sldId id="368" r:id="rId106"/>
-    <p:sldId id="369" r:id="rId107"/>
-    <p:sldId id="370" r:id="rId108"/>
-    <p:sldId id="371" r:id="rId109"/>
-    <p:sldId id="372" r:id="rId110"/>
-    <p:sldId id="373" r:id="rId111"/>
-    <p:sldId id="374" r:id="rId112"/>
-    <p:sldId id="375" r:id="rId113"/>
-    <p:sldId id="376" r:id="rId114"/>
-    <p:sldId id="377" r:id="rId115"/>
-    <p:sldId id="378" r:id="rId116"/>
-    <p:sldId id="380" r:id="rId117"/>
-    <p:sldId id="381" r:id="rId118"/>
+    <p:sldId id="591" r:id="rId96"/>
+    <p:sldId id="356" r:id="rId97"/>
+    <p:sldId id="357" r:id="rId98"/>
+    <p:sldId id="358" r:id="rId99"/>
+    <p:sldId id="359" r:id="rId100"/>
+    <p:sldId id="360" r:id="rId101"/>
+    <p:sldId id="361" r:id="rId102"/>
+    <p:sldId id="364" r:id="rId103"/>
+    <p:sldId id="365" r:id="rId104"/>
+    <p:sldId id="366" r:id="rId105"/>
+    <p:sldId id="367" r:id="rId106"/>
+    <p:sldId id="368" r:id="rId107"/>
+    <p:sldId id="369" r:id="rId108"/>
+    <p:sldId id="370" r:id="rId109"/>
+    <p:sldId id="371" r:id="rId110"/>
+    <p:sldId id="372" r:id="rId111"/>
+    <p:sldId id="373" r:id="rId112"/>
+    <p:sldId id="374" r:id="rId113"/>
+    <p:sldId id="375" r:id="rId114"/>
+    <p:sldId id="376" r:id="rId115"/>
+    <p:sldId id="377" r:id="rId116"/>
+    <p:sldId id="378" r:id="rId117"/>
+    <p:sldId id="380" r:id="rId118"/>
+    <p:sldId id="381" r:id="rId119"/>
   </p:sldIdLst>
   <p:sldSz cx="12192000" cy="6858000"/>
   <p:notesSz cx="6858000" cy="9144000"/>
@@ -4125,6 +4126,518 @@
         <p:cNvGrpSpPr/>
         <p:nvPr/>
       </p:nvGrpSpPr>
+      <p:grpSpPr>
+        <a:xfrm>
+          <a:off x="0" y="0"/>
+          <a:ext cx="0" cy="0"/>
+          <a:chOff x="0" y="0"/>
+          <a:chExt cx="0" cy="0"/>
+        </a:xfrm>
+      </p:grpSpPr>
+      <p:sp>
+        <p:nvSpPr>
+          <p:cNvPr id="4" name="Slide Number Placeholder 3"/>
+          <p:cNvSpPr>
+            <a:spLocks noGrp="1"/>
+          </p:cNvSpPr>
+          <p:nvPr>
+            <p:ph type="sldNum" sz="quarter" idx="2"/>
+          </p:nvPr>
+        </p:nvSpPr>
+        <p:spPr/>
+        <p:txBody>
+          <a:bodyPr/>
+          <a:lstStyle/>
+          <a:p>
+            <a:pPr lvl="0"/>
+            <a:fld id="{86CB4B4D-7CA3-9044-876B-883B54F8677D}" type="slidenum">
+              <a:rPr lang="uk-UA" smtClean="0"/>
+            </a:fld>
+            <a:endParaRPr lang="uk-UA"/>
+          </a:p>
+        </p:txBody>
+      </p:sp>
+      <p:sp>
+        <p:nvSpPr>
+          <p:cNvPr id="3" name="Title 2"/>
+          <p:cNvSpPr>
+            <a:spLocks noGrp="1"/>
+          </p:cNvSpPr>
+          <p:nvPr>
+            <p:ph type="title"/>
+          </p:nvPr>
+        </p:nvSpPr>
+        <p:spPr>
+          <a:xfrm>
+            <a:off x="800100" y="488950"/>
+            <a:ext cx="10515600" cy="1325563"/>
+          </a:xfrm>
+        </p:spPr>
+        <p:txBody>
+          <a:bodyPr>
+            <a:normAutofit/>
+          </a:bodyPr>
+          <a:lstStyle/>
+          <a:p>
+            <a:r>
+              <a:rPr lang="en-US">
+                <a:sym typeface="+mn-ea"/>
+              </a:rPr>
+              <a:t>16)</a:t>
+            </a:r>
+            <a:r>
+              <a:rPr lang="en-US" u="sng">
+                <a:gradFill>
+                  <a:gsLst>
+                    <a:gs pos="21000">
+                      <a:srgbClr val="53575C"/>
+                    </a:gs>
+                    <a:gs pos="88000">
+                      <a:srgbClr val="C5C7CA"/>
+                    </a:gs>
+                  </a:gsLst>
+                  <a:lin ang="5400000"/>
+                </a:gradFill>
+                <a:effectLst/>
+                <a:sym typeface="+mn-ea"/>
+              </a:rPr>
+              <a:t>Improper Server Side Filter</a:t>
+            </a:r>
+            <a:endParaRPr lang="en-IN" dirty="0" smtClean="0"/>
+          </a:p>
+        </p:txBody>
+      </p:sp>
+      <p:graphicFrame>
+        <p:nvGraphicFramePr>
+          <p:cNvPr id="6" name="Table 5"/>
+          <p:cNvGraphicFramePr>
+            <a:graphicFrameLocks noGrp="1"/>
+          </p:cNvGraphicFramePr>
+          <p:nvPr/>
+        </p:nvGraphicFramePr>
+        <p:xfrm>
+          <a:off x="1751173" y="2188740"/>
+          <a:ext cx="8109380" cy="2821929"/>
+        </p:xfrm>
+        <a:graphic>
+          <a:graphicData uri="http://schemas.openxmlformats.org/drawingml/2006/table">
+            <a:tbl>
+              <a:tblPr firstRow="1" bandRow="1">
+                <a:tableStyleId>{5C22544A-7EE6-4342-B048-85BDC9FD1C3A}</a:tableStyleId>
+              </a:tblPr>
+              <a:tblGrid>
+                <a:gridCol w="1413562"/>
+                <a:gridCol w="6695818"/>
+              </a:tblGrid>
+              <a:tr h="415290">
+                <a:tc>
+                  <a:txBody>
+                    <a:bodyPr/>
+                    <a:lstStyle/>
+                    <a:p>
+                      <a:pPr algn="ctr"/>
+                      <a:endParaRPr lang="en-US" sz="1600" dirty="0"/>
+                    </a:p>
+                  </a:txBody>
+                  <a:tcPr marL="82988" marR="82988" marT="41494" marB="41494">
+                    <a:lnL w="12700" cmpd="sng">
+                      <a:noFill/>
+                    </a:lnL>
+                    <a:lnR w="12700" cmpd="sng">
+                      <a:noFill/>
+                    </a:lnR>
+                    <a:lnT w="12700" cmpd="sng">
+                      <a:noFill/>
+                    </a:lnT>
+                    <a:lnB w="12700" cap="flat" cmpd="sng" algn="ctr">
+                      <a:solidFill>
+                        <a:schemeClr val="tx1"/>
+                      </a:solidFill>
+                      <a:prstDash val="solid"/>
+                      <a:round/>
+                      <a:headEnd type="none" w="med" len="med"/>
+                      <a:tailEnd type="none" w="med" len="med"/>
+                    </a:lnB>
+                    <a:lnTlToBr w="12700" cmpd="sng">
+                      <a:noFill/>
+                      <a:prstDash val="solid"/>
+                    </a:lnTlToBr>
+                    <a:lnBlToTr w="12700" cmpd="sng">
+                      <a:noFill/>
+                      <a:prstDash val="solid"/>
+                    </a:lnBlToTr>
+                    <a:noFill/>
+                  </a:tcPr>
+                </a:tc>
+                <a:tc>
+                  <a:txBody>
+                    <a:bodyPr/>
+                    <a:lstStyle/>
+                    <a:p>
+                      <a:endParaRPr lang="en-US" sz="1600" dirty="0"/>
+                    </a:p>
+                  </a:txBody>
+                  <a:tcPr marL="82988" marR="82988" marT="41494" marB="41494">
+                    <a:lnL w="12700" cmpd="sng">
+                      <a:noFill/>
+                    </a:lnL>
+                    <a:lnR w="12700" cmpd="sng">
+                      <a:noFill/>
+                    </a:lnR>
+                    <a:lnT w="12700" cmpd="sng">
+                      <a:noFill/>
+                    </a:lnT>
+                    <a:lnB w="12700" cap="flat" cmpd="sng" algn="ctr">
+                      <a:solidFill>
+                        <a:schemeClr val="tx1"/>
+                      </a:solidFill>
+                      <a:prstDash val="solid"/>
+                      <a:round/>
+                      <a:headEnd type="none" w="med" len="med"/>
+                      <a:tailEnd type="none" w="med" len="med"/>
+                    </a:lnB>
+                    <a:lnTlToBr w="12700" cmpd="sng">
+                      <a:noFill/>
+                      <a:prstDash val="solid"/>
+                    </a:lnTlToBr>
+                    <a:lnBlToTr w="12700" cmpd="sng">
+                      <a:noFill/>
+                      <a:prstDash val="solid"/>
+                    </a:lnBlToTr>
+                    <a:noFill/>
+                  </a:tcPr>
+                </a:tc>
+              </a:tr>
+              <a:tr h="2406639">
+                <a:tc>
+                  <a:txBody>
+                    <a:bodyPr/>
+                    <a:lstStyle/>
+                    <a:p>
+                      <a:pPr algn="ctr"/>
+                      <a:r>
+                        <a:rPr lang="en-US" altLang="en-IN" sz="1600" dirty="0" smtClean="0">
+                          <a:solidFill>
+                            <a:schemeClr val="tx1"/>
+                          </a:solidFill>
+                          <a:latin typeface="Calibri" panose="020F0502020204030204" charset="0"/>
+                        </a:rPr>
+                        <a:t>Improper Server Side Filter</a:t>
+                      </a:r>
+                      <a:r>
+                        <a:rPr lang="en-IN" sz="1600" dirty="0" smtClean="0">
+                          <a:solidFill>
+                            <a:schemeClr val="tx1"/>
+                          </a:solidFill>
+                          <a:latin typeface="Calibri" panose="020F0502020204030204" charset="0"/>
+                        </a:rPr>
+                        <a:t> </a:t>
+                      </a:r>
+                      <a:r>
+                        <a:rPr lang="en-US" sz="1300" dirty="0" smtClean="0">
+                          <a:solidFill>
+                            <a:schemeClr val="tx1"/>
+                          </a:solidFill>
+                          <a:latin typeface="Calibri" panose="020F0502020204030204" charset="0"/>
+                        </a:rPr>
+                        <a:t>(Low)</a:t>
+                      </a:r>
+                      <a:endParaRPr lang="en-US" sz="1300" dirty="0">
+                        <a:solidFill>
+                          <a:schemeClr val="tx1"/>
+                        </a:solidFill>
+                        <a:latin typeface="Calibri" panose="020F0502020204030204" charset="0"/>
+                      </a:endParaRPr>
+                    </a:p>
+                  </a:txBody>
+                  <a:tcPr marL="82988" marR="82988" marT="41494" marB="41494" anchor="ctr">
+                    <a:lnL w="12700" cap="flat" cmpd="sng" algn="ctr">
+                      <a:solidFill>
+                        <a:schemeClr val="tx1"/>
+                      </a:solidFill>
+                      <a:prstDash val="solid"/>
+                      <a:round/>
+                      <a:headEnd type="none" w="med" len="med"/>
+                      <a:tailEnd type="none" w="med" len="med"/>
+                    </a:lnL>
+                    <a:lnR w="12700" cap="flat" cmpd="sng" algn="ctr">
+                      <a:solidFill>
+                        <a:schemeClr val="tx1"/>
+                      </a:solidFill>
+                      <a:prstDash val="solid"/>
+                      <a:round/>
+                      <a:headEnd type="none" w="med" len="med"/>
+                      <a:tailEnd type="none" w="med" len="med"/>
+                    </a:lnR>
+                    <a:lnT w="12700" cap="flat" cmpd="sng" algn="ctr">
+                      <a:solidFill>
+                        <a:schemeClr val="tx1"/>
+                      </a:solidFill>
+                      <a:prstDash val="solid"/>
+                      <a:round/>
+                      <a:headEnd type="none" w="med" len="med"/>
+                      <a:tailEnd type="none" w="med" len="med"/>
+                    </a:lnT>
+                    <a:lnB w="12700" cap="flat" cmpd="sng" algn="ctr">
+                      <a:solidFill>
+                        <a:schemeClr val="tx1"/>
+                      </a:solidFill>
+                      <a:prstDash val="solid"/>
+                      <a:round/>
+                      <a:headEnd type="none" w="med" len="med"/>
+                      <a:tailEnd type="none" w="med" len="med"/>
+                    </a:lnB>
+                    <a:solidFill>
+                      <a:srgbClr val="92D050"/>
+                    </a:solidFill>
+                  </a:tcPr>
+                </a:tc>
+                <a:tc>
+                  <a:txBody>
+                    <a:bodyPr/>
+                    <a:lstStyle/>
+                    <a:p>
+                      <a:r>
+                        <a:rPr lang="en-US" sz="1300" dirty="0" smtClean="0">
+                          <a:solidFill>
+                            <a:schemeClr val="tx1"/>
+                          </a:solidFill>
+                          <a:latin typeface="Calibri" panose="020F0502020204030204" charset="0"/>
+                        </a:rPr>
+                        <a:t> </a:t>
+                      </a:r>
+                      <a:endParaRPr lang="en-US" sz="1300" dirty="0">
+                        <a:solidFill>
+                          <a:schemeClr val="tx1"/>
+                        </a:solidFill>
+                        <a:latin typeface="Calibri" panose="020F0502020204030204" charset="0"/>
+                      </a:endParaRPr>
+                    </a:p>
+                    <a:p>
+                      <a:r>
+                        <a:rPr lang="en-US" sz="1300" baseline="0" dirty="0" smtClean="0">
+                          <a:solidFill>
+                            <a:schemeClr val="tx1"/>
+                          </a:solidFill>
+                          <a:latin typeface="Calibri" panose="020F0502020204030204" charset="0"/>
+                        </a:rPr>
+                        <a:t>Below mentioned </a:t>
+                      </a:r>
+                      <a:r>
+                        <a:rPr lang="en-US" sz="1300" baseline="0" dirty="0" err="1" smtClean="0">
+                          <a:solidFill>
+                            <a:schemeClr val="tx1"/>
+                          </a:solidFill>
+                          <a:latin typeface="Calibri" panose="020F0502020204030204" charset="0"/>
+                        </a:rPr>
+                        <a:t>urls</a:t>
+                      </a:r>
+                      <a:r>
+                        <a:rPr lang="en-US" sz="1300" baseline="0" dirty="0" smtClean="0">
+                          <a:solidFill>
+                            <a:schemeClr val="tx1"/>
+                          </a:solidFill>
+                          <a:latin typeface="Calibri" panose="020F0502020204030204" charset="0"/>
+                        </a:rPr>
+                        <a:t> have improper server side filter</a:t>
+                      </a:r>
+                      <a:endParaRPr lang="en-US" sz="1300" dirty="0" smtClean="0">
+                        <a:solidFill>
+                          <a:schemeClr val="tx1"/>
+                        </a:solidFill>
+                        <a:latin typeface="Calibri" panose="020F0502020204030204" charset="0"/>
+                        <a:cs typeface="Calibri" panose="020F0502020204030204" charset="0"/>
+                      </a:endParaRPr>
+                    </a:p>
+                    <a:p>
+                      <a:endParaRPr lang="en-US" sz="1300" dirty="0" smtClean="0">
+                        <a:solidFill>
+                          <a:schemeClr val="tx1"/>
+                        </a:solidFill>
+                        <a:latin typeface="Calibri" panose="020F0502020204030204" charset="0"/>
+                      </a:endParaRPr>
+                    </a:p>
+                    <a:p>
+                      <a:r>
+                        <a:rPr lang="en-US" sz="1300" b="1" dirty="0" smtClean="0">
+                          <a:solidFill>
+                            <a:schemeClr val="tx1"/>
+                          </a:solidFill>
+                          <a:latin typeface="Calibri" panose="020F0502020204030204" charset="0"/>
+                        </a:rPr>
+                        <a:t>Affected URL :</a:t>
+                      </a:r>
+                      <a:endParaRPr lang="en-US" sz="1300" b="0" i="0" u="none" strike="noStrike" dirty="0" smtClean="0">
+                        <a:solidFill>
+                          <a:schemeClr val="tx1"/>
+                        </a:solidFill>
+                        <a:effectLst/>
+                        <a:latin typeface="Calibri" panose="020F0502020204030204" charset="0"/>
+                        <a:ea typeface="+mn-ea"/>
+                        <a:cs typeface="+mn-cs"/>
+                        <a:sym typeface="Arial" panose="020B0604020202020204"/>
+                      </a:endParaRPr>
+                    </a:p>
+                    <a:p>
+                      <a:pPr marL="285750" indent="-285750">
+                        <a:buFont typeface="Arial" panose="020B0604020202020204" pitchFamily="34" charset="0"/>
+                        <a:buChar char="•"/>
+                      </a:pPr>
+                      <a:r>
+                        <a:rPr lang="en-US" sz="1300" b="0" dirty="0" smtClean="0">
+                          <a:solidFill>
+                            <a:schemeClr val="tx1"/>
+                          </a:solidFill>
+                          <a:latin typeface="Calibri" panose="020F0502020204030204" charset="0"/>
+                        </a:rPr>
+                        <a:t>http://13.233.108.21/profile/16/edit/</a:t>
+                      </a:r>
+                      <a:endParaRPr lang="en-US" sz="1300" b="0" dirty="0" smtClean="0">
+                        <a:solidFill>
+                          <a:schemeClr val="tx1"/>
+                        </a:solidFill>
+                        <a:latin typeface="Calibri" panose="020F0502020204030204" charset="0"/>
+                      </a:endParaRPr>
+                    </a:p>
+                    <a:p>
+                      <a:pPr indent="0">
+                        <a:buFont typeface="Arial" panose="020B0604020202020204" pitchFamily="34" charset="0"/>
+                        <a:buNone/>
+                      </a:pPr>
+                      <a:r>
+                        <a:rPr lang="en-US" sz="1300" b="1" dirty="0" smtClean="0">
+                          <a:solidFill>
+                            <a:schemeClr val="tx1"/>
+                          </a:solidFill>
+                          <a:latin typeface="Calibri" panose="020F0502020204030204" charset="0"/>
+                        </a:rPr>
+                        <a:t>Affected parameter:</a:t>
+                      </a:r>
+                      <a:endParaRPr lang="en-US" sz="1300" b="0" dirty="0" smtClean="0">
+                        <a:solidFill>
+                          <a:schemeClr val="tx1"/>
+                        </a:solidFill>
+                        <a:latin typeface="Calibri" panose="020F0502020204030204" charset="0"/>
+                      </a:endParaRPr>
+                    </a:p>
+                    <a:p>
+                      <a:pPr marL="285750" indent="-285750">
+                        <a:buFont typeface="Arial" panose="020B0604020202020204" pitchFamily="34" charset="0"/>
+                        <a:buChar char="•"/>
+                      </a:pPr>
+                      <a:r>
+                        <a:rPr lang="en-US" sz="1300" b="0" dirty="0" smtClean="0">
+                          <a:solidFill>
+                            <a:schemeClr val="tx1"/>
+                          </a:solidFill>
+                          <a:latin typeface="Calibri" panose="020F0502020204030204" charset="0"/>
+                        </a:rPr>
+                        <a:t>Contact Number</a:t>
+                      </a:r>
+                      <a:endParaRPr lang="en-US" sz="1300" b="0" dirty="0" smtClean="0">
+                        <a:solidFill>
+                          <a:schemeClr val="tx1"/>
+                        </a:solidFill>
+                        <a:latin typeface="Calibri" panose="020F0502020204030204" charset="0"/>
+                      </a:endParaRPr>
+                    </a:p>
+                    <a:p>
+                      <a:pPr marL="285750" indent="-285750">
+                        <a:buFont typeface="Arial" panose="020B0604020202020204" pitchFamily="34" charset="0"/>
+                        <a:buChar char="•"/>
+                      </a:pPr>
+                      <a:endParaRPr lang="en-US" sz="1300" b="0" dirty="0" smtClean="0">
+                        <a:solidFill>
+                          <a:schemeClr val="tx1"/>
+                        </a:solidFill>
+                        <a:latin typeface="Calibri" panose="020F0502020204030204" charset="0"/>
+                      </a:endParaRPr>
+                    </a:p>
+                    <a:p>
+                      <a:pPr marL="285750" indent="-285750">
+                        <a:buFont typeface="Arial" panose="020B0604020202020204" pitchFamily="34" charset="0"/>
+                        <a:buChar char="•"/>
+                      </a:pPr>
+                      <a:endParaRPr lang="en-US" sz="1300" b="0" dirty="0">
+                        <a:solidFill>
+                          <a:schemeClr val="tx1"/>
+                        </a:solidFill>
+                        <a:latin typeface="Calibri" panose="020F0502020204030204" charset="0"/>
+                      </a:endParaRPr>
+                    </a:p>
+                  </a:txBody>
+                  <a:tcPr marL="82988" marR="82988" marT="41494" marB="41494">
+                    <a:lnL w="12700" cap="flat" cmpd="sng" algn="ctr">
+                      <a:solidFill>
+                        <a:schemeClr val="tx1"/>
+                      </a:solidFill>
+                      <a:prstDash val="solid"/>
+                      <a:round/>
+                      <a:headEnd type="none" w="med" len="med"/>
+                      <a:tailEnd type="none" w="med" len="med"/>
+                    </a:lnL>
+                    <a:lnR w="12700" cap="flat" cmpd="sng" algn="ctr">
+                      <a:solidFill>
+                        <a:schemeClr val="tx1"/>
+                      </a:solidFill>
+                      <a:prstDash val="solid"/>
+                      <a:round/>
+                      <a:headEnd type="none" w="med" len="med"/>
+                      <a:tailEnd type="none" w="med" len="med"/>
+                    </a:lnR>
+                    <a:lnT w="12700" cap="flat" cmpd="sng" algn="ctr">
+                      <a:solidFill>
+                        <a:schemeClr val="tx1"/>
+                      </a:solidFill>
+                      <a:prstDash val="solid"/>
+                      <a:round/>
+                      <a:headEnd type="none" w="med" len="med"/>
+                      <a:tailEnd type="none" w="med" len="med"/>
+                    </a:lnT>
+                    <a:lnB w="12700" cap="flat" cmpd="sng" algn="ctr">
+                      <a:solidFill>
+                        <a:schemeClr val="tx1"/>
+                      </a:solidFill>
+                      <a:prstDash val="solid"/>
+                      <a:round/>
+                      <a:headEnd type="none" w="med" len="med"/>
+                      <a:tailEnd type="none" w="med" len="med"/>
+                    </a:lnB>
+                    <a:solidFill>
+                      <a:schemeClr val="bg1"/>
+                    </a:solidFill>
+                  </a:tcPr>
+                </a:tc>
+              </a:tr>
+            </a:tbl>
+          </a:graphicData>
+        </a:graphic>
+      </p:graphicFrame>
+    </p:spTree>
+  </p:cSld>
+  <p:clrMapOvr>
+    <a:masterClrMapping/>
+  </p:clrMapOvr>
+  <p:transition spd="med"/>
+  <p:timing>
+    <p:tnLst>
+      <p:par>
+        <p:cTn id="1" dur="indefinite" restart="never" nodeType="tmRoot"/>
+      </p:par>
+    </p:tnLst>
+  </p:timing>
+</p:sld>
+</file>
+
+<file path=ppt/slides/slide101.xml><?xml version="1.0" encoding="utf-8"?>
+<p:sld xmlns:a="http://schemas.openxmlformats.org/drawingml/2006/main" xmlns:r="http://schemas.openxmlformats.org/officeDocument/2006/relationships" xmlns:p="http://schemas.openxmlformats.org/presentationml/2006/main">
+  <p:cSld>
+    <p:spTree>
+      <p:nvGrpSpPr>
+        <p:cNvPr id="1" name=""/>
+        <p:cNvGrpSpPr/>
+        <p:nvPr/>
+      </p:nvGrpSpPr>
       <p:grpSpPr/>
       <p:sp>
         <p:nvSpPr>
@@ -4241,7 +4754,7 @@
 </p:sld>
 </file>
 
-<file path=ppt/slides/slide101.xml><?xml version="1.0" encoding="utf-8"?>
+<file path=ppt/slides/slide102.xml><?xml version="1.0" encoding="utf-8"?>
 <p:sld xmlns:a="http://schemas.openxmlformats.org/drawingml/2006/main" xmlns:r="http://schemas.openxmlformats.org/officeDocument/2006/relationships" xmlns:p="http://schemas.openxmlformats.org/presentationml/2006/main">
   <p:cSld>
     <p:spTree>
@@ -4401,7 +4914,7 @@
 </p:sld>
 </file>
 
-<file path=ppt/slides/slide102.xml><?xml version="1.0" encoding="utf-8"?>
+<file path=ppt/slides/slide103.xml><?xml version="1.0" encoding="utf-8"?>
 <p:sld xmlns:a="http://schemas.openxmlformats.org/drawingml/2006/main" xmlns:r="http://schemas.openxmlformats.org/officeDocument/2006/relationships" xmlns:p="http://schemas.openxmlformats.org/presentationml/2006/main">
   <p:cSld>
     <p:spTree>
@@ -4629,7 +5142,7 @@
 </p:sld>
 </file>
 
-<file path=ppt/slides/slide103.xml><?xml version="1.0" encoding="utf-8"?>
+<file path=ppt/slides/slide104.xml><?xml version="1.0" encoding="utf-8"?>
 <p:sld xmlns:a="http://schemas.openxmlformats.org/drawingml/2006/main" xmlns:r="http://schemas.openxmlformats.org/officeDocument/2006/relationships" xmlns:p="http://schemas.openxmlformats.org/presentationml/2006/main">
   <p:cSld>
     <p:spTree>
@@ -4731,7 +5244,7 @@
 </p:sld>
 </file>
 
-<file path=ppt/slides/slide104.xml><?xml version="1.0" encoding="utf-8"?>
+<file path=ppt/slides/slide105.xml><?xml version="1.0" encoding="utf-8"?>
 <p:sld xmlns:a="http://schemas.openxmlformats.org/drawingml/2006/main" xmlns:r="http://schemas.openxmlformats.org/officeDocument/2006/relationships" xmlns:p="http://schemas.openxmlformats.org/presentationml/2006/main">
   <p:cSld>
     <p:spTree>
@@ -5467,7 +5980,7 @@
 </p:sld>
 </file>
 
-<file path=ppt/slides/slide105.xml><?xml version="1.0" encoding="utf-8"?>
+<file path=ppt/slides/slide106.xml><?xml version="1.0" encoding="utf-8"?>
 <p:sld xmlns:a="http://schemas.openxmlformats.org/drawingml/2006/main" xmlns:r="http://schemas.openxmlformats.org/officeDocument/2006/relationships" xmlns:p="http://schemas.openxmlformats.org/presentationml/2006/main">
   <p:cSld>
     <p:spTree>
@@ -5588,7 +6101,7 @@
 </p:sld>
 </file>
 
-<file path=ppt/slides/slide106.xml><?xml version="1.0" encoding="utf-8"?>
+<file path=ppt/slides/slide107.xml><?xml version="1.0" encoding="utf-8"?>
 <p:sld xmlns:a="http://schemas.openxmlformats.org/drawingml/2006/main" xmlns:r="http://schemas.openxmlformats.org/officeDocument/2006/relationships" xmlns:p="http://schemas.openxmlformats.org/presentationml/2006/main">
   <p:cSld>
     <p:spTree>
@@ -5731,7 +6244,7 @@
 </p:sld>
 </file>
 
-<file path=ppt/slides/slide107.xml><?xml version="1.0" encoding="utf-8"?>
+<file path=ppt/slides/slide108.xml><?xml version="1.0" encoding="utf-8"?>
 <p:sld xmlns:a="http://schemas.openxmlformats.org/drawingml/2006/main" xmlns:r="http://schemas.openxmlformats.org/officeDocument/2006/relationships" xmlns:p="http://schemas.openxmlformats.org/presentationml/2006/main">
   <p:cSld>
     <p:spTree>
@@ -5996,7 +6509,7 @@
 </p:sld>
 </file>
 
-<file path=ppt/slides/slide108.xml><?xml version="1.0" encoding="utf-8"?>
+<file path=ppt/slides/slide109.xml><?xml version="1.0" encoding="utf-8"?>
 <p:sld xmlns:a="http://schemas.openxmlformats.org/drawingml/2006/main" xmlns:r="http://schemas.openxmlformats.org/officeDocument/2006/relationships" xmlns:p="http://schemas.openxmlformats.org/presentationml/2006/main">
   <p:cSld>
     <p:spTree>
@@ -6079,547 +6592,6 @@
           </a:p>
         </p:txBody>
       </p:sp>
-    </p:spTree>
-  </p:cSld>
-  <p:clrMapOvr>
-    <a:masterClrMapping/>
-  </p:clrMapOvr>
-</p:sld>
-</file>
-
-<file path=ppt/slides/slide109.xml><?xml version="1.0" encoding="utf-8"?>
-<p:sld xmlns:a="http://schemas.openxmlformats.org/drawingml/2006/main" xmlns:r="http://schemas.openxmlformats.org/officeDocument/2006/relationships" xmlns:p="http://schemas.openxmlformats.org/presentationml/2006/main">
-  <p:cSld>
-    <p:spTree>
-      <p:nvGrpSpPr>
-        <p:cNvPr id="1" name=""/>
-        <p:cNvGrpSpPr/>
-        <p:nvPr/>
-      </p:nvGrpSpPr>
-      <p:grpSpPr/>
-      <p:sp>
-        <p:nvSpPr>
-          <p:cNvPr id="2" name="Title 1"/>
-          <p:cNvSpPr>
-            <a:spLocks noGrp="1"/>
-          </p:cNvSpPr>
-          <p:nvPr>
-            <p:ph type="title"/>
-          </p:nvPr>
-        </p:nvSpPr>
-        <p:spPr/>
-        <p:txBody>
-          <a:bodyPr/>
-          <a:p>
-            <a:r>
-              <a:rPr lang="en-US"/>
-              <a:t>18.</a:t>
-            </a:r>
-            <a:r>
-              <a:rPr lang="en-US" u="sng">
-                <a:solidFill>
-                  <a:schemeClr val="accent1"/>
-                </a:solidFill>
-                <a:effectLst>
-                  <a:outerShdw blurRad="38100" dist="25400" dir="5400000" algn="ctr" rotWithShape="0">
-                    <a:srgbClr val="6E747A">
-                      <a:alpha val="43000"/>
-                    </a:srgbClr>
-                  </a:outerShdw>
-                </a:effectLst>
-              </a:rPr>
-              <a:t>Default Debug Pages</a:t>
-            </a:r>
-            <a:endParaRPr lang="en-US" u="sng">
-              <a:solidFill>
-                <a:schemeClr val="accent1"/>
-              </a:solidFill>
-              <a:effectLst>
-                <a:outerShdw blurRad="38100" dist="25400" dir="5400000" algn="ctr" rotWithShape="0">
-                  <a:srgbClr val="6E747A">
-                    <a:alpha val="43000"/>
-                  </a:srgbClr>
-                </a:outerShdw>
-              </a:effectLst>
-            </a:endParaRPr>
-          </a:p>
-        </p:txBody>
-      </p:sp>
-      <p:graphicFrame>
-        <p:nvGraphicFramePr>
-          <p:cNvPr id="6" name="Content Placeholder 5"/>
-          <p:cNvGraphicFramePr>
-            <a:graphicFrameLocks noGrp="1"/>
-          </p:cNvGraphicFramePr>
-          <p:nvPr>
-            <p:ph idx="1"/>
-          </p:nvPr>
-        </p:nvGraphicFramePr>
-        <p:xfrm>
-          <a:off x="838200" y="1825625"/>
-          <a:ext cx="10515600" cy="2821940"/>
-        </p:xfrm>
-        <a:graphic>
-          <a:graphicData uri="http://schemas.openxmlformats.org/drawingml/2006/table">
-            <a:tbl>
-              <a:tblPr firstRow="1" bandRow="1">
-                <a:tableStyleId>{5C22544A-7EE6-4342-B048-85BDC9FD1C3A}</a:tableStyleId>
-              </a:tblPr>
-              <a:tblGrid>
-                <a:gridCol w="1832610"/>
-                <a:gridCol w="8682990"/>
-              </a:tblGrid>
-              <a:tr h="415290">
-                <a:tc>
-                  <a:txBody>
-                    <a:bodyPr/>
-                    <a:p>
-                      <a:pPr algn="ctr"/>
-                      <a:endParaRPr lang="en-US" sz="1600" dirty="0"/>
-                    </a:p>
-                  </a:txBody>
-                  <a:tcPr marL="82988" marR="82988" marT="41494" marB="41494">
-                    <a:lnL w="12700" cmpd="sng">
-                      <a:noFill/>
-                    </a:lnL>
-                    <a:lnR w="12700" cmpd="sng">
-                      <a:noFill/>
-                    </a:lnR>
-                    <a:lnT w="12700" cmpd="sng">
-                      <a:noFill/>
-                    </a:lnT>
-                    <a:lnB w="12700" cap="flat" cmpd="sng" algn="ctr">
-                      <a:solidFill>
-                        <a:schemeClr val="tx1"/>
-                      </a:solidFill>
-                      <a:prstDash val="solid"/>
-                      <a:round/>
-                      <a:headEnd type="none" w="med" len="med"/>
-                      <a:tailEnd type="none" w="med" len="med"/>
-                    </a:lnB>
-                    <a:lnTlToBr w="12700" cmpd="sng">
-                      <a:noFill/>
-                      <a:prstDash val="solid"/>
-                    </a:lnTlToBr>
-                    <a:lnBlToTr w="12700" cmpd="sng">
-                      <a:noFill/>
-                      <a:prstDash val="solid"/>
-                    </a:lnBlToTr>
-                    <a:noFill/>
-                  </a:tcPr>
-                </a:tc>
-                <a:tc>
-                  <a:txBody>
-                    <a:bodyPr/>
-                    <a:p>
-                      <a:endParaRPr lang="en-US" sz="1600" dirty="0"/>
-                    </a:p>
-                  </a:txBody>
-                  <a:tcPr marL="82988" marR="82988" marT="41494" marB="41494">
-                    <a:lnL w="12700" cmpd="sng">
-                      <a:noFill/>
-                    </a:lnL>
-                    <a:lnR w="12700" cmpd="sng">
-                      <a:noFill/>
-                    </a:lnR>
-                    <a:lnT w="12700" cmpd="sng">
-                      <a:noFill/>
-                    </a:lnT>
-                    <a:lnB w="12700" cap="flat" cmpd="sng" algn="ctr">
-                      <a:solidFill>
-                        <a:schemeClr val="tx1"/>
-                      </a:solidFill>
-                      <a:prstDash val="solid"/>
-                      <a:round/>
-                      <a:headEnd type="none" w="med" len="med"/>
-                      <a:tailEnd type="none" w="med" len="med"/>
-                    </a:lnB>
-                    <a:lnTlToBr w="12700" cmpd="sng">
-                      <a:noFill/>
-                      <a:prstDash val="solid"/>
-                    </a:lnTlToBr>
-                    <a:lnBlToTr w="12700" cmpd="sng">
-                      <a:noFill/>
-                      <a:prstDash val="solid"/>
-                    </a:lnBlToTr>
-                    <a:noFill/>
-                  </a:tcPr>
-                </a:tc>
-              </a:tr>
-              <a:tr h="2406639">
-                <a:tc>
-                  <a:txBody>
-                    <a:bodyPr/>
-                    <a:p>
-                      <a:pPr algn="ctr"/>
-                      <a:r>
-                        <a:rPr lang="en-US" altLang="en-IN" sz="1600" dirty="0" smtClean="0">
-                          <a:solidFill>
-                            <a:schemeClr val="tx1"/>
-                          </a:solidFill>
-                          <a:latin typeface="Calibri" panose="020F0502020204030204" charset="0"/>
-                        </a:rPr>
-                        <a:t>Default Debug Pages</a:t>
-                      </a:r>
-                      <a:r>
-                        <a:rPr lang="en-IN" sz="1600" dirty="0" smtClean="0">
-                          <a:solidFill>
-                            <a:schemeClr val="tx1"/>
-                          </a:solidFill>
-                          <a:latin typeface="Calibri" panose="020F0502020204030204" charset="0"/>
-                        </a:rPr>
-                        <a:t> </a:t>
-                      </a:r>
-                      <a:r>
-                        <a:rPr lang="en-US" sz="1300" dirty="0" smtClean="0">
-                          <a:solidFill>
-                            <a:schemeClr val="tx1"/>
-                          </a:solidFill>
-                          <a:latin typeface="Calibri" panose="020F0502020204030204" charset="0"/>
-                        </a:rPr>
-                        <a:t>(Low)</a:t>
-                      </a:r>
-                      <a:endParaRPr lang="en-US" sz="1300" dirty="0">
-                        <a:solidFill>
-                          <a:schemeClr val="tx1"/>
-                        </a:solidFill>
-                        <a:latin typeface="Calibri" panose="020F0502020204030204" charset="0"/>
-                      </a:endParaRPr>
-                    </a:p>
-                  </a:txBody>
-                  <a:tcPr marL="82988" marR="82988" marT="41494" marB="41494" anchor="ctr">
-                    <a:lnL w="12700" cap="flat" cmpd="sng" algn="ctr">
-                      <a:solidFill>
-                        <a:schemeClr val="tx1"/>
-                      </a:solidFill>
-                      <a:prstDash val="solid"/>
-                      <a:round/>
-                      <a:headEnd type="none" w="med" len="med"/>
-                      <a:tailEnd type="none" w="med" len="med"/>
-                    </a:lnL>
-                    <a:lnR w="12700" cap="flat" cmpd="sng" algn="ctr">
-                      <a:solidFill>
-                        <a:schemeClr val="tx1"/>
-                      </a:solidFill>
-                      <a:prstDash val="solid"/>
-                      <a:round/>
-                      <a:headEnd type="none" w="med" len="med"/>
-                      <a:tailEnd type="none" w="med" len="med"/>
-                    </a:lnR>
-                    <a:lnT w="12700" cap="flat" cmpd="sng" algn="ctr">
-                      <a:solidFill>
-                        <a:schemeClr val="tx1"/>
-                      </a:solidFill>
-                      <a:prstDash val="solid"/>
-                      <a:round/>
-                      <a:headEnd type="none" w="med" len="med"/>
-                      <a:tailEnd type="none" w="med" len="med"/>
-                    </a:lnT>
-                    <a:lnB w="12700" cap="flat" cmpd="sng" algn="ctr">
-                      <a:solidFill>
-                        <a:schemeClr val="tx1"/>
-                      </a:solidFill>
-                      <a:prstDash val="solid"/>
-                      <a:round/>
-                      <a:headEnd type="none" w="med" len="med"/>
-                      <a:tailEnd type="none" w="med" len="med"/>
-                    </a:lnB>
-                    <a:solidFill>
-                      <a:srgbClr val="92D050"/>
-                    </a:solidFill>
-                  </a:tcPr>
-                </a:tc>
-                <a:tc>
-                  <a:txBody>
-                    <a:bodyPr/>
-                    <a:p>
-                      <a:r>
-                        <a:rPr lang="en-US" sz="1300" dirty="0" smtClean="0">
-                          <a:solidFill>
-                            <a:schemeClr val="tx1"/>
-                          </a:solidFill>
-                          <a:latin typeface="Calibri" panose="020F0502020204030204" charset="0"/>
-                        </a:rPr>
-                        <a:t> </a:t>
-                      </a:r>
-                      <a:endParaRPr lang="en-US" sz="1300" dirty="0">
-                        <a:solidFill>
-                          <a:schemeClr val="tx1"/>
-                        </a:solidFill>
-                        <a:latin typeface="Calibri" panose="020F0502020204030204" charset="0"/>
-                      </a:endParaRPr>
-                    </a:p>
-                    <a:p>
-                      <a:r>
-                        <a:rPr lang="en-US" sz="1300" baseline="0" dirty="0" smtClean="0">
-                          <a:solidFill>
-                            <a:schemeClr val="tx1"/>
-                          </a:solidFill>
-                          <a:latin typeface="Calibri" panose="020F0502020204030204" charset="0"/>
-                        </a:rPr>
-                        <a:t>Below mentioned </a:t>
-                      </a:r>
-                      <a:r>
-                        <a:rPr lang="en-US" sz="1300" baseline="0" dirty="0" err="1" smtClean="0">
-                          <a:solidFill>
-                            <a:schemeClr val="tx1"/>
-                          </a:solidFill>
-                          <a:latin typeface="Calibri" panose="020F0502020204030204" charset="0"/>
-                        </a:rPr>
-                        <a:t>urls</a:t>
-                      </a:r>
-                      <a:r>
-                        <a:rPr lang="en-US" sz="1300" baseline="0" dirty="0" smtClean="0">
-                          <a:solidFill>
-                            <a:schemeClr val="tx1"/>
-                          </a:solidFill>
-                          <a:latin typeface="Calibri" panose="020F0502020204030204" charset="0"/>
-                        </a:rPr>
-                        <a:t> have improper server side filter</a:t>
-                      </a:r>
-                      <a:endParaRPr lang="en-US" sz="1300" dirty="0" smtClean="0">
-                        <a:solidFill>
-                          <a:schemeClr val="tx1"/>
-                        </a:solidFill>
-                        <a:latin typeface="Calibri" panose="020F0502020204030204" charset="0"/>
-                        <a:cs typeface="Calibri" panose="020F0502020204030204" charset="0"/>
-                      </a:endParaRPr>
-                    </a:p>
-                    <a:p>
-                      <a:endParaRPr lang="en-US" sz="1300" dirty="0" smtClean="0">
-                        <a:solidFill>
-                          <a:schemeClr val="tx1"/>
-                        </a:solidFill>
-                        <a:latin typeface="Calibri" panose="020F0502020204030204" charset="0"/>
-                      </a:endParaRPr>
-                    </a:p>
-                    <a:p>
-                      <a:r>
-                        <a:rPr lang="en-US" sz="1300" b="1" dirty="0" smtClean="0">
-                          <a:solidFill>
-                            <a:schemeClr val="tx1"/>
-                          </a:solidFill>
-                          <a:latin typeface="Calibri" panose="020F0502020204030204" charset="0"/>
-                        </a:rPr>
-                        <a:t>Affected URL :</a:t>
-                      </a:r>
-                      <a:endParaRPr lang="en-US" sz="1300" b="0" i="0" u="none" strike="noStrike" dirty="0" smtClean="0">
-                        <a:solidFill>
-                          <a:schemeClr val="tx1"/>
-                        </a:solidFill>
-                        <a:effectLst/>
-                        <a:latin typeface="Calibri" panose="020F0502020204030204" charset="0"/>
-                        <a:ea typeface="+mn-ea"/>
-                        <a:cs typeface="+mn-cs"/>
-                        <a:sym typeface="Arial" panose="020B0604020202020204"/>
-                      </a:endParaRPr>
-                    </a:p>
-                    <a:p>
-                      <a:pPr marL="285750" indent="-285750">
-                        <a:buFont typeface="Arial" panose="020B0604020202020204" pitchFamily="34" charset="0"/>
-                        <a:buChar char="•"/>
-                      </a:pPr>
-                      <a:r>
-                        <a:rPr lang="en-US" sz="1300" b="0" i="0" u="none" strike="noStrike" dirty="0" smtClean="0">
-                          <a:solidFill>
-                            <a:schemeClr val="dk1"/>
-                          </a:solidFill>
-                          <a:effectLst/>
-                          <a:latin typeface="Calibri" panose="020F0502020204030204" charset="0"/>
-                          <a:ea typeface="+mn-ea"/>
-                          <a:cs typeface="Calibri" panose="020F0502020204030204" charset="0"/>
-                          <a:sym typeface="Arial" panose="020B0604020202020204"/>
-                        </a:rPr>
-                        <a:t>http://35.154.118.58/</a:t>
-                      </a:r>
-                      <a:endParaRPr lang="en-US" sz="1300" b="0" i="0" u="none" strike="noStrike" dirty="0" smtClean="0">
-                        <a:solidFill>
-                          <a:schemeClr val="dk1"/>
-                        </a:solidFill>
-                        <a:effectLst/>
-                        <a:latin typeface="Calibri" panose="020F0502020204030204" charset="0"/>
-                        <a:ea typeface="+mn-ea"/>
-                        <a:cs typeface="Calibri" panose="020F0502020204030204" charset="0"/>
-                        <a:sym typeface="Arial" panose="020B0604020202020204"/>
-                      </a:endParaRPr>
-                    </a:p>
-                    <a:p>
-                      <a:pPr marL="0" indent="0">
-                        <a:buFont typeface="Arial" panose="020B0604020202020204" pitchFamily="34" charset="0"/>
-                        <a:buNone/>
-                      </a:pPr>
-                      <a:endParaRPr lang="en-US" sz="1300" b="0" dirty="0" smtClean="0">
-                        <a:solidFill>
-                          <a:schemeClr val="tx1"/>
-                        </a:solidFill>
-                        <a:latin typeface="Calibri" panose="020F0502020204030204" charset="0"/>
-                      </a:endParaRPr>
-                    </a:p>
-                    <a:p>
-                      <a:pPr marL="285750" indent="-285750">
-                        <a:buFont typeface="Arial" panose="020B0604020202020204" pitchFamily="34" charset="0"/>
-                        <a:buChar char="•"/>
-                      </a:pPr>
-                      <a:endParaRPr lang="en-US" sz="1300" b="0" dirty="0" smtClean="0">
-                        <a:solidFill>
-                          <a:schemeClr val="tx1"/>
-                        </a:solidFill>
-                        <a:latin typeface="Calibri" panose="020F0502020204030204" charset="0"/>
-                      </a:endParaRPr>
-                    </a:p>
-                    <a:p>
-                      <a:pPr indent="0">
-                        <a:buFont typeface="Arial" panose="020B0604020202020204" pitchFamily="34" charset="0"/>
-                        <a:buNone/>
-                      </a:pPr>
-                      <a:r>
-                        <a:rPr lang="en-US" sz="1300" b="0" dirty="0">
-                          <a:solidFill>
-                            <a:schemeClr val="tx1"/>
-                          </a:solidFill>
-                          <a:latin typeface="Calibri" panose="020F0502020204030204" charset="0"/>
-                        </a:rPr>
-                        <a:t>Default pages available:</a:t>
-                      </a:r>
-                      <a:endParaRPr lang="en-US" sz="1300" b="0" dirty="0">
-                        <a:solidFill>
-                          <a:schemeClr val="tx1"/>
-                        </a:solidFill>
-                        <a:latin typeface="Calibri" panose="020F0502020204030204" charset="0"/>
-                      </a:endParaRPr>
-                    </a:p>
-                    <a:p>
-                      <a:pPr marL="285750" indent="-285750">
-                        <a:buFont typeface="Arial" panose="020B0604020202020204" pitchFamily="34" charset="0"/>
-                        <a:buChar char="•"/>
-                      </a:pPr>
-                      <a:r>
-                        <a:rPr lang="en-US" sz="1300" b="0" dirty="0">
-                          <a:solidFill>
-                            <a:schemeClr val="tx1"/>
-                          </a:solidFill>
-                          <a:latin typeface="Calibri" panose="020F0502020204030204" charset="0"/>
-                        </a:rPr>
-                        <a:t>robots.txt</a:t>
-                      </a:r>
-                      <a:endParaRPr lang="en-US" sz="1300" b="0" dirty="0">
-                        <a:solidFill>
-                          <a:schemeClr val="tx1"/>
-                        </a:solidFill>
-                        <a:latin typeface="Calibri" panose="020F0502020204030204" charset="0"/>
-                      </a:endParaRPr>
-                    </a:p>
-                    <a:p>
-                      <a:pPr marL="285750" indent="-285750">
-                        <a:buFont typeface="Arial" panose="020B0604020202020204" pitchFamily="34" charset="0"/>
-                        <a:buChar char="•"/>
-                      </a:pPr>
-                      <a:r>
-                        <a:rPr lang="en-US" sz="1300" b="0" dirty="0">
-                          <a:solidFill>
-                            <a:schemeClr val="tx1"/>
-                          </a:solidFill>
-                          <a:latin typeface="Calibri" panose="020F0502020204030204" charset="0"/>
-                        </a:rPr>
-                        <a:t>sever-status</a:t>
-                      </a:r>
-                      <a:endParaRPr lang="en-US" sz="1300" b="0" dirty="0">
-                        <a:solidFill>
-                          <a:schemeClr val="tx1"/>
-                        </a:solidFill>
-                        <a:latin typeface="Calibri" panose="020F0502020204030204" charset="0"/>
-                      </a:endParaRPr>
-                    </a:p>
-                    <a:p>
-                      <a:pPr marL="285750" indent="-285750">
-                        <a:buFont typeface="Arial" panose="020B0604020202020204" pitchFamily="34" charset="0"/>
-                        <a:buChar char="•"/>
-                      </a:pPr>
-                      <a:r>
-                        <a:rPr lang="en-US" sz="1300" b="0" dirty="0">
-                          <a:solidFill>
-                            <a:schemeClr val="tx1"/>
-                          </a:solidFill>
-                          <a:latin typeface="Calibri" panose="020F0502020204030204" charset="0"/>
-                        </a:rPr>
-                        <a:t>phpinfo.php</a:t>
-                      </a:r>
-                      <a:endParaRPr lang="en-US" sz="1300" b="0" dirty="0">
-                        <a:solidFill>
-                          <a:schemeClr val="tx1"/>
-                        </a:solidFill>
-                        <a:latin typeface="Calibri" panose="020F0502020204030204" charset="0"/>
-                      </a:endParaRPr>
-                    </a:p>
-                    <a:p>
-                      <a:pPr marL="285750" indent="-285750">
-                        <a:buFont typeface="Arial" panose="020B0604020202020204" pitchFamily="34" charset="0"/>
-                        <a:buChar char="•"/>
-                      </a:pPr>
-                      <a:r>
-                        <a:rPr lang="en-US" sz="1300" b="0" dirty="0">
-                          <a:solidFill>
-                            <a:schemeClr val="tx1"/>
-                          </a:solidFill>
-                          <a:latin typeface="Calibri" panose="020F0502020204030204" charset="0"/>
-                        </a:rPr>
-                        <a:t>userlist.txt</a:t>
-                      </a:r>
-                      <a:endParaRPr lang="en-US" sz="1300" b="0" dirty="0">
-                        <a:solidFill>
-                          <a:schemeClr val="tx1"/>
-                        </a:solidFill>
-                        <a:latin typeface="Calibri" panose="020F0502020204030204" charset="0"/>
-                      </a:endParaRPr>
-                    </a:p>
-                  </a:txBody>
-                  <a:tcPr marL="82988" marR="82988" marT="41494" marB="41494">
-                    <a:lnL w="12700" cap="flat" cmpd="sng" algn="ctr">
-                      <a:solidFill>
-                        <a:schemeClr val="tx1"/>
-                      </a:solidFill>
-                      <a:prstDash val="solid"/>
-                      <a:round/>
-                      <a:headEnd type="none" w="med" len="med"/>
-                      <a:tailEnd type="none" w="med" len="med"/>
-                    </a:lnL>
-                    <a:lnR w="12700" cap="flat" cmpd="sng" algn="ctr">
-                      <a:solidFill>
-                        <a:schemeClr val="tx1"/>
-                      </a:solidFill>
-                      <a:prstDash val="solid"/>
-                      <a:round/>
-                      <a:headEnd type="none" w="med" len="med"/>
-                      <a:tailEnd type="none" w="med" len="med"/>
-                    </a:lnR>
-                    <a:lnT w="12700" cap="flat" cmpd="sng" algn="ctr">
-                      <a:solidFill>
-                        <a:schemeClr val="tx1"/>
-                      </a:solidFill>
-                      <a:prstDash val="solid"/>
-                      <a:round/>
-                      <a:headEnd type="none" w="med" len="med"/>
-                      <a:tailEnd type="none" w="med" len="med"/>
-                    </a:lnT>
-                    <a:lnB w="12700" cap="flat" cmpd="sng" algn="ctr">
-                      <a:solidFill>
-                        <a:schemeClr val="tx1"/>
-                      </a:solidFill>
-                      <a:prstDash val="solid"/>
-                      <a:round/>
-                      <a:headEnd type="none" w="med" len="med"/>
-                      <a:tailEnd type="none" w="med" len="med"/>
-                    </a:lnB>
-                    <a:solidFill>
-                      <a:schemeClr val="bg1"/>
-                    </a:solidFill>
-                  </a:tcPr>
-                </a:tc>
-              </a:tr>
-            </a:tbl>
-          </a:graphicData>
-        </a:graphic>
-      </p:graphicFrame>
     </p:spTree>
   </p:cSld>
   <p:clrMapOvr>
@@ -6802,6 +6774,547 @@
           <a:bodyPr/>
           <a:p>
             <a:r>
+              <a:rPr lang="en-US"/>
+              <a:t>18.</a:t>
+            </a:r>
+            <a:r>
+              <a:rPr lang="en-US" u="sng">
+                <a:solidFill>
+                  <a:schemeClr val="accent1"/>
+                </a:solidFill>
+                <a:effectLst>
+                  <a:outerShdw blurRad="38100" dist="25400" dir="5400000" algn="ctr" rotWithShape="0">
+                    <a:srgbClr val="6E747A">
+                      <a:alpha val="43000"/>
+                    </a:srgbClr>
+                  </a:outerShdw>
+                </a:effectLst>
+              </a:rPr>
+              <a:t>Default Debug Pages</a:t>
+            </a:r>
+            <a:endParaRPr lang="en-US" u="sng">
+              <a:solidFill>
+                <a:schemeClr val="accent1"/>
+              </a:solidFill>
+              <a:effectLst>
+                <a:outerShdw blurRad="38100" dist="25400" dir="5400000" algn="ctr" rotWithShape="0">
+                  <a:srgbClr val="6E747A">
+                    <a:alpha val="43000"/>
+                  </a:srgbClr>
+                </a:outerShdw>
+              </a:effectLst>
+            </a:endParaRPr>
+          </a:p>
+        </p:txBody>
+      </p:sp>
+      <p:graphicFrame>
+        <p:nvGraphicFramePr>
+          <p:cNvPr id="6" name="Content Placeholder 5"/>
+          <p:cNvGraphicFramePr>
+            <a:graphicFrameLocks noGrp="1"/>
+          </p:cNvGraphicFramePr>
+          <p:nvPr>
+            <p:ph idx="1"/>
+          </p:nvPr>
+        </p:nvGraphicFramePr>
+        <p:xfrm>
+          <a:off x="838200" y="1825625"/>
+          <a:ext cx="10515600" cy="2821940"/>
+        </p:xfrm>
+        <a:graphic>
+          <a:graphicData uri="http://schemas.openxmlformats.org/drawingml/2006/table">
+            <a:tbl>
+              <a:tblPr firstRow="1" bandRow="1">
+                <a:tableStyleId>{5C22544A-7EE6-4342-B048-85BDC9FD1C3A}</a:tableStyleId>
+              </a:tblPr>
+              <a:tblGrid>
+                <a:gridCol w="1832610"/>
+                <a:gridCol w="8682990"/>
+              </a:tblGrid>
+              <a:tr h="415290">
+                <a:tc>
+                  <a:txBody>
+                    <a:bodyPr/>
+                    <a:p>
+                      <a:pPr algn="ctr"/>
+                      <a:endParaRPr lang="en-US" sz="1600" dirty="0"/>
+                    </a:p>
+                  </a:txBody>
+                  <a:tcPr marL="82988" marR="82988" marT="41494" marB="41494">
+                    <a:lnL w="12700" cmpd="sng">
+                      <a:noFill/>
+                    </a:lnL>
+                    <a:lnR w="12700" cmpd="sng">
+                      <a:noFill/>
+                    </a:lnR>
+                    <a:lnT w="12700" cmpd="sng">
+                      <a:noFill/>
+                    </a:lnT>
+                    <a:lnB w="12700" cap="flat" cmpd="sng" algn="ctr">
+                      <a:solidFill>
+                        <a:schemeClr val="tx1"/>
+                      </a:solidFill>
+                      <a:prstDash val="solid"/>
+                      <a:round/>
+                      <a:headEnd type="none" w="med" len="med"/>
+                      <a:tailEnd type="none" w="med" len="med"/>
+                    </a:lnB>
+                    <a:lnTlToBr w="12700" cmpd="sng">
+                      <a:noFill/>
+                      <a:prstDash val="solid"/>
+                    </a:lnTlToBr>
+                    <a:lnBlToTr w="12700" cmpd="sng">
+                      <a:noFill/>
+                      <a:prstDash val="solid"/>
+                    </a:lnBlToTr>
+                    <a:noFill/>
+                  </a:tcPr>
+                </a:tc>
+                <a:tc>
+                  <a:txBody>
+                    <a:bodyPr/>
+                    <a:p>
+                      <a:endParaRPr lang="en-US" sz="1600" dirty="0"/>
+                    </a:p>
+                  </a:txBody>
+                  <a:tcPr marL="82988" marR="82988" marT="41494" marB="41494">
+                    <a:lnL w="12700" cmpd="sng">
+                      <a:noFill/>
+                    </a:lnL>
+                    <a:lnR w="12700" cmpd="sng">
+                      <a:noFill/>
+                    </a:lnR>
+                    <a:lnT w="12700" cmpd="sng">
+                      <a:noFill/>
+                    </a:lnT>
+                    <a:lnB w="12700" cap="flat" cmpd="sng" algn="ctr">
+                      <a:solidFill>
+                        <a:schemeClr val="tx1"/>
+                      </a:solidFill>
+                      <a:prstDash val="solid"/>
+                      <a:round/>
+                      <a:headEnd type="none" w="med" len="med"/>
+                      <a:tailEnd type="none" w="med" len="med"/>
+                    </a:lnB>
+                    <a:lnTlToBr w="12700" cmpd="sng">
+                      <a:noFill/>
+                      <a:prstDash val="solid"/>
+                    </a:lnTlToBr>
+                    <a:lnBlToTr w="12700" cmpd="sng">
+                      <a:noFill/>
+                      <a:prstDash val="solid"/>
+                    </a:lnBlToTr>
+                    <a:noFill/>
+                  </a:tcPr>
+                </a:tc>
+              </a:tr>
+              <a:tr h="2406639">
+                <a:tc>
+                  <a:txBody>
+                    <a:bodyPr/>
+                    <a:p>
+                      <a:pPr algn="ctr"/>
+                      <a:r>
+                        <a:rPr lang="en-US" altLang="en-IN" sz="1600" dirty="0" smtClean="0">
+                          <a:solidFill>
+                            <a:schemeClr val="tx1"/>
+                          </a:solidFill>
+                          <a:latin typeface="Calibri" panose="020F0502020204030204" charset="0"/>
+                        </a:rPr>
+                        <a:t>Default Debug Pages</a:t>
+                      </a:r>
+                      <a:r>
+                        <a:rPr lang="en-IN" sz="1600" dirty="0" smtClean="0">
+                          <a:solidFill>
+                            <a:schemeClr val="tx1"/>
+                          </a:solidFill>
+                          <a:latin typeface="Calibri" panose="020F0502020204030204" charset="0"/>
+                        </a:rPr>
+                        <a:t> </a:t>
+                      </a:r>
+                      <a:r>
+                        <a:rPr lang="en-US" sz="1300" dirty="0" smtClean="0">
+                          <a:solidFill>
+                            <a:schemeClr val="tx1"/>
+                          </a:solidFill>
+                          <a:latin typeface="Calibri" panose="020F0502020204030204" charset="0"/>
+                        </a:rPr>
+                        <a:t>(Low)</a:t>
+                      </a:r>
+                      <a:endParaRPr lang="en-US" sz="1300" dirty="0">
+                        <a:solidFill>
+                          <a:schemeClr val="tx1"/>
+                        </a:solidFill>
+                        <a:latin typeface="Calibri" panose="020F0502020204030204" charset="0"/>
+                      </a:endParaRPr>
+                    </a:p>
+                  </a:txBody>
+                  <a:tcPr marL="82988" marR="82988" marT="41494" marB="41494" anchor="ctr">
+                    <a:lnL w="12700" cap="flat" cmpd="sng" algn="ctr">
+                      <a:solidFill>
+                        <a:schemeClr val="tx1"/>
+                      </a:solidFill>
+                      <a:prstDash val="solid"/>
+                      <a:round/>
+                      <a:headEnd type="none" w="med" len="med"/>
+                      <a:tailEnd type="none" w="med" len="med"/>
+                    </a:lnL>
+                    <a:lnR w="12700" cap="flat" cmpd="sng" algn="ctr">
+                      <a:solidFill>
+                        <a:schemeClr val="tx1"/>
+                      </a:solidFill>
+                      <a:prstDash val="solid"/>
+                      <a:round/>
+                      <a:headEnd type="none" w="med" len="med"/>
+                      <a:tailEnd type="none" w="med" len="med"/>
+                    </a:lnR>
+                    <a:lnT w="12700" cap="flat" cmpd="sng" algn="ctr">
+                      <a:solidFill>
+                        <a:schemeClr val="tx1"/>
+                      </a:solidFill>
+                      <a:prstDash val="solid"/>
+                      <a:round/>
+                      <a:headEnd type="none" w="med" len="med"/>
+                      <a:tailEnd type="none" w="med" len="med"/>
+                    </a:lnT>
+                    <a:lnB w="12700" cap="flat" cmpd="sng" algn="ctr">
+                      <a:solidFill>
+                        <a:schemeClr val="tx1"/>
+                      </a:solidFill>
+                      <a:prstDash val="solid"/>
+                      <a:round/>
+                      <a:headEnd type="none" w="med" len="med"/>
+                      <a:tailEnd type="none" w="med" len="med"/>
+                    </a:lnB>
+                    <a:solidFill>
+                      <a:srgbClr val="92D050"/>
+                    </a:solidFill>
+                  </a:tcPr>
+                </a:tc>
+                <a:tc>
+                  <a:txBody>
+                    <a:bodyPr/>
+                    <a:p>
+                      <a:r>
+                        <a:rPr lang="en-US" sz="1300" dirty="0" smtClean="0">
+                          <a:solidFill>
+                            <a:schemeClr val="tx1"/>
+                          </a:solidFill>
+                          <a:latin typeface="Calibri" panose="020F0502020204030204" charset="0"/>
+                        </a:rPr>
+                        <a:t> </a:t>
+                      </a:r>
+                      <a:endParaRPr lang="en-US" sz="1300" dirty="0">
+                        <a:solidFill>
+                          <a:schemeClr val="tx1"/>
+                        </a:solidFill>
+                        <a:latin typeface="Calibri" panose="020F0502020204030204" charset="0"/>
+                      </a:endParaRPr>
+                    </a:p>
+                    <a:p>
+                      <a:r>
+                        <a:rPr lang="en-US" sz="1300" baseline="0" dirty="0" smtClean="0">
+                          <a:solidFill>
+                            <a:schemeClr val="tx1"/>
+                          </a:solidFill>
+                          <a:latin typeface="Calibri" panose="020F0502020204030204" charset="0"/>
+                        </a:rPr>
+                        <a:t>Below mentioned </a:t>
+                      </a:r>
+                      <a:r>
+                        <a:rPr lang="en-US" sz="1300" baseline="0" dirty="0" err="1" smtClean="0">
+                          <a:solidFill>
+                            <a:schemeClr val="tx1"/>
+                          </a:solidFill>
+                          <a:latin typeface="Calibri" panose="020F0502020204030204" charset="0"/>
+                        </a:rPr>
+                        <a:t>urls</a:t>
+                      </a:r>
+                      <a:r>
+                        <a:rPr lang="en-US" sz="1300" baseline="0" dirty="0" smtClean="0">
+                          <a:solidFill>
+                            <a:schemeClr val="tx1"/>
+                          </a:solidFill>
+                          <a:latin typeface="Calibri" panose="020F0502020204030204" charset="0"/>
+                        </a:rPr>
+                        <a:t> have improper server side filter</a:t>
+                      </a:r>
+                      <a:endParaRPr lang="en-US" sz="1300" dirty="0" smtClean="0">
+                        <a:solidFill>
+                          <a:schemeClr val="tx1"/>
+                        </a:solidFill>
+                        <a:latin typeface="Calibri" panose="020F0502020204030204" charset="0"/>
+                        <a:cs typeface="Calibri" panose="020F0502020204030204" charset="0"/>
+                      </a:endParaRPr>
+                    </a:p>
+                    <a:p>
+                      <a:endParaRPr lang="en-US" sz="1300" dirty="0" smtClean="0">
+                        <a:solidFill>
+                          <a:schemeClr val="tx1"/>
+                        </a:solidFill>
+                        <a:latin typeface="Calibri" panose="020F0502020204030204" charset="0"/>
+                      </a:endParaRPr>
+                    </a:p>
+                    <a:p>
+                      <a:r>
+                        <a:rPr lang="en-US" sz="1300" b="1" dirty="0" smtClean="0">
+                          <a:solidFill>
+                            <a:schemeClr val="tx1"/>
+                          </a:solidFill>
+                          <a:latin typeface="Calibri" panose="020F0502020204030204" charset="0"/>
+                        </a:rPr>
+                        <a:t>Affected URL :</a:t>
+                      </a:r>
+                      <a:endParaRPr lang="en-US" sz="1300" b="0" i="0" u="none" strike="noStrike" dirty="0" smtClean="0">
+                        <a:solidFill>
+                          <a:schemeClr val="tx1"/>
+                        </a:solidFill>
+                        <a:effectLst/>
+                        <a:latin typeface="Calibri" panose="020F0502020204030204" charset="0"/>
+                        <a:ea typeface="+mn-ea"/>
+                        <a:cs typeface="+mn-cs"/>
+                        <a:sym typeface="Arial" panose="020B0604020202020204"/>
+                      </a:endParaRPr>
+                    </a:p>
+                    <a:p>
+                      <a:pPr marL="285750" indent="-285750">
+                        <a:buFont typeface="Arial" panose="020B0604020202020204" pitchFamily="34" charset="0"/>
+                        <a:buChar char="•"/>
+                      </a:pPr>
+                      <a:r>
+                        <a:rPr lang="en-US" sz="1300" b="0" i="0" u="none" strike="noStrike" dirty="0" smtClean="0">
+                          <a:solidFill>
+                            <a:schemeClr val="dk1"/>
+                          </a:solidFill>
+                          <a:effectLst/>
+                          <a:latin typeface="Calibri" panose="020F0502020204030204" charset="0"/>
+                          <a:ea typeface="+mn-ea"/>
+                          <a:cs typeface="Calibri" panose="020F0502020204030204" charset="0"/>
+                          <a:sym typeface="Arial" panose="020B0604020202020204"/>
+                        </a:rPr>
+                        <a:t>http://35.154.118.58/</a:t>
+                      </a:r>
+                      <a:endParaRPr lang="en-US" sz="1300" b="0" i="0" u="none" strike="noStrike" dirty="0" smtClean="0">
+                        <a:solidFill>
+                          <a:schemeClr val="dk1"/>
+                        </a:solidFill>
+                        <a:effectLst/>
+                        <a:latin typeface="Calibri" panose="020F0502020204030204" charset="0"/>
+                        <a:ea typeface="+mn-ea"/>
+                        <a:cs typeface="Calibri" panose="020F0502020204030204" charset="0"/>
+                        <a:sym typeface="Arial" panose="020B0604020202020204"/>
+                      </a:endParaRPr>
+                    </a:p>
+                    <a:p>
+                      <a:pPr marL="0" indent="0">
+                        <a:buFont typeface="Arial" panose="020B0604020202020204" pitchFamily="34" charset="0"/>
+                        <a:buNone/>
+                      </a:pPr>
+                      <a:endParaRPr lang="en-US" sz="1300" b="0" dirty="0" smtClean="0">
+                        <a:solidFill>
+                          <a:schemeClr val="tx1"/>
+                        </a:solidFill>
+                        <a:latin typeface="Calibri" panose="020F0502020204030204" charset="0"/>
+                      </a:endParaRPr>
+                    </a:p>
+                    <a:p>
+                      <a:pPr marL="285750" indent="-285750">
+                        <a:buFont typeface="Arial" panose="020B0604020202020204" pitchFamily="34" charset="0"/>
+                        <a:buChar char="•"/>
+                      </a:pPr>
+                      <a:endParaRPr lang="en-US" sz="1300" b="0" dirty="0" smtClean="0">
+                        <a:solidFill>
+                          <a:schemeClr val="tx1"/>
+                        </a:solidFill>
+                        <a:latin typeface="Calibri" panose="020F0502020204030204" charset="0"/>
+                      </a:endParaRPr>
+                    </a:p>
+                    <a:p>
+                      <a:pPr indent="0">
+                        <a:buFont typeface="Arial" panose="020B0604020202020204" pitchFamily="34" charset="0"/>
+                        <a:buNone/>
+                      </a:pPr>
+                      <a:r>
+                        <a:rPr lang="en-US" sz="1300" b="0" dirty="0">
+                          <a:solidFill>
+                            <a:schemeClr val="tx1"/>
+                          </a:solidFill>
+                          <a:latin typeface="Calibri" panose="020F0502020204030204" charset="0"/>
+                        </a:rPr>
+                        <a:t>Default pages available:</a:t>
+                      </a:r>
+                      <a:endParaRPr lang="en-US" sz="1300" b="0" dirty="0">
+                        <a:solidFill>
+                          <a:schemeClr val="tx1"/>
+                        </a:solidFill>
+                        <a:latin typeface="Calibri" panose="020F0502020204030204" charset="0"/>
+                      </a:endParaRPr>
+                    </a:p>
+                    <a:p>
+                      <a:pPr marL="285750" indent="-285750">
+                        <a:buFont typeface="Arial" panose="020B0604020202020204" pitchFamily="34" charset="0"/>
+                        <a:buChar char="•"/>
+                      </a:pPr>
+                      <a:r>
+                        <a:rPr lang="en-US" sz="1300" b="0" dirty="0">
+                          <a:solidFill>
+                            <a:schemeClr val="tx1"/>
+                          </a:solidFill>
+                          <a:latin typeface="Calibri" panose="020F0502020204030204" charset="0"/>
+                        </a:rPr>
+                        <a:t>robots.txt</a:t>
+                      </a:r>
+                      <a:endParaRPr lang="en-US" sz="1300" b="0" dirty="0">
+                        <a:solidFill>
+                          <a:schemeClr val="tx1"/>
+                        </a:solidFill>
+                        <a:latin typeface="Calibri" panose="020F0502020204030204" charset="0"/>
+                      </a:endParaRPr>
+                    </a:p>
+                    <a:p>
+                      <a:pPr marL="285750" indent="-285750">
+                        <a:buFont typeface="Arial" panose="020B0604020202020204" pitchFamily="34" charset="0"/>
+                        <a:buChar char="•"/>
+                      </a:pPr>
+                      <a:r>
+                        <a:rPr lang="en-US" sz="1300" b="0" dirty="0">
+                          <a:solidFill>
+                            <a:schemeClr val="tx1"/>
+                          </a:solidFill>
+                          <a:latin typeface="Calibri" panose="020F0502020204030204" charset="0"/>
+                        </a:rPr>
+                        <a:t>sever-status</a:t>
+                      </a:r>
+                      <a:endParaRPr lang="en-US" sz="1300" b="0" dirty="0">
+                        <a:solidFill>
+                          <a:schemeClr val="tx1"/>
+                        </a:solidFill>
+                        <a:latin typeface="Calibri" panose="020F0502020204030204" charset="0"/>
+                      </a:endParaRPr>
+                    </a:p>
+                    <a:p>
+                      <a:pPr marL="285750" indent="-285750">
+                        <a:buFont typeface="Arial" panose="020B0604020202020204" pitchFamily="34" charset="0"/>
+                        <a:buChar char="•"/>
+                      </a:pPr>
+                      <a:r>
+                        <a:rPr lang="en-US" sz="1300" b="0" dirty="0">
+                          <a:solidFill>
+                            <a:schemeClr val="tx1"/>
+                          </a:solidFill>
+                          <a:latin typeface="Calibri" panose="020F0502020204030204" charset="0"/>
+                        </a:rPr>
+                        <a:t>phpinfo.php</a:t>
+                      </a:r>
+                      <a:endParaRPr lang="en-US" sz="1300" b="0" dirty="0">
+                        <a:solidFill>
+                          <a:schemeClr val="tx1"/>
+                        </a:solidFill>
+                        <a:latin typeface="Calibri" panose="020F0502020204030204" charset="0"/>
+                      </a:endParaRPr>
+                    </a:p>
+                    <a:p>
+                      <a:pPr marL="285750" indent="-285750">
+                        <a:buFont typeface="Arial" panose="020B0604020202020204" pitchFamily="34" charset="0"/>
+                        <a:buChar char="•"/>
+                      </a:pPr>
+                      <a:r>
+                        <a:rPr lang="en-US" sz="1300" b="0" dirty="0">
+                          <a:solidFill>
+                            <a:schemeClr val="tx1"/>
+                          </a:solidFill>
+                          <a:latin typeface="Calibri" panose="020F0502020204030204" charset="0"/>
+                        </a:rPr>
+                        <a:t>userlist.txt</a:t>
+                      </a:r>
+                      <a:endParaRPr lang="en-US" sz="1300" b="0" dirty="0">
+                        <a:solidFill>
+                          <a:schemeClr val="tx1"/>
+                        </a:solidFill>
+                        <a:latin typeface="Calibri" panose="020F0502020204030204" charset="0"/>
+                      </a:endParaRPr>
+                    </a:p>
+                  </a:txBody>
+                  <a:tcPr marL="82988" marR="82988" marT="41494" marB="41494">
+                    <a:lnL w="12700" cap="flat" cmpd="sng" algn="ctr">
+                      <a:solidFill>
+                        <a:schemeClr val="tx1"/>
+                      </a:solidFill>
+                      <a:prstDash val="solid"/>
+                      <a:round/>
+                      <a:headEnd type="none" w="med" len="med"/>
+                      <a:tailEnd type="none" w="med" len="med"/>
+                    </a:lnL>
+                    <a:lnR w="12700" cap="flat" cmpd="sng" algn="ctr">
+                      <a:solidFill>
+                        <a:schemeClr val="tx1"/>
+                      </a:solidFill>
+                      <a:prstDash val="solid"/>
+                      <a:round/>
+                      <a:headEnd type="none" w="med" len="med"/>
+                      <a:tailEnd type="none" w="med" len="med"/>
+                    </a:lnR>
+                    <a:lnT w="12700" cap="flat" cmpd="sng" algn="ctr">
+                      <a:solidFill>
+                        <a:schemeClr val="tx1"/>
+                      </a:solidFill>
+                      <a:prstDash val="solid"/>
+                      <a:round/>
+                      <a:headEnd type="none" w="med" len="med"/>
+                      <a:tailEnd type="none" w="med" len="med"/>
+                    </a:lnT>
+                    <a:lnB w="12700" cap="flat" cmpd="sng" algn="ctr">
+                      <a:solidFill>
+                        <a:schemeClr val="tx1"/>
+                      </a:solidFill>
+                      <a:prstDash val="solid"/>
+                      <a:round/>
+                      <a:headEnd type="none" w="med" len="med"/>
+                      <a:tailEnd type="none" w="med" len="med"/>
+                    </a:lnB>
+                    <a:solidFill>
+                      <a:schemeClr val="bg1"/>
+                    </a:solidFill>
+                  </a:tcPr>
+                </a:tc>
+              </a:tr>
+            </a:tbl>
+          </a:graphicData>
+        </a:graphic>
+      </p:graphicFrame>
+    </p:spTree>
+  </p:cSld>
+  <p:clrMapOvr>
+    <a:masterClrMapping/>
+  </p:clrMapOvr>
+</p:sld>
+</file>
+
+<file path=ppt/slides/slide111.xml><?xml version="1.0" encoding="utf-8"?>
+<p:sld xmlns:a="http://schemas.openxmlformats.org/drawingml/2006/main" xmlns:r="http://schemas.openxmlformats.org/officeDocument/2006/relationships" xmlns:p="http://schemas.openxmlformats.org/presentationml/2006/main">
+  <p:cSld>
+    <p:spTree>
+      <p:nvGrpSpPr>
+        <p:cNvPr id="1" name=""/>
+        <p:cNvGrpSpPr/>
+        <p:nvPr/>
+      </p:nvGrpSpPr>
+      <p:grpSpPr/>
+      <p:sp>
+        <p:nvSpPr>
+          <p:cNvPr id="2" name="Title 1"/>
+          <p:cNvSpPr>
+            <a:spLocks noGrp="1"/>
+          </p:cNvSpPr>
+          <p:nvPr>
+            <p:ph type="title"/>
+          </p:nvPr>
+        </p:nvSpPr>
+        <p:spPr/>
+        <p:txBody>
+          <a:bodyPr/>
+          <a:p>
+            <a:r>
               <a:rPr lang="en-US" u="sng">
                 <a:ln w="22225">
                   <a:solidFill>
@@ -6887,133 +7400,6 @@
           <a:xfrm>
             <a:off x="2079625" y="2816225"/>
             <a:ext cx="7702550" cy="1970405"/>
-          </a:xfrm>
-          <a:prstGeom prst="rect">
-            <a:avLst/>
-          </a:prstGeom>
-        </p:spPr>
-      </p:pic>
-    </p:spTree>
-  </p:cSld>
-  <p:clrMapOvr>
-    <a:masterClrMapping/>
-  </p:clrMapOvr>
-</p:sld>
-</file>
-
-<file path=ppt/slides/slide111.xml><?xml version="1.0" encoding="utf-8"?>
-<p:sld xmlns:a="http://schemas.openxmlformats.org/drawingml/2006/main" xmlns:r="http://schemas.openxmlformats.org/officeDocument/2006/relationships" xmlns:p="http://schemas.openxmlformats.org/presentationml/2006/main">
-  <p:cSld>
-    <p:spTree>
-      <p:nvGrpSpPr>
-        <p:cNvPr id="1" name=""/>
-        <p:cNvGrpSpPr/>
-        <p:nvPr/>
-      </p:nvGrpSpPr>
-      <p:grpSpPr/>
-      <p:sp>
-        <p:nvSpPr>
-          <p:cNvPr id="3" name="Content Placeholder 2"/>
-          <p:cNvSpPr>
-            <a:spLocks noGrp="1"/>
-          </p:cNvSpPr>
-          <p:nvPr>
-            <p:ph idx="1"/>
-          </p:nvPr>
-        </p:nvSpPr>
-        <p:spPr>
-          <a:xfrm>
-            <a:off x="838200" y="1015365"/>
-            <a:ext cx="10515600" cy="563880"/>
-          </a:xfrm>
-        </p:spPr>
-        <p:txBody>
-          <a:bodyPr/>
-          <a:p>
-            <a:pPr marL="0" indent="0">
-              <a:buNone/>
-            </a:pPr>
-            <a:r>
-              <a:rPr lang="en-US"/>
-              <a:t>When we entered phpinfo.php at the end ,we got:</a:t>
-            </a:r>
-            <a:endParaRPr lang="en-US"/>
-          </a:p>
-        </p:txBody>
-      </p:sp>
-      <p:sp>
-        <p:nvSpPr>
-          <p:cNvPr id="4" name="Title 3"/>
-          <p:cNvSpPr>
-            <a:spLocks noGrp="1"/>
-          </p:cNvSpPr>
-          <p:nvPr>
-            <p:ph type="title"/>
-          </p:nvPr>
-        </p:nvSpPr>
-        <p:spPr>
-          <a:xfrm>
-            <a:off x="838200" y="-17145"/>
-            <a:ext cx="10515600" cy="1325563"/>
-          </a:xfrm>
-        </p:spPr>
-        <p:txBody>
-          <a:bodyPr/>
-          <a:p>
-            <a:r>
-              <a:rPr lang="en-US" u="sng">
-                <a:ln w="22225">
-                  <a:solidFill>
-                    <a:schemeClr val="accent2"/>
-                  </a:solidFill>
-                  <a:prstDash val="solid"/>
-                </a:ln>
-                <a:solidFill>
-                  <a:schemeClr val="accent2">
-                    <a:lumMod val="40000"/>
-                    <a:lumOff val="60000"/>
-                  </a:schemeClr>
-                </a:solidFill>
-                <a:effectLst/>
-              </a:rPr>
-              <a:t>Proof Of Concept(PoC):</a:t>
-            </a:r>
-            <a:endParaRPr lang="en-US" u="sng">
-              <a:ln w="22225">
-                <a:solidFill>
-                  <a:schemeClr val="accent2"/>
-                </a:solidFill>
-                <a:prstDash val="solid"/>
-              </a:ln>
-              <a:solidFill>
-                <a:schemeClr val="accent2">
-                  <a:lumMod val="40000"/>
-                  <a:lumOff val="60000"/>
-                </a:schemeClr>
-              </a:solidFill>
-              <a:effectLst/>
-            </a:endParaRPr>
-          </a:p>
-        </p:txBody>
-      </p:sp>
-      <p:pic>
-        <p:nvPicPr>
-          <p:cNvPr id="5" name="Picture 4" descr="version detected"/>
-          <p:cNvPicPr>
-            <a:picLocks noChangeAspect="1"/>
-          </p:cNvPicPr>
-          <p:nvPr/>
-        </p:nvPicPr>
-        <p:blipFill>
-          <a:blip r:embed="rId1"/>
-          <a:stretch>
-            <a:fillRect/>
-          </a:stretch>
-        </p:blipFill>
-        <p:spPr>
-          <a:xfrm>
-            <a:off x="838200" y="1579245"/>
-            <a:ext cx="10058400" cy="5061585"/>
           </a:xfrm>
           <a:prstGeom prst="rect">
             <a:avLst/>
@@ -7050,21 +7436,19 @@
         </p:nvSpPr>
         <p:spPr>
           <a:xfrm>
-            <a:off x="838200" y="1825625"/>
-            <a:ext cx="10515600" cy="504190"/>
+            <a:off x="838200" y="1015365"/>
+            <a:ext cx="10515600" cy="563880"/>
           </a:xfrm>
         </p:spPr>
         <p:txBody>
-          <a:bodyPr>
-            <a:normAutofit lnSpcReduction="20000"/>
-          </a:bodyPr>
+          <a:bodyPr/>
           <a:p>
             <a:pPr marL="0" indent="0">
               <a:buNone/>
             </a:pPr>
             <a:r>
               <a:rPr lang="en-US"/>
-              <a:t>When we entered server-info at the end of index URL:</a:t>
+              <a:t>When we entered phpinfo.php at the end ,we got:</a:t>
             </a:r>
             <a:endParaRPr lang="en-US"/>
           </a:p>
@@ -7080,7 +7464,12 @@
             <p:ph type="title"/>
           </p:nvPr>
         </p:nvSpPr>
-        <p:spPr/>
+        <p:spPr>
+          <a:xfrm>
+            <a:off x="838200" y="-17145"/>
+            <a:ext cx="10515600" cy="1325563"/>
+          </a:xfrm>
+        </p:spPr>
         <p:txBody>
           <a:bodyPr/>
           <a:p>
@@ -7122,7 +7511,7 @@
       </p:sp>
       <p:pic>
         <p:nvPicPr>
-          <p:cNvPr id="5" name="Picture 4" descr="server status"/>
+          <p:cNvPr id="5" name="Picture 4" descr="version detected"/>
           <p:cNvPicPr>
             <a:picLocks noChangeAspect="1"/>
           </p:cNvPicPr>
@@ -7136,8 +7525,8 @@
         </p:blipFill>
         <p:spPr>
           <a:xfrm>
-            <a:off x="1194435" y="2329815"/>
-            <a:ext cx="8395335" cy="4453255"/>
+            <a:off x="838200" y="1579245"/>
+            <a:ext cx="10058400" cy="5061585"/>
           </a:xfrm>
           <a:prstGeom prst="rect">
             <a:avLst/>
@@ -7175,6 +7564,130 @@
         <p:spPr>
           <a:xfrm>
             <a:off x="838200" y="1825625"/>
+            <a:ext cx="10515600" cy="504190"/>
+          </a:xfrm>
+        </p:spPr>
+        <p:txBody>
+          <a:bodyPr>
+            <a:normAutofit lnSpcReduction="20000"/>
+          </a:bodyPr>
+          <a:p>
+            <a:pPr marL="0" indent="0">
+              <a:buNone/>
+            </a:pPr>
+            <a:r>
+              <a:rPr lang="en-US"/>
+              <a:t>When we entered server-info at the end of index URL:</a:t>
+            </a:r>
+            <a:endParaRPr lang="en-US"/>
+          </a:p>
+        </p:txBody>
+      </p:sp>
+      <p:sp>
+        <p:nvSpPr>
+          <p:cNvPr id="4" name="Title 3"/>
+          <p:cNvSpPr>
+            <a:spLocks noGrp="1"/>
+          </p:cNvSpPr>
+          <p:nvPr>
+            <p:ph type="title"/>
+          </p:nvPr>
+        </p:nvSpPr>
+        <p:spPr/>
+        <p:txBody>
+          <a:bodyPr/>
+          <a:p>
+            <a:r>
+              <a:rPr lang="en-US" u="sng">
+                <a:ln w="22225">
+                  <a:solidFill>
+                    <a:schemeClr val="accent2"/>
+                  </a:solidFill>
+                  <a:prstDash val="solid"/>
+                </a:ln>
+                <a:solidFill>
+                  <a:schemeClr val="accent2">
+                    <a:lumMod val="40000"/>
+                    <a:lumOff val="60000"/>
+                  </a:schemeClr>
+                </a:solidFill>
+                <a:effectLst/>
+              </a:rPr>
+              <a:t>Proof Of Concept(PoC):</a:t>
+            </a:r>
+            <a:endParaRPr lang="en-US" u="sng">
+              <a:ln w="22225">
+                <a:solidFill>
+                  <a:schemeClr val="accent2"/>
+                </a:solidFill>
+                <a:prstDash val="solid"/>
+              </a:ln>
+              <a:solidFill>
+                <a:schemeClr val="accent2">
+                  <a:lumMod val="40000"/>
+                  <a:lumOff val="60000"/>
+                </a:schemeClr>
+              </a:solidFill>
+              <a:effectLst/>
+            </a:endParaRPr>
+          </a:p>
+        </p:txBody>
+      </p:sp>
+      <p:pic>
+        <p:nvPicPr>
+          <p:cNvPr id="5" name="Picture 4" descr="server status"/>
+          <p:cNvPicPr>
+            <a:picLocks noChangeAspect="1"/>
+          </p:cNvPicPr>
+          <p:nvPr/>
+        </p:nvPicPr>
+        <p:blipFill>
+          <a:blip r:embed="rId1"/>
+          <a:stretch>
+            <a:fillRect/>
+          </a:stretch>
+        </p:blipFill>
+        <p:spPr>
+          <a:xfrm>
+            <a:off x="1194435" y="2329815"/>
+            <a:ext cx="8395335" cy="4453255"/>
+          </a:xfrm>
+          <a:prstGeom prst="rect">
+            <a:avLst/>
+          </a:prstGeom>
+        </p:spPr>
+      </p:pic>
+    </p:spTree>
+  </p:cSld>
+  <p:clrMapOvr>
+    <a:masterClrMapping/>
+  </p:clrMapOvr>
+</p:sld>
+</file>
+
+<file path=ppt/slides/slide114.xml><?xml version="1.0" encoding="utf-8"?>
+<p:sld xmlns:a="http://schemas.openxmlformats.org/drawingml/2006/main" xmlns:r="http://schemas.openxmlformats.org/officeDocument/2006/relationships" xmlns:p="http://schemas.openxmlformats.org/presentationml/2006/main">
+  <p:cSld>
+    <p:spTree>
+      <p:nvGrpSpPr>
+        <p:cNvPr id="1" name=""/>
+        <p:cNvGrpSpPr/>
+        <p:nvPr/>
+      </p:nvGrpSpPr>
+      <p:grpSpPr/>
+      <p:sp>
+        <p:nvSpPr>
+          <p:cNvPr id="3" name="Content Placeholder 2"/>
+          <p:cNvSpPr>
+            <a:spLocks noGrp="1"/>
+          </p:cNvSpPr>
+          <p:nvPr>
+            <p:ph idx="1"/>
+          </p:nvPr>
+        </p:nvSpPr>
+        <p:spPr>
+          <a:xfrm>
+            <a:off x="838200" y="1825625"/>
             <a:ext cx="10515600" cy="533400"/>
           </a:xfrm>
         </p:spPr>
@@ -7274,7 +7787,7 @@
 </p:sld>
 </file>
 
-<file path=ppt/slides/slide114.xml><?xml version="1.0" encoding="utf-8"?>
+<file path=ppt/slides/slide115.xml><?xml version="1.0" encoding="utf-8"?>
 <p:sld xmlns:a="http://schemas.openxmlformats.org/drawingml/2006/main" xmlns:r="http://schemas.openxmlformats.org/officeDocument/2006/relationships" xmlns:p="http://schemas.openxmlformats.org/presentationml/2006/main">
   <p:cSld>
     <p:spTree>
@@ -7614,7 +8127,7 @@
 </p:sld>
 </file>
 
-<file path=ppt/slides/slide115.xml><?xml version="1.0" encoding="utf-8"?>
+<file path=ppt/slides/slide116.xml><?xml version="1.0" encoding="utf-8"?>
 <p:sld xmlns:a="http://schemas.openxmlformats.org/drawingml/2006/main" xmlns:r="http://schemas.openxmlformats.org/officeDocument/2006/relationships" xmlns:p="http://schemas.openxmlformats.org/presentationml/2006/main">
   <p:cSld>
     <p:spTree>
@@ -30589,55 +31102,24 @@
         </p:nvSpPr>
         <p:spPr/>
         <p:txBody>
-          <a:bodyPr>
-            <a:scene3d>
-              <a:camera prst="orthographicFront"/>
-              <a:lightRig rig="soft" dir="t">
-                <a:rot lat="0" lon="0" rev="15600000"/>
-              </a:lightRig>
-            </a:scene3d>
-            <a:sp3d extrusionH="57150" prstMaterial="softEdge">
-              <a:bevelT w="25400" h="38100"/>
-            </a:sp3d>
-          </a:bodyPr>
-          <a:p>
-            <a:r>
-              <a:rPr lang="en-US">
+          <a:bodyPr/>
+          <a:p>
+            <a:r>
+              <a:rPr lang="en-US" sz="3200" b="1">
+                <a:ln/>
                 <a:solidFill>
-                  <a:schemeClr val="accent4"/>
-                </a:solidFill>
-              </a:rPr>
-              <a:t>14)</a:t>
-            </a:r>
-            <a:r>
-              <a:rPr lang="en-US" u="sng">
-                <a:solidFill>
-                  <a:schemeClr val="accent4"/>
-                </a:solidFill>
-              </a:rPr>
-              <a:t>Unrequired details</a:t>
-            </a:r>
-            <a:r>
-              <a:rPr lang="en-US" u="sng">
-                <a:solidFill>
-                  <a:schemeClr val="accent4"/>
+                  <a:schemeClr val="tx1"/>
                 </a:solidFill>
                 <a:effectLst/>
               </a:rPr>
-              <a:t> for seller</a:t>
-            </a:r>
-            <a:r>
-              <a:rPr lang="en-US">
-                <a:solidFill>
-                  <a:schemeClr val="accent4"/>
-                </a:solidFill>
-              </a:rPr>
-              <a:t>:</a:t>
-            </a:r>
-            <a:endParaRPr lang="en-US">
+              <a:t>16. PII Leakage:</a:t>
+            </a:r>
+            <a:endParaRPr lang="en-US" sz="3200" b="1">
+              <a:ln/>
               <a:solidFill>
-                <a:schemeClr val="accent4"/>
+                <a:schemeClr val="tx1"/>
               </a:solidFill>
+              <a:effectLst/>
             </a:endParaRPr>
           </a:p>
         </p:txBody>
@@ -30756,7 +31238,7 @@
                           </a:solidFill>
                           <a:latin typeface="Calibri" panose="020F0502020204030204" charset="0"/>
                         </a:rPr>
-                        <a:t>Unrequired Details for seller</a:t>
+                        <a:t>PII Leakage</a:t>
                       </a:r>
                       <a:r>
                         <a:rPr lang="en-IN" sz="1600" dirty="0" smtClean="0">
@@ -30854,7 +31336,7 @@
                           </a:solidFill>
                           <a:latin typeface="Calibri" panose="020F0502020204030204" charset="0"/>
                         </a:rPr>
-                        <a:t>Below mentioned URL gives the unrequired details about the seller:</a:t>
+                        <a:t>Below mentioned URL gives the unrequired details about the seller and user:</a:t>
                       </a:r>
                       <a:endParaRPr lang="en-US" sz="1300" dirty="0" smtClean="0">
                         <a:solidFill>
@@ -30909,7 +31391,36 @@
                           <a:cs typeface="Calibri" panose="020F0502020204030204" charset="0"/>
                           <a:sym typeface="Arial" panose="020B0604020202020204"/>
                         </a:rPr>
-                        <a:t>http://35.154.118.58/products/details.php?p_id=2(or any other p_id)</a:t>
+                        <a:t>http://15.206.67.102/products/details.php?p_id=28</a:t>
+                      </a:r>
+                      <a:endParaRPr lang="en-US" sz="1300" b="0" i="0" u="none" strike="noStrike" dirty="0" smtClean="0">
+                        <a:solidFill>
+                          <a:schemeClr val="dk1"/>
+                        </a:solidFill>
+                        <a:effectLst/>
+                        <a:latin typeface="Calibri" panose="020F0502020204030204" charset="0"/>
+                        <a:ea typeface="+mn-ea"/>
+                        <a:cs typeface="Calibri" panose="020F0502020204030204" charset="0"/>
+                        <a:sym typeface="Arial" panose="020B0604020202020204"/>
+                      </a:endParaRPr>
+                    </a:p>
+                    <a:p>
+                      <a:pPr marL="285750" indent="-285750">
+                        <a:buFont typeface="Arial" panose="020B0604020202020204" pitchFamily="34" charset="0"/>
+                        <a:buChar char="•"/>
+                      </a:pPr>
+                      <a:r>
+                        <a:rPr lang="en-US" sz="1300" b="0" i="0" u="none" strike="noStrike" dirty="0" smtClean="0">
+                          <a:solidFill>
+                            <a:schemeClr val="dk1"/>
+                          </a:solidFill>
+                          <a:effectLst/>
+                          <a:latin typeface="Calibri" panose="020F0502020204030204" charset="0"/>
+                          <a:ea typeface="+mn-ea"/>
+                          <a:cs typeface="Calibri" panose="020F0502020204030204" charset="0"/>
+                          <a:sym typeface="Arial" panose="020B0604020202020204"/>
+                        </a:rPr>
+                        <a:t>http://13.232.248.46/login/customer.php</a:t>
                       </a:r>
                       <a:endParaRPr lang="en-US" sz="1300" b="0" i="0" u="none" strike="noStrike" dirty="0" smtClean="0">
                         <a:solidFill>
@@ -31039,31 +31550,22 @@
           <a:bodyPr/>
           <a:p>
             <a:r>
-              <a:rPr lang="en-US" u="sng">
-                <a:ln w="10160">
-                  <a:solidFill>
-                    <a:schemeClr val="accent5"/>
-                  </a:solidFill>
-                  <a:prstDash val="solid"/>
-                </a:ln>
+              <a:rPr lang="en-US" sz="3200" b="1">
+                <a:ln/>
                 <a:solidFill>
-                  <a:srgbClr val="FFFFFF"/>
+                  <a:schemeClr val="tx1"/>
                 </a:solidFill>
-                <a:effectLst>
-                  <a:outerShdw blurRad="38100" dist="22860" dir="5400000" algn="tl" rotWithShape="0">
-                    <a:srgbClr val="000000">
-                      <a:alpha val="30000"/>
-                    </a:srgbClr>
-                  </a:outerShdw>
-                </a:effectLst>
+                <a:effectLst/>
               </a:rPr>
-              <a:t>Observation</a:t>
-            </a:r>
-            <a:r>
-              <a:rPr lang="en-US"/>
-              <a:t>:</a:t>
-            </a:r>
-            <a:endParaRPr lang="en-US"/>
+              <a:t>Observation:</a:t>
+            </a:r>
+            <a:endParaRPr lang="en-US" sz="3200" b="1">
+              <a:ln/>
+              <a:solidFill>
+                <a:schemeClr val="tx1"/>
+              </a:solidFill>
+              <a:effectLst/>
+            </a:endParaRPr>
           </a:p>
         </p:txBody>
       </p:sp>
@@ -31079,29 +31581,29 @@
         </p:nvSpPr>
         <p:spPr>
           <a:xfrm>
-            <a:off x="838200" y="1825625"/>
+            <a:off x="1155700" y="1457325"/>
             <a:ext cx="10311130" cy="961390"/>
           </a:xfrm>
         </p:spPr>
         <p:txBody>
           <a:bodyPr>
-            <a:normAutofit lnSpcReduction="20000"/>
+            <a:normAutofit/>
           </a:bodyPr>
           <a:p>
             <a:pPr marL="0" indent="0">
               <a:buNone/>
             </a:pPr>
             <a:r>
-              <a:rPr lang="en-US"/>
+              <a:rPr lang="en-US" sz="2400"/>
               <a:t>When we click on the “Seller Info” option,we get the details of the seller ,even those which are not required like the pan card number,etc.</a:t>
             </a:r>
-            <a:endParaRPr lang="en-US"/>
+            <a:endParaRPr lang="en-US" sz="2400"/>
           </a:p>
         </p:txBody>
       </p:sp>
       <p:pic>
         <p:nvPicPr>
-          <p:cNvPr id="5" name="Content Placeholder 4" descr="Capture"/>
+          <p:cNvPr id="5" name="Content Placeholder 4" descr="C:\Users\Datagrokr\Documents\program\CEH-Hack-a-thon\reports\Lifestyle Store\vulnerabilities\PII\seller info\POC.pngPOC"/>
           <p:cNvPicPr>
             <a:picLocks noChangeAspect="1"/>
           </p:cNvPicPr>
@@ -31111,14 +31613,15 @@
         </p:nvPicPr>
         <p:blipFill>
           <a:blip r:embed="rId1"/>
+          <a:srcRect/>
           <a:stretch>
             <a:fillRect/>
           </a:stretch>
         </p:blipFill>
         <p:spPr>
           <a:xfrm>
-            <a:off x="2354580" y="2787015"/>
-            <a:ext cx="7510145" cy="3665855"/>
+            <a:off x="2637155" y="2787015"/>
+            <a:ext cx="6944995" cy="3665855"/>
           </a:xfrm>
           <a:prstGeom prst="rect">
             <a:avLst/>
@@ -31158,31 +31661,19 @@
           <a:bodyPr/>
           <a:p>
             <a:r>
-              <a:rPr lang="en-US" u="sng">
+              <a:rPr lang="en-US" sz="3200" b="1">
                 <a:solidFill>
-                  <a:schemeClr val="accent1"/>
+                  <a:schemeClr val="tx1"/>
                 </a:solidFill>
-                <a:effectLst>
-                  <a:outerShdw blurRad="38100" dist="25400" dir="5400000" algn="ctr" rotWithShape="0">
-                    <a:srgbClr val="6E747A">
-                      <a:alpha val="43000"/>
-                    </a:srgbClr>
-                  </a:outerShdw>
-                </a:effectLst>
+                <a:effectLst/>
               </a:rPr>
-              <a:t>Business Impact(Moderate):</a:t>
-            </a:r>
-            <a:endParaRPr lang="en-US" u="sng">
+              <a:t>Observation:</a:t>
+            </a:r>
+            <a:endParaRPr lang="en-US" sz="3200" b="1">
               <a:solidFill>
-                <a:schemeClr val="accent1"/>
+                <a:schemeClr val="tx1"/>
               </a:solidFill>
-              <a:effectLst>
-                <a:outerShdw blurRad="38100" dist="25400" dir="5400000" algn="ctr" rotWithShape="0">
-                  <a:srgbClr val="6E747A">
-                    <a:alpha val="43000"/>
-                  </a:srgbClr>
-                </a:outerShdw>
-              </a:effectLst>
+              <a:effectLst/>
             </a:endParaRPr>
           </a:p>
         </p:txBody>
@@ -31199,20 +31690,196 @@
         </p:nvSpPr>
         <p:spPr>
           <a:xfrm>
-            <a:off x="838200" y="1825625"/>
-            <a:ext cx="10710545" cy="4351655"/>
+            <a:off x="1155700" y="1457325"/>
+            <a:ext cx="10311130" cy="466090"/>
           </a:xfrm>
         </p:spPr>
         <p:txBody>
-          <a:bodyPr/>
+          <a:bodyPr>
+            <a:normAutofit/>
+          </a:bodyPr>
           <a:p>
             <a:pPr marL="0" indent="0">
               <a:buNone/>
             </a:pPr>
             <a:r>
-              <a:rPr lang="en-US"/>
-              <a:t>There is no direct business impact in this case ,but this amount of information can definitely lead to social engineering attacks on the seller and can indirectly harm the business.</a:t>
-            </a:r>
+              <a:rPr lang="en-US" sz="2400"/>
+              <a:t>You can see Customer usernames are displayed publicly.</a:t>
+            </a:r>
+            <a:endParaRPr lang="en-US" sz="2400"/>
+          </a:p>
+        </p:txBody>
+      </p:sp>
+      <p:pic>
+        <p:nvPicPr>
+          <p:cNvPr id="5" name="Content Placeholder 4" descr="C:\Users\Datagrokr\Documents\program\CEH-Hack-a-thon\reports\Lifestyle Store\vulnerabilities\PII\customer-login-user-info\observation.pngobservation"/>
+          <p:cNvPicPr>
+            <a:picLocks noChangeAspect="1"/>
+          </p:cNvPicPr>
+          <p:nvPr>
+            <p:ph sz="half" idx="2"/>
+          </p:nvPr>
+        </p:nvPicPr>
+        <p:blipFill>
+          <a:blip r:embed="rId1"/>
+          <a:srcRect/>
+          <a:stretch>
+            <a:fillRect/>
+          </a:stretch>
+        </p:blipFill>
+        <p:spPr>
+          <a:xfrm>
+            <a:off x="4207510" y="2226945"/>
+            <a:ext cx="3776345" cy="3665855"/>
+          </a:xfrm>
+          <a:prstGeom prst="rect">
+            <a:avLst/>
+          </a:prstGeom>
+          <a:ln>
+            <a:noFill/>
+          </a:ln>
+        </p:spPr>
+      </p:pic>
+      <p:sp>
+        <p:nvSpPr>
+          <p:cNvPr id="4" name="Rectangle 3"/>
+          <p:cNvSpPr/>
+          <p:nvPr/>
+        </p:nvSpPr>
+        <p:spPr>
+          <a:xfrm>
+            <a:off x="4439285" y="4562475"/>
+            <a:ext cx="991235" cy="1134745"/>
+          </a:xfrm>
+          <a:prstGeom prst="rect">
+            <a:avLst/>
+          </a:prstGeom>
+          <a:noFill/>
+          <a:ln w="28575"/>
+          <a:extLst>
+            <a:ext uri="{909E8E84-426E-40DD-AFC4-6F175D3DCCD1}">
+              <a14:hiddenFill xmlns:a14="http://schemas.microsoft.com/office/drawing/2010/main">
+                <a:solidFill>
+                  <a:schemeClr val="lt1"/>
+                </a:solidFill>
+              </a14:hiddenFill>
+            </a:ext>
+          </a:extLst>
+        </p:spPr>
+        <p:style>
+          <a:lnRef idx="2">
+            <a:schemeClr val="accent2"/>
+          </a:lnRef>
+          <a:fillRef idx="1">
+            <a:schemeClr val="lt1"/>
+          </a:fillRef>
+          <a:effectRef idx="0">
+            <a:schemeClr val="accent2"/>
+          </a:effectRef>
+          <a:fontRef idx="minor">
+            <a:schemeClr val="dk1"/>
+          </a:fontRef>
+        </p:style>
+        <p:txBody>
+          <a:bodyPr rtlCol="0" anchor="ctr"/>
+          <a:p>
+            <a:pPr algn="ctr"/>
+            <a:endParaRPr lang="en-US"/>
+          </a:p>
+        </p:txBody>
+      </p:sp>
+      <p:sp>
+        <p:nvSpPr>
+          <p:cNvPr id="6" name="Rectangle 5"/>
+          <p:cNvSpPr/>
+          <p:nvPr/>
+        </p:nvSpPr>
+        <p:spPr>
+          <a:xfrm>
+            <a:off x="5607685" y="4537075"/>
+            <a:ext cx="991235" cy="1134745"/>
+          </a:xfrm>
+          <a:prstGeom prst="rect">
+            <a:avLst/>
+          </a:prstGeom>
+          <a:noFill/>
+          <a:ln w="28575"/>
+          <a:extLst>
+            <a:ext uri="{909E8E84-426E-40DD-AFC4-6F175D3DCCD1}">
+              <a14:hiddenFill xmlns:a14="http://schemas.microsoft.com/office/drawing/2010/main">
+                <a:solidFill>
+                  <a:schemeClr val="lt1"/>
+                </a:solidFill>
+              </a14:hiddenFill>
+            </a:ext>
+          </a:extLst>
+        </p:spPr>
+        <p:style>
+          <a:lnRef idx="2">
+            <a:schemeClr val="accent2"/>
+          </a:lnRef>
+          <a:fillRef idx="1">
+            <a:schemeClr val="lt1"/>
+          </a:fillRef>
+          <a:effectRef idx="0">
+            <a:schemeClr val="accent2"/>
+          </a:effectRef>
+          <a:fontRef idx="minor">
+            <a:schemeClr val="dk1"/>
+          </a:fontRef>
+        </p:style>
+        <p:txBody>
+          <a:bodyPr rtlCol="0" anchor="ctr"/>
+          <a:p>
+            <a:pPr algn="ctr"/>
+            <a:endParaRPr lang="en-US"/>
+          </a:p>
+        </p:txBody>
+      </p:sp>
+      <p:sp>
+        <p:nvSpPr>
+          <p:cNvPr id="7" name="Rectangle 6"/>
+          <p:cNvSpPr/>
+          <p:nvPr/>
+        </p:nvSpPr>
+        <p:spPr>
+          <a:xfrm>
+            <a:off x="6763385" y="4524375"/>
+            <a:ext cx="991235" cy="1134745"/>
+          </a:xfrm>
+          <a:prstGeom prst="rect">
+            <a:avLst/>
+          </a:prstGeom>
+          <a:noFill/>
+          <a:ln w="28575"/>
+          <a:extLst>
+            <a:ext uri="{909E8E84-426E-40DD-AFC4-6F175D3DCCD1}">
+              <a14:hiddenFill xmlns:a14="http://schemas.microsoft.com/office/drawing/2010/main">
+                <a:solidFill>
+                  <a:schemeClr val="lt1"/>
+                </a:solidFill>
+              </a14:hiddenFill>
+            </a:ext>
+          </a:extLst>
+        </p:spPr>
+        <p:style>
+          <a:lnRef idx="2">
+            <a:schemeClr val="accent2"/>
+          </a:lnRef>
+          <a:fillRef idx="1">
+            <a:schemeClr val="lt1"/>
+          </a:fillRef>
+          <a:effectRef idx="0">
+            <a:schemeClr val="accent2"/>
+          </a:effectRef>
+          <a:fontRef idx="minor">
+            <a:schemeClr val="dk1"/>
+          </a:fontRef>
+        </p:style>
+        <p:txBody>
+          <a:bodyPr rtlCol="0" anchor="ctr"/>
+          <a:p>
+            <a:pPr algn="ctr"/>
             <a:endParaRPr lang="en-US"/>
           </a:p>
         </p:txBody>
@@ -31250,14 +31917,22 @@
           <a:bodyPr/>
           <a:p>
             <a:r>
-              <a:rPr lang="en-US" u="sng"/>
-              <a:t>Recommendation</a:t>
-            </a:r>
-            <a:r>
-              <a:rPr lang="en-US"/>
-              <a:t>:</a:t>
-            </a:r>
-            <a:endParaRPr lang="en-US"/>
+              <a:rPr lang="en-US" sz="3200" b="1">
+                <a:ln/>
+                <a:solidFill>
+                  <a:schemeClr val="tx1"/>
+                </a:solidFill>
+                <a:effectLst/>
+              </a:rPr>
+              <a:t>Business Impact(Moderate):</a:t>
+            </a:r>
+            <a:endParaRPr lang="en-US" sz="3200" b="1">
+              <a:ln/>
+              <a:solidFill>
+                <a:schemeClr val="tx1"/>
+              </a:solidFill>
+              <a:effectLst/>
+            </a:endParaRPr>
           </a:p>
         </p:txBody>
       </p:sp>
@@ -31273,8 +31948,8 @@
         </p:nvSpPr>
         <p:spPr>
           <a:xfrm>
-            <a:off x="838200" y="1825625"/>
-            <a:ext cx="11195685" cy="4351655"/>
+            <a:off x="927100" y="1825625"/>
+            <a:ext cx="10710545" cy="4351655"/>
           </a:xfrm>
         </p:spPr>
         <p:txBody>
@@ -31284,10 +31959,10 @@
               <a:buNone/>
             </a:pPr>
             <a:r>
-              <a:rPr lang="en-US"/>
-              <a:t>Only name and email is sufficient as far as the query or help is concerned.</a:t>
-            </a:r>
-            <a:endParaRPr lang="en-US"/>
+              <a:rPr lang="en-US" sz="2400"/>
+              <a:t>There is no direct business impact in this case ,but this amount of information can definitely lead to social engineering attacks on the seller and can indirectly harm the business.</a:t>
+            </a:r>
+            <a:endParaRPr lang="en-US" sz="2400"/>
           </a:p>
         </p:txBody>
       </p:sp>
@@ -31321,6 +31996,90 @@
         </p:nvSpPr>
         <p:spPr/>
         <p:txBody>
+          <a:bodyPr/>
+          <a:p>
+            <a:r>
+              <a:rPr lang="en-US" sz="3200" b="1"/>
+              <a:t>Recommendation</a:t>
+            </a:r>
+            <a:r>
+              <a:rPr lang="en-US"/>
+              <a:t>:</a:t>
+            </a:r>
+            <a:endParaRPr lang="en-US"/>
+          </a:p>
+        </p:txBody>
+      </p:sp>
+      <p:sp>
+        <p:nvSpPr>
+          <p:cNvPr id="3" name="Content Placeholder 2"/>
+          <p:cNvSpPr>
+            <a:spLocks noGrp="1"/>
+          </p:cNvSpPr>
+          <p:nvPr>
+            <p:ph sz="half" idx="1"/>
+          </p:nvPr>
+        </p:nvSpPr>
+        <p:spPr>
+          <a:xfrm>
+            <a:off x="838200" y="1825625"/>
+            <a:ext cx="11195685" cy="4351655"/>
+          </a:xfrm>
+        </p:spPr>
+        <p:txBody>
+          <a:bodyPr/>
+          <a:p>
+            <a:pPr marL="0" indent="0">
+              <a:buNone/>
+            </a:pPr>
+            <a:r>
+              <a:rPr lang="en-US"/>
+              <a:t>Only name and email is sufficient as far as the query or help is concerned.</a:t>
+            </a:r>
+            <a:endParaRPr lang="en-US"/>
+          </a:p>
+          <a:p>
+            <a:pPr marL="0" indent="0">
+              <a:buNone/>
+            </a:pPr>
+            <a:r>
+              <a:rPr lang="en-US"/>
+              <a:t>Username and profile pic of other user should not be display</a:t>
+            </a:r>
+            <a:endParaRPr lang="en-US"/>
+          </a:p>
+        </p:txBody>
+      </p:sp>
+    </p:spTree>
+  </p:cSld>
+  <p:clrMapOvr>
+    <a:masterClrMapping/>
+  </p:clrMapOvr>
+</p:sld>
+</file>
+
+<file path=ppt/slides/slide96.xml><?xml version="1.0" encoding="utf-8"?>
+<p:sld xmlns:a="http://schemas.openxmlformats.org/drawingml/2006/main" xmlns:r="http://schemas.openxmlformats.org/officeDocument/2006/relationships" xmlns:p="http://schemas.openxmlformats.org/presentationml/2006/main">
+  <p:cSld>
+    <p:spTree>
+      <p:nvGrpSpPr>
+        <p:cNvPr id="1" name=""/>
+        <p:cNvGrpSpPr/>
+        <p:nvPr/>
+      </p:nvGrpSpPr>
+      <p:grpSpPr/>
+      <p:sp>
+        <p:nvSpPr>
+          <p:cNvPr id="2" name="Title 1"/>
+          <p:cNvSpPr>
+            <a:spLocks noGrp="1"/>
+          </p:cNvSpPr>
+          <p:nvPr>
+            <p:ph type="title"/>
+          </p:nvPr>
+        </p:nvSpPr>
+        <p:spPr/>
+        <p:txBody>
           <a:bodyPr>
             <a:scene3d>
               <a:camera prst="orthographicFront"/>
@@ -31730,7 +32489,7 @@
 </p:sld>
 </file>
 
-<file path=ppt/slides/slide96.xml><?xml version="1.0" encoding="utf-8"?>
+<file path=ppt/slides/slide97.xml><?xml version="1.0" encoding="utf-8"?>
 <p:sld xmlns:a="http://schemas.openxmlformats.org/drawingml/2006/main" xmlns:r="http://schemas.openxmlformats.org/officeDocument/2006/relationships" xmlns:p="http://schemas.openxmlformats.org/presentationml/2006/main">
   <p:cSld>
     <p:spTree>
@@ -31886,7 +32645,7 @@
 </p:sld>
 </file>
 
-<file path=ppt/slides/slide97.xml><?xml version="1.0" encoding="utf-8"?>
+<file path=ppt/slides/slide98.xml><?xml version="1.0" encoding="utf-8"?>
 <p:sld xmlns:a="http://schemas.openxmlformats.org/drawingml/2006/main" xmlns:r="http://schemas.openxmlformats.org/officeDocument/2006/relationships" xmlns:p="http://schemas.openxmlformats.org/presentationml/2006/main">
   <p:cSld>
     <p:spTree>
@@ -31974,7 +32733,7 @@
 </p:sld>
 </file>
 
-<file path=ppt/slides/slide98.xml><?xml version="1.0" encoding="utf-8"?>
+<file path=ppt/slides/slide99.xml><?xml version="1.0" encoding="utf-8"?>
 <p:sld xmlns:a="http://schemas.openxmlformats.org/drawingml/2006/main" xmlns:r="http://schemas.openxmlformats.org/officeDocument/2006/relationships" xmlns:p="http://schemas.openxmlformats.org/presentationml/2006/main">
   <p:cSld>
     <p:spTree>
@@ -32189,518 +32948,6 @@
   <p:clrMapOvr>
     <a:masterClrMapping/>
   </p:clrMapOvr>
-</p:sld>
-</file>
-
-<file path=ppt/slides/slide99.xml><?xml version="1.0" encoding="utf-8"?>
-<p:sld xmlns:a="http://schemas.openxmlformats.org/drawingml/2006/main" xmlns:r="http://schemas.openxmlformats.org/officeDocument/2006/relationships" xmlns:p="http://schemas.openxmlformats.org/presentationml/2006/main">
-  <p:cSld>
-    <p:spTree>
-      <p:nvGrpSpPr>
-        <p:cNvPr id="1" name=""/>
-        <p:cNvGrpSpPr/>
-        <p:nvPr/>
-      </p:nvGrpSpPr>
-      <p:grpSpPr>
-        <a:xfrm>
-          <a:off x="0" y="0"/>
-          <a:ext cx="0" cy="0"/>
-          <a:chOff x="0" y="0"/>
-          <a:chExt cx="0" cy="0"/>
-        </a:xfrm>
-      </p:grpSpPr>
-      <p:sp>
-        <p:nvSpPr>
-          <p:cNvPr id="4" name="Slide Number Placeholder 3"/>
-          <p:cNvSpPr>
-            <a:spLocks noGrp="1"/>
-          </p:cNvSpPr>
-          <p:nvPr>
-            <p:ph type="sldNum" sz="quarter" idx="2"/>
-          </p:nvPr>
-        </p:nvSpPr>
-        <p:spPr/>
-        <p:txBody>
-          <a:bodyPr/>
-          <a:lstStyle/>
-          <a:p>
-            <a:pPr lvl="0"/>
-            <a:fld id="{86CB4B4D-7CA3-9044-876B-883B54F8677D}" type="slidenum">
-              <a:rPr lang="uk-UA" smtClean="0"/>
-            </a:fld>
-            <a:endParaRPr lang="uk-UA"/>
-          </a:p>
-        </p:txBody>
-      </p:sp>
-      <p:sp>
-        <p:nvSpPr>
-          <p:cNvPr id="3" name="Title 2"/>
-          <p:cNvSpPr>
-            <a:spLocks noGrp="1"/>
-          </p:cNvSpPr>
-          <p:nvPr>
-            <p:ph type="title"/>
-          </p:nvPr>
-        </p:nvSpPr>
-        <p:spPr>
-          <a:xfrm>
-            <a:off x="800100" y="488950"/>
-            <a:ext cx="10515600" cy="1325563"/>
-          </a:xfrm>
-        </p:spPr>
-        <p:txBody>
-          <a:bodyPr>
-            <a:normAutofit/>
-          </a:bodyPr>
-          <a:lstStyle/>
-          <a:p>
-            <a:r>
-              <a:rPr lang="en-US">
-                <a:sym typeface="+mn-ea"/>
-              </a:rPr>
-              <a:t>16)</a:t>
-            </a:r>
-            <a:r>
-              <a:rPr lang="en-US" u="sng">
-                <a:gradFill>
-                  <a:gsLst>
-                    <a:gs pos="21000">
-                      <a:srgbClr val="53575C"/>
-                    </a:gs>
-                    <a:gs pos="88000">
-                      <a:srgbClr val="C5C7CA"/>
-                    </a:gs>
-                  </a:gsLst>
-                  <a:lin ang="5400000"/>
-                </a:gradFill>
-                <a:effectLst/>
-                <a:sym typeface="+mn-ea"/>
-              </a:rPr>
-              <a:t>Improper Server Side Filter</a:t>
-            </a:r>
-            <a:endParaRPr lang="en-IN" dirty="0" smtClean="0"/>
-          </a:p>
-        </p:txBody>
-      </p:sp>
-      <p:graphicFrame>
-        <p:nvGraphicFramePr>
-          <p:cNvPr id="6" name="Table 5"/>
-          <p:cNvGraphicFramePr>
-            <a:graphicFrameLocks noGrp="1"/>
-          </p:cNvGraphicFramePr>
-          <p:nvPr/>
-        </p:nvGraphicFramePr>
-        <p:xfrm>
-          <a:off x="1751173" y="2188740"/>
-          <a:ext cx="8109380" cy="2821929"/>
-        </p:xfrm>
-        <a:graphic>
-          <a:graphicData uri="http://schemas.openxmlformats.org/drawingml/2006/table">
-            <a:tbl>
-              <a:tblPr firstRow="1" bandRow="1">
-                <a:tableStyleId>{5C22544A-7EE6-4342-B048-85BDC9FD1C3A}</a:tableStyleId>
-              </a:tblPr>
-              <a:tblGrid>
-                <a:gridCol w="1413562"/>
-                <a:gridCol w="6695818"/>
-              </a:tblGrid>
-              <a:tr h="415290">
-                <a:tc>
-                  <a:txBody>
-                    <a:bodyPr/>
-                    <a:lstStyle/>
-                    <a:p>
-                      <a:pPr algn="ctr"/>
-                      <a:endParaRPr lang="en-US" sz="1600" dirty="0"/>
-                    </a:p>
-                  </a:txBody>
-                  <a:tcPr marL="82988" marR="82988" marT="41494" marB="41494">
-                    <a:lnL w="12700" cmpd="sng">
-                      <a:noFill/>
-                    </a:lnL>
-                    <a:lnR w="12700" cmpd="sng">
-                      <a:noFill/>
-                    </a:lnR>
-                    <a:lnT w="12700" cmpd="sng">
-                      <a:noFill/>
-                    </a:lnT>
-                    <a:lnB w="12700" cap="flat" cmpd="sng" algn="ctr">
-                      <a:solidFill>
-                        <a:schemeClr val="tx1"/>
-                      </a:solidFill>
-                      <a:prstDash val="solid"/>
-                      <a:round/>
-                      <a:headEnd type="none" w="med" len="med"/>
-                      <a:tailEnd type="none" w="med" len="med"/>
-                    </a:lnB>
-                    <a:lnTlToBr w="12700" cmpd="sng">
-                      <a:noFill/>
-                      <a:prstDash val="solid"/>
-                    </a:lnTlToBr>
-                    <a:lnBlToTr w="12700" cmpd="sng">
-                      <a:noFill/>
-                      <a:prstDash val="solid"/>
-                    </a:lnBlToTr>
-                    <a:noFill/>
-                  </a:tcPr>
-                </a:tc>
-                <a:tc>
-                  <a:txBody>
-                    <a:bodyPr/>
-                    <a:lstStyle/>
-                    <a:p>
-                      <a:endParaRPr lang="en-US" sz="1600" dirty="0"/>
-                    </a:p>
-                  </a:txBody>
-                  <a:tcPr marL="82988" marR="82988" marT="41494" marB="41494">
-                    <a:lnL w="12700" cmpd="sng">
-                      <a:noFill/>
-                    </a:lnL>
-                    <a:lnR w="12700" cmpd="sng">
-                      <a:noFill/>
-                    </a:lnR>
-                    <a:lnT w="12700" cmpd="sng">
-                      <a:noFill/>
-                    </a:lnT>
-                    <a:lnB w="12700" cap="flat" cmpd="sng" algn="ctr">
-                      <a:solidFill>
-                        <a:schemeClr val="tx1"/>
-                      </a:solidFill>
-                      <a:prstDash val="solid"/>
-                      <a:round/>
-                      <a:headEnd type="none" w="med" len="med"/>
-                      <a:tailEnd type="none" w="med" len="med"/>
-                    </a:lnB>
-                    <a:lnTlToBr w="12700" cmpd="sng">
-                      <a:noFill/>
-                      <a:prstDash val="solid"/>
-                    </a:lnTlToBr>
-                    <a:lnBlToTr w="12700" cmpd="sng">
-                      <a:noFill/>
-                      <a:prstDash val="solid"/>
-                    </a:lnBlToTr>
-                    <a:noFill/>
-                  </a:tcPr>
-                </a:tc>
-              </a:tr>
-              <a:tr h="2406639">
-                <a:tc>
-                  <a:txBody>
-                    <a:bodyPr/>
-                    <a:lstStyle/>
-                    <a:p>
-                      <a:pPr algn="ctr"/>
-                      <a:r>
-                        <a:rPr lang="en-US" altLang="en-IN" sz="1600" dirty="0" smtClean="0">
-                          <a:solidFill>
-                            <a:schemeClr val="tx1"/>
-                          </a:solidFill>
-                          <a:latin typeface="Calibri" panose="020F0502020204030204" charset="0"/>
-                        </a:rPr>
-                        <a:t>Improper Server Side Filter</a:t>
-                      </a:r>
-                      <a:r>
-                        <a:rPr lang="en-IN" sz="1600" dirty="0" smtClean="0">
-                          <a:solidFill>
-                            <a:schemeClr val="tx1"/>
-                          </a:solidFill>
-                          <a:latin typeface="Calibri" panose="020F0502020204030204" charset="0"/>
-                        </a:rPr>
-                        <a:t> </a:t>
-                      </a:r>
-                      <a:r>
-                        <a:rPr lang="en-US" sz="1300" dirty="0" smtClean="0">
-                          <a:solidFill>
-                            <a:schemeClr val="tx1"/>
-                          </a:solidFill>
-                          <a:latin typeface="Calibri" panose="020F0502020204030204" charset="0"/>
-                        </a:rPr>
-                        <a:t>(Low)</a:t>
-                      </a:r>
-                      <a:endParaRPr lang="en-US" sz="1300" dirty="0">
-                        <a:solidFill>
-                          <a:schemeClr val="tx1"/>
-                        </a:solidFill>
-                        <a:latin typeface="Calibri" panose="020F0502020204030204" charset="0"/>
-                      </a:endParaRPr>
-                    </a:p>
-                  </a:txBody>
-                  <a:tcPr marL="82988" marR="82988" marT="41494" marB="41494" anchor="ctr">
-                    <a:lnL w="12700" cap="flat" cmpd="sng" algn="ctr">
-                      <a:solidFill>
-                        <a:schemeClr val="tx1"/>
-                      </a:solidFill>
-                      <a:prstDash val="solid"/>
-                      <a:round/>
-                      <a:headEnd type="none" w="med" len="med"/>
-                      <a:tailEnd type="none" w="med" len="med"/>
-                    </a:lnL>
-                    <a:lnR w="12700" cap="flat" cmpd="sng" algn="ctr">
-                      <a:solidFill>
-                        <a:schemeClr val="tx1"/>
-                      </a:solidFill>
-                      <a:prstDash val="solid"/>
-                      <a:round/>
-                      <a:headEnd type="none" w="med" len="med"/>
-                      <a:tailEnd type="none" w="med" len="med"/>
-                    </a:lnR>
-                    <a:lnT w="12700" cap="flat" cmpd="sng" algn="ctr">
-                      <a:solidFill>
-                        <a:schemeClr val="tx1"/>
-                      </a:solidFill>
-                      <a:prstDash val="solid"/>
-                      <a:round/>
-                      <a:headEnd type="none" w="med" len="med"/>
-                      <a:tailEnd type="none" w="med" len="med"/>
-                    </a:lnT>
-                    <a:lnB w="12700" cap="flat" cmpd="sng" algn="ctr">
-                      <a:solidFill>
-                        <a:schemeClr val="tx1"/>
-                      </a:solidFill>
-                      <a:prstDash val="solid"/>
-                      <a:round/>
-                      <a:headEnd type="none" w="med" len="med"/>
-                      <a:tailEnd type="none" w="med" len="med"/>
-                    </a:lnB>
-                    <a:solidFill>
-                      <a:srgbClr val="92D050"/>
-                    </a:solidFill>
-                  </a:tcPr>
-                </a:tc>
-                <a:tc>
-                  <a:txBody>
-                    <a:bodyPr/>
-                    <a:lstStyle/>
-                    <a:p>
-                      <a:r>
-                        <a:rPr lang="en-US" sz="1300" dirty="0" smtClean="0">
-                          <a:solidFill>
-                            <a:schemeClr val="tx1"/>
-                          </a:solidFill>
-                          <a:latin typeface="Calibri" panose="020F0502020204030204" charset="0"/>
-                        </a:rPr>
-                        <a:t> </a:t>
-                      </a:r>
-                      <a:endParaRPr lang="en-US" sz="1300" dirty="0">
-                        <a:solidFill>
-                          <a:schemeClr val="tx1"/>
-                        </a:solidFill>
-                        <a:latin typeface="Calibri" panose="020F0502020204030204" charset="0"/>
-                      </a:endParaRPr>
-                    </a:p>
-                    <a:p>
-                      <a:r>
-                        <a:rPr lang="en-US" sz="1300" baseline="0" dirty="0" smtClean="0">
-                          <a:solidFill>
-                            <a:schemeClr val="tx1"/>
-                          </a:solidFill>
-                          <a:latin typeface="Calibri" panose="020F0502020204030204" charset="0"/>
-                        </a:rPr>
-                        <a:t>Below mentioned </a:t>
-                      </a:r>
-                      <a:r>
-                        <a:rPr lang="en-US" sz="1300" baseline="0" dirty="0" err="1" smtClean="0">
-                          <a:solidFill>
-                            <a:schemeClr val="tx1"/>
-                          </a:solidFill>
-                          <a:latin typeface="Calibri" panose="020F0502020204030204" charset="0"/>
-                        </a:rPr>
-                        <a:t>urls</a:t>
-                      </a:r>
-                      <a:r>
-                        <a:rPr lang="en-US" sz="1300" baseline="0" dirty="0" smtClean="0">
-                          <a:solidFill>
-                            <a:schemeClr val="tx1"/>
-                          </a:solidFill>
-                          <a:latin typeface="Calibri" panose="020F0502020204030204" charset="0"/>
-                        </a:rPr>
-                        <a:t> have improper server side filter</a:t>
-                      </a:r>
-                      <a:endParaRPr lang="en-US" sz="1300" dirty="0" smtClean="0">
-                        <a:solidFill>
-                          <a:schemeClr val="tx1"/>
-                        </a:solidFill>
-                        <a:latin typeface="Calibri" panose="020F0502020204030204" charset="0"/>
-                        <a:cs typeface="Calibri" panose="020F0502020204030204" charset="0"/>
-                      </a:endParaRPr>
-                    </a:p>
-                    <a:p>
-                      <a:endParaRPr lang="en-US" sz="1300" dirty="0" smtClean="0">
-                        <a:solidFill>
-                          <a:schemeClr val="tx1"/>
-                        </a:solidFill>
-                        <a:latin typeface="Calibri" panose="020F0502020204030204" charset="0"/>
-                      </a:endParaRPr>
-                    </a:p>
-                    <a:p>
-                      <a:r>
-                        <a:rPr lang="en-US" sz="1300" b="1" dirty="0" smtClean="0">
-                          <a:solidFill>
-                            <a:schemeClr val="tx1"/>
-                          </a:solidFill>
-                          <a:latin typeface="Calibri" panose="020F0502020204030204" charset="0"/>
-                        </a:rPr>
-                        <a:t>Affected URL :</a:t>
-                      </a:r>
-                      <a:endParaRPr lang="en-US" sz="1300" b="0" i="0" u="none" strike="noStrike" dirty="0" smtClean="0">
-                        <a:solidFill>
-                          <a:schemeClr val="tx1"/>
-                        </a:solidFill>
-                        <a:effectLst/>
-                        <a:latin typeface="Calibri" panose="020F0502020204030204" charset="0"/>
-                        <a:ea typeface="+mn-ea"/>
-                        <a:cs typeface="+mn-cs"/>
-                        <a:sym typeface="Arial" panose="020B0604020202020204"/>
-                      </a:endParaRPr>
-                    </a:p>
-                    <a:p>
-                      <a:pPr marL="285750" indent="-285750">
-                        <a:buFont typeface="Arial" panose="020B0604020202020204" pitchFamily="34" charset="0"/>
-                        <a:buChar char="•"/>
-                      </a:pPr>
-                      <a:r>
-                        <a:rPr lang="en-US" sz="1300" b="0" dirty="0" smtClean="0">
-                          <a:solidFill>
-                            <a:schemeClr val="tx1"/>
-                          </a:solidFill>
-                          <a:latin typeface="Calibri" panose="020F0502020204030204" charset="0"/>
-                        </a:rPr>
-                        <a:t>http://13.233.108.21/profile/16/edit/</a:t>
-                      </a:r>
-                      <a:endParaRPr lang="en-US" sz="1300" b="0" dirty="0" smtClean="0">
-                        <a:solidFill>
-                          <a:schemeClr val="tx1"/>
-                        </a:solidFill>
-                        <a:latin typeface="Calibri" panose="020F0502020204030204" charset="0"/>
-                      </a:endParaRPr>
-                    </a:p>
-                    <a:p>
-                      <a:pPr indent="0">
-                        <a:buFont typeface="Arial" panose="020B0604020202020204" pitchFamily="34" charset="0"/>
-                        <a:buNone/>
-                      </a:pPr>
-                      <a:r>
-                        <a:rPr lang="en-US" sz="1300" b="1" dirty="0" smtClean="0">
-                          <a:solidFill>
-                            <a:schemeClr val="tx1"/>
-                          </a:solidFill>
-                          <a:latin typeface="Calibri" panose="020F0502020204030204" charset="0"/>
-                        </a:rPr>
-                        <a:t>Affected parameter:</a:t>
-                      </a:r>
-                      <a:endParaRPr lang="en-US" sz="1300" b="0" dirty="0" smtClean="0">
-                        <a:solidFill>
-                          <a:schemeClr val="tx1"/>
-                        </a:solidFill>
-                        <a:latin typeface="Calibri" panose="020F0502020204030204" charset="0"/>
-                      </a:endParaRPr>
-                    </a:p>
-                    <a:p>
-                      <a:pPr marL="285750" indent="-285750">
-                        <a:buFont typeface="Arial" panose="020B0604020202020204" pitchFamily="34" charset="0"/>
-                        <a:buChar char="•"/>
-                      </a:pPr>
-                      <a:r>
-                        <a:rPr lang="en-US" sz="1300" b="0" dirty="0" smtClean="0">
-                          <a:solidFill>
-                            <a:schemeClr val="tx1"/>
-                          </a:solidFill>
-                          <a:latin typeface="Calibri" panose="020F0502020204030204" charset="0"/>
-                        </a:rPr>
-                        <a:t>Contact Number</a:t>
-                      </a:r>
-                      <a:endParaRPr lang="en-US" sz="1300" b="0" dirty="0" smtClean="0">
-                        <a:solidFill>
-                          <a:schemeClr val="tx1"/>
-                        </a:solidFill>
-                        <a:latin typeface="Calibri" panose="020F0502020204030204" charset="0"/>
-                      </a:endParaRPr>
-                    </a:p>
-                    <a:p>
-                      <a:pPr marL="285750" indent="-285750">
-                        <a:buFont typeface="Arial" panose="020B0604020202020204" pitchFamily="34" charset="0"/>
-                        <a:buChar char="•"/>
-                      </a:pPr>
-                      <a:endParaRPr lang="en-US" sz="1300" b="0" dirty="0" smtClean="0">
-                        <a:solidFill>
-                          <a:schemeClr val="tx1"/>
-                        </a:solidFill>
-                        <a:latin typeface="Calibri" panose="020F0502020204030204" charset="0"/>
-                      </a:endParaRPr>
-                    </a:p>
-                    <a:p>
-                      <a:pPr marL="285750" indent="-285750">
-                        <a:buFont typeface="Arial" panose="020B0604020202020204" pitchFamily="34" charset="0"/>
-                        <a:buChar char="•"/>
-                      </a:pPr>
-                      <a:endParaRPr lang="en-US" sz="1300" b="0" dirty="0">
-                        <a:solidFill>
-                          <a:schemeClr val="tx1"/>
-                        </a:solidFill>
-                        <a:latin typeface="Calibri" panose="020F0502020204030204" charset="0"/>
-                      </a:endParaRPr>
-                    </a:p>
-                  </a:txBody>
-                  <a:tcPr marL="82988" marR="82988" marT="41494" marB="41494">
-                    <a:lnL w="12700" cap="flat" cmpd="sng" algn="ctr">
-                      <a:solidFill>
-                        <a:schemeClr val="tx1"/>
-                      </a:solidFill>
-                      <a:prstDash val="solid"/>
-                      <a:round/>
-                      <a:headEnd type="none" w="med" len="med"/>
-                      <a:tailEnd type="none" w="med" len="med"/>
-                    </a:lnL>
-                    <a:lnR w="12700" cap="flat" cmpd="sng" algn="ctr">
-                      <a:solidFill>
-                        <a:schemeClr val="tx1"/>
-                      </a:solidFill>
-                      <a:prstDash val="solid"/>
-                      <a:round/>
-                      <a:headEnd type="none" w="med" len="med"/>
-                      <a:tailEnd type="none" w="med" len="med"/>
-                    </a:lnR>
-                    <a:lnT w="12700" cap="flat" cmpd="sng" algn="ctr">
-                      <a:solidFill>
-                        <a:schemeClr val="tx1"/>
-                      </a:solidFill>
-                      <a:prstDash val="solid"/>
-                      <a:round/>
-                      <a:headEnd type="none" w="med" len="med"/>
-                      <a:tailEnd type="none" w="med" len="med"/>
-                    </a:lnT>
-                    <a:lnB w="12700" cap="flat" cmpd="sng" algn="ctr">
-                      <a:solidFill>
-                        <a:schemeClr val="tx1"/>
-                      </a:solidFill>
-                      <a:prstDash val="solid"/>
-                      <a:round/>
-                      <a:headEnd type="none" w="med" len="med"/>
-                      <a:tailEnd type="none" w="med" len="med"/>
-                    </a:lnB>
-                    <a:solidFill>
-                      <a:schemeClr val="bg1"/>
-                    </a:solidFill>
-                  </a:tcPr>
-                </a:tc>
-              </a:tr>
-            </a:tbl>
-          </a:graphicData>
-        </a:graphic>
-      </p:graphicFrame>
-    </p:spTree>
-  </p:cSld>
-  <p:clrMapOvr>
-    <a:masterClrMapping/>
-  </p:clrMapOvr>
-  <p:transition spd="med"/>
-  <p:timing>
-    <p:tnLst>
-      <p:par>
-        <p:cTn id="1" dur="indefinite" restart="never" nodeType="tmRoot"/>
-      </p:par>
-    </p:tnLst>
-  </p:timing>
 </p:sld>
 </file>
 

</xml_diff>

<commit_message>
reports: Client Side Filter Bypass ppt done
</commit_message>
<xml_diff>
--- a/reports/Lifestyle Store/LifeStyle Store Application Reports.pptx
+++ b/reports/Lifestyle Store/LifeStyle Store Application Reports.pptx
@@ -103,13 +103,13 @@
     <p:sldId id="591" r:id="rId96"/>
     <p:sldId id="356" r:id="rId97"/>
     <p:sldId id="357" r:id="rId98"/>
-    <p:sldId id="358" r:id="rId99"/>
-    <p:sldId id="359" r:id="rId100"/>
-    <p:sldId id="360" r:id="rId101"/>
-    <p:sldId id="361" r:id="rId102"/>
-    <p:sldId id="364" r:id="rId103"/>
-    <p:sldId id="365" r:id="rId104"/>
-    <p:sldId id="366" r:id="rId105"/>
+    <p:sldId id="364" r:id="rId99"/>
+    <p:sldId id="365" r:id="rId100"/>
+    <p:sldId id="366" r:id="rId101"/>
+    <p:sldId id="592" r:id="rId102"/>
+    <p:sldId id="593" r:id="rId103"/>
+    <p:sldId id="594" r:id="rId104"/>
+    <p:sldId id="595" r:id="rId105"/>
     <p:sldId id="367" r:id="rId106"/>
     <p:sldId id="368" r:id="rId107"/>
     <p:sldId id="369" r:id="rId108"/>
@@ -4126,506 +4126,110 @@
         <p:cNvGrpSpPr/>
         <p:nvPr/>
       </p:nvGrpSpPr>
-      <p:grpSpPr>
-        <a:xfrm>
-          <a:off x="0" y="0"/>
-          <a:ext cx="0" cy="0"/>
-          <a:chOff x="0" y="0"/>
-          <a:chExt cx="0" cy="0"/>
-        </a:xfrm>
-      </p:grpSpPr>
+      <p:grpSpPr/>
       <p:sp>
         <p:nvSpPr>
-          <p:cNvPr id="4" name="Slide Number Placeholder 3"/>
+          <p:cNvPr id="2" name="Title 1"/>
           <p:cNvSpPr>
             <a:spLocks noGrp="1"/>
           </p:cNvSpPr>
           <p:nvPr>
-            <p:ph type="sldNum" sz="quarter" idx="2"/>
+            <p:ph type="title"/>
           </p:nvPr>
         </p:nvSpPr>
-        <p:spPr/>
+        <p:spPr>
+          <a:xfrm>
+            <a:off x="840105" y="651510"/>
+            <a:ext cx="4387850" cy="714375"/>
+          </a:xfrm>
+        </p:spPr>
         <p:txBody>
           <a:bodyPr/>
-          <a:lstStyle/>
-          <a:p>
-            <a:pPr lvl="0"/>
-            <a:fld id="{86CB4B4D-7CA3-9044-876B-883B54F8677D}" type="slidenum">
-              <a:rPr lang="uk-UA" smtClean="0"/>
-            </a:fld>
-            <a:endParaRPr lang="uk-UA"/>
+          <a:p>
+            <a:r>
+              <a:rPr lang="en-US" sz="3200" b="1">
+                <a:solidFill>
+                  <a:schemeClr val="tx1"/>
+                </a:solidFill>
+                <a:effectLst/>
+              </a:rPr>
+              <a:t>Proof Of Concept(PoC):</a:t>
+            </a:r>
+            <a:endParaRPr lang="en-US" sz="3200" b="1">
+              <a:solidFill>
+                <a:schemeClr val="tx1"/>
+              </a:solidFill>
+              <a:effectLst/>
+            </a:endParaRPr>
           </a:p>
         </p:txBody>
       </p:sp>
       <p:sp>
         <p:nvSpPr>
-          <p:cNvPr id="3" name="Title 2"/>
+          <p:cNvPr id="3" name="Text Placeholder 2"/>
           <p:cNvSpPr>
             <a:spLocks noGrp="1"/>
           </p:cNvSpPr>
           <p:nvPr>
-            <p:ph type="title"/>
+            <p:ph type="body" sz="half" idx="2"/>
           </p:nvPr>
         </p:nvSpPr>
         <p:spPr>
           <a:xfrm>
-            <a:off x="800100" y="488950"/>
-            <a:ext cx="10515600" cy="1325563"/>
+            <a:off x="1183005" y="1397000"/>
+            <a:ext cx="10633710" cy="565785"/>
           </a:xfrm>
         </p:spPr>
         <p:txBody>
-          <a:bodyPr>
-            <a:normAutofit/>
-          </a:bodyPr>
-          <a:lstStyle/>
-          <a:p>
-            <a:r>
-              <a:rPr lang="en-US">
-                <a:sym typeface="+mn-ea"/>
-              </a:rPr>
-              <a:t>16)</a:t>
-            </a:r>
-            <a:r>
-              <a:rPr lang="en-US" u="sng">
-                <a:gradFill>
-                  <a:gsLst>
-                    <a:gs pos="21000">
-                      <a:srgbClr val="53575C"/>
-                    </a:gs>
-                    <a:gs pos="88000">
-                      <a:srgbClr val="C5C7CA"/>
-                    </a:gs>
-                  </a:gsLst>
-                  <a:lin ang="5400000"/>
-                </a:gradFill>
-                <a:effectLst/>
-                <a:sym typeface="+mn-ea"/>
-              </a:rPr>
-              <a:t>Improper Server Side Filter</a:t>
-            </a:r>
-            <a:endParaRPr lang="en-IN" dirty="0" smtClean="0"/>
+          <a:bodyPr/>
+          <a:p>
+            <a:pPr marL="0" indent="0">
+              <a:buNone/>
+            </a:pPr>
+            <a:r>
+              <a:rPr lang="en-US"/>
+              <a:t>Give a valid email id and intercept the request using burp suite then change the email id, and click on proceed, it get register successfully.</a:t>
+            </a:r>
+            <a:endParaRPr lang="en-US"/>
           </a:p>
         </p:txBody>
       </p:sp>
-      <p:graphicFrame>
-        <p:nvGraphicFramePr>
-          <p:cNvPr id="6" name="Table 5"/>
-          <p:cNvGraphicFramePr>
-            <a:graphicFrameLocks noGrp="1"/>
-          </p:cNvGraphicFramePr>
+      <p:pic>
+        <p:nvPicPr>
+          <p:cNvPr id="4" name="Picture 3" descr="C:\Users\Datagrokr\Documents\program\CEH-Hack-a-thon\reports\Lifestyle Store\vulnerabilities\Client Side Filter Bypass\forum-register\POC.pngPOC"/>
+          <p:cNvPicPr>
+            <a:picLocks noChangeAspect="1"/>
+          </p:cNvPicPr>
           <p:nvPr/>
-        </p:nvGraphicFramePr>
-        <p:xfrm>
-          <a:off x="1751173" y="2188740"/>
-          <a:ext cx="8109380" cy="2821929"/>
-        </p:xfrm>
-        <a:graphic>
-          <a:graphicData uri="http://schemas.openxmlformats.org/drawingml/2006/table">
-            <a:tbl>
-              <a:tblPr firstRow="1" bandRow="1">
-                <a:tableStyleId>{5C22544A-7EE6-4342-B048-85BDC9FD1C3A}</a:tableStyleId>
-              </a:tblPr>
-              <a:tblGrid>
-                <a:gridCol w="1413562"/>
-                <a:gridCol w="6695818"/>
-              </a:tblGrid>
-              <a:tr h="415290">
-                <a:tc>
-                  <a:txBody>
-                    <a:bodyPr/>
-                    <a:lstStyle/>
-                    <a:p>
-                      <a:pPr algn="ctr"/>
-                      <a:endParaRPr lang="en-US" sz="1600" dirty="0"/>
-                    </a:p>
-                  </a:txBody>
-                  <a:tcPr marL="82988" marR="82988" marT="41494" marB="41494">
-                    <a:lnL w="12700" cmpd="sng">
-                      <a:noFill/>
-                    </a:lnL>
-                    <a:lnR w="12700" cmpd="sng">
-                      <a:noFill/>
-                    </a:lnR>
-                    <a:lnT w="12700" cmpd="sng">
-                      <a:noFill/>
-                    </a:lnT>
-                    <a:lnB w="12700" cap="flat" cmpd="sng" algn="ctr">
-                      <a:solidFill>
-                        <a:schemeClr val="tx1"/>
-                      </a:solidFill>
-                      <a:prstDash val="solid"/>
-                      <a:round/>
-                      <a:headEnd type="none" w="med" len="med"/>
-                      <a:tailEnd type="none" w="med" len="med"/>
-                    </a:lnB>
-                    <a:lnTlToBr w="12700" cmpd="sng">
-                      <a:noFill/>
-                      <a:prstDash val="solid"/>
-                    </a:lnTlToBr>
-                    <a:lnBlToTr w="12700" cmpd="sng">
-                      <a:noFill/>
-                      <a:prstDash val="solid"/>
-                    </a:lnBlToTr>
-                    <a:noFill/>
-                  </a:tcPr>
-                </a:tc>
-                <a:tc>
-                  <a:txBody>
-                    <a:bodyPr/>
-                    <a:lstStyle/>
-                    <a:p>
-                      <a:endParaRPr lang="en-US" sz="1600" dirty="0"/>
-                    </a:p>
-                  </a:txBody>
-                  <a:tcPr marL="82988" marR="82988" marT="41494" marB="41494">
-                    <a:lnL w="12700" cmpd="sng">
-                      <a:noFill/>
-                    </a:lnL>
-                    <a:lnR w="12700" cmpd="sng">
-                      <a:noFill/>
-                    </a:lnR>
-                    <a:lnT w="12700" cmpd="sng">
-                      <a:noFill/>
-                    </a:lnT>
-                    <a:lnB w="12700" cap="flat" cmpd="sng" algn="ctr">
-                      <a:solidFill>
-                        <a:schemeClr val="tx1"/>
-                      </a:solidFill>
-                      <a:prstDash val="solid"/>
-                      <a:round/>
-                      <a:headEnd type="none" w="med" len="med"/>
-                      <a:tailEnd type="none" w="med" len="med"/>
-                    </a:lnB>
-                    <a:lnTlToBr w="12700" cmpd="sng">
-                      <a:noFill/>
-                      <a:prstDash val="solid"/>
-                    </a:lnTlToBr>
-                    <a:lnBlToTr w="12700" cmpd="sng">
-                      <a:noFill/>
-                      <a:prstDash val="solid"/>
-                    </a:lnBlToTr>
-                    <a:noFill/>
-                  </a:tcPr>
-                </a:tc>
-              </a:tr>
-              <a:tr h="2406639">
-                <a:tc>
-                  <a:txBody>
-                    <a:bodyPr/>
-                    <a:lstStyle/>
-                    <a:p>
-                      <a:pPr algn="ctr"/>
-                      <a:r>
-                        <a:rPr lang="en-US" altLang="en-IN" sz="1600" dirty="0" smtClean="0">
-                          <a:solidFill>
-                            <a:schemeClr val="tx1"/>
-                          </a:solidFill>
-                          <a:latin typeface="Calibri" panose="020F0502020204030204" charset="0"/>
-                        </a:rPr>
-                        <a:t>Improper Server Side Filter</a:t>
-                      </a:r>
-                      <a:r>
-                        <a:rPr lang="en-IN" sz="1600" dirty="0" smtClean="0">
-                          <a:solidFill>
-                            <a:schemeClr val="tx1"/>
-                          </a:solidFill>
-                          <a:latin typeface="Calibri" panose="020F0502020204030204" charset="0"/>
-                        </a:rPr>
-                        <a:t> </a:t>
-                      </a:r>
-                      <a:r>
-                        <a:rPr lang="en-US" sz="1300" dirty="0" smtClean="0">
-                          <a:solidFill>
-                            <a:schemeClr val="tx1"/>
-                          </a:solidFill>
-                          <a:latin typeface="Calibri" panose="020F0502020204030204" charset="0"/>
-                        </a:rPr>
-                        <a:t>(Low)</a:t>
-                      </a:r>
-                      <a:endParaRPr lang="en-US" sz="1300" dirty="0">
-                        <a:solidFill>
-                          <a:schemeClr val="tx1"/>
-                        </a:solidFill>
-                        <a:latin typeface="Calibri" panose="020F0502020204030204" charset="0"/>
-                      </a:endParaRPr>
-                    </a:p>
-                  </a:txBody>
-                  <a:tcPr marL="82988" marR="82988" marT="41494" marB="41494" anchor="ctr">
-                    <a:lnL w="12700" cap="flat" cmpd="sng" algn="ctr">
-                      <a:solidFill>
-                        <a:schemeClr val="tx1"/>
-                      </a:solidFill>
-                      <a:prstDash val="solid"/>
-                      <a:round/>
-                      <a:headEnd type="none" w="med" len="med"/>
-                      <a:tailEnd type="none" w="med" len="med"/>
-                    </a:lnL>
-                    <a:lnR w="12700" cap="flat" cmpd="sng" algn="ctr">
-                      <a:solidFill>
-                        <a:schemeClr val="tx1"/>
-                      </a:solidFill>
-                      <a:prstDash val="solid"/>
-                      <a:round/>
-                      <a:headEnd type="none" w="med" len="med"/>
-                      <a:tailEnd type="none" w="med" len="med"/>
-                    </a:lnR>
-                    <a:lnT w="12700" cap="flat" cmpd="sng" algn="ctr">
-                      <a:solidFill>
-                        <a:schemeClr val="tx1"/>
-                      </a:solidFill>
-                      <a:prstDash val="solid"/>
-                      <a:round/>
-                      <a:headEnd type="none" w="med" len="med"/>
-                      <a:tailEnd type="none" w="med" len="med"/>
-                    </a:lnT>
-                    <a:lnB w="12700" cap="flat" cmpd="sng" algn="ctr">
-                      <a:solidFill>
-                        <a:schemeClr val="tx1"/>
-                      </a:solidFill>
-                      <a:prstDash val="solid"/>
-                      <a:round/>
-                      <a:headEnd type="none" w="med" len="med"/>
-                      <a:tailEnd type="none" w="med" len="med"/>
-                    </a:lnB>
-                    <a:solidFill>
-                      <a:srgbClr val="92D050"/>
-                    </a:solidFill>
-                  </a:tcPr>
-                </a:tc>
-                <a:tc>
-                  <a:txBody>
-                    <a:bodyPr/>
-                    <a:lstStyle/>
-                    <a:p>
-                      <a:r>
-                        <a:rPr lang="en-US" sz="1300" dirty="0" smtClean="0">
-                          <a:solidFill>
-                            <a:schemeClr val="tx1"/>
-                          </a:solidFill>
-                          <a:latin typeface="Calibri" panose="020F0502020204030204" charset="0"/>
-                        </a:rPr>
-                        <a:t> </a:t>
-                      </a:r>
-                      <a:endParaRPr lang="en-US" sz="1300" dirty="0">
-                        <a:solidFill>
-                          <a:schemeClr val="tx1"/>
-                        </a:solidFill>
-                        <a:latin typeface="Calibri" panose="020F0502020204030204" charset="0"/>
-                      </a:endParaRPr>
-                    </a:p>
-                    <a:p>
-                      <a:r>
-                        <a:rPr lang="en-US" sz="1300" baseline="0" dirty="0" smtClean="0">
-                          <a:solidFill>
-                            <a:schemeClr val="tx1"/>
-                          </a:solidFill>
-                          <a:latin typeface="Calibri" panose="020F0502020204030204" charset="0"/>
-                        </a:rPr>
-                        <a:t>Below mentioned </a:t>
-                      </a:r>
-                      <a:r>
-                        <a:rPr lang="en-US" sz="1300" baseline="0" dirty="0" err="1" smtClean="0">
-                          <a:solidFill>
-                            <a:schemeClr val="tx1"/>
-                          </a:solidFill>
-                          <a:latin typeface="Calibri" panose="020F0502020204030204" charset="0"/>
-                        </a:rPr>
-                        <a:t>urls</a:t>
-                      </a:r>
-                      <a:r>
-                        <a:rPr lang="en-US" sz="1300" baseline="0" dirty="0" smtClean="0">
-                          <a:solidFill>
-                            <a:schemeClr val="tx1"/>
-                          </a:solidFill>
-                          <a:latin typeface="Calibri" panose="020F0502020204030204" charset="0"/>
-                        </a:rPr>
-                        <a:t> have improper server side filter</a:t>
-                      </a:r>
-                      <a:endParaRPr lang="en-US" sz="1300" dirty="0" smtClean="0">
-                        <a:solidFill>
-                          <a:schemeClr val="tx1"/>
-                        </a:solidFill>
-                        <a:latin typeface="Calibri" panose="020F0502020204030204" charset="0"/>
-                        <a:cs typeface="Calibri" panose="020F0502020204030204" charset="0"/>
-                      </a:endParaRPr>
-                    </a:p>
-                    <a:p>
-                      <a:endParaRPr lang="en-US" sz="1300" dirty="0" smtClean="0">
-                        <a:solidFill>
-                          <a:schemeClr val="tx1"/>
-                        </a:solidFill>
-                        <a:latin typeface="Calibri" panose="020F0502020204030204" charset="0"/>
-                      </a:endParaRPr>
-                    </a:p>
-                    <a:p>
-                      <a:r>
-                        <a:rPr lang="en-US" sz="1300" b="1" dirty="0" smtClean="0">
-                          <a:solidFill>
-                            <a:schemeClr val="tx1"/>
-                          </a:solidFill>
-                          <a:latin typeface="Calibri" panose="020F0502020204030204" charset="0"/>
-                        </a:rPr>
-                        <a:t>Affected URL :</a:t>
-                      </a:r>
-                      <a:endParaRPr lang="en-US" sz="1300" b="0" i="0" u="none" strike="noStrike" dirty="0" smtClean="0">
-                        <a:solidFill>
-                          <a:schemeClr val="tx1"/>
-                        </a:solidFill>
-                        <a:effectLst/>
-                        <a:latin typeface="Calibri" panose="020F0502020204030204" charset="0"/>
-                        <a:ea typeface="+mn-ea"/>
-                        <a:cs typeface="+mn-cs"/>
-                        <a:sym typeface="Arial" panose="020B0604020202020204"/>
-                      </a:endParaRPr>
-                    </a:p>
-                    <a:p>
-                      <a:pPr marL="285750" indent="-285750">
-                        <a:buFont typeface="Arial" panose="020B0604020202020204" pitchFamily="34" charset="0"/>
-                        <a:buChar char="•"/>
-                      </a:pPr>
-                      <a:r>
-                        <a:rPr lang="en-US" sz="1300" b="0" dirty="0" smtClean="0">
-                          <a:solidFill>
-                            <a:schemeClr val="tx1"/>
-                          </a:solidFill>
-                          <a:latin typeface="Calibri" panose="020F0502020204030204" charset="0"/>
-                        </a:rPr>
-                        <a:t>http://13.233.108.21/profile/16/edit/</a:t>
-                      </a:r>
-                      <a:endParaRPr lang="en-US" sz="1300" b="0" dirty="0" smtClean="0">
-                        <a:solidFill>
-                          <a:schemeClr val="tx1"/>
-                        </a:solidFill>
-                        <a:latin typeface="Calibri" panose="020F0502020204030204" charset="0"/>
-                      </a:endParaRPr>
-                    </a:p>
-                    <a:p>
-                      <a:pPr indent="0">
-                        <a:buFont typeface="Arial" panose="020B0604020202020204" pitchFamily="34" charset="0"/>
-                        <a:buNone/>
-                      </a:pPr>
-                      <a:r>
-                        <a:rPr lang="en-US" sz="1300" b="1" dirty="0" smtClean="0">
-                          <a:solidFill>
-                            <a:schemeClr val="tx1"/>
-                          </a:solidFill>
-                          <a:latin typeface="Calibri" panose="020F0502020204030204" charset="0"/>
-                        </a:rPr>
-                        <a:t>Affected parameter:</a:t>
-                      </a:r>
-                      <a:endParaRPr lang="en-US" sz="1300" b="0" dirty="0" smtClean="0">
-                        <a:solidFill>
-                          <a:schemeClr val="tx1"/>
-                        </a:solidFill>
-                        <a:latin typeface="Calibri" panose="020F0502020204030204" charset="0"/>
-                      </a:endParaRPr>
-                    </a:p>
-                    <a:p>
-                      <a:pPr marL="285750" indent="-285750">
-                        <a:buFont typeface="Arial" panose="020B0604020202020204" pitchFamily="34" charset="0"/>
-                        <a:buChar char="•"/>
-                      </a:pPr>
-                      <a:r>
-                        <a:rPr lang="en-US" sz="1300" b="0" dirty="0" smtClean="0">
-                          <a:solidFill>
-                            <a:schemeClr val="tx1"/>
-                          </a:solidFill>
-                          <a:latin typeface="Calibri" panose="020F0502020204030204" charset="0"/>
-                        </a:rPr>
-                        <a:t>Contact Number</a:t>
-                      </a:r>
-                      <a:endParaRPr lang="en-US" sz="1300" b="0" dirty="0" smtClean="0">
-                        <a:solidFill>
-                          <a:schemeClr val="tx1"/>
-                        </a:solidFill>
-                        <a:latin typeface="Calibri" panose="020F0502020204030204" charset="0"/>
-                      </a:endParaRPr>
-                    </a:p>
-                    <a:p>
-                      <a:pPr marL="285750" indent="-285750">
-                        <a:buFont typeface="Arial" panose="020B0604020202020204" pitchFamily="34" charset="0"/>
-                        <a:buChar char="•"/>
-                      </a:pPr>
-                      <a:endParaRPr lang="en-US" sz="1300" b="0" dirty="0" smtClean="0">
-                        <a:solidFill>
-                          <a:schemeClr val="tx1"/>
-                        </a:solidFill>
-                        <a:latin typeface="Calibri" panose="020F0502020204030204" charset="0"/>
-                      </a:endParaRPr>
-                    </a:p>
-                    <a:p>
-                      <a:pPr marL="285750" indent="-285750">
-                        <a:buFont typeface="Arial" panose="020B0604020202020204" pitchFamily="34" charset="0"/>
-                        <a:buChar char="•"/>
-                      </a:pPr>
-                      <a:endParaRPr lang="en-US" sz="1300" b="0" dirty="0">
-                        <a:solidFill>
-                          <a:schemeClr val="tx1"/>
-                        </a:solidFill>
-                        <a:latin typeface="Calibri" panose="020F0502020204030204" charset="0"/>
-                      </a:endParaRPr>
-                    </a:p>
-                  </a:txBody>
-                  <a:tcPr marL="82988" marR="82988" marT="41494" marB="41494">
-                    <a:lnL w="12700" cap="flat" cmpd="sng" algn="ctr">
-                      <a:solidFill>
-                        <a:schemeClr val="tx1"/>
-                      </a:solidFill>
-                      <a:prstDash val="solid"/>
-                      <a:round/>
-                      <a:headEnd type="none" w="med" len="med"/>
-                      <a:tailEnd type="none" w="med" len="med"/>
-                    </a:lnL>
-                    <a:lnR w="12700" cap="flat" cmpd="sng" algn="ctr">
-                      <a:solidFill>
-                        <a:schemeClr val="tx1"/>
-                      </a:solidFill>
-                      <a:prstDash val="solid"/>
-                      <a:round/>
-                      <a:headEnd type="none" w="med" len="med"/>
-                      <a:tailEnd type="none" w="med" len="med"/>
-                    </a:lnR>
-                    <a:lnT w="12700" cap="flat" cmpd="sng" algn="ctr">
-                      <a:solidFill>
-                        <a:schemeClr val="tx1"/>
-                      </a:solidFill>
-                      <a:prstDash val="solid"/>
-                      <a:round/>
-                      <a:headEnd type="none" w="med" len="med"/>
-                      <a:tailEnd type="none" w="med" len="med"/>
-                    </a:lnT>
-                    <a:lnB w="12700" cap="flat" cmpd="sng" algn="ctr">
-                      <a:solidFill>
-                        <a:schemeClr val="tx1"/>
-                      </a:solidFill>
-                      <a:prstDash val="solid"/>
-                      <a:round/>
-                      <a:headEnd type="none" w="med" len="med"/>
-                      <a:tailEnd type="none" w="med" len="med"/>
-                    </a:lnB>
-                    <a:solidFill>
-                      <a:schemeClr val="bg1"/>
-                    </a:solidFill>
-                  </a:tcPr>
-                </a:tc>
-              </a:tr>
-            </a:tbl>
-          </a:graphicData>
-        </a:graphic>
-      </p:graphicFrame>
+        </p:nvPicPr>
+        <p:blipFill>
+          <a:blip r:embed="rId1"/>
+          <a:srcRect/>
+          <a:stretch>
+            <a:fillRect/>
+          </a:stretch>
+        </p:blipFill>
+        <p:spPr>
+          <a:xfrm>
+            <a:off x="1172845" y="3170555"/>
+            <a:ext cx="9951085" cy="2284095"/>
+          </a:xfrm>
+          <a:prstGeom prst="rect">
+            <a:avLst/>
+          </a:prstGeom>
+          <a:ln>
+            <a:solidFill>
+              <a:schemeClr val="tx1"/>
+            </a:solidFill>
+          </a:ln>
+        </p:spPr>
+      </p:pic>
     </p:spTree>
   </p:cSld>
   <p:clrMapOvr>
     <a:masterClrMapping/>
   </p:clrMapOvr>
   <p:transition spd="med"/>
-  <p:timing>
-    <p:tnLst>
-      <p:par>
-        <p:cTn id="1" dur="indefinite" restart="never" nodeType="tmRoot"/>
-      </p:par>
-    </p:tnLst>
-  </p:timing>
 </p:sld>
 </file>
 
@@ -4649,40 +4253,27 @@
             <p:ph type="title"/>
           </p:nvPr>
         </p:nvSpPr>
-        <p:spPr/>
+        <p:spPr>
+          <a:xfrm>
+            <a:off x="840105" y="457200"/>
+            <a:ext cx="3931920" cy="596265"/>
+          </a:xfrm>
+        </p:spPr>
         <p:txBody>
           <a:bodyPr/>
           <a:p>
             <a:r>
-              <a:rPr lang="en-US" u="sng">
-                <a:ln w="22225">
-                  <a:solidFill>
-                    <a:schemeClr val="accent2"/>
-                  </a:solidFill>
-                  <a:prstDash val="solid"/>
-                </a:ln>
+              <a:rPr lang="en-US" sz="3200" b="1">
                 <a:solidFill>
-                  <a:schemeClr val="accent2">
-                    <a:lumMod val="40000"/>
-                    <a:lumOff val="60000"/>
-                  </a:schemeClr>
+                  <a:schemeClr val="tx1"/>
                 </a:solidFill>
                 <a:effectLst/>
               </a:rPr>
               <a:t>Observation:</a:t>
             </a:r>
-            <a:endParaRPr lang="en-US" u="sng">
-              <a:ln w="22225">
-                <a:solidFill>
-                  <a:schemeClr val="accent2"/>
-                </a:solidFill>
-                <a:prstDash val="solid"/>
-              </a:ln>
+            <a:endParaRPr lang="en-US" sz="3200" b="1">
               <a:solidFill>
-                <a:schemeClr val="accent2">
-                  <a:lumMod val="40000"/>
-                  <a:lumOff val="60000"/>
-                </a:schemeClr>
+                <a:schemeClr val="tx1"/>
               </a:solidFill>
               <a:effectLst/>
             </a:endParaRPr>
@@ -4696,18 +4287,18 @@
             <a:spLocks noGrp="1"/>
           </p:cNvSpPr>
           <p:nvPr>
-            <p:ph type="body" idx="1"/>
+            <p:ph type="body" sz="half" idx="2"/>
           </p:nvPr>
         </p:nvSpPr>
         <p:spPr>
           <a:xfrm>
-            <a:off x="838200" y="1825625"/>
-            <a:ext cx="10515600" cy="887095"/>
+            <a:off x="1049020" y="1053465"/>
+            <a:ext cx="10307320" cy="722630"/>
           </a:xfrm>
         </p:spPr>
         <p:txBody>
           <a:bodyPr>
-            <a:normAutofit lnSpcReduction="10000"/>
+            <a:normAutofit/>
           </a:bodyPr>
           <a:p>
             <a:pPr marL="0" indent="0">
@@ -4715,7 +4306,7 @@
             </a:pPr>
             <a:r>
               <a:rPr lang="en-US"/>
-              <a:t>After logging in as customer,when we try to edit our phone number to some invalid one ,the error is as shown.</a:t>
+              <a:t>Navigate to customer password reset page “http://13.233.207.87/reset_password/customer.php” and try to give a already register username , email id of the register user is been populated in the input field click on send.</a:t>
             </a:r>
             <a:endParaRPr lang="en-US"/>
           </a:p>
@@ -4723,7 +4314,7 @@
       </p:sp>
       <p:pic>
         <p:nvPicPr>
-          <p:cNvPr id="4" name="Picture 3" descr="phone no verification client side"/>
+          <p:cNvPr id="4" name="Picture 3" descr="C:\Users\Datagrokr\Documents\program\CEH-Hack-a-thon\reports\Lifestyle Store\vulnerabilities\Client Side Filter Bypass\Customer-Password-reset\observation.pngobservation"/>
           <p:cNvPicPr>
             <a:picLocks noChangeAspect="1"/>
           </p:cNvPicPr>
@@ -4731,18 +4322,55 @@
         </p:nvPicPr>
         <p:blipFill>
           <a:blip r:embed="rId1"/>
+          <a:srcRect/>
           <a:stretch>
             <a:fillRect/>
           </a:stretch>
         </p:blipFill>
         <p:spPr>
           <a:xfrm>
-            <a:off x="1548130" y="2921000"/>
-            <a:ext cx="8677910" cy="2025015"/>
+            <a:off x="1049020" y="2051685"/>
+            <a:ext cx="6690360" cy="3291205"/>
           </a:xfrm>
           <a:prstGeom prst="rect">
             <a:avLst/>
           </a:prstGeom>
+          <a:ln>
+            <a:solidFill>
+              <a:schemeClr val="tx1"/>
+            </a:solidFill>
+          </a:ln>
+        </p:spPr>
+      </p:pic>
+      <p:pic>
+        <p:nvPicPr>
+          <p:cNvPr id="5" name="Picture Placeholder 4" descr="observation1"/>
+          <p:cNvPicPr>
+            <a:picLocks noChangeAspect="1"/>
+          </p:cNvPicPr>
+          <p:nvPr>
+            <p:ph type="pic" idx="1"/>
+          </p:nvPr>
+        </p:nvPicPr>
+        <p:blipFill>
+          <a:blip r:embed="rId2"/>
+          <a:stretch>
+            <a:fillRect/>
+          </a:stretch>
+        </p:blipFill>
+        <p:spPr>
+          <a:xfrm>
+            <a:off x="5475605" y="2834005"/>
+            <a:ext cx="6172200" cy="3029585"/>
+          </a:xfrm>
+          <a:prstGeom prst="rect">
+            <a:avLst/>
+          </a:prstGeom>
+          <a:ln>
+            <a:solidFill>
+              <a:schemeClr val="tx1"/>
+            </a:solidFill>
+          </a:ln>
         </p:spPr>
       </p:pic>
     </p:spTree>
@@ -4774,32 +4402,29 @@
             <p:ph type="title"/>
           </p:nvPr>
         </p:nvSpPr>
-        <p:spPr/>
+        <p:spPr>
+          <a:xfrm>
+            <a:off x="840105" y="457200"/>
+            <a:ext cx="3931920" cy="699135"/>
+          </a:xfrm>
+        </p:spPr>
         <p:txBody>
           <a:bodyPr>
-            <a:scene3d>
-              <a:camera prst="orthographicFront"/>
-              <a:lightRig rig="soft" dir="t">
-                <a:rot lat="0" lon="0" rev="15600000"/>
-              </a:lightRig>
-            </a:scene3d>
-            <a:sp3d extrusionH="57150" prstMaterial="softEdge">
-              <a:bevelT w="25400" h="38100"/>
-            </a:sp3d>
+            <a:normAutofit fontScale="90000"/>
           </a:bodyPr>
           <a:p>
             <a:r>
-              <a:rPr lang="en-US" u="sng">
+              <a:rPr lang="en-US" sz="3200" b="1">
                 <a:solidFill>
-                  <a:schemeClr val="accent4"/>
+                  <a:schemeClr val="tx1"/>
                 </a:solidFill>
                 <a:effectLst/>
               </a:rPr>
               <a:t>Proof Of Concept(PoC):</a:t>
             </a:r>
-            <a:endParaRPr lang="en-US" u="sng">
+            <a:endParaRPr lang="en-US" sz="3200" b="1">
               <a:solidFill>
-                <a:schemeClr val="accent4"/>
+                <a:schemeClr val="tx1"/>
               </a:solidFill>
               <a:effectLst/>
             </a:endParaRPr>
@@ -4813,13 +4438,13 @@
             <a:spLocks noGrp="1"/>
           </p:cNvSpPr>
           <p:nvPr>
-            <p:ph type="body" idx="1"/>
+            <p:ph type="body" sz="half" idx="2"/>
           </p:nvPr>
         </p:nvSpPr>
         <p:spPr>
           <a:xfrm>
-            <a:off x="838200" y="1825625"/>
-            <a:ext cx="10515600" cy="1005840"/>
+            <a:off x="840105" y="1156335"/>
+            <a:ext cx="10789285" cy="675640"/>
           </a:xfrm>
         </p:spPr>
         <p:txBody>
@@ -4830,7 +4455,7 @@
             </a:pPr>
             <a:r>
               <a:rPr lang="en-US"/>
-              <a:t>But when we give a valid phone number on the client side,but intercept it through burpsuite and again give invalid number,it gets accepted.</a:t>
+              <a:t>AFter click on send a html page get open, click on 'click here' link, a page will open for providing new password for the user.</a:t>
             </a:r>
             <a:endParaRPr lang="en-US"/>
           </a:p>
@@ -4838,7 +4463,7 @@
       </p:sp>
       <p:pic>
         <p:nvPicPr>
-          <p:cNvPr id="4" name="Picture 3" descr="Contact no. after using burpsuite and hence no proper server side filter"/>
+          <p:cNvPr id="4" name="Picture 3" descr="C:\Users\Datagrokr\Documents\program\CEH-Hack-a-thon\reports\Lifestyle Store\vulnerabilities\Client Side Filter Bypass\Customer-Password-reset\poc-reset-link.pngpoc-reset-link"/>
           <p:cNvPicPr>
             <a:picLocks noChangeAspect="1"/>
           </p:cNvPicPr>
@@ -4846,65 +4471,57 @@
         </p:nvPicPr>
         <p:blipFill>
           <a:blip r:embed="rId1"/>
+          <a:srcRect/>
           <a:stretch>
             <a:fillRect/>
           </a:stretch>
         </p:blipFill>
         <p:spPr>
           <a:xfrm>
-            <a:off x="1533525" y="3009265"/>
-            <a:ext cx="7962900" cy="3219450"/>
+            <a:off x="988060" y="2192655"/>
+            <a:ext cx="8720455" cy="2284095"/>
           </a:xfrm>
           <a:prstGeom prst="rect">
             <a:avLst/>
           </a:prstGeom>
+          <a:ln>
+            <a:solidFill>
+              <a:schemeClr val="tx1"/>
+            </a:solidFill>
+          </a:ln>
         </p:spPr>
       </p:pic>
-      <p:sp>
-        <p:nvSpPr>
-          <p:cNvPr id="9" name="Rectangle 8"/>
-          <p:cNvSpPr/>
-          <p:nvPr/>
-        </p:nvSpPr>
+      <p:pic>
+        <p:nvPicPr>
+          <p:cNvPr id="5" name="Picture Placeholder 4" descr="poc"/>
+          <p:cNvPicPr>
+            <a:picLocks noChangeAspect="1"/>
+          </p:cNvPicPr>
+          <p:nvPr>
+            <p:ph type="pic" idx="1"/>
+          </p:nvPr>
+        </p:nvPicPr>
+        <p:blipFill>
+          <a:blip r:embed="rId2"/>
+          <a:stretch>
+            <a:fillRect/>
+          </a:stretch>
+        </p:blipFill>
         <p:spPr>
           <a:xfrm>
-            <a:off x="1693545" y="4799330"/>
-            <a:ext cx="5177790" cy="331470"/>
+            <a:off x="5348605" y="3663315"/>
+            <a:ext cx="6172200" cy="2670810"/>
           </a:xfrm>
           <a:prstGeom prst="rect">
             <a:avLst/>
           </a:prstGeom>
-          <a:noFill/>
-          <a:ln w="38100">
+          <a:ln>
             <a:solidFill>
-              <a:srgbClr val="FF0000"/>
+              <a:schemeClr val="tx1"/>
             </a:solidFill>
           </a:ln>
         </p:spPr>
-        <p:style>
-          <a:lnRef idx="2">
-            <a:schemeClr val="accent1">
-              <a:shade val="50000"/>
-            </a:schemeClr>
-          </a:lnRef>
-          <a:fillRef idx="1">
-            <a:schemeClr val="accent1"/>
-          </a:fillRef>
-          <a:effectRef idx="0">
-            <a:schemeClr val="accent1"/>
-          </a:effectRef>
-          <a:fontRef idx="minor">
-            <a:schemeClr val="lt1"/>
-          </a:fontRef>
-        </p:style>
-        <p:txBody>
-          <a:bodyPr rtlCol="0" anchor="ctr"/>
-          <a:p>
-            <a:pPr algn="ctr"/>
-            <a:endParaRPr lang="en-IN"/>
-          </a:p>
-        </p:txBody>
-      </p:sp>
+      </p:pic>
     </p:spTree>
   </p:cSld>
   <p:clrMapOvr>
@@ -4936,43 +4553,22 @@
         </p:nvSpPr>
         <p:spPr/>
         <p:txBody>
-          <a:bodyPr>
-            <a:scene3d>
-              <a:camera prst="orthographicFront"/>
-              <a:lightRig rig="threePt" dir="t"/>
-            </a:scene3d>
-          </a:bodyPr>
-          <a:p>
-            <a:r>
-              <a:rPr lang="en-US" u="sng">
-                <a:ln w="22225">
-                  <a:solidFill>
-                    <a:schemeClr val="accent2"/>
-                  </a:solidFill>
-                  <a:prstDash val="solid"/>
-                </a:ln>
+          <a:bodyPr/>
+          <a:p>
+            <a:r>
+              <a:rPr lang="en-US" sz="3200" b="1">
+                <a:ln/>
                 <a:solidFill>
-                  <a:schemeClr val="accent2">
-                    <a:lumMod val="40000"/>
-                    <a:lumOff val="60000"/>
-                  </a:schemeClr>
+                  <a:schemeClr val="tx1"/>
                 </a:solidFill>
                 <a:effectLst/>
               </a:rPr>
               <a:t>Business Impact(Low):</a:t>
             </a:r>
-            <a:endParaRPr lang="en-US" u="sng">
-              <a:ln w="22225">
-                <a:solidFill>
-                  <a:schemeClr val="accent2"/>
-                </a:solidFill>
-                <a:prstDash val="solid"/>
-              </a:ln>
+            <a:endParaRPr lang="en-US" sz="3200" b="1">
+              <a:ln/>
               <a:solidFill>
-                <a:schemeClr val="accent2">
-                  <a:lumMod val="40000"/>
-                  <a:lumOff val="60000"/>
-                </a:schemeClr>
+                <a:schemeClr val="tx1"/>
               </a:solidFill>
               <a:effectLst/>
             </a:endParaRPr>
@@ -4991,8 +4587,8 @@
         </p:nvSpPr>
         <p:spPr>
           <a:xfrm>
-            <a:off x="838200" y="1501140"/>
-            <a:ext cx="10515600" cy="4351338"/>
+            <a:off x="1003300" y="1437640"/>
+            <a:ext cx="10515600" cy="1103630"/>
           </a:xfrm>
         </p:spPr>
         <p:txBody>
@@ -5029,10 +4625,6 @@
         <p:txBody>
           <a:bodyPr vert="horz" lIns="91440" tIns="45720" rIns="91440" bIns="45720" rtlCol="0" anchor="ctr">
             <a:normAutofit/>
-            <a:scene3d>
-              <a:camera prst="orthographicFront"/>
-              <a:lightRig rig="threePt" dir="t"/>
-            </a:scene3d>
           </a:bodyPr>
           <a:lstStyle>
             <a:lvl1pPr algn="l" defTabSz="914400" rtl="0" eaLnBrk="1" latinLnBrk="0" hangingPunct="1">
@@ -5055,35 +4647,19 @@
           </a:lstStyle>
           <a:p>
             <a:r>
-              <a:rPr lang="en-US" u="sng">
-                <a:ln w="22225">
-                  <a:solidFill>
-                    <a:schemeClr val="accent2"/>
-                  </a:solidFill>
-                  <a:prstDash val="solid"/>
-                </a:ln>
+              <a:rPr lang="en-US" sz="3200" b="1">
+                <a:ln/>
                 <a:solidFill>
-                  <a:schemeClr val="accent2">
-                    <a:lumMod val="40000"/>
-                    <a:lumOff val="60000"/>
-                  </a:schemeClr>
+                  <a:schemeClr val="tx1"/>
                 </a:solidFill>
                 <a:effectLst/>
               </a:rPr>
               <a:t>Recommendation:</a:t>
             </a:r>
-            <a:endParaRPr lang="en-US" u="sng">
-              <a:ln w="22225">
-                <a:solidFill>
-                  <a:schemeClr val="accent2"/>
-                </a:solidFill>
-                <a:prstDash val="solid"/>
-              </a:ln>
+            <a:endParaRPr lang="en-US" sz="3200" b="1">
+              <a:ln/>
               <a:solidFill>
-                <a:schemeClr val="accent2">
-                  <a:lumMod val="40000"/>
-                  <a:lumOff val="60000"/>
-                </a:schemeClr>
+                <a:schemeClr val="tx1"/>
               </a:solidFill>
               <a:effectLst/>
             </a:endParaRPr>
@@ -5099,7 +4675,7 @@
         <p:spPr>
           <a:xfrm>
             <a:off x="957580" y="3730625"/>
-            <a:ext cx="10584815" cy="2245360"/>
+            <a:ext cx="10584815" cy="1899920"/>
           </a:xfrm>
           <a:prstGeom prst="rect">
             <a:avLst/>
@@ -5111,23 +4687,59 @@
             <a:spAutoFit/>
           </a:bodyPr>
           <a:p>
+            <a:pPr marL="514350" indent="-514350">
+              <a:lnSpc>
+                <a:spcPct val="60000"/>
+              </a:lnSpc>
+              <a:buAutoNum type="arabicPeriod"/>
+            </a:pPr>
             <a:r>
               <a:rPr lang="en-US" sz="2800"/>
-              <a:t>1) Implement all critical checks on server side code only</a:t>
+              <a:t>Implement all critical checks on server side code only</a:t>
             </a:r>
             <a:endParaRPr lang="en-US" sz="2800"/>
           </a:p>
           <a:p>
+            <a:pPr marL="514350" indent="-514350">
+              <a:lnSpc>
+                <a:spcPct val="60000"/>
+              </a:lnSpc>
+              <a:buAutoNum type="arabicPeriod"/>
+            </a:pPr>
+            <a:endParaRPr lang="en-US" sz="2800"/>
+          </a:p>
+          <a:p>
+            <a:pPr marL="514350" indent="-514350">
+              <a:lnSpc>
+                <a:spcPct val="60000"/>
+              </a:lnSpc>
+              <a:buAutoNum type="arabicPeriod"/>
+            </a:pPr>
             <a:r>
               <a:rPr lang="en-US" sz="2800"/>
-              <a:t>2)Client-side checks must be treated as decoratives only</a:t>
+              <a:t>Client-side checks must be treated as decoratives only</a:t>
             </a:r>
             <a:endParaRPr lang="en-US" sz="2800"/>
           </a:p>
           <a:p>
+            <a:pPr marL="514350" indent="-514350">
+              <a:lnSpc>
+                <a:spcPct val="60000"/>
+              </a:lnSpc>
+              <a:buAutoNum type="arabicPeriod"/>
+            </a:pPr>
+            <a:endParaRPr lang="en-US" sz="2800"/>
+          </a:p>
+          <a:p>
+            <a:pPr marL="514350" indent="-514350">
+              <a:lnSpc>
+                <a:spcPct val="60000"/>
+              </a:lnSpc>
+              <a:buAutoNum type="arabicPeriod"/>
+            </a:pPr>
             <a:r>
               <a:rPr lang="en-US" sz="2800"/>
-              <a:t>3)All business logic must be implemented and checked on the server code. This includes user input, the flow of applications and even the URL/Modules a user is supposed to access or not</a:t>
+              <a:t>All business logic must be implemented and checked on the server code. This includes user input, the flow of applications and even the URL/Modules a user is supposed to access or not</a:t>
             </a:r>
             <a:endParaRPr lang="en-US" sz="2800"/>
           </a:p>
@@ -5164,30 +4776,22 @@
         </p:nvSpPr>
         <p:spPr/>
         <p:txBody>
-          <a:bodyPr>
-            <a:scene3d>
-              <a:camera prst="orthographicFront"/>
-              <a:lightRig rig="soft" dir="t">
-                <a:rot lat="0" lon="0" rev="15600000"/>
-              </a:lightRig>
-            </a:scene3d>
-            <a:sp3d extrusionH="57150" prstMaterial="softEdge">
-              <a:bevelT w="25400" h="38100"/>
-            </a:sp3d>
-          </a:bodyPr>
-          <a:p>
-            <a:r>
-              <a:rPr lang="en-US" u="sng">
+          <a:bodyPr/>
+          <a:p>
+            <a:r>
+              <a:rPr lang="en-US" sz="3200" b="1">
+                <a:ln/>
                 <a:solidFill>
-                  <a:schemeClr val="accent4"/>
+                  <a:schemeClr val="tx1"/>
                 </a:solidFill>
                 <a:effectLst/>
               </a:rPr>
               <a:t>References:</a:t>
             </a:r>
-            <a:endParaRPr lang="en-US" u="sng">
+            <a:endParaRPr lang="en-US" sz="3200" b="1">
+              <a:ln/>
               <a:solidFill>
-                <a:schemeClr val="accent4"/>
+                <a:schemeClr val="tx1"/>
               </a:solidFill>
               <a:effectLst/>
             </a:endParaRPr>
@@ -5208,28 +4812,26 @@
         <p:txBody>
           <a:bodyPr/>
           <a:p>
-            <a:pPr marL="0" indent="0">
-              <a:buNone/>
+            <a:pPr>
+              <a:lnSpc>
+                <a:spcPct val="80000"/>
+              </a:lnSpc>
             </a:pPr>
             <a:r>
               <a:rPr lang="en-US"/>
-              <a:t>1)http://projects.webappsec.org/w/page/13246933/Improper%20Input%20Handling</a:t>
+              <a:t>http://projects.webappsec.org/w/page/13246933/Improper%20Input%20Handling</a:t>
             </a:r>
             <a:endParaRPr lang="en-US"/>
           </a:p>
           <a:p>
-            <a:pPr marL="0" indent="0">
-              <a:buNone/>
+            <a:pPr>
+              <a:lnSpc>
+                <a:spcPct val="80000"/>
+              </a:lnSpc>
             </a:pPr>
-            <a:endParaRPr lang="en-US"/>
-          </a:p>
-          <a:p>
-            <a:pPr marL="0" indent="0">
-              <a:buNone/>
-            </a:pPr>
             <a:r>
               <a:rPr lang="en-US"/>
-              <a:t>2)https://www.owasp.org/index.php/Unvalidated_Input</a:t>
+              <a:t>https://www.owasp.org/index.php/Unvalidated_Input</a:t>
             </a:r>
             <a:endParaRPr lang="en-US"/>
           </a:p>
@@ -28222,15 +27824,26 @@
         <p:spPr>
           <a:xfrm>
             <a:off x="901700" y="1413510"/>
-            <a:ext cx="10930255" cy="750570"/>
+            <a:ext cx="10930255" cy="1036320"/>
           </a:xfrm>
         </p:spPr>
         <p:txBody>
-          <a:bodyPr/>
+          <a:bodyPr>
+            <a:normAutofit fontScale="80000"/>
+          </a:bodyPr>
           <a:p>
             <a:r>
               <a:rPr lang="en-US" sz="2400"/>
               <a:t>To Mitigate host header injections allows only a whitelist of allowed hostnames.</a:t>
+            </a:r>
+            <a:endParaRPr lang="en-US" sz="2400"/>
+          </a:p>
+          <a:p>
+            <a:r>
+              <a:rPr lang="en-US" sz="2400">
+                <a:sym typeface="+mn-ea"/>
+              </a:rPr>
+              <a:t>Upgrade to the latest version of Affected Software/theme/plugin/OS which means latest version number.</a:t>
             </a:r>
             <a:endParaRPr lang="en-US" sz="2400"/>
           </a:p>
@@ -32067,77 +31680,92 @@
         <p:cNvGrpSpPr/>
         <p:nvPr/>
       </p:nvGrpSpPr>
-      <p:grpSpPr/>
+      <p:grpSpPr>
+        <a:xfrm>
+          <a:off x="0" y="0"/>
+          <a:ext cx="0" cy="0"/>
+          <a:chOff x="0" y="0"/>
+          <a:chExt cx="0" cy="0"/>
+        </a:xfrm>
+      </p:grpSpPr>
       <p:sp>
         <p:nvSpPr>
-          <p:cNvPr id="2" name="Title 1"/>
+          <p:cNvPr id="4" name="Slide Number Placeholder 3"/>
           <p:cNvSpPr>
             <a:spLocks noGrp="1"/>
           </p:cNvSpPr>
           <p:nvPr>
-            <p:ph type="title"/>
+            <p:ph type="sldNum" sz="quarter" idx="2"/>
           </p:nvPr>
         </p:nvSpPr>
         <p:spPr/>
         <p:txBody>
+          <a:bodyPr/>
+          <a:lstStyle/>
+          <a:p>
+            <a:pPr lvl="0"/>
+            <a:fld id="{86CB4B4D-7CA3-9044-876B-883B54F8677D}" type="slidenum">
+              <a:rPr lang="uk-UA" smtClean="0"/>
+            </a:fld>
+            <a:endParaRPr lang="uk-UA"/>
+          </a:p>
+        </p:txBody>
+      </p:sp>
+      <p:sp>
+        <p:nvSpPr>
+          <p:cNvPr id="3" name="Title 2"/>
+          <p:cNvSpPr>
+            <a:spLocks noGrp="1"/>
+          </p:cNvSpPr>
+          <p:nvPr>
+            <p:ph type="title"/>
+          </p:nvPr>
+        </p:nvSpPr>
+        <p:spPr>
+          <a:xfrm>
+            <a:off x="800100" y="488950"/>
+            <a:ext cx="10515600" cy="1325563"/>
+          </a:xfrm>
+        </p:spPr>
+        <p:txBody>
           <a:bodyPr>
-            <a:scene3d>
-              <a:camera prst="orthographicFront"/>
-              <a:lightRig rig="soft" dir="t">
-                <a:rot lat="0" lon="0" rev="15600000"/>
-              </a:lightRig>
-            </a:scene3d>
-            <a:sp3d extrusionH="57150" prstMaterial="softEdge">
-              <a:bevelT w="25400" h="38100"/>
-            </a:sp3d>
+            <a:normAutofit/>
           </a:bodyPr>
-          <a:p>
-            <a:r>
-              <a:rPr lang="en-US">
+          <a:lstStyle/>
+          <a:p>
+            <a:r>
+              <a:rPr lang="en-US" sz="3200" b="1">
+                <a:ln/>
                 <a:solidFill>
-                  <a:schemeClr val="accent4"/>
-                </a:solidFill>
-              </a:rPr>
-              <a:t>15)</a:t>
-            </a:r>
-            <a:r>
-              <a:rPr lang="en-US" u="sng">
-                <a:solidFill>
-                  <a:schemeClr val="accent4"/>
+                  <a:schemeClr val="tx1"/>
                 </a:solidFill>
                 <a:effectLst/>
+                <a:sym typeface="+mn-ea"/>
               </a:rPr>
-              <a:t>Outdated Elements</a:t>
-            </a:r>
-            <a:r>
-              <a:rPr lang="en-US">
-                <a:solidFill>
-                  <a:schemeClr val="accent4"/>
-                </a:solidFill>
-              </a:rPr>
-              <a:t>:</a:t>
-            </a:r>
-            <a:endParaRPr lang="en-US">
+              <a:t>17. Client Side Filter Bypass</a:t>
+            </a:r>
+            <a:endParaRPr lang="en-US" sz="3200" b="1" dirty="0" smtClean="0">
+              <a:ln/>
               <a:solidFill>
-                <a:schemeClr val="accent4"/>
+                <a:schemeClr val="tx1"/>
               </a:solidFill>
+              <a:effectLst/>
+              <a:sym typeface="+mn-ea"/>
             </a:endParaRPr>
           </a:p>
         </p:txBody>
       </p:sp>
       <p:graphicFrame>
         <p:nvGraphicFramePr>
-          <p:cNvPr id="6" name="Content Placeholder 5"/>
+          <p:cNvPr id="6" name="Table 5"/>
           <p:cNvGraphicFramePr>
             <a:graphicFrameLocks noGrp="1"/>
           </p:cNvGraphicFramePr>
-          <p:nvPr>
-            <p:ph idx="1"/>
-          </p:nvPr>
+          <p:nvPr/>
         </p:nvGraphicFramePr>
         <p:xfrm>
-          <a:off x="838200" y="1825625"/>
-          <a:ext cx="10515600" cy="2082800"/>
+          <a:off x="1929765" y="1833245"/>
+          <a:ext cx="8109585" cy="3959860"/>
         </p:xfrm>
         <a:graphic>
           <a:graphicData uri="http://schemas.openxmlformats.org/drawingml/2006/table">
@@ -32146,13 +31774,14 @@
                 <a:tableStyleId>{5C22544A-7EE6-4342-B048-85BDC9FD1C3A}</a:tableStyleId>
               </a:tblPr>
               <a:tblGrid>
-                <a:gridCol w="1832610"/>
-                <a:gridCol w="8682990"/>
+                <a:gridCol w="1413510"/>
+                <a:gridCol w="6696075"/>
               </a:tblGrid>
-              <a:tr h="415290">
+              <a:tr h="336550">
                 <a:tc>
                   <a:txBody>
                     <a:bodyPr/>
+                    <a:lstStyle/>
                     <a:p>
                       <a:pPr algn="ctr"/>
                       <a:endParaRPr lang="en-US" sz="1600" dirty="0"/>
@@ -32191,6 +31820,7 @@
                 <a:tc>
                   <a:txBody>
                     <a:bodyPr/>
+                    <a:lstStyle/>
                     <a:p>
                       <a:endParaRPr lang="en-US" sz="1600" dirty="0"/>
                     </a:p>
@@ -32226,10 +31856,11 @@
                   </a:tcPr>
                 </a:tc>
               </a:tr>
-              <a:tr h="1344930">
-                <a:tc>
+              <a:tr h="1607820">
+                <a:tc rowSpan="3">
                   <a:txBody>
                     <a:bodyPr/>
+                    <a:lstStyle/>
                     <a:p>
                       <a:pPr algn="ctr"/>
                       <a:r>
@@ -32239,7 +31870,7 @@
                           </a:solidFill>
                           <a:latin typeface="Calibri" panose="020F0502020204030204" charset="0"/>
                         </a:rPr>
-                        <a:t>Outdated Elements</a:t>
+                        <a:t>Client Side Filter Bypass</a:t>
                       </a:r>
                       <a:r>
                         <a:rPr lang="en-IN" sz="1600" dirty="0" smtClean="0">
@@ -32257,7 +31888,7 @@
                           </a:solidFill>
                           <a:latin typeface="Calibri" panose="020F0502020204030204" charset="0"/>
                         </a:rPr>
-                        <a:t>(Moderate)</a:t>
+                        <a:t>(Low)</a:t>
                       </a:r>
                       <a:endParaRPr lang="en-US" sz="1300" dirty="0">
                         <a:solidFill>
@@ -32305,13 +31936,14 @@
                       <a:tailEnd type="none" w="med" len="med"/>
                     </a:lnB>
                     <a:solidFill>
-                      <a:srgbClr val="FFFF00"/>
+                      <a:srgbClr val="92D050"/>
                     </a:solidFill>
                   </a:tcPr>
                 </a:tc>
                 <a:tc>
                   <a:txBody>
                     <a:bodyPr/>
+                    <a:lstStyle/>
                     <a:p>
                       <a:r>
                         <a:rPr lang="en-US" sz="1300" dirty="0" smtClean="0">
@@ -32322,6 +31954,41 @@
                         </a:rPr>
                         <a:t> </a:t>
                       </a:r>
+                      <a:endParaRPr lang="en-US" sz="1300" dirty="0">
+                        <a:solidFill>
+                          <a:schemeClr val="tx1"/>
+                        </a:solidFill>
+                        <a:latin typeface="Calibri" panose="020F0502020204030204" charset="0"/>
+                      </a:endParaRPr>
+                    </a:p>
+                    <a:p>
+                      <a:r>
+                        <a:rPr lang="en-US" sz="1300" baseline="0" dirty="0" smtClean="0">
+                          <a:solidFill>
+                            <a:schemeClr val="tx1"/>
+                          </a:solidFill>
+                          <a:latin typeface="Calibri" panose="020F0502020204030204" charset="0"/>
+                        </a:rPr>
+                        <a:t>Below mentioned </a:t>
+                      </a:r>
+                      <a:r>
+                        <a:rPr lang="en-US" sz="1300" baseline="0" dirty="0" err="1" smtClean="0">
+                          <a:solidFill>
+                            <a:schemeClr val="tx1"/>
+                          </a:solidFill>
+                          <a:latin typeface="Calibri" panose="020F0502020204030204" charset="0"/>
+                        </a:rPr>
+                        <a:t>urls</a:t>
+                      </a:r>
+                      <a:r>
+                        <a:rPr lang="en-US" sz="1300" baseline="0" dirty="0" smtClean="0">
+                          <a:solidFill>
+                            <a:schemeClr val="tx1"/>
+                          </a:solidFill>
+                          <a:latin typeface="Calibri" panose="020F0502020204030204" charset="0"/>
+                        </a:rPr>
+                        <a:t> have improper server side filter</a:t>
+                      </a:r>
                       <a:endParaRPr lang="en-US" sz="1300" dirty="0" smtClean="0">
                         <a:solidFill>
                           <a:schemeClr val="tx1"/>
@@ -32346,7 +32013,7 @@
                           </a:solidFill>
                           <a:latin typeface="Calibri" panose="020F0502020204030204" charset="0"/>
                         </a:rPr>
-                        <a:t>Affected Elements :</a:t>
+                        <a:t>Affected URL :</a:t>
                       </a:r>
                       <a:endParaRPr lang="en-US" sz="1300" b="0" i="0" u="none" strike="noStrike" dirty="0" smtClean="0">
                         <a:solidFill>
@@ -32365,27 +32032,40 @@
                         <a:buChar char="•"/>
                       </a:pPr>
                       <a:r>
-                        <a:rPr lang="en-US" sz="1300" b="0" i="0" u="none" strike="noStrike" dirty="0" smtClean="0">
+                        <a:rPr lang="en-US" sz="1300" b="0" dirty="0" smtClean="0">
                           <a:solidFill>
-                            <a:schemeClr val="dk1"/>
+                            <a:schemeClr val="tx1"/>
                           </a:solidFill>
-                          <a:effectLst/>
-                          <a:latin typeface="Calibri" panose="020F0502020204030204" charset="0"/>
-                          <a:ea typeface="+mn-ea"/>
-                          <a:cs typeface="Calibri" panose="020F0502020204030204" charset="0"/>
-                          <a:sym typeface="Arial" panose="020B0604020202020204"/>
-                        </a:rPr>
-                        <a:t>PHP</a:t>
-                      </a:r>
-                      <a:endParaRPr lang="en-US" sz="1300" b="0" i="0" u="none" strike="noStrike" dirty="0" smtClean="0">
+                          <a:latin typeface="Calibri" panose="020F0502020204030204" charset="0"/>
+                        </a:rPr>
+                        <a:t>http://13.233.108.21/profile/16/edit/</a:t>
+                      </a:r>
+                      <a:endParaRPr lang="en-US" sz="1300" b="0" dirty="0" smtClean="0">
                         <a:solidFill>
-                          <a:schemeClr val="dk1"/>
+                          <a:schemeClr val="tx1"/>
                         </a:solidFill>
-                        <a:effectLst/>
-                        <a:latin typeface="Calibri" panose="020F0502020204030204" charset="0"/>
-                        <a:ea typeface="+mn-ea"/>
-                        <a:cs typeface="Calibri" panose="020F0502020204030204" charset="0"/>
-                        <a:sym typeface="Arial" panose="020B0604020202020204"/>
+                        <a:latin typeface="Calibri" panose="020F0502020204030204" charset="0"/>
+                      </a:endParaRPr>
+                    </a:p>
+                    <a:p>
+                      <a:pPr indent="0">
+                        <a:buFont typeface="Arial" panose="020B0604020202020204" pitchFamily="34" charset="0"/>
+                        <a:buNone/>
+                      </a:pPr>
+                      <a:r>
+                        <a:rPr lang="en-US" sz="1300" b="1" dirty="0" smtClean="0">
+                          <a:solidFill>
+                            <a:schemeClr val="tx1"/>
+                          </a:solidFill>
+                          <a:latin typeface="Calibri" panose="020F0502020204030204" charset="0"/>
+                        </a:rPr>
+                        <a:t>Affected parameter:</a:t>
+                      </a:r>
+                      <a:endParaRPr lang="en-US" sz="1300" b="0" dirty="0" smtClean="0">
+                        <a:solidFill>
+                          <a:schemeClr val="tx1"/>
+                        </a:solidFill>
+                        <a:latin typeface="Calibri" panose="020F0502020204030204" charset="0"/>
                       </a:endParaRPr>
                     </a:p>
                     <a:p>
@@ -32393,6 +32073,177 @@
                         <a:buFont typeface="Arial" panose="020B0604020202020204" pitchFamily="34" charset="0"/>
                         <a:buChar char="•"/>
                       </a:pPr>
+                      <a:r>
+                        <a:rPr lang="en-US" sz="1300" b="0" dirty="0" smtClean="0">
+                          <a:solidFill>
+                            <a:schemeClr val="tx1"/>
+                          </a:solidFill>
+                          <a:latin typeface="Calibri" panose="020F0502020204030204" charset="0"/>
+                        </a:rPr>
+                        <a:t>Contact Number</a:t>
+                      </a:r>
+                      <a:endParaRPr lang="en-US" sz="1300" b="0" dirty="0">
+                        <a:solidFill>
+                          <a:schemeClr val="tx1"/>
+                        </a:solidFill>
+                        <a:latin typeface="Calibri" panose="020F0502020204030204" charset="0"/>
+                      </a:endParaRPr>
+                    </a:p>
+                  </a:txBody>
+                  <a:tcPr marL="82988" marR="82988" marT="41494" marB="41494">
+                    <a:lnL w="12700" cap="flat" cmpd="sng" algn="ctr">
+                      <a:solidFill>
+                        <a:schemeClr val="tx1"/>
+                      </a:solidFill>
+                      <a:prstDash val="solid"/>
+                      <a:round/>
+                      <a:headEnd type="none" w="med" len="med"/>
+                      <a:tailEnd type="none" w="med" len="med"/>
+                    </a:lnL>
+                    <a:lnR w="12700" cap="flat" cmpd="sng" algn="ctr">
+                      <a:solidFill>
+                        <a:schemeClr val="tx1"/>
+                      </a:solidFill>
+                      <a:prstDash val="solid"/>
+                      <a:round/>
+                      <a:headEnd type="none" w="med" len="med"/>
+                      <a:tailEnd type="none" w="med" len="med"/>
+                    </a:lnR>
+                    <a:lnT w="12700" cap="flat" cmpd="sng" algn="ctr">
+                      <a:solidFill>
+                        <a:schemeClr val="tx1"/>
+                      </a:solidFill>
+                      <a:prstDash val="solid"/>
+                      <a:round/>
+                      <a:headEnd type="none" w="med" len="med"/>
+                      <a:tailEnd type="none" w="med" len="med"/>
+                    </a:lnT>
+                    <a:lnB w="12700" cap="flat" cmpd="sng" algn="ctr">
+                      <a:solidFill>
+                        <a:schemeClr val="tx1"/>
+                      </a:solidFill>
+                      <a:prstDash val="solid"/>
+                      <a:round/>
+                      <a:headEnd type="none" w="med" len="med"/>
+                      <a:tailEnd type="none" w="med" len="med"/>
+                    </a:lnB>
+                    <a:solidFill>
+                      <a:schemeClr val="bg1"/>
+                    </a:solidFill>
+                  </a:tcPr>
+                </a:tc>
+              </a:tr>
+              <a:tr h="1007745">
+                <a:tc vMerge="1">
+                  <a:tcPr marL="82988" marR="82988" marT="41494" marB="41494" anchor="ctr">
+                    <a:lnL w="12700" cap="flat" cmpd="sng" algn="ctr">
+                      <a:solidFill>
+                        <a:schemeClr val="tx1"/>
+                      </a:solidFill>
+                      <a:prstDash val="solid"/>
+                      <a:round/>
+                      <a:headEnd type="none" w="med" len="med"/>
+                      <a:tailEnd type="none" w="med" len="med"/>
+                    </a:lnL>
+                    <a:lnR w="12700" cap="flat" cmpd="sng" algn="ctr">
+                      <a:solidFill>
+                        <a:schemeClr val="tx1"/>
+                      </a:solidFill>
+                      <a:prstDash val="solid"/>
+                      <a:round/>
+                      <a:headEnd type="none" w="med" len="med"/>
+                      <a:tailEnd type="none" w="med" len="med"/>
+                    </a:lnR>
+                    <a:lnT w="12700" cap="flat" cmpd="sng" algn="ctr">
+                      <a:solidFill>
+                        <a:schemeClr val="tx1"/>
+                      </a:solidFill>
+                      <a:prstDash val="solid"/>
+                      <a:round/>
+                      <a:headEnd type="none" w="med" len="med"/>
+                      <a:tailEnd type="none" w="med" len="med"/>
+                    </a:lnT>
+                    <a:lnB w="12700" cap="flat" cmpd="sng" algn="ctr">
+                      <a:solidFill>
+                        <a:schemeClr val="tx1"/>
+                      </a:solidFill>
+                      <a:prstDash val="solid"/>
+                      <a:round/>
+                      <a:headEnd type="none" w="med" len="med"/>
+                      <a:tailEnd type="none" w="med" len="med"/>
+                    </a:lnB>
+                    <a:solidFill>
+                      <a:srgbClr val="92D050"/>
+                    </a:solidFill>
+                  </a:tcPr>
+                </a:tc>
+                <a:tc>
+                  <a:txBody>
+                    <a:bodyPr/>
+                    <a:p>
+                      <a:pPr indent="0">
+                        <a:buFont typeface="Arial" panose="020B0604020202020204" pitchFamily="34" charset="0"/>
+                        <a:buNone/>
+                      </a:pPr>
+                      <a:r>
+                        <a:rPr lang="en-US" sz="1300" b="1" dirty="0" smtClean="0">
+                          <a:solidFill>
+                            <a:schemeClr val="tx1"/>
+                          </a:solidFill>
+                          <a:latin typeface="Calibri" panose="020F0502020204030204" charset="0"/>
+                          <a:sym typeface="+mn-ea"/>
+                        </a:rPr>
+                        <a:t>Affected URL :</a:t>
+                      </a:r>
+                      <a:endParaRPr lang="en-US" sz="1300" b="0" i="0" u="none" strike="noStrike" dirty="0" smtClean="0">
+                        <a:solidFill>
+                          <a:schemeClr val="tx1"/>
+                        </a:solidFill>
+                        <a:effectLst/>
+                        <a:latin typeface="Calibri" panose="020F0502020204030204" charset="0"/>
+                        <a:ea typeface="+mn-ea"/>
+                        <a:cs typeface="+mn-cs"/>
+                        <a:sym typeface="Arial" panose="020B0604020202020204"/>
+                      </a:endParaRPr>
+                    </a:p>
+                    <a:p>
+                      <a:pPr marL="285750" indent="-285750">
+                        <a:buFont typeface="Arial" panose="020B0604020202020204" pitchFamily="34" charset="0"/>
+                        <a:buChar char="•"/>
+                      </a:pPr>
+                      <a:r>
+                        <a:rPr lang="en-US" sz="1300" dirty="0" smtClean="0">
+                          <a:solidFill>
+                            <a:schemeClr val="tx1"/>
+                          </a:solidFill>
+                          <a:latin typeface="Calibri" panose="020F0502020204030204" charset="0"/>
+                          <a:sym typeface="+mn-ea"/>
+                        </a:rPr>
+                        <a:t>http://13.233.207.87/forum/index.php?u=/user/register</a:t>
+                      </a:r>
+                      <a:endParaRPr lang="en-US" sz="1300" dirty="0" smtClean="0">
+                        <a:solidFill>
+                          <a:schemeClr val="tx1"/>
+                        </a:solidFill>
+                        <a:latin typeface="Calibri" panose="020F0502020204030204" charset="0"/>
+                        <a:sym typeface="+mn-ea"/>
+                      </a:endParaRPr>
+                    </a:p>
+                    <a:p>
+                      <a:pPr indent="0">
+                        <a:buFont typeface="Arial" panose="020B0604020202020204" pitchFamily="34" charset="0"/>
+                        <a:buNone/>
+                      </a:pPr>
+                      <a:r>
+                        <a:rPr lang="en-US" sz="1300" b="1" dirty="0" smtClean="0">
+                          <a:solidFill>
+                            <a:schemeClr val="tx1"/>
+                          </a:solidFill>
+                          <a:latin typeface="Calibri" panose="020F0502020204030204" charset="0"/>
+                          <a:sym typeface="+mn-ea"/>
+                        </a:rPr>
+                        <a:t>Affected parameter:</a:t>
+                      </a:r>
                       <a:endParaRPr lang="en-US" sz="1300" b="0" dirty="0" smtClean="0">
                         <a:solidFill>
                           <a:schemeClr val="tx1"/>
@@ -32406,15 +32257,198 @@
                         <a:buChar char="•"/>
                       </a:pPr>
                       <a:r>
-                        <a:rPr lang="en-US" sz="1300" b="0" dirty="0" smtClean="0">
+                        <a:rPr lang="en-US" sz="1300" b="0" dirty="0">
                           <a:solidFill>
                             <a:schemeClr val="tx1"/>
                           </a:solidFill>
                           <a:latin typeface="Calibri" panose="020F0502020204030204" charset="0"/>
                         </a:rPr>
-                        <a:t>WonderCMS</a:t>
+                        <a:t>Email address</a:t>
+                      </a:r>
+                      <a:endParaRPr lang="en-US" sz="1300" b="0" dirty="0">
+                        <a:solidFill>
+                          <a:schemeClr val="tx1"/>
+                        </a:solidFill>
+                        <a:latin typeface="Calibri" panose="020F0502020204030204" charset="0"/>
+                      </a:endParaRPr>
+                    </a:p>
+                  </a:txBody>
+                  <a:tcPr marL="82988" marR="82988" marT="41494" marB="41494">
+                    <a:lnL w="12700" cap="flat" cmpd="sng" algn="ctr">
+                      <a:solidFill>
+                        <a:schemeClr val="tx1"/>
+                      </a:solidFill>
+                      <a:prstDash val="solid"/>
+                      <a:round/>
+                      <a:headEnd type="none" w="med" len="med"/>
+                      <a:tailEnd type="none" w="med" len="med"/>
+                    </a:lnL>
+                    <a:lnR w="12700" cap="flat" cmpd="sng" algn="ctr">
+                      <a:solidFill>
+                        <a:schemeClr val="tx1"/>
+                      </a:solidFill>
+                      <a:prstDash val="solid"/>
+                      <a:round/>
+                      <a:headEnd type="none" w="med" len="med"/>
+                      <a:tailEnd type="none" w="med" len="med"/>
+                    </a:lnR>
+                    <a:lnT w="12700" cap="flat" cmpd="sng" algn="ctr">
+                      <a:solidFill>
+                        <a:schemeClr val="tx1"/>
+                      </a:solidFill>
+                      <a:prstDash val="solid"/>
+                      <a:round/>
+                      <a:headEnd type="none" w="med" len="med"/>
+                      <a:tailEnd type="none" w="med" len="med"/>
+                    </a:lnT>
+                    <a:lnB w="12700" cap="flat" cmpd="sng" algn="ctr">
+                      <a:solidFill>
+                        <a:schemeClr val="tx1"/>
+                      </a:solidFill>
+                      <a:prstDash val="solid"/>
+                      <a:round/>
+                      <a:headEnd type="none" w="med" len="med"/>
+                      <a:tailEnd type="none" w="med" len="med"/>
+                    </a:lnB>
+                    <a:solidFill>
+                      <a:schemeClr val="bg1"/>
+                    </a:solidFill>
+                  </a:tcPr>
+                </a:tc>
+              </a:tr>
+              <a:tr h="1007745">
+                <a:tc vMerge="1">
+                  <a:tcPr marL="82988" marR="82988" marT="41494" marB="41494" anchor="ctr">
+                    <a:lnL w="12700" cap="flat" cmpd="sng" algn="ctr">
+                      <a:solidFill>
+                        <a:schemeClr val="tx1"/>
+                      </a:solidFill>
+                      <a:prstDash val="solid"/>
+                      <a:round/>
+                      <a:headEnd type="none" w="med" len="med"/>
+                      <a:tailEnd type="none" w="med" len="med"/>
+                    </a:lnL>
+                    <a:lnR w="12700" cap="flat" cmpd="sng" algn="ctr">
+                      <a:solidFill>
+                        <a:schemeClr val="tx1"/>
+                      </a:solidFill>
+                      <a:prstDash val="solid"/>
+                      <a:round/>
+                      <a:headEnd type="none" w="med" len="med"/>
+                      <a:tailEnd type="none" w="med" len="med"/>
+                    </a:lnR>
+                    <a:lnT w="12700" cap="flat" cmpd="sng" algn="ctr">
+                      <a:solidFill>
+                        <a:schemeClr val="tx1"/>
+                      </a:solidFill>
+                      <a:prstDash val="solid"/>
+                      <a:round/>
+                      <a:headEnd type="none" w="med" len="med"/>
+                      <a:tailEnd type="none" w="med" len="med"/>
+                    </a:lnT>
+                    <a:lnB w="12700" cap="flat" cmpd="sng" algn="ctr">
+                      <a:solidFill>
+                        <a:schemeClr val="tx1"/>
+                      </a:solidFill>
+                      <a:prstDash val="solid"/>
+                      <a:round/>
+                      <a:headEnd type="none" w="med" len="med"/>
+                      <a:tailEnd type="none" w="med" len="med"/>
+                    </a:lnB>
+                    <a:solidFill>
+                      <a:srgbClr val="92D050"/>
+                    </a:solidFill>
+                  </a:tcPr>
+                </a:tc>
+                <a:tc>
+                  <a:txBody>
+                    <a:bodyPr/>
+                    <a:p>
+                      <a:pPr indent="0">
+                        <a:buFont typeface="Arial" panose="020B0604020202020204" pitchFamily="34" charset="0"/>
+                        <a:buNone/>
+                      </a:pPr>
+                      <a:r>
+                        <a:rPr lang="en-US" sz="1300" b="1" dirty="0" smtClean="0">
+                          <a:solidFill>
+                            <a:schemeClr val="tx1"/>
+                          </a:solidFill>
+                          <a:latin typeface="Calibri" panose="020F0502020204030204" charset="0"/>
+                          <a:sym typeface="+mn-ea"/>
+                        </a:rPr>
+                        <a:t>Affected URL :</a:t>
+                      </a:r>
+                      <a:endParaRPr lang="en-US" sz="1300" b="0" i="0" u="none" strike="noStrike" dirty="0" smtClean="0">
+                        <a:solidFill>
+                          <a:schemeClr val="tx1"/>
+                        </a:solidFill>
+                        <a:effectLst/>
+                        <a:latin typeface="Calibri" panose="020F0502020204030204" charset="0"/>
+                        <a:ea typeface="+mn-ea"/>
+                        <a:cs typeface="+mn-cs"/>
+                        <a:sym typeface="Arial" panose="020B0604020202020204"/>
+                      </a:endParaRPr>
+                    </a:p>
+                    <a:p>
+                      <a:pPr marL="285750" indent="-285750">
+                        <a:buFont typeface="Arial" panose="020B0604020202020204" pitchFamily="34" charset="0"/>
+                        <a:buChar char="•"/>
+                      </a:pPr>
+                      <a:r>
+                        <a:rPr lang="en-US" sz="1300" dirty="0" smtClean="0">
+                          <a:solidFill>
+                            <a:schemeClr val="tx1"/>
+                          </a:solidFill>
+                          <a:latin typeface="Calibri" panose="020F0502020204030204" charset="0"/>
+                          <a:sym typeface="+mn-ea"/>
+                        </a:rPr>
+                        <a:t>http://13.233.207.87/reset_password/customer.php</a:t>
+                      </a:r>
+                      <a:endParaRPr lang="en-US" sz="1300" dirty="0" smtClean="0">
+                        <a:solidFill>
+                          <a:schemeClr val="tx1"/>
+                        </a:solidFill>
+                        <a:latin typeface="Calibri" panose="020F0502020204030204" charset="0"/>
+                        <a:sym typeface="+mn-ea"/>
+                      </a:endParaRPr>
+                    </a:p>
+                    <a:p>
+                      <a:pPr indent="0">
+                        <a:buFont typeface="Arial" panose="020B0604020202020204" pitchFamily="34" charset="0"/>
+                        <a:buNone/>
+                      </a:pPr>
+                      <a:r>
+                        <a:rPr lang="en-US" sz="1300" b="1" dirty="0" smtClean="0">
+                          <a:solidFill>
+                            <a:schemeClr val="tx1"/>
+                          </a:solidFill>
+                          <a:latin typeface="Calibri" panose="020F0502020204030204" charset="0"/>
+                          <a:sym typeface="+mn-ea"/>
+                        </a:rPr>
+                        <a:t>Affected parameter:</a:t>
                       </a:r>
                       <a:endParaRPr lang="en-US" sz="1300" b="0" dirty="0" smtClean="0">
+                        <a:solidFill>
+                          <a:schemeClr val="tx1"/>
+                        </a:solidFill>
+                        <a:latin typeface="Calibri" panose="020F0502020204030204" charset="0"/>
+                      </a:endParaRPr>
+                    </a:p>
+                    <a:p>
+                      <a:pPr marL="285750" indent="-285750">
+                        <a:buFont typeface="Arial" panose="020B0604020202020204" pitchFamily="34" charset="0"/>
+                        <a:buChar char="•"/>
+                      </a:pPr>
+                      <a:r>
+                        <a:rPr lang="en-US" sz="1300" b="0" dirty="0">
+                          <a:solidFill>
+                            <a:schemeClr val="tx1"/>
+                          </a:solidFill>
+                          <a:latin typeface="Calibri" panose="020F0502020204030204" charset="0"/>
+                        </a:rPr>
+                        <a:t>Password</a:t>
+                      </a:r>
+                      <a:endParaRPr lang="en-US" sz="1300" b="0" dirty="0">
                         <a:solidFill>
                           <a:schemeClr val="tx1"/>
                         </a:solidFill>
@@ -32486,6 +32520,14 @@
   <p:clrMapOvr>
     <a:masterClrMapping/>
   </p:clrMapOvr>
+  <p:transition spd="med"/>
+  <p:timing>
+    <p:tnLst>
+      <p:par>
+        <p:cTn id="1" dur="indefinite" restart="never" nodeType="tmRoot"/>
+      </p:par>
+    </p:tnLst>
+  </p:timing>
 </p:sld>
 </file>
 
@@ -32514,61 +32556,39 @@
           <a:bodyPr/>
           <a:p>
             <a:r>
-              <a:rPr lang="en-US" u="sng">
-                <a:ln w="10160">
-                  <a:solidFill>
-                    <a:schemeClr val="accent5"/>
-                  </a:solidFill>
-                  <a:prstDash val="solid"/>
-                </a:ln>
+              <a:rPr lang="en-US" sz="3200" b="1">
+                <a:ln/>
                 <a:solidFill>
-                  <a:srgbClr val="FFFFFF"/>
+                  <a:schemeClr val="tx1"/>
                 </a:solidFill>
-                <a:effectLst>
-                  <a:outerShdw blurRad="38100" dist="22860" dir="5400000" algn="tl" rotWithShape="0">
-                    <a:srgbClr val="000000">
-                      <a:alpha val="30000"/>
-                    </a:srgbClr>
-                  </a:outerShdw>
-                </a:effectLst>
+                <a:effectLst/>
               </a:rPr>
-              <a:t>Observations:</a:t>
-            </a:r>
-            <a:endParaRPr lang="en-US" u="sng">
-              <a:ln w="10160">
-                <a:solidFill>
-                  <a:schemeClr val="accent5"/>
-                </a:solidFill>
-                <a:prstDash val="solid"/>
-              </a:ln>
+              <a:t>Observation:</a:t>
+            </a:r>
+            <a:endParaRPr lang="en-US" sz="3200" b="1">
+              <a:ln/>
               <a:solidFill>
-                <a:srgbClr val="FFFFFF"/>
+                <a:schemeClr val="tx1"/>
               </a:solidFill>
-              <a:effectLst>
-                <a:outerShdw blurRad="38100" dist="22860" dir="5400000" algn="tl" rotWithShape="0">
-                  <a:srgbClr val="000000">
-                    <a:alpha val="30000"/>
-                  </a:srgbClr>
-                </a:outerShdw>
-              </a:effectLst>
+              <a:effectLst/>
             </a:endParaRPr>
           </a:p>
         </p:txBody>
       </p:sp>
       <p:sp>
         <p:nvSpPr>
-          <p:cNvPr id="3" name="Content Placeholder 2"/>
+          <p:cNvPr id="3" name="Text Placeholder 2"/>
           <p:cNvSpPr>
             <a:spLocks noGrp="1"/>
           </p:cNvSpPr>
           <p:nvPr>
-            <p:ph sz="half" idx="1"/>
+            <p:ph type="body" idx="1"/>
           </p:nvPr>
         </p:nvSpPr>
         <p:spPr>
           <a:xfrm>
-            <a:off x="838200" y="1825625"/>
-            <a:ext cx="10872470" cy="1213485"/>
+            <a:off x="1143000" y="1406525"/>
+            <a:ext cx="10515600" cy="887095"/>
           </a:xfrm>
         </p:spPr>
         <p:txBody>
@@ -32581,7 +32601,7 @@
             </a:pPr>
             <a:r>
               <a:rPr lang="en-US"/>
-              <a:t>The PHP version installed is not the latest one and has multiple vulnerabilities that can be exploited.Also, wondercms is also outdated and highly vulnerable.</a:t>
+              <a:t>After logging in as customer,when we try to edit our phone number to some invalid one ,the error is as shown.</a:t>
             </a:r>
             <a:endParaRPr lang="en-US"/>
           </a:p>
@@ -32589,48 +32609,23 @@
       </p:sp>
       <p:pic>
         <p:nvPicPr>
-          <p:cNvPr id="5" name="Content Placeholder 4" descr="php version"/>
+          <p:cNvPr id="4" name="Picture 3" descr="C:\Users\Datagrokr\Documents\program\CEH-Hack-a-thon\reports\Lifestyle Store\vulnerabilities\Client Side Filter Bypass\Profile-Edit\observation.pngobservation"/>
           <p:cNvPicPr>
             <a:picLocks noChangeAspect="1"/>
           </p:cNvPicPr>
-          <p:nvPr>
-            <p:ph sz="half" idx="2"/>
-          </p:nvPr>
+          <p:nvPr/>
         </p:nvPicPr>
         <p:blipFill>
           <a:blip r:embed="rId1"/>
+          <a:srcRect/>
           <a:stretch>
             <a:fillRect/>
           </a:stretch>
         </p:blipFill>
         <p:spPr>
           <a:xfrm>
-            <a:off x="584835" y="4242435"/>
-            <a:ext cx="6334125" cy="1551305"/>
-          </a:xfrm>
-          <a:prstGeom prst="rect">
-            <a:avLst/>
-          </a:prstGeom>
-        </p:spPr>
-      </p:pic>
-      <p:pic>
-        <p:nvPicPr>
-          <p:cNvPr id="6" name="Picture 5" descr="wonder cms version"/>
-          <p:cNvPicPr>
-            <a:picLocks noChangeAspect="1"/>
-          </p:cNvPicPr>
-          <p:nvPr/>
-        </p:nvPicPr>
-        <p:blipFill>
-          <a:blip r:embed="rId2"/>
-          <a:stretch>
-            <a:fillRect/>
-          </a:stretch>
-        </p:blipFill>
-        <p:spPr>
-          <a:xfrm>
-            <a:off x="7170420" y="3935095"/>
-            <a:ext cx="4838700" cy="2496820"/>
+            <a:off x="3384550" y="2239645"/>
+            <a:ext cx="5472430" cy="3938270"/>
           </a:xfrm>
           <a:prstGeom prst="rect">
             <a:avLst/>
@@ -32642,6 +32637,7 @@
   <p:clrMapOvr>
     <a:masterClrMapping/>
   </p:clrMapOvr>
+  <p:transition spd="med"/>
 </p:sld>
 </file>
 
@@ -32665,50 +32661,49 @@
             <p:ph type="title"/>
           </p:nvPr>
         </p:nvSpPr>
-        <p:spPr/>
+        <p:spPr>
+          <a:xfrm>
+            <a:off x="840105" y="651510"/>
+            <a:ext cx="4387850" cy="714375"/>
+          </a:xfrm>
+        </p:spPr>
         <p:txBody>
           <a:bodyPr/>
           <a:p>
             <a:r>
-              <a:rPr lang="en-US" u="sng">
-                <a:ln w="22225">
-                  <a:solidFill>
-                    <a:schemeClr val="accent2"/>
-                  </a:solidFill>
-                  <a:prstDash val="solid"/>
-                </a:ln>
+              <a:rPr lang="en-US" sz="3200" b="1">
+                <a:ln/>
                 <a:solidFill>
-                  <a:schemeClr val="accent2">
-                    <a:lumMod val="40000"/>
-                    <a:lumOff val="60000"/>
-                  </a:schemeClr>
+                  <a:schemeClr val="tx1"/>
                 </a:solidFill>
                 <a:effectLst/>
               </a:rPr>
-              <a:t>Business Impact(High)</a:t>
-            </a:r>
-            <a:r>
-              <a:rPr lang="en-US"/>
-              <a:t>:</a:t>
-            </a:r>
-            <a:endParaRPr lang="en-US"/>
+              <a:t>Proof Of Concept(PoC):</a:t>
+            </a:r>
+            <a:endParaRPr lang="en-US" sz="3200" b="1">
+              <a:ln/>
+              <a:solidFill>
+                <a:schemeClr val="tx1"/>
+              </a:solidFill>
+              <a:effectLst/>
+            </a:endParaRPr>
           </a:p>
         </p:txBody>
       </p:sp>
       <p:sp>
         <p:nvSpPr>
-          <p:cNvPr id="3" name="Content Placeholder 2"/>
+          <p:cNvPr id="3" name="Text Placeholder 2"/>
           <p:cNvSpPr>
             <a:spLocks noGrp="1"/>
           </p:cNvSpPr>
           <p:nvPr>
-            <p:ph sz="half" idx="1"/>
+            <p:ph type="body" sz="half" idx="2"/>
           </p:nvPr>
         </p:nvSpPr>
         <p:spPr>
           <a:xfrm>
-            <a:off x="838200" y="1825625"/>
-            <a:ext cx="10636250" cy="1875155"/>
+            <a:off x="1183005" y="1397000"/>
+            <a:ext cx="10633710" cy="565785"/>
           </a:xfrm>
         </p:spPr>
         <p:txBody>
@@ -32719,17 +32714,79 @@
             </a:pPr>
             <a:r>
               <a:rPr lang="en-US"/>
-              <a:t>Exploits of every vulnerability detected is regularly made public and hence outdated software can very easily be taken advantage of.If the attacker comes to know about this vulnerability,he may directly use the exploit to take down the entire system,which is a big risk.</a:t>
+              <a:t>But when we give a valid phone number on the client side,but intercept it through burpsuite and again give invalid number,it gets accepted. </a:t>
             </a:r>
             <a:endParaRPr lang="en-US"/>
           </a:p>
         </p:txBody>
       </p:sp>
+      <p:pic>
+        <p:nvPicPr>
+          <p:cNvPr id="4" name="Picture 3" descr="C:\Users\Datagrokr\Documents\program\CEH-Hack-a-thon\reports\Lifestyle Store\vulnerabilities\Client Side Filter Bypass\Profile-Edit\burp-suite-intercept.pngburp-suite-intercept"/>
+          <p:cNvPicPr>
+            <a:picLocks noChangeAspect="1"/>
+          </p:cNvPicPr>
+          <p:nvPr/>
+        </p:nvPicPr>
+        <p:blipFill>
+          <a:blip r:embed="rId1"/>
+          <a:srcRect/>
+          <a:stretch>
+            <a:fillRect/>
+          </a:stretch>
+        </p:blipFill>
+        <p:spPr>
+          <a:xfrm>
+            <a:off x="1172528" y="2422525"/>
+            <a:ext cx="7511415" cy="3219450"/>
+          </a:xfrm>
+          <a:prstGeom prst="rect">
+            <a:avLst/>
+          </a:prstGeom>
+          <a:ln>
+            <a:solidFill>
+              <a:schemeClr val="tx1"/>
+            </a:solidFill>
+          </a:ln>
+        </p:spPr>
+      </p:pic>
+      <p:pic>
+        <p:nvPicPr>
+          <p:cNvPr id="5" name="Picture Placeholder 4" descr="POC"/>
+          <p:cNvPicPr>
+            <a:picLocks noChangeAspect="1"/>
+          </p:cNvPicPr>
+          <p:nvPr>
+            <p:ph type="pic" idx="1"/>
+          </p:nvPr>
+        </p:nvPicPr>
+        <p:blipFill>
+          <a:blip r:embed="rId2"/>
+          <a:stretch>
+            <a:fillRect/>
+          </a:stretch>
+        </p:blipFill>
+        <p:spPr>
+          <a:xfrm>
+            <a:off x="5535295" y="2792095"/>
+            <a:ext cx="6172200" cy="3583305"/>
+          </a:xfrm>
+          <a:prstGeom prst="rect">
+            <a:avLst/>
+          </a:prstGeom>
+          <a:ln>
+            <a:solidFill>
+              <a:schemeClr val="tx1"/>
+            </a:solidFill>
+          </a:ln>
+        </p:spPr>
+      </p:pic>
     </p:spTree>
   </p:cSld>
   <p:clrMapOvr>
     <a:masterClrMapping/>
   </p:clrMapOvr>
+  <p:transition spd="med"/>
 </p:sld>
 </file>
 
@@ -32755,199 +32812,89 @@
         </p:nvSpPr>
         <p:spPr/>
         <p:txBody>
-          <a:bodyPr>
-            <a:scene3d>
-              <a:camera prst="orthographicFront"/>
-              <a:lightRig rig="soft" dir="t">
-                <a:rot lat="0" lon="0" rev="15600000"/>
-              </a:lightRig>
-            </a:scene3d>
-            <a:sp3d extrusionH="57150" prstMaterial="softEdge">
-              <a:bevelT w="25400" h="38100"/>
-            </a:sp3d>
-          </a:bodyPr>
-          <a:p>
-            <a:r>
-              <a:rPr lang="en-US" u="sng">
+          <a:bodyPr/>
+          <a:p>
+            <a:r>
+              <a:rPr lang="en-US" sz="3200" b="1">
                 <a:solidFill>
-                  <a:schemeClr val="accent4"/>
+                  <a:schemeClr val="tx1"/>
                 </a:solidFill>
                 <a:effectLst/>
               </a:rPr>
-              <a:t>Recommendation</a:t>
-            </a:r>
-            <a:r>
-              <a:rPr lang="en-US">
-                <a:solidFill>
-                  <a:schemeClr val="accent4"/>
-                </a:solidFill>
-              </a:rPr>
-              <a:t>:</a:t>
-            </a:r>
-            <a:endParaRPr lang="en-US">
+              <a:t>Observation:</a:t>
+            </a:r>
+            <a:endParaRPr lang="en-US" sz="3200" b="1">
               <a:solidFill>
-                <a:schemeClr val="accent4"/>
+                <a:schemeClr val="tx1"/>
               </a:solidFill>
+              <a:effectLst/>
             </a:endParaRPr>
           </a:p>
         </p:txBody>
       </p:sp>
       <p:sp>
         <p:nvSpPr>
-          <p:cNvPr id="3" name="Content Placeholder 2"/>
+          <p:cNvPr id="3" name="Text Placeholder 2"/>
           <p:cNvSpPr>
             <a:spLocks noGrp="1"/>
           </p:cNvSpPr>
           <p:nvPr>
-            <p:ph sz="half" idx="1"/>
+            <p:ph type="body" idx="1"/>
           </p:nvPr>
         </p:nvSpPr>
         <p:spPr>
           <a:xfrm>
-            <a:off x="838200" y="1412875"/>
-            <a:ext cx="10768965" cy="1875790"/>
+            <a:off x="1143000" y="1406525"/>
+            <a:ext cx="10515600" cy="887095"/>
           </a:xfrm>
         </p:spPr>
         <p:txBody>
-          <a:bodyPr/>
+          <a:bodyPr>
+            <a:normAutofit fontScale="70000"/>
+          </a:bodyPr>
           <a:p>
             <a:pPr marL="0" indent="0">
               <a:buNone/>
             </a:pPr>
             <a:r>
               <a:rPr lang="en-US"/>
-              <a:t>1) Upgrade to the latest version of Affected Software/theme/plugin/OS which means latest version number</a:t>
-            </a:r>
-            <a:endParaRPr lang="en-US"/>
-          </a:p>
-          <a:p>
-            <a:pPr marL="0" indent="0">
-              <a:buNone/>
-            </a:pPr>
-            <a:r>
-              <a:rPr lang="en-US"/>
-              <a:t> 2) If upgrade is not possible for the time being, isolate the server from any other critical data and servers</a:t>
+              <a:t>Navigate to registration forum page “http://13.233.207.87/forum/index.php?u=/user/register” and try to register a user with invalid email id, it gives an error.</a:t>
             </a:r>
             <a:endParaRPr lang="en-US"/>
           </a:p>
         </p:txBody>
       </p:sp>
-      <p:sp>
-        <p:nvSpPr>
-          <p:cNvPr id="6" name="Title 1"/>
-          <p:cNvSpPr>
-            <a:spLocks noGrp="1"/>
-          </p:cNvSpPr>
+      <p:pic>
+        <p:nvPicPr>
+          <p:cNvPr id="4" name="Picture 3" descr="C:\Users\Datagrokr\Documents\program\CEH-Hack-a-thon\reports\Lifestyle Store\vulnerabilities\Client Side Filter Bypass\forum-register\observation.pngobservation"/>
+          <p:cNvPicPr>
+            <a:picLocks noChangeAspect="1"/>
+          </p:cNvPicPr>
           <p:nvPr/>
-        </p:nvSpPr>
+        </p:nvPicPr>
+        <p:blipFill>
+          <a:blip r:embed="rId1"/>
+          <a:srcRect/>
+          <a:stretch>
+            <a:fillRect/>
+          </a:stretch>
+        </p:blipFill>
         <p:spPr>
           <a:xfrm>
-            <a:off x="838200" y="3175635"/>
-            <a:ext cx="10515600" cy="1325563"/>
+            <a:off x="1833245" y="2481263"/>
+            <a:ext cx="8869045" cy="3812540"/>
           </a:xfrm>
           <a:prstGeom prst="rect">
             <a:avLst/>
           </a:prstGeom>
         </p:spPr>
-        <p:txBody>
-          <a:bodyPr vert="horz" lIns="91440" tIns="45720" rIns="91440" bIns="45720" rtlCol="0" anchor="ctr">
-            <a:normAutofit/>
-            <a:scene3d>
-              <a:camera prst="orthographicFront"/>
-              <a:lightRig rig="soft" dir="t">
-                <a:rot lat="0" lon="0" rev="15600000"/>
-              </a:lightRig>
-            </a:scene3d>
-            <a:sp3d extrusionH="57150" prstMaterial="softEdge">
-              <a:bevelT w="25400" h="38100"/>
-            </a:sp3d>
-          </a:bodyPr>
-          <a:lstStyle>
-            <a:lvl1pPr algn="l" defTabSz="914400" rtl="0" eaLnBrk="1" latinLnBrk="0" hangingPunct="1">
-              <a:lnSpc>
-                <a:spcPct val="90000"/>
-              </a:lnSpc>
-              <a:spcBef>
-                <a:spcPct val="0"/>
-              </a:spcBef>
-              <a:buNone/>
-              <a:defRPr sz="4400" kern="1200">
-                <a:solidFill>
-                  <a:schemeClr val="tx1"/>
-                </a:solidFill>
-                <a:latin typeface="+mj-lt"/>
-                <a:ea typeface="+mj-ea"/>
-                <a:cs typeface="+mj-cs"/>
-              </a:defRPr>
-            </a:lvl1pPr>
-          </a:lstStyle>
-          <a:p>
-            <a:r>
-              <a:rPr lang="en-US" u="sng">
-                <a:solidFill>
-                  <a:schemeClr val="accent4"/>
-                </a:solidFill>
-                <a:effectLst/>
-              </a:rPr>
-              <a:t>References</a:t>
-            </a:r>
-            <a:r>
-              <a:rPr lang="en-US">
-                <a:solidFill>
-                  <a:schemeClr val="accent4"/>
-                </a:solidFill>
-              </a:rPr>
-              <a:t>:</a:t>
-            </a:r>
-            <a:endParaRPr lang="en-US">
-              <a:solidFill>
-                <a:schemeClr val="accent4"/>
-              </a:solidFill>
-            </a:endParaRPr>
-          </a:p>
-        </p:txBody>
-      </p:sp>
-      <p:sp>
-        <p:nvSpPr>
-          <p:cNvPr id="7" name="Text Box 6"/>
-          <p:cNvSpPr txBox="1"/>
-          <p:nvPr/>
-        </p:nvSpPr>
-        <p:spPr>
-          <a:xfrm>
-            <a:off x="957580" y="4452620"/>
-            <a:ext cx="10526395" cy="1814830"/>
-          </a:xfrm>
-          <a:prstGeom prst="rect">
-            <a:avLst/>
-          </a:prstGeom>
-          <a:noFill/>
-        </p:spPr>
-        <p:txBody>
-          <a:bodyPr wrap="square" rtlCol="0">
-            <a:spAutoFit/>
-          </a:bodyPr>
-          <a:p>
-            <a:r>
-              <a:rPr lang="en-US" sz="2800"/>
-              <a:t>1)https://www.cvedetails.com/vulnerability-list/vendor_id-74/product_id-128/version_id-298515/PHP-PHP-5.6.39.html</a:t>
-            </a:r>
-            <a:endParaRPr lang="en-US" sz="2800"/>
-          </a:p>
-          <a:p>
-            <a:r>
-              <a:rPr lang="en-US" sz="2800"/>
-              <a:t>2)https://www.owasp.org/index.php/Top_10-2017_A9-Using_Components_with_Known_Vulnerabilities</a:t>
-            </a:r>
-            <a:endParaRPr lang="en-US" sz="2800"/>
-          </a:p>
-        </p:txBody>
-      </p:sp>
+      </p:pic>
     </p:spTree>
   </p:cSld>
   <p:clrMapOvr>
     <a:masterClrMapping/>
   </p:clrMapOvr>
+  <p:transition spd="med"/>
 </p:sld>
 </file>
 

</xml_diff>

<commit_message>
reports: Descriptive Message and Descriptive Pages ppt done
</commit_message>
<xml_diff>
--- a/reports/Lifestyle Store/LifeStyle Store Application Reports.pptx
+++ b/reports/Lifestyle Store/LifeStyle Store Application Reports.pptx
@@ -4871,38 +4871,20 @@
           <a:bodyPr/>
           <a:p>
             <a:r>
-              <a:rPr lang="en-US"/>
-              <a:t>17)</a:t>
-            </a:r>
-            <a:r>
-              <a:rPr lang="en-US" u="sng">
-                <a:gradFill>
-                  <a:gsLst>
-                    <a:gs pos="21000">
-                      <a:srgbClr val="53575C"/>
-                    </a:gs>
-                    <a:gs pos="88000">
-                      <a:srgbClr val="C5C7CA"/>
-                    </a:gs>
-                  </a:gsLst>
-                  <a:lin ang="5400000"/>
-                </a:gradFill>
+              <a:rPr lang="en-US" sz="3200" b="1">
+                <a:ln/>
+                <a:solidFill>
+                  <a:schemeClr val="tx1"/>
+                </a:solidFill>
                 <a:effectLst/>
               </a:rPr>
-              <a:t>Default Error Display:</a:t>
-            </a:r>
-            <a:endParaRPr lang="en-US" u="sng">
-              <a:gradFill>
-                <a:gsLst>
-                  <a:gs pos="21000">
-                    <a:srgbClr val="53575C"/>
-                  </a:gs>
-                  <a:gs pos="88000">
-                    <a:srgbClr val="C5C7CA"/>
-                  </a:gs>
-                </a:gsLst>
-                <a:lin ang="5400000"/>
-              </a:gradFill>
+              <a:t>18. Descriptive Messages:</a:t>
+            </a:r>
+            <a:endParaRPr lang="en-US" sz="3200" b="1">
+              <a:ln/>
+              <a:solidFill>
+                <a:schemeClr val="tx1"/>
+              </a:solidFill>
               <a:effectLst/>
             </a:endParaRPr>
           </a:p>
@@ -5022,7 +5004,7 @@
                           </a:solidFill>
                           <a:latin typeface="Calibri" panose="020F0502020204030204" charset="0"/>
                         </a:rPr>
-                        <a:t>Default Error Display</a:t>
+                        <a:t>Descriptive Messages</a:t>
                       </a:r>
                       <a:r>
                         <a:rPr lang="en-IN" sz="1600" dirty="0" smtClean="0">
@@ -5263,7 +5245,7 @@
                           </a:solidFill>
                           <a:latin typeface="Calibri" panose="020F0502020204030204" charset="0"/>
                         </a:rPr>
-                        <a:t>en'.php</a:t>
+                        <a:t>en1.php</a:t>
                       </a:r>
                       <a:endParaRPr lang="en-US" sz="1300" b="0" dirty="0" smtClean="0">
                         <a:solidFill>
@@ -5604,39 +5586,24 @@
         </p:nvSpPr>
         <p:spPr/>
         <p:txBody>
-          <a:bodyPr>
-            <a:scene3d>
-              <a:camera prst="orthographicFront"/>
-              <a:lightRig rig="soft" dir="t">
-                <a:rot lat="0" lon="0" rev="15600000"/>
-              </a:lightRig>
-            </a:scene3d>
-            <a:sp3d extrusionH="57150" prstMaterial="softEdge">
-              <a:bevelT w="25400" h="38100"/>
-            </a:sp3d>
-          </a:bodyPr>
-          <a:p>
-            <a:r>
-              <a:rPr lang="en-US" u="sng">
+          <a:bodyPr/>
+          <a:p>
+            <a:r>
+              <a:rPr lang="en-US" sz="3200" b="1">
+                <a:ln/>
                 <a:solidFill>
-                  <a:schemeClr val="accent4"/>
+                  <a:schemeClr val="tx1"/>
                 </a:solidFill>
                 <a:effectLst/>
               </a:rPr>
-              <a:t>Observation</a:t>
-            </a:r>
-            <a:r>
-              <a:rPr lang="en-US">
-                <a:solidFill>
-                  <a:schemeClr val="accent4"/>
-                </a:solidFill>
-              </a:rPr>
-              <a:t>:</a:t>
-            </a:r>
-            <a:endParaRPr lang="en-US">
+              <a:t>Observation:</a:t>
+            </a:r>
+            <a:endParaRPr lang="en-US" sz="3200" b="1">
+              <a:ln/>
               <a:solidFill>
-                <a:schemeClr val="accent4"/>
+                <a:schemeClr val="tx1"/>
               </a:solidFill>
+              <a:effectLst/>
             </a:endParaRPr>
           </a:p>
         </p:txBody>
@@ -5653,7 +5620,7 @@
         </p:nvSpPr>
         <p:spPr>
           <a:xfrm>
-            <a:off x="838200" y="1825625"/>
+            <a:off x="1041400" y="1355725"/>
             <a:ext cx="10515600" cy="592455"/>
           </a:xfrm>
         </p:spPr>
@@ -5664,16 +5631,16 @@
               <a:buNone/>
             </a:pPr>
             <a:r>
-              <a:rPr lang="en-US"/>
+              <a:rPr lang="en-US" sz="2400"/>
               <a:t>The default error with the path is displayed as:</a:t>
             </a:r>
-            <a:endParaRPr lang="en-US"/>
+            <a:endParaRPr lang="en-US" sz="2400"/>
           </a:p>
         </p:txBody>
       </p:sp>
       <p:pic>
         <p:nvPicPr>
-          <p:cNvPr id="4" name="Picture 3" descr="language selection"/>
+          <p:cNvPr id="4" name="Picture 3" descr="C:\Users\Datagrokr\Documents\program\CEH-Hack-a-thon\reports\Lifestyle Store\vulnerabilities\Descriptive Messages\Language\observation.pngobservation"/>
           <p:cNvPicPr>
             <a:picLocks noChangeAspect="1"/>
           </p:cNvPicPr>
@@ -5681,14 +5648,15 @@
         </p:nvPicPr>
         <p:blipFill>
           <a:blip r:embed="rId1"/>
+          <a:srcRect/>
           <a:stretch>
             <a:fillRect/>
           </a:stretch>
         </p:blipFill>
         <p:spPr>
           <a:xfrm>
-            <a:off x="722630" y="2773045"/>
-            <a:ext cx="11385550" cy="2422525"/>
+            <a:off x="1026160" y="2430780"/>
+            <a:ext cx="10139680" cy="2777490"/>
           </a:xfrm>
           <a:prstGeom prst="rect">
             <a:avLst/>
@@ -5723,7 +5691,21 @@
             <p:ph type="title"/>
           </p:nvPr>
         </p:nvSpPr>
-        <p:spPr/>
+        <p:spPr>
+          <a:noFill/>
+          <a:ln>
+            <a:noFill/>
+          </a:ln>
+          <a:extLst>
+            <a:ext uri="{909E8E84-426E-40DD-AFC4-6F175D3DCCD1}">
+              <a14:hiddenFill xmlns:a14="http://schemas.microsoft.com/office/drawing/2010/main">
+                <a:solidFill>
+                  <a:schemeClr val="lt1"/>
+                </a:solidFill>
+              </a14:hiddenFill>
+            </a:ext>
+          </a:extLst>
+        </p:spPr>
         <p:style>
           <a:lnRef idx="2">
             <a:schemeClr val="accent2"/>
@@ -5739,43 +5721,22 @@
           </a:fontRef>
         </p:style>
         <p:txBody>
-          <a:bodyPr>
-            <a:scene3d>
-              <a:camera prst="orthographicFront"/>
-              <a:lightRig rig="threePt" dir="t"/>
-            </a:scene3d>
-          </a:bodyPr>
-          <a:p>
-            <a:r>
-              <a:rPr lang="en-US" u="sng">
-                <a:ln w="22225">
-                  <a:solidFill>
-                    <a:schemeClr val="accent2"/>
-                  </a:solidFill>
-                  <a:prstDash val="solid"/>
-                </a:ln>
+          <a:bodyPr/>
+          <a:p>
+            <a:r>
+              <a:rPr lang="en-US" sz="3200" b="1">
+                <a:ln/>
                 <a:solidFill>
-                  <a:schemeClr val="accent2">
-                    <a:lumMod val="40000"/>
-                    <a:lumOff val="60000"/>
-                  </a:schemeClr>
+                  <a:schemeClr val="tx1"/>
                 </a:solidFill>
                 <a:effectLst/>
               </a:rPr>
               <a:t>Proof Of Concept(PoC):</a:t>
             </a:r>
-            <a:endParaRPr lang="en-US" u="sng">
-              <a:ln w="22225">
-                <a:solidFill>
-                  <a:schemeClr val="accent2"/>
-                </a:solidFill>
-                <a:prstDash val="solid"/>
-              </a:ln>
+            <a:endParaRPr lang="en-US" sz="3200" b="1">
+              <a:ln/>
               <a:solidFill>
-                <a:schemeClr val="accent2">
-                  <a:lumMod val="40000"/>
-                  <a:lumOff val="60000"/>
-                </a:schemeClr>
+                <a:schemeClr val="tx1"/>
               </a:solidFill>
               <a:effectLst/>
             </a:endParaRPr>
@@ -5794,8 +5755,8 @@
         </p:nvSpPr>
         <p:spPr>
           <a:xfrm>
-            <a:off x="838200" y="1825625"/>
-            <a:ext cx="10516235" cy="4351655"/>
+            <a:off x="1079500" y="1597025"/>
+            <a:ext cx="10516235" cy="643255"/>
           </a:xfrm>
         </p:spPr>
         <p:txBody>
@@ -5805,16 +5766,16 @@
               <a:buNone/>
             </a:pPr>
             <a:r>
-              <a:rPr lang="en-US"/>
+              <a:rPr lang="en-US" sz="2400"/>
               <a:t>When we give ' in the search option of the home page,we get the error as:</a:t>
             </a:r>
-            <a:endParaRPr lang="en-US"/>
+            <a:endParaRPr lang="en-US" sz="2400"/>
           </a:p>
         </p:txBody>
       </p:sp>
       <p:pic>
         <p:nvPicPr>
-          <p:cNvPr id="4" name="Content Placeholder 3" descr="Capture"/>
+          <p:cNvPr id="4" name="Content Placeholder 3" descr="C:\Users\Datagrokr\Documents\program\CEH-Hack-a-thon\reports\Lifestyle Store\vulnerabilities\Descriptive Messages\Search\observation.pngobservation"/>
           <p:cNvPicPr>
             <a:picLocks noChangeAspect="1"/>
           </p:cNvPicPr>
@@ -5824,14 +5785,15 @@
         </p:nvPicPr>
         <p:blipFill>
           <a:blip r:embed="rId1"/>
+          <a:srcRect/>
           <a:stretch>
             <a:fillRect/>
           </a:stretch>
         </p:blipFill>
         <p:spPr>
           <a:xfrm>
-            <a:off x="673100" y="3695700"/>
-            <a:ext cx="10591165" cy="1494790"/>
+            <a:off x="1195070" y="2451735"/>
+            <a:ext cx="10400665" cy="2307590"/>
           </a:xfrm>
           <a:prstGeom prst="rect">
             <a:avLst/>
@@ -5871,31 +5833,26 @@
           <a:bodyPr/>
           <a:p>
             <a:r>
-              <a:rPr lang="en-US" u="sng">
-                <a:ln w="10160">
-                  <a:solidFill>
-                    <a:schemeClr val="accent5"/>
-                  </a:solidFill>
-                  <a:prstDash val="solid"/>
-                </a:ln>
+              <a:rPr lang="en-US" sz="3200" b="1">
+                <a:ln/>
                 <a:solidFill>
-                  <a:srgbClr val="FFFFFF"/>
+                  <a:schemeClr val="tx1"/>
                 </a:solidFill>
-                <a:effectLst>
-                  <a:outerShdw blurRad="38100" dist="22860" dir="5400000" algn="tl" rotWithShape="0">
-                    <a:srgbClr val="000000">
-                      <a:alpha val="30000"/>
-                    </a:srgbClr>
-                  </a:outerShdw>
-                </a:effectLst>
+                <a:effectLst/>
+                <a:latin typeface="+mn-lt"/>
+                <a:cs typeface="+mn-lt"/>
               </a:rPr>
-              <a:t>Business Impact(Moderate)</a:t>
-            </a:r>
-            <a:r>
-              <a:rPr lang="en-US"/>
-              <a:t>:</a:t>
-            </a:r>
-            <a:endParaRPr lang="en-US"/>
+              <a:t>Business Impact(Moderate):</a:t>
+            </a:r>
+            <a:endParaRPr lang="en-US" sz="3200" b="1">
+              <a:ln/>
+              <a:solidFill>
+                <a:schemeClr val="tx1"/>
+              </a:solidFill>
+              <a:effectLst/>
+              <a:latin typeface="+mn-lt"/>
+              <a:cs typeface="+mn-lt"/>
+            </a:endParaRPr>
           </a:p>
         </p:txBody>
       </p:sp>
@@ -6007,10 +5964,6 @@
         <p:txBody>
           <a:bodyPr vert="horz" lIns="91440" tIns="45720" rIns="91440" bIns="45720" rtlCol="0" anchor="ctr">
             <a:normAutofit/>
-            <a:scene3d>
-              <a:camera prst="orthographicFront"/>
-              <a:lightRig rig="threePt" dir="t"/>
-            </a:scene3d>
           </a:bodyPr>
           <a:lstStyle>
             <a:lvl1pPr algn="l" defTabSz="914400" rtl="0" eaLnBrk="1" latinLnBrk="0" hangingPunct="1">
@@ -6033,43 +5986,37 @@
           </a:lstStyle>
           <a:p>
             <a:r>
-              <a:rPr lang="en-US" u="sng">
-                <a:ln w="10160">
-                  <a:solidFill>
-                    <a:schemeClr val="accent5"/>
-                  </a:solidFill>
-                  <a:prstDash val="solid"/>
-                </a:ln>
+              <a:rPr lang="en-US" sz="3200" b="1">
+                <a:ln/>
                 <a:solidFill>
-                  <a:srgbClr val="FFFFFF"/>
+                  <a:schemeClr val="tx1"/>
                 </a:solidFill>
                 <a:effectLst>
-                  <a:outerShdw blurRad="38100" dist="22860" dir="5400000" algn="tl" rotWithShape="0">
-                    <a:srgbClr val="000000">
-                      <a:alpha val="30000"/>
-                    </a:srgbClr>
+                  <a:outerShdw blurRad="38100" dist="19050" dir="2700000" algn="tl" rotWithShape="0">
+                    <a:schemeClr val="dk1">
+                      <a:alpha val="40000"/>
+                    </a:schemeClr>
                   </a:outerShdw>
                 </a:effectLst>
+                <a:latin typeface="+mn-lt"/>
+                <a:cs typeface="+mn-lt"/>
               </a:rPr>
               <a:t>Recommendation:</a:t>
             </a:r>
-            <a:endParaRPr lang="en-US" u="sng">
-              <a:ln w="10160">
-                <a:solidFill>
-                  <a:schemeClr val="accent5"/>
-                </a:solidFill>
-                <a:prstDash val="solid"/>
-              </a:ln>
+            <a:endParaRPr lang="en-US" sz="3200" b="1">
+              <a:ln/>
               <a:solidFill>
-                <a:srgbClr val="FFFFFF"/>
+                <a:schemeClr val="tx1"/>
               </a:solidFill>
               <a:effectLst>
-                <a:outerShdw blurRad="38100" dist="22860" dir="5400000" algn="tl" rotWithShape="0">
-                  <a:srgbClr val="000000">
-                    <a:alpha val="30000"/>
-                  </a:srgbClr>
+                <a:outerShdw blurRad="38100" dist="19050" dir="2700000" algn="tl" rotWithShape="0">
+                  <a:schemeClr val="dk1">
+                    <a:alpha val="40000"/>
+                  </a:schemeClr>
                 </a:outerShdw>
               </a:effectLst>
+              <a:latin typeface="+mn-lt"/>
+              <a:cs typeface="+mn-lt"/>
             </a:endParaRPr>
           </a:p>
         </p:txBody>
@@ -6133,30 +6080,22 @@
         </p:nvSpPr>
         <p:spPr/>
         <p:txBody>
-          <a:bodyPr>
-            <a:scene3d>
-              <a:camera prst="orthographicFront"/>
-              <a:lightRig rig="soft" dir="t">
-                <a:rot lat="0" lon="0" rev="15600000"/>
-              </a:lightRig>
-            </a:scene3d>
-            <a:sp3d extrusionH="57150" prstMaterial="softEdge">
-              <a:bevelT w="25400" h="38100"/>
-            </a:sp3d>
-          </a:bodyPr>
-          <a:p>
-            <a:r>
-              <a:rPr lang="en-US" u="sng">
+          <a:bodyPr/>
+          <a:p>
+            <a:r>
+              <a:rPr lang="en-US" sz="3200" b="1">
+                <a:ln/>
                 <a:solidFill>
-                  <a:schemeClr val="accent4"/>
+                  <a:schemeClr val="tx1"/>
                 </a:solidFill>
                 <a:effectLst/>
               </a:rPr>
               <a:t>References:</a:t>
             </a:r>
-            <a:endParaRPr lang="en-US" u="sng">
+            <a:endParaRPr lang="en-US" sz="3200" b="1">
+              <a:ln/>
               <a:solidFill>
-                <a:schemeClr val="accent4"/>
+                <a:schemeClr val="tx1"/>
               </a:solidFill>
               <a:effectLst/>
             </a:endParaRPr>
@@ -6178,19 +6117,61 @@
             <a:avLst/>
           </a:prstGeom>
           <a:noFill/>
+          <a:ln>
+            <a:noFill/>
+          </a:ln>
+          <a:extLst>
+            <a:ext uri="{909E8E84-426E-40DD-AFC4-6F175D3DCCD1}">
+              <a14:hiddenFill xmlns:a14="http://schemas.microsoft.com/office/drawing/2010/main">
+                <a:solidFill>
+                  <a:schemeClr val="lt1"/>
+                </a:solidFill>
+              </a14:hiddenFill>
+            </a:ext>
+          </a:extLst>
         </p:spPr>
+        <p:style>
+          <a:lnRef idx="2">
+            <a:schemeClr val="dk1"/>
+          </a:lnRef>
+          <a:fillRef idx="1">
+            <a:schemeClr val="lt1"/>
+          </a:fillRef>
+          <a:effectRef idx="0">
+            <a:schemeClr val="dk1"/>
+          </a:effectRef>
+          <a:fontRef idx="minor">
+            <a:schemeClr val="dk1"/>
+          </a:fontRef>
+        </p:style>
         <p:txBody>
           <a:bodyPr wrap="square" rtlCol="0">
             <a:spAutoFit/>
           </a:bodyPr>
           <a:p>
+            <a:pPr marL="457200" indent="-457200">
+              <a:buFont typeface="Arial" panose="020B0604020202020204" pitchFamily="34" charset="0"/>
+              <a:buChar char="•"/>
+            </a:pPr>
             <a:r>
               <a:rPr lang="en-US" sz="2800">
+                <a:ln/>
+                <a:solidFill>
+                  <a:schemeClr val="tx1"/>
+                </a:solidFill>
+                <a:effectLst/>
                 <a:hlinkClick r:id="rId1" action="ppaction://hlinkfile"/>
               </a:rPr>
               <a:t>https://www.owasp.org/index.php/Improper_Error_Handling</a:t>
             </a:r>
-            <a:endParaRPr lang="en-US" sz="2800"/>
+            <a:endParaRPr lang="en-US" sz="2800">
+              <a:ln/>
+              <a:solidFill>
+                <a:schemeClr val="tx1"/>
+              </a:solidFill>
+              <a:effectLst/>
+              <a:hlinkClick r:id="rId1" action="ppaction://hlinkfile"/>
+            </a:endParaRPr>
           </a:p>
         </p:txBody>
       </p:sp>
@@ -6376,35 +6357,21 @@
           <a:bodyPr/>
           <a:p>
             <a:r>
-              <a:rPr lang="en-US"/>
-              <a:t>18.</a:t>
-            </a:r>
-            <a:r>
-              <a:rPr lang="en-US" u="sng">
+              <a:rPr lang="en-US" sz="3200" b="1">
+                <a:ln/>
                 <a:solidFill>
-                  <a:schemeClr val="accent1"/>
+                  <a:schemeClr val="tx1"/>
                 </a:solidFill>
-                <a:effectLst>
-                  <a:outerShdw blurRad="38100" dist="25400" dir="5400000" algn="ctr" rotWithShape="0">
-                    <a:srgbClr val="6E747A">
-                      <a:alpha val="43000"/>
-                    </a:srgbClr>
-                  </a:outerShdw>
-                </a:effectLst>
+                <a:effectLst/>
               </a:rPr>
-              <a:t>Default Debug Pages</a:t>
-            </a:r>
-            <a:endParaRPr lang="en-US" u="sng">
+              <a:t>19. Descriptive Pages:</a:t>
+            </a:r>
+            <a:endParaRPr lang="en-US" sz="3200" b="1">
+              <a:ln/>
               <a:solidFill>
-                <a:schemeClr val="accent1"/>
+                <a:schemeClr val="tx1"/>
               </a:solidFill>
-              <a:effectLst>
-                <a:outerShdw blurRad="38100" dist="25400" dir="5400000" algn="ctr" rotWithShape="0">
-                  <a:srgbClr val="6E747A">
-                    <a:alpha val="43000"/>
-                  </a:srgbClr>
-                </a:outerShdw>
-              </a:effectLst>
+              <a:effectLst/>
             </a:endParaRPr>
           </a:p>
         </p:txBody>
@@ -6523,7 +6490,7 @@
                           </a:solidFill>
                           <a:latin typeface="Calibri" panose="020F0502020204030204" charset="0"/>
                         </a:rPr>
-                        <a:t>Default Debug Pages</a:t>
+                        <a:t>Descriptive Pages</a:t>
                       </a:r>
                       <a:r>
                         <a:rPr lang="en-IN" sz="1600" dirty="0" smtClean="0">
@@ -6694,7 +6661,7 @@
                           <a:cs typeface="Calibri" panose="020F0502020204030204" charset="0"/>
                           <a:sym typeface="Arial" panose="020B0604020202020204"/>
                         </a:rPr>
-                        <a:t>http://35.154.118.58/</a:t>
+                        <a:t>http://35.154.118.58</a:t>
                       </a:r>
                       <a:endParaRPr lang="en-US" sz="1300" b="0" i="0" u="none" strike="noStrike" dirty="0" smtClean="0">
                         <a:solidFill>
@@ -6917,35 +6884,19 @@
           <a:bodyPr/>
           <a:p>
             <a:r>
-              <a:rPr lang="en-US" u="sng">
-                <a:ln w="22225">
-                  <a:solidFill>
-                    <a:schemeClr val="accent2"/>
-                  </a:solidFill>
-                  <a:prstDash val="solid"/>
-                </a:ln>
+              <a:rPr lang="en-US" sz="3200" b="1">
+                <a:ln/>
                 <a:solidFill>
-                  <a:schemeClr val="accent2">
-                    <a:lumMod val="40000"/>
-                    <a:lumOff val="60000"/>
-                  </a:schemeClr>
+                  <a:schemeClr val="tx1"/>
                 </a:solidFill>
                 <a:effectLst/>
               </a:rPr>
               <a:t>Proof Of Concept(PoC):</a:t>
             </a:r>
-            <a:endParaRPr lang="en-US" u="sng">
-              <a:ln w="22225">
-                <a:solidFill>
-                  <a:schemeClr val="accent2"/>
-                </a:solidFill>
-                <a:prstDash val="solid"/>
-              </a:ln>
+            <a:endParaRPr lang="en-US" sz="3200" b="1">
+              <a:ln/>
               <a:solidFill>
-                <a:schemeClr val="accent2">
-                  <a:lumMod val="40000"/>
-                  <a:lumOff val="60000"/>
-                </a:schemeClr>
+                <a:schemeClr val="tx1"/>
               </a:solidFill>
               <a:effectLst/>
             </a:endParaRPr>
@@ -6964,29 +6915,29 @@
         </p:nvSpPr>
         <p:spPr>
           <a:xfrm>
-            <a:off x="838200" y="1825625"/>
+            <a:off x="1168400" y="1508125"/>
             <a:ext cx="10515600" cy="503555"/>
           </a:xfrm>
         </p:spPr>
         <p:txBody>
           <a:bodyPr>
-            <a:normAutofit lnSpcReduction="20000"/>
+            <a:normAutofit/>
           </a:bodyPr>
           <a:p>
             <a:pPr marL="0" indent="0">
               <a:buNone/>
             </a:pPr>
             <a:r>
-              <a:rPr lang="en-US"/>
+              <a:rPr lang="en-US" sz="2400"/>
               <a:t>When we entered robots.txt at the end of the index page URL,we got:</a:t>
             </a:r>
-            <a:endParaRPr lang="en-US"/>
+            <a:endParaRPr lang="en-US" sz="2400"/>
           </a:p>
         </p:txBody>
       </p:sp>
       <p:pic>
         <p:nvPicPr>
-          <p:cNvPr id="4" name="Picture 3" descr="Capture"/>
+          <p:cNvPr id="4" name="Picture 3" descr="C:\Users\Datagrokr\Documents\program\CEH-Hack-a-thon\reports\Lifestyle Store\vulnerabilities\Descriptive Pages\robots.txt.pngrobots.txt"/>
           <p:cNvPicPr>
             <a:picLocks noChangeAspect="1"/>
           </p:cNvPicPr>
@@ -6994,14 +6945,15 @@
         </p:nvPicPr>
         <p:blipFill>
           <a:blip r:embed="rId1"/>
+          <a:srcRect/>
           <a:stretch>
             <a:fillRect/>
           </a:stretch>
         </p:blipFill>
         <p:spPr>
           <a:xfrm>
-            <a:off x="2079625" y="2816225"/>
-            <a:ext cx="7702550" cy="1970405"/>
+            <a:off x="1269365" y="2455545"/>
+            <a:ext cx="10084435" cy="2362835"/>
           </a:xfrm>
           <a:prstGeom prst="rect">
             <a:avLst/>
@@ -7038,7 +6990,7 @@
         </p:nvSpPr>
         <p:spPr>
           <a:xfrm>
-            <a:off x="838200" y="1015365"/>
+            <a:off x="1257300" y="1015365"/>
             <a:ext cx="10515600" cy="563880"/>
           </a:xfrm>
         </p:spPr>
@@ -7049,10 +7001,10 @@
               <a:buNone/>
             </a:pPr>
             <a:r>
-              <a:rPr lang="en-US"/>
+              <a:rPr lang="en-US" sz="2400"/>
               <a:t>When we entered phpinfo.php at the end ,we got:</a:t>
             </a:r>
-            <a:endParaRPr lang="en-US"/>
+            <a:endParaRPr lang="en-US" sz="2400"/>
           </a:p>
         </p:txBody>
       </p:sp>
@@ -7068,43 +7020,27 @@
         </p:nvSpPr>
         <p:spPr>
           <a:xfrm>
-            <a:off x="838200" y="-17145"/>
-            <a:ext cx="10515600" cy="1325563"/>
+            <a:off x="838200" y="350520"/>
+            <a:ext cx="10515600" cy="806450"/>
           </a:xfrm>
         </p:spPr>
         <p:txBody>
           <a:bodyPr/>
           <a:p>
             <a:r>
-              <a:rPr lang="en-US" u="sng">
-                <a:ln w="22225">
-                  <a:solidFill>
-                    <a:schemeClr val="accent2"/>
-                  </a:solidFill>
-                  <a:prstDash val="solid"/>
-                </a:ln>
+              <a:rPr lang="en-US" sz="3200" b="1">
+                <a:ln/>
                 <a:solidFill>
-                  <a:schemeClr val="accent2">
-                    <a:lumMod val="40000"/>
-                    <a:lumOff val="60000"/>
-                  </a:schemeClr>
+                  <a:schemeClr val="tx1"/>
                 </a:solidFill>
                 <a:effectLst/>
               </a:rPr>
               <a:t>Proof Of Concept(PoC):</a:t>
             </a:r>
-            <a:endParaRPr lang="en-US" u="sng">
-              <a:ln w="22225">
-                <a:solidFill>
-                  <a:schemeClr val="accent2"/>
-                </a:solidFill>
-                <a:prstDash val="solid"/>
-              </a:ln>
+            <a:endParaRPr lang="en-US" sz="3200" b="1">
+              <a:ln/>
               <a:solidFill>
-                <a:schemeClr val="accent2">
-                  <a:lumMod val="40000"/>
-                  <a:lumOff val="60000"/>
-                </a:schemeClr>
+                <a:schemeClr val="tx1"/>
               </a:solidFill>
               <a:effectLst/>
             </a:endParaRPr>
@@ -7113,7 +7049,7 @@
       </p:sp>
       <p:pic>
         <p:nvPicPr>
-          <p:cNvPr id="5" name="Picture 4" descr="version detected"/>
+          <p:cNvPr id="5" name="Picture 4" descr="C:\Users\Datagrokr\Documents\program\CEH-Hack-a-thon\reports\Lifestyle Store\vulnerabilities\Descriptive Pages\phpinfo.php.pngphpinfo.php"/>
           <p:cNvPicPr>
             <a:picLocks noChangeAspect="1"/>
           </p:cNvPicPr>
@@ -7121,14 +7057,15 @@
         </p:nvPicPr>
         <p:blipFill>
           <a:blip r:embed="rId1"/>
+          <a:srcRect/>
           <a:stretch>
             <a:fillRect/>
           </a:stretch>
         </p:blipFill>
         <p:spPr>
           <a:xfrm>
-            <a:off x="838200" y="1579245"/>
-            <a:ext cx="10058400" cy="5061585"/>
+            <a:off x="1481455" y="1579245"/>
+            <a:ext cx="8771890" cy="5061585"/>
           </a:xfrm>
           <a:prstGeom prst="rect">
             <a:avLst/>
@@ -7165,23 +7102,23 @@
         </p:nvSpPr>
         <p:spPr>
           <a:xfrm>
-            <a:off x="838200" y="1825625"/>
+            <a:off x="1054100" y="1304925"/>
             <a:ext cx="10515600" cy="504190"/>
           </a:xfrm>
         </p:spPr>
         <p:txBody>
           <a:bodyPr>
-            <a:normAutofit lnSpcReduction="20000"/>
+            <a:normAutofit/>
           </a:bodyPr>
           <a:p>
             <a:pPr marL="0" indent="0">
               <a:buNone/>
             </a:pPr>
             <a:r>
-              <a:rPr lang="en-US"/>
+              <a:rPr lang="en-US" sz="2400"/>
               <a:t>When we entered server-info at the end of index URL:</a:t>
             </a:r>
-            <a:endParaRPr lang="en-US"/>
+            <a:endParaRPr lang="en-US" sz="2400"/>
           </a:p>
         </p:txBody>
       </p:sp>
@@ -7200,35 +7137,19 @@
           <a:bodyPr/>
           <a:p>
             <a:r>
-              <a:rPr lang="en-US" u="sng">
-                <a:ln w="22225">
-                  <a:solidFill>
-                    <a:schemeClr val="accent2"/>
-                  </a:solidFill>
-                  <a:prstDash val="solid"/>
-                </a:ln>
+              <a:rPr lang="en-US" sz="3200" b="1">
+                <a:ln/>
                 <a:solidFill>
-                  <a:schemeClr val="accent2">
-                    <a:lumMod val="40000"/>
-                    <a:lumOff val="60000"/>
-                  </a:schemeClr>
+                  <a:schemeClr val="tx1"/>
                 </a:solidFill>
                 <a:effectLst/>
               </a:rPr>
               <a:t>Proof Of Concept(PoC):</a:t>
             </a:r>
-            <a:endParaRPr lang="en-US" u="sng">
-              <a:ln w="22225">
-                <a:solidFill>
-                  <a:schemeClr val="accent2"/>
-                </a:solidFill>
-                <a:prstDash val="solid"/>
-              </a:ln>
+            <a:endParaRPr lang="en-US" sz="3200" b="1">
+              <a:ln/>
               <a:solidFill>
-                <a:schemeClr val="accent2">
-                  <a:lumMod val="40000"/>
-                  <a:lumOff val="60000"/>
-                </a:schemeClr>
+                <a:schemeClr val="tx1"/>
               </a:solidFill>
               <a:effectLst/>
             </a:endParaRPr>
@@ -7237,7 +7158,7 @@
       </p:sp>
       <p:pic>
         <p:nvPicPr>
-          <p:cNvPr id="5" name="Picture 4" descr="server status"/>
+          <p:cNvPr id="5" name="Picture 4" descr="C:\Users\Datagrokr\Documents\program\CEH-Hack-a-thon\reports\Lifestyle Store\vulnerabilities\Descriptive Pages\server-status.pngserver-status"/>
           <p:cNvPicPr>
             <a:picLocks noChangeAspect="1"/>
           </p:cNvPicPr>
@@ -7245,14 +7166,15 @@
         </p:nvPicPr>
         <p:blipFill>
           <a:blip r:embed="rId1"/>
+          <a:srcRect/>
           <a:stretch>
             <a:fillRect/>
           </a:stretch>
         </p:blipFill>
         <p:spPr>
           <a:xfrm>
-            <a:off x="1194435" y="2329815"/>
-            <a:ext cx="8395335" cy="4453255"/>
+            <a:off x="2156778" y="1910715"/>
+            <a:ext cx="6546850" cy="4453255"/>
           </a:xfrm>
           <a:prstGeom prst="rect">
             <a:avLst/>
@@ -7289,7 +7211,7 @@
         </p:nvSpPr>
         <p:spPr>
           <a:xfrm>
-            <a:off x="838200" y="1825625"/>
+            <a:off x="1122045" y="1317625"/>
             <a:ext cx="10515600" cy="533400"/>
           </a:xfrm>
         </p:spPr>
@@ -7300,10 +7222,10 @@
               <a:buNone/>
             </a:pPr>
             <a:r>
-              <a:rPr lang="en-US"/>
+              <a:rPr lang="en-US" sz="2400"/>
               <a:t>When we typed and entered userlist.txt at the end:</a:t>
             </a:r>
-            <a:endParaRPr lang="en-US"/>
+            <a:endParaRPr lang="en-US" sz="2400"/>
           </a:p>
         </p:txBody>
       </p:sp>
@@ -7322,35 +7244,19 @@
           <a:bodyPr/>
           <a:p>
             <a:r>
-              <a:rPr lang="en-US" u="sng">
-                <a:ln w="22225">
-                  <a:solidFill>
-                    <a:schemeClr val="accent2"/>
-                  </a:solidFill>
-                  <a:prstDash val="solid"/>
-                </a:ln>
+              <a:rPr lang="en-US" sz="3200" b="1">
+                <a:ln/>
                 <a:solidFill>
-                  <a:schemeClr val="accent2">
-                    <a:lumMod val="40000"/>
-                    <a:lumOff val="60000"/>
-                  </a:schemeClr>
+                  <a:schemeClr val="tx1"/>
                 </a:solidFill>
                 <a:effectLst/>
               </a:rPr>
               <a:t>Proof Of Concept(PoC):</a:t>
             </a:r>
-            <a:endParaRPr lang="en-US" u="sng">
-              <a:ln w="22225">
-                <a:solidFill>
-                  <a:schemeClr val="accent2"/>
-                </a:solidFill>
-                <a:prstDash val="solid"/>
-              </a:ln>
+            <a:endParaRPr lang="en-US" sz="3200" b="1">
+              <a:ln/>
               <a:solidFill>
-                <a:schemeClr val="accent2">
-                  <a:lumMod val="40000"/>
-                  <a:lumOff val="60000"/>
-                </a:schemeClr>
+                <a:schemeClr val="tx1"/>
               </a:solidFill>
               <a:effectLst/>
             </a:endParaRPr>
@@ -7359,7 +7265,7 @@
       </p:sp>
       <p:pic>
         <p:nvPicPr>
-          <p:cNvPr id="5" name="Picture 4" descr="userlist"/>
+          <p:cNvPr id="5" name="Picture 4" descr="C:\Users\Datagrokr\Documents\program\CEH-Hack-a-thon\reports\Lifestyle Store\vulnerabilities\Descriptive Pages\userlist.txt.pnguserlist.txt"/>
           <p:cNvPicPr>
             <a:picLocks noChangeAspect="1"/>
           </p:cNvPicPr>
@@ -7367,14 +7273,15 @@
         </p:nvPicPr>
         <p:blipFill>
           <a:blip r:embed="rId1"/>
+          <a:srcRect/>
           <a:stretch>
             <a:fillRect/>
           </a:stretch>
         </p:blipFill>
         <p:spPr>
           <a:xfrm>
-            <a:off x="2093595" y="2566035"/>
-            <a:ext cx="8571865" cy="2959100"/>
+            <a:off x="2152650" y="2248535"/>
+            <a:ext cx="7886065" cy="2959100"/>
           </a:xfrm>
           <a:prstGeom prst="rect">
             <a:avLst/>
@@ -7418,7 +7325,7 @@
         </p:nvSpPr>
         <p:spPr>
           <a:xfrm>
-            <a:off x="548668" y="670201"/>
+            <a:off x="459768" y="670201"/>
             <a:ext cx="7974481" cy="948905"/>
           </a:xfrm>
         </p:spPr>
@@ -7429,10 +7336,26 @@
           <a:lstStyle/>
           <a:p>
             <a:r>
-              <a:rPr lang="en-IN" dirty="0" smtClean="0"/>
+              <a:rPr lang="en-IN" sz="3200" b="1" dirty="0" smtClean="0">
+                <a:ln/>
+                <a:solidFill>
+                  <a:schemeClr val="tx1"/>
+                </a:solidFill>
+                <a:effectLst/>
+                <a:latin typeface="+mn-lt"/>
+                <a:cs typeface="+mn-lt"/>
+              </a:rPr>
               <a:t>Business Impact – Moderate</a:t>
             </a:r>
-            <a:endParaRPr lang="en-IN" dirty="0"/>
+            <a:endParaRPr lang="en-IN" sz="3200" b="1" dirty="0" smtClean="0">
+              <a:ln/>
+              <a:solidFill>
+                <a:schemeClr val="tx1"/>
+              </a:solidFill>
+              <a:effectLst/>
+              <a:latin typeface="+mn-lt"/>
+              <a:cs typeface="+mn-lt"/>
+            </a:endParaRPr>
           </a:p>
         </p:txBody>
       </p:sp>
@@ -7467,7 +7390,7 @@
         </p:nvSpPr>
         <p:spPr>
           <a:xfrm>
-            <a:off x="548416" y="1518249"/>
+            <a:off x="726216" y="1518249"/>
             <a:ext cx="9576659" cy="948726"/>
           </a:xfrm>
           <a:prstGeom prst="rect">
@@ -7560,10 +7483,26 @@
           </a:lstStyle>
           <a:p>
             <a:r>
-              <a:rPr lang="en-IN" dirty="0" smtClean="0"/>
+              <a:rPr lang="en-IN" sz="3200" b="1" dirty="0" smtClean="0">
+                <a:ln/>
+                <a:solidFill>
+                  <a:schemeClr val="tx1"/>
+                </a:solidFill>
+                <a:effectLst/>
+                <a:latin typeface="+mn-lt"/>
+                <a:cs typeface="+mn-lt"/>
+              </a:rPr>
               <a:t>Recommendation</a:t>
             </a:r>
-            <a:endParaRPr lang="en-IN" dirty="0"/>
+            <a:endParaRPr lang="en-IN" sz="3200" b="1" dirty="0" smtClean="0">
+              <a:ln/>
+              <a:solidFill>
+                <a:schemeClr val="tx1"/>
+              </a:solidFill>
+              <a:effectLst/>
+              <a:latin typeface="+mn-lt"/>
+              <a:cs typeface="+mn-lt"/>
+            </a:endParaRPr>
           </a:p>
         </p:txBody>
       </p:sp>
@@ -7634,7 +7573,7 @@
         </p:nvSpPr>
         <p:spPr>
           <a:xfrm>
-            <a:off x="436273" y="3989807"/>
+            <a:off x="461673" y="3989807"/>
             <a:ext cx="10515600" cy="1325563"/>
           </a:xfrm>
           <a:prstGeom prst="rect">
@@ -7666,10 +7605,26 @@
           </a:lstStyle>
           <a:p>
             <a:r>
-              <a:rPr lang="en-IN" dirty="0" smtClean="0"/>
+              <a:rPr lang="en-IN" sz="3200" b="1" dirty="0" smtClean="0">
+                <a:ln/>
+                <a:solidFill>
+                  <a:schemeClr val="tx1"/>
+                </a:solidFill>
+                <a:effectLst/>
+                <a:latin typeface="+mn-lt"/>
+                <a:cs typeface="+mn-lt"/>
+              </a:rPr>
               <a:t>References:</a:t>
             </a:r>
-            <a:endParaRPr lang="en-IN" dirty="0"/>
+            <a:endParaRPr lang="en-IN" sz="3200" b="1" dirty="0" smtClean="0">
+              <a:ln/>
+              <a:solidFill>
+                <a:schemeClr val="tx1"/>
+              </a:solidFill>
+              <a:effectLst/>
+              <a:latin typeface="+mn-lt"/>
+              <a:cs typeface="+mn-lt"/>
+            </a:endParaRPr>
           </a:p>
         </p:txBody>
       </p:sp>
@@ -7681,8 +7636,8 @@
         </p:nvSpPr>
         <p:spPr>
           <a:xfrm>
-            <a:off x="436273" y="5194120"/>
-            <a:ext cx="11353800" cy="1200329"/>
+            <a:off x="728345" y="4940300"/>
+            <a:ext cx="10891520" cy="1198880"/>
           </a:xfrm>
           <a:prstGeom prst="rect">
             <a:avLst/>
@@ -7694,6 +7649,10 @@
           </a:bodyPr>
           <a:lstStyle/>
           <a:p>
+            <a:pPr marL="285750" indent="-285750">
+              <a:buFont typeface="Arial" panose="020B0604020202020204" pitchFamily="34" charset="0"/>
+              <a:buChar char="•"/>
+            </a:pPr>
             <a:r>
               <a:rPr lang="en-US" i="1" dirty="0" smtClean="0">
                 <a:latin typeface="Calibri" panose="020F0502020204030204" charset="0"/>
@@ -7705,6 +7664,10 @@
             </a:endParaRPr>
           </a:p>
           <a:p>
+            <a:pPr marL="285750" indent="-285750">
+              <a:buFont typeface="Arial" panose="020B0604020202020204" pitchFamily="34" charset="0"/>
+              <a:buChar char="•"/>
+            </a:pPr>
             <a:r>
               <a:rPr lang="en-IN" i="1" dirty="0" smtClean="0"/>
               <a:t>https://httpd.apache.org/docs/current/mod/mod_status.html</a:t>
@@ -7712,6 +7675,10 @@
             <a:endParaRPr lang="en-IN" i="1" dirty="0" smtClean="0"/>
           </a:p>
           <a:p>
+            <a:pPr marL="285750" indent="-285750">
+              <a:buFont typeface="Arial" panose="020B0604020202020204" pitchFamily="34" charset="0"/>
+              <a:buChar char="•"/>
+            </a:pPr>
             <a:r>
               <a:rPr lang="en-IN" i="1" dirty="0" smtClean="0"/>
               <a:t>https://www.beyondsecurity.com/scan_pentest_network_vulnerabilities_apache_http_server_httponly_cookie_information_disclosure</a:t>

</xml_diff>